<commit_message>
added changes to the agenda
</commit_message>
<xml_diff>
--- a/documents/presentation/presentation jit compiler.pptx
+++ b/documents/presentation/presentation jit compiler.pptx
@@ -1,12 +1,22 @@
 
 <file path=ppt/presentation.xml><?xml version="1.0" encoding="utf-8"?>
-<p:presentation xmlns:a="http://schemas.openxmlformats.org/drawingml/2006/main" xmlns:r="http://schemas.openxmlformats.org/officeDocument/2006/relationships" xmlns:p="http://schemas.openxmlformats.org/presentationml/2006/main" saveSubsetFonts="1">
+<p:presentation xmlns:a="http://schemas.openxmlformats.org/drawingml/2006/main" xmlns:r="http://schemas.openxmlformats.org/officeDocument/2006/relationships" xmlns:p="http://schemas.openxmlformats.org/presentationml/2006/main" showSpecialPlsOnTitleSld="0" saveSubsetFonts="1">
   <p:sldMasterIdLst>
     <p:sldMasterId id="2147483660" r:id="rId1"/>
   </p:sldMasterIdLst>
+  <p:notesMasterIdLst>
+    <p:notesMasterId r:id="rId11"/>
+  </p:notesMasterIdLst>
   <p:sldIdLst>
     <p:sldId id="256" r:id="rId2"/>
     <p:sldId id="257" r:id="rId3"/>
+    <p:sldId id="258" r:id="rId4"/>
+    <p:sldId id="259" r:id="rId5"/>
+    <p:sldId id="260" r:id="rId6"/>
+    <p:sldId id="261" r:id="rId7"/>
+    <p:sldId id="262" r:id="rId8"/>
+    <p:sldId id="263" r:id="rId9"/>
+    <p:sldId id="264" r:id="rId10"/>
   </p:sldIdLst>
   <p:sldSz cx="12192000" cy="6858000"/>
   <p:notesSz cx="6858000" cy="9144000"/>
@@ -105,13 +115,18 @@
       </a:defRPr>
     </a:lvl9pPr>
   </p:defaultTextStyle>
+  <p:extLst>
+    <p:ext uri="{EFAFB233-063F-42B5-8137-9DF3F51BA10A}">
+      <p15:sldGuideLst xmlns:p15="http://schemas.microsoft.com/office/powerpoint/2012/main"/>
+    </p:ext>
+  </p:extLst>
 </p:presentation>
 </file>
 
 <file path=ppt/revisionInfo.xml><?xml version="1.0" encoding="utf-8"?>
 <p1510:revInfo xmlns:a="http://schemas.openxmlformats.org/drawingml/2006/main" xmlns:r="http://schemas.openxmlformats.org/officeDocument/2006/relationships" xmlns:p1510="http://schemas.microsoft.com/office/powerpoint/2015/10/main">
   <p1510:revLst>
-    <p1510:client id="{624A80EA-D9D4-4B65-BDA5-67D086C5850A}" v="1" dt="2024-09-21T11:27:58.987"/>
+    <p1510:client id="{624A80EA-D9D4-4B65-BDA5-67D086C5850A}" v="2" dt="2024-09-26T10:58:30.043"/>
   </p1510:revLst>
 </p1510:revInfo>
 </file>
@@ -121,7 +136,7 @@
   <pc:docChgLst>
     <pc:chgData name="Arauz Bonilla,Jorge J.U." userId="1bf2599c-1c01-48b4-bae8-52167a7d20f0" providerId="ADAL" clId="{624A80EA-D9D4-4B65-BDA5-67D086C5850A}"/>
     <pc:docChg chg="custSel addSld modSld">
-      <pc:chgData name="Arauz Bonilla,Jorge J.U." userId="1bf2599c-1c01-48b4-bae8-52167a7d20f0" providerId="ADAL" clId="{624A80EA-D9D4-4B65-BDA5-67D086C5850A}" dt="2024-09-21T11:28:36.075" v="47" actId="680"/>
+      <pc:chgData name="Arauz Bonilla,Jorge J.U." userId="1bf2599c-1c01-48b4-bae8-52167a7d20f0" providerId="ADAL" clId="{624A80EA-D9D4-4B65-BDA5-67D086C5850A}" dt="2024-09-26T11:00:35.895" v="537" actId="478"/>
       <pc:docMkLst>
         <pc:docMk/>
       </pc:docMkLst>
@@ -188,16 +203,495 @@
           </ac:picMkLst>
         </pc:picChg>
       </pc:sldChg>
-      <pc:sldChg chg="new">
-        <pc:chgData name="Arauz Bonilla,Jorge J.U." userId="1bf2599c-1c01-48b4-bae8-52167a7d20f0" providerId="ADAL" clId="{624A80EA-D9D4-4B65-BDA5-67D086C5850A}" dt="2024-09-21T11:28:36.075" v="47" actId="680"/>
+      <pc:sldChg chg="modSp new mod">
+        <pc:chgData name="Arauz Bonilla,Jorge J.U." userId="1bf2599c-1c01-48b4-bae8-52167a7d20f0" providerId="ADAL" clId="{624A80EA-D9D4-4B65-BDA5-67D086C5850A}" dt="2024-09-26T10:55:41.544" v="339" actId="20577"/>
         <pc:sldMkLst>
           <pc:docMk/>
           <pc:sldMk cId="543737575" sldId="257"/>
         </pc:sldMkLst>
+        <pc:spChg chg="mod">
+          <ac:chgData name="Arauz Bonilla,Jorge J.U." userId="1bf2599c-1c01-48b4-bae8-52167a7d20f0" providerId="ADAL" clId="{624A80EA-D9D4-4B65-BDA5-67D086C5850A}" dt="2024-09-26T10:46:23.752" v="68" actId="20577"/>
+          <ac:spMkLst>
+            <pc:docMk/>
+            <pc:sldMk cId="543737575" sldId="257"/>
+            <ac:spMk id="2" creationId="{86B2AB5A-50BA-A089-BB94-5FD4241D3378}"/>
+          </ac:spMkLst>
+        </pc:spChg>
+        <pc:spChg chg="mod">
+          <ac:chgData name="Arauz Bonilla,Jorge J.U." userId="1bf2599c-1c01-48b4-bae8-52167a7d20f0" providerId="ADAL" clId="{624A80EA-D9D4-4B65-BDA5-67D086C5850A}" dt="2024-09-26T10:55:41.544" v="339" actId="20577"/>
+          <ac:spMkLst>
+            <pc:docMk/>
+            <pc:sldMk cId="543737575" sldId="257"/>
+            <ac:spMk id="3" creationId="{EACC5093-29E8-7CAE-3E9B-05E3508EF747}"/>
+          </ac:spMkLst>
+        </pc:spChg>
+      </pc:sldChg>
+      <pc:sldChg chg="modSp new mod">
+        <pc:chgData name="Arauz Bonilla,Jorge J.U." userId="1bf2599c-1c01-48b4-bae8-52167a7d20f0" providerId="ADAL" clId="{624A80EA-D9D4-4B65-BDA5-67D086C5850A}" dt="2024-09-26T10:57:48.816" v="514" actId="20577"/>
+        <pc:sldMkLst>
+          <pc:docMk/>
+          <pc:sldMk cId="2995959217" sldId="258"/>
+        </pc:sldMkLst>
+        <pc:spChg chg="mod">
+          <ac:chgData name="Arauz Bonilla,Jorge J.U." userId="1bf2599c-1c01-48b4-bae8-52167a7d20f0" providerId="ADAL" clId="{624A80EA-D9D4-4B65-BDA5-67D086C5850A}" dt="2024-09-26T10:57:48.816" v="514" actId="20577"/>
+          <ac:spMkLst>
+            <pc:docMk/>
+            <pc:sldMk cId="2995959217" sldId="258"/>
+            <ac:spMk id="2" creationId="{F6802B09-E94F-1FD7-978C-AF7DBFB6DC77}"/>
+          </ac:spMkLst>
+        </pc:spChg>
+      </pc:sldChg>
+      <pc:sldChg chg="modSp new mod">
+        <pc:chgData name="Arauz Bonilla,Jorge J.U." userId="1bf2599c-1c01-48b4-bae8-52167a7d20f0" providerId="ADAL" clId="{624A80EA-D9D4-4B65-BDA5-67D086C5850A}" dt="2024-09-26T10:58:44.731" v="516"/>
+        <pc:sldMkLst>
+          <pc:docMk/>
+          <pc:sldMk cId="1192826150" sldId="259"/>
+        </pc:sldMkLst>
+        <pc:spChg chg="mod">
+          <ac:chgData name="Arauz Bonilla,Jorge J.U." userId="1bf2599c-1c01-48b4-bae8-52167a7d20f0" providerId="ADAL" clId="{624A80EA-D9D4-4B65-BDA5-67D086C5850A}" dt="2024-09-26T10:58:44.731" v="516"/>
+          <ac:spMkLst>
+            <pc:docMk/>
+            <pc:sldMk cId="1192826150" sldId="259"/>
+            <ac:spMk id="2" creationId="{0D579919-C6E2-9567-7090-CAE53ABB98F2}"/>
+          </ac:spMkLst>
+        </pc:spChg>
+      </pc:sldChg>
+      <pc:sldChg chg="modSp new mod">
+        <pc:chgData name="Arauz Bonilla,Jorge J.U." userId="1bf2599c-1c01-48b4-bae8-52167a7d20f0" providerId="ADAL" clId="{624A80EA-D9D4-4B65-BDA5-67D086C5850A}" dt="2024-09-26T10:58:54.353" v="518"/>
+        <pc:sldMkLst>
+          <pc:docMk/>
+          <pc:sldMk cId="2644708043" sldId="260"/>
+        </pc:sldMkLst>
+        <pc:spChg chg="mod">
+          <ac:chgData name="Arauz Bonilla,Jorge J.U." userId="1bf2599c-1c01-48b4-bae8-52167a7d20f0" providerId="ADAL" clId="{624A80EA-D9D4-4B65-BDA5-67D086C5850A}" dt="2024-09-26T10:58:54.353" v="518"/>
+          <ac:spMkLst>
+            <pc:docMk/>
+            <pc:sldMk cId="2644708043" sldId="260"/>
+            <ac:spMk id="2" creationId="{0E3D4BE5-9B71-A8EB-F825-B02C792C5B66}"/>
+          </ac:spMkLst>
+        </pc:spChg>
+      </pc:sldChg>
+      <pc:sldChg chg="modSp new mod">
+        <pc:chgData name="Arauz Bonilla,Jorge J.U." userId="1bf2599c-1c01-48b4-bae8-52167a7d20f0" providerId="ADAL" clId="{624A80EA-D9D4-4B65-BDA5-67D086C5850A}" dt="2024-09-26T10:59:12.732" v="520"/>
+        <pc:sldMkLst>
+          <pc:docMk/>
+          <pc:sldMk cId="1517301832" sldId="261"/>
+        </pc:sldMkLst>
+        <pc:spChg chg="mod">
+          <ac:chgData name="Arauz Bonilla,Jorge J.U." userId="1bf2599c-1c01-48b4-bae8-52167a7d20f0" providerId="ADAL" clId="{624A80EA-D9D4-4B65-BDA5-67D086C5850A}" dt="2024-09-26T10:59:12.732" v="520"/>
+          <ac:spMkLst>
+            <pc:docMk/>
+            <pc:sldMk cId="1517301832" sldId="261"/>
+            <ac:spMk id="2" creationId="{2C5B0782-7159-8F98-2E27-954D7DE52950}"/>
+          </ac:spMkLst>
+        </pc:spChg>
+      </pc:sldChg>
+      <pc:sldChg chg="modSp new mod">
+        <pc:chgData name="Arauz Bonilla,Jorge J.U." userId="1bf2599c-1c01-48b4-bae8-52167a7d20f0" providerId="ADAL" clId="{624A80EA-D9D4-4B65-BDA5-67D086C5850A}" dt="2024-09-26T10:59:31.561" v="522"/>
+        <pc:sldMkLst>
+          <pc:docMk/>
+          <pc:sldMk cId="3655054582" sldId="262"/>
+        </pc:sldMkLst>
+        <pc:spChg chg="mod">
+          <ac:chgData name="Arauz Bonilla,Jorge J.U." userId="1bf2599c-1c01-48b4-bae8-52167a7d20f0" providerId="ADAL" clId="{624A80EA-D9D4-4B65-BDA5-67D086C5850A}" dt="2024-09-26T10:59:31.561" v="522"/>
+          <ac:spMkLst>
+            <pc:docMk/>
+            <pc:sldMk cId="3655054582" sldId="262"/>
+            <ac:spMk id="2" creationId="{800C4E1B-00E5-859C-2C85-775346947D8A}"/>
+          </ac:spMkLst>
+        </pc:spChg>
+      </pc:sldChg>
+      <pc:sldChg chg="modSp new mod">
+        <pc:chgData name="Arauz Bonilla,Jorge J.U." userId="1bf2599c-1c01-48b4-bae8-52167a7d20f0" providerId="ADAL" clId="{624A80EA-D9D4-4B65-BDA5-67D086C5850A}" dt="2024-09-26T10:59:44.769" v="524"/>
+        <pc:sldMkLst>
+          <pc:docMk/>
+          <pc:sldMk cId="808733467" sldId="263"/>
+        </pc:sldMkLst>
+        <pc:spChg chg="mod">
+          <ac:chgData name="Arauz Bonilla,Jorge J.U." userId="1bf2599c-1c01-48b4-bae8-52167a7d20f0" providerId="ADAL" clId="{624A80EA-D9D4-4B65-BDA5-67D086C5850A}" dt="2024-09-26T10:59:44.769" v="524"/>
+          <ac:spMkLst>
+            <pc:docMk/>
+            <pc:sldMk cId="808733467" sldId="263"/>
+            <ac:spMk id="2" creationId="{38748AEC-27DB-9458-5620-025583B84467}"/>
+          </ac:spMkLst>
+        </pc:spChg>
+      </pc:sldChg>
+      <pc:sldChg chg="delSp modSp new mod">
+        <pc:chgData name="Arauz Bonilla,Jorge J.U." userId="1bf2599c-1c01-48b4-bae8-52167a7d20f0" providerId="ADAL" clId="{624A80EA-D9D4-4B65-BDA5-67D086C5850A}" dt="2024-09-26T11:00:35.895" v="537" actId="478"/>
+        <pc:sldMkLst>
+          <pc:docMk/>
+          <pc:sldMk cId="2403430344" sldId="264"/>
+        </pc:sldMkLst>
+        <pc:spChg chg="mod">
+          <ac:chgData name="Arauz Bonilla,Jorge J.U." userId="1bf2599c-1c01-48b4-bae8-52167a7d20f0" providerId="ADAL" clId="{624A80EA-D9D4-4B65-BDA5-67D086C5850A}" dt="2024-09-26T11:00:34.265" v="536" actId="1076"/>
+          <ac:spMkLst>
+            <pc:docMk/>
+            <pc:sldMk cId="2403430344" sldId="264"/>
+            <ac:spMk id="2" creationId="{220305A0-C5E7-D7B2-2FDF-5333EC4E6D1A}"/>
+          </ac:spMkLst>
+        </pc:spChg>
+        <pc:spChg chg="del">
+          <ac:chgData name="Arauz Bonilla,Jorge J.U." userId="1bf2599c-1c01-48b4-bae8-52167a7d20f0" providerId="ADAL" clId="{624A80EA-D9D4-4B65-BDA5-67D086C5850A}" dt="2024-09-26T11:00:35.895" v="537" actId="478"/>
+          <ac:spMkLst>
+            <pc:docMk/>
+            <pc:sldMk cId="2403430344" sldId="264"/>
+            <ac:spMk id="3" creationId="{30C993AC-272C-11C1-4041-64843A27BC92}"/>
+          </ac:spMkLst>
+        </pc:spChg>
       </pc:sldChg>
     </pc:docChg>
   </pc:docChgLst>
 </pc:chgInfo>
+</file>
+
+<file path=ppt/notesMasters/notesMaster1.xml><?xml version="1.0" encoding="utf-8"?>
+<p:notesMaster xmlns:a="http://schemas.openxmlformats.org/drawingml/2006/main" xmlns:r="http://schemas.openxmlformats.org/officeDocument/2006/relationships" xmlns:p="http://schemas.openxmlformats.org/presentationml/2006/main">
+  <p:cSld>
+    <p:bg>
+      <p:bgRef idx="1001">
+        <a:schemeClr val="bg1"/>
+      </p:bgRef>
+    </p:bg>
+    <p:spTree>
+      <p:nvGrpSpPr>
+        <p:cNvPr id="1" name=""/>
+        <p:cNvGrpSpPr/>
+        <p:nvPr/>
+      </p:nvGrpSpPr>
+      <p:grpSpPr>
+        <a:xfrm>
+          <a:off x="0" y="0"/>
+          <a:ext cx="0" cy="0"/>
+          <a:chOff x="0" y="0"/>
+          <a:chExt cx="0" cy="0"/>
+        </a:xfrm>
+      </p:grpSpPr>
+      <p:sp>
+        <p:nvSpPr>
+          <p:cNvPr id="2" name="Header Placeholder 1"/>
+          <p:cNvSpPr>
+            <a:spLocks noGrp="1"/>
+          </p:cNvSpPr>
+          <p:nvPr>
+            <p:ph type="hdr" sz="quarter"/>
+          </p:nvPr>
+        </p:nvSpPr>
+        <p:spPr>
+          <a:xfrm>
+            <a:off x="0" y="0"/>
+            <a:ext cx="2971800" cy="458788"/>
+          </a:xfrm>
+          <a:prstGeom prst="rect">
+            <a:avLst/>
+          </a:prstGeom>
+        </p:spPr>
+        <p:txBody>
+          <a:bodyPr vert="horz" lIns="91440" tIns="45720" rIns="91440" bIns="45720" rtlCol="0"/>
+          <a:lstStyle>
+            <a:lvl1pPr algn="l">
+              <a:defRPr sz="1200"/>
+            </a:lvl1pPr>
+          </a:lstStyle>
+          <a:p>
+            <a:endParaRPr lang="en-NZ"/>
+          </a:p>
+        </p:txBody>
+      </p:sp>
+      <p:sp>
+        <p:nvSpPr>
+          <p:cNvPr id="3" name="Date Placeholder 2"/>
+          <p:cNvSpPr>
+            <a:spLocks noGrp="1"/>
+          </p:cNvSpPr>
+          <p:nvPr>
+            <p:ph type="dt" idx="1"/>
+          </p:nvPr>
+        </p:nvSpPr>
+        <p:spPr>
+          <a:xfrm>
+            <a:off x="3884613" y="0"/>
+            <a:ext cx="2971800" cy="458788"/>
+          </a:xfrm>
+          <a:prstGeom prst="rect">
+            <a:avLst/>
+          </a:prstGeom>
+        </p:spPr>
+        <p:txBody>
+          <a:bodyPr vert="horz" lIns="91440" tIns="45720" rIns="91440" bIns="45720" rtlCol="0"/>
+          <a:lstStyle>
+            <a:lvl1pPr algn="r">
+              <a:defRPr sz="1200"/>
+            </a:lvl1pPr>
+          </a:lstStyle>
+          <a:p>
+            <a:fld id="{7097D9E5-16FE-4A2E-9805-C519DE9D3040}" type="datetimeFigureOut">
+              <a:rPr lang="en-NZ" smtClean="0"/>
+              <a:t>26/09/2024</a:t>
+            </a:fld>
+            <a:endParaRPr lang="en-NZ"/>
+          </a:p>
+        </p:txBody>
+      </p:sp>
+      <p:sp>
+        <p:nvSpPr>
+          <p:cNvPr id="4" name="Slide Image Placeholder 3"/>
+          <p:cNvSpPr>
+            <a:spLocks noGrp="1" noRot="1" noChangeAspect="1"/>
+          </p:cNvSpPr>
+          <p:nvPr>
+            <p:ph type="sldImg" idx="2"/>
+          </p:nvPr>
+        </p:nvSpPr>
+        <p:spPr>
+          <a:xfrm>
+            <a:off x="685800" y="1143000"/>
+            <a:ext cx="5486400" cy="3086100"/>
+          </a:xfrm>
+          <a:prstGeom prst="rect">
+            <a:avLst/>
+          </a:prstGeom>
+          <a:noFill/>
+          <a:ln w="12700">
+            <a:solidFill>
+              <a:prstClr val="black"/>
+            </a:solidFill>
+          </a:ln>
+        </p:spPr>
+        <p:txBody>
+          <a:bodyPr vert="horz" lIns="91440" tIns="45720" rIns="91440" bIns="45720" rtlCol="0" anchor="ctr"/>
+          <a:lstStyle/>
+          <a:p>
+            <a:endParaRPr lang="en-NZ"/>
+          </a:p>
+        </p:txBody>
+      </p:sp>
+      <p:sp>
+        <p:nvSpPr>
+          <p:cNvPr id="5" name="Notes Placeholder 4"/>
+          <p:cNvSpPr>
+            <a:spLocks noGrp="1"/>
+          </p:cNvSpPr>
+          <p:nvPr>
+            <p:ph type="body" sz="quarter" idx="3"/>
+          </p:nvPr>
+        </p:nvSpPr>
+        <p:spPr>
+          <a:xfrm>
+            <a:off x="685800" y="4400550"/>
+            <a:ext cx="5486400" cy="3600450"/>
+          </a:xfrm>
+          <a:prstGeom prst="rect">
+            <a:avLst/>
+          </a:prstGeom>
+        </p:spPr>
+        <p:txBody>
+          <a:bodyPr vert="horz" lIns="91440" tIns="45720" rIns="91440" bIns="45720" rtlCol="0"/>
+          <a:lstStyle/>
+          <a:p>
+            <a:pPr lvl="0"/>
+            <a:r>
+              <a:rPr lang="en-US"/>
+              <a:t>Click to edit Master text styles</a:t>
+            </a:r>
+          </a:p>
+          <a:p>
+            <a:pPr lvl="1"/>
+            <a:r>
+              <a:rPr lang="en-US"/>
+              <a:t>Second level</a:t>
+            </a:r>
+          </a:p>
+          <a:p>
+            <a:pPr lvl="2"/>
+            <a:r>
+              <a:rPr lang="en-US"/>
+              <a:t>Third level</a:t>
+            </a:r>
+          </a:p>
+          <a:p>
+            <a:pPr lvl="3"/>
+            <a:r>
+              <a:rPr lang="en-US"/>
+              <a:t>Fourth level</a:t>
+            </a:r>
+          </a:p>
+          <a:p>
+            <a:pPr lvl="4"/>
+            <a:r>
+              <a:rPr lang="en-US"/>
+              <a:t>Fifth level</a:t>
+            </a:r>
+            <a:endParaRPr lang="en-NZ"/>
+          </a:p>
+        </p:txBody>
+      </p:sp>
+      <p:sp>
+        <p:nvSpPr>
+          <p:cNvPr id="6" name="Footer Placeholder 5"/>
+          <p:cNvSpPr>
+            <a:spLocks noGrp="1"/>
+          </p:cNvSpPr>
+          <p:nvPr>
+            <p:ph type="ftr" sz="quarter" idx="4"/>
+          </p:nvPr>
+        </p:nvSpPr>
+        <p:spPr>
+          <a:xfrm>
+            <a:off x="0" y="8685213"/>
+            <a:ext cx="2971800" cy="458787"/>
+          </a:xfrm>
+          <a:prstGeom prst="rect">
+            <a:avLst/>
+          </a:prstGeom>
+        </p:spPr>
+        <p:txBody>
+          <a:bodyPr vert="horz" lIns="91440" tIns="45720" rIns="91440" bIns="45720" rtlCol="0" anchor="b"/>
+          <a:lstStyle>
+            <a:lvl1pPr algn="l">
+              <a:defRPr sz="1200"/>
+            </a:lvl1pPr>
+          </a:lstStyle>
+          <a:p>
+            <a:endParaRPr lang="en-NZ"/>
+          </a:p>
+        </p:txBody>
+      </p:sp>
+      <p:sp>
+        <p:nvSpPr>
+          <p:cNvPr id="7" name="Slide Number Placeholder 6"/>
+          <p:cNvSpPr>
+            <a:spLocks noGrp="1"/>
+          </p:cNvSpPr>
+          <p:nvPr>
+            <p:ph type="sldNum" sz="quarter" idx="5"/>
+          </p:nvPr>
+        </p:nvSpPr>
+        <p:spPr>
+          <a:xfrm>
+            <a:off x="3884613" y="8685213"/>
+            <a:ext cx="2971800" cy="458787"/>
+          </a:xfrm>
+          <a:prstGeom prst="rect">
+            <a:avLst/>
+          </a:prstGeom>
+        </p:spPr>
+        <p:txBody>
+          <a:bodyPr vert="horz" lIns="91440" tIns="45720" rIns="91440" bIns="45720" rtlCol="0" anchor="b"/>
+          <a:lstStyle>
+            <a:lvl1pPr algn="r">
+              <a:defRPr sz="1200"/>
+            </a:lvl1pPr>
+          </a:lstStyle>
+          <a:p>
+            <a:fld id="{25EE1673-0553-4148-A07E-DCD73FF70A10}" type="slidenum">
+              <a:rPr lang="en-NZ" smtClean="0"/>
+              <a:t>‹#›</a:t>
+            </a:fld>
+            <a:endParaRPr lang="en-NZ"/>
+          </a:p>
+        </p:txBody>
+      </p:sp>
+    </p:spTree>
+    <p:extLst>
+      <p:ext uri="{BB962C8B-B14F-4D97-AF65-F5344CB8AC3E}">
+        <p14:creationId xmlns:p14="http://schemas.microsoft.com/office/powerpoint/2010/main" val="4093906699"/>
+      </p:ext>
+    </p:extLst>
+  </p:cSld>
+  <p:clrMap bg1="lt1" tx1="dk1" bg2="lt2" tx2="dk2" accent1="accent1" accent2="accent2" accent3="accent3" accent4="accent4" accent5="accent5" accent6="accent6" hlink="hlink" folHlink="folHlink"/>
+  <p:notesStyle>
+    <a:lvl1pPr marL="0" algn="l" defTabSz="914400" rtl="0" eaLnBrk="1" latinLnBrk="0" hangingPunct="1">
+      <a:defRPr sz="1200" kern="1200">
+        <a:solidFill>
+          <a:schemeClr val="tx1"/>
+        </a:solidFill>
+        <a:latin typeface="+mn-lt"/>
+        <a:ea typeface="+mn-ea"/>
+        <a:cs typeface="+mn-cs"/>
+      </a:defRPr>
+    </a:lvl1pPr>
+    <a:lvl2pPr marL="457200" algn="l" defTabSz="914400" rtl="0" eaLnBrk="1" latinLnBrk="0" hangingPunct="1">
+      <a:defRPr sz="1200" kern="1200">
+        <a:solidFill>
+          <a:schemeClr val="tx1"/>
+        </a:solidFill>
+        <a:latin typeface="+mn-lt"/>
+        <a:ea typeface="+mn-ea"/>
+        <a:cs typeface="+mn-cs"/>
+      </a:defRPr>
+    </a:lvl2pPr>
+    <a:lvl3pPr marL="914400" algn="l" defTabSz="914400" rtl="0" eaLnBrk="1" latinLnBrk="0" hangingPunct="1">
+      <a:defRPr sz="1200" kern="1200">
+        <a:solidFill>
+          <a:schemeClr val="tx1"/>
+        </a:solidFill>
+        <a:latin typeface="+mn-lt"/>
+        <a:ea typeface="+mn-ea"/>
+        <a:cs typeface="+mn-cs"/>
+      </a:defRPr>
+    </a:lvl3pPr>
+    <a:lvl4pPr marL="1371600" algn="l" defTabSz="914400" rtl="0" eaLnBrk="1" latinLnBrk="0" hangingPunct="1">
+      <a:defRPr sz="1200" kern="1200">
+        <a:solidFill>
+          <a:schemeClr val="tx1"/>
+        </a:solidFill>
+        <a:latin typeface="+mn-lt"/>
+        <a:ea typeface="+mn-ea"/>
+        <a:cs typeface="+mn-cs"/>
+      </a:defRPr>
+    </a:lvl4pPr>
+    <a:lvl5pPr marL="1828800" algn="l" defTabSz="914400" rtl="0" eaLnBrk="1" latinLnBrk="0" hangingPunct="1">
+      <a:defRPr sz="1200" kern="1200">
+        <a:solidFill>
+          <a:schemeClr val="tx1"/>
+        </a:solidFill>
+        <a:latin typeface="+mn-lt"/>
+        <a:ea typeface="+mn-ea"/>
+        <a:cs typeface="+mn-cs"/>
+      </a:defRPr>
+    </a:lvl5pPr>
+    <a:lvl6pPr marL="2286000" algn="l" defTabSz="914400" rtl="0" eaLnBrk="1" latinLnBrk="0" hangingPunct="1">
+      <a:defRPr sz="1200" kern="1200">
+        <a:solidFill>
+          <a:schemeClr val="tx1"/>
+        </a:solidFill>
+        <a:latin typeface="+mn-lt"/>
+        <a:ea typeface="+mn-ea"/>
+        <a:cs typeface="+mn-cs"/>
+      </a:defRPr>
+    </a:lvl6pPr>
+    <a:lvl7pPr marL="2743200" algn="l" defTabSz="914400" rtl="0" eaLnBrk="1" latinLnBrk="0" hangingPunct="1">
+      <a:defRPr sz="1200" kern="1200">
+        <a:solidFill>
+          <a:schemeClr val="tx1"/>
+        </a:solidFill>
+        <a:latin typeface="+mn-lt"/>
+        <a:ea typeface="+mn-ea"/>
+        <a:cs typeface="+mn-cs"/>
+      </a:defRPr>
+    </a:lvl7pPr>
+    <a:lvl8pPr marL="3200400" algn="l" defTabSz="914400" rtl="0" eaLnBrk="1" latinLnBrk="0" hangingPunct="1">
+      <a:defRPr sz="1200" kern="1200">
+        <a:solidFill>
+          <a:schemeClr val="tx1"/>
+        </a:solidFill>
+        <a:latin typeface="+mn-lt"/>
+        <a:ea typeface="+mn-ea"/>
+        <a:cs typeface="+mn-cs"/>
+      </a:defRPr>
+    </a:lvl8pPr>
+    <a:lvl9pPr marL="3657600" algn="l" defTabSz="914400" rtl="0" eaLnBrk="1" latinLnBrk="0" hangingPunct="1">
+      <a:defRPr sz="1200" kern="1200">
+        <a:solidFill>
+          <a:schemeClr val="tx1"/>
+        </a:solidFill>
+        <a:latin typeface="+mn-lt"/>
+        <a:ea typeface="+mn-ea"/>
+        <a:cs typeface="+mn-cs"/>
+      </a:defRPr>
+    </a:lvl9pPr>
+  </p:notesStyle>
+</p:notesMaster>
 </file>
 
 <file path=ppt/slideLayouts/slideLayout1.xml><?xml version="1.0" encoding="utf-8"?>
@@ -384,9 +878,9 @@
           <a:bodyPr/>
           <a:lstStyle/>
           <a:p>
-            <a:fld id="{A3F6A66D-3231-4B47-ADF7-976215983DB6}" type="datetimeFigureOut">
+            <a:fld id="{131A0DB0-A85B-4487-8F34-6C89C5E4FE9D}" type="datetime1">
               <a:rPr lang="en-NZ" smtClean="0"/>
-              <a:t>21/09/2024</a:t>
+              <a:t>26/09/2024</a:t>
             </a:fld>
             <a:endParaRPr lang="en-NZ"/>
           </a:p>
@@ -659,9 +1153,9 @@
           <a:bodyPr/>
           <a:lstStyle/>
           <a:p>
-            <a:fld id="{A3F6A66D-3231-4B47-ADF7-976215983DB6}" type="datetimeFigureOut">
+            <a:fld id="{5323748D-C940-46E8-A8FE-39A302589491}" type="datetime1">
               <a:rPr lang="en-NZ" smtClean="0"/>
-              <a:t>21/09/2024</a:t>
+              <a:t>26/09/2024</a:t>
             </a:fld>
             <a:endParaRPr lang="en-NZ"/>
           </a:p>
@@ -853,9 +1347,9 @@
           <a:bodyPr/>
           <a:lstStyle/>
           <a:p>
-            <a:fld id="{A3F6A66D-3231-4B47-ADF7-976215983DB6}" type="datetimeFigureOut">
+            <a:fld id="{8E1F1FAA-C845-4339-889E-28EF06EE40FF}" type="datetime1">
               <a:rPr lang="en-NZ" smtClean="0"/>
-              <a:t>21/09/2024</a:t>
+              <a:t>26/09/2024</a:t>
             </a:fld>
             <a:endParaRPr lang="en-NZ"/>
           </a:p>
@@ -1126,9 +1620,9 @@
           <a:bodyPr/>
           <a:lstStyle/>
           <a:p>
-            <a:fld id="{A3F6A66D-3231-4B47-ADF7-976215983DB6}" type="datetimeFigureOut">
+            <a:fld id="{944BABD2-5B36-4C22-8FAE-825B3CD25B81}" type="datetime1">
               <a:rPr lang="en-NZ" smtClean="0"/>
-              <a:t>21/09/2024</a:t>
+              <a:t>26/09/2024</a:t>
             </a:fld>
             <a:endParaRPr lang="en-NZ"/>
           </a:p>
@@ -1467,9 +1961,9 @@
           <a:bodyPr/>
           <a:lstStyle/>
           <a:p>
-            <a:fld id="{A3F6A66D-3231-4B47-ADF7-976215983DB6}" type="datetimeFigureOut">
+            <a:fld id="{7E84032B-D658-433F-842C-DAFAE1FBCD74}" type="datetime1">
               <a:rPr lang="en-NZ" smtClean="0"/>
-              <a:t>21/09/2024</a:t>
+              <a:t>26/09/2024</a:t>
             </a:fld>
             <a:endParaRPr lang="en-NZ"/>
           </a:p>
@@ -2090,9 +2584,9 @@
           <a:bodyPr/>
           <a:lstStyle/>
           <a:p>
-            <a:fld id="{A3F6A66D-3231-4B47-ADF7-976215983DB6}" type="datetimeFigureOut">
+            <a:fld id="{BE0BD24D-BB39-48BC-8468-64E039742EBA}" type="datetime1">
               <a:rPr lang="en-NZ" smtClean="0"/>
-              <a:t>21/09/2024</a:t>
+              <a:t>26/09/2024</a:t>
             </a:fld>
             <a:endParaRPr lang="en-NZ"/>
           </a:p>
@@ -2950,9 +3444,9 @@
           <a:bodyPr/>
           <a:lstStyle/>
           <a:p>
-            <a:fld id="{A3F6A66D-3231-4B47-ADF7-976215983DB6}" type="datetimeFigureOut">
+            <a:fld id="{1BEEC8BB-492B-4068-A56A-07D34DE636F2}" type="datetime1">
               <a:rPr lang="en-NZ" smtClean="0"/>
-              <a:t>21/09/2024</a:t>
+              <a:t>26/09/2024</a:t>
             </a:fld>
             <a:endParaRPr lang="en-NZ"/>
           </a:p>
@@ -3120,9 +3614,9 @@
           <a:bodyPr/>
           <a:lstStyle/>
           <a:p>
-            <a:fld id="{A3F6A66D-3231-4B47-ADF7-976215983DB6}" type="datetimeFigureOut">
+            <a:fld id="{511142B1-8092-47B7-9305-FA1D52CEA1CE}" type="datetime1">
               <a:rPr lang="en-NZ" smtClean="0"/>
-              <a:t>21/09/2024</a:t>
+              <a:t>26/09/2024</a:t>
             </a:fld>
             <a:endParaRPr lang="en-NZ"/>
           </a:p>
@@ -3300,9 +3794,9 @@
           <a:bodyPr/>
           <a:lstStyle/>
           <a:p>
-            <a:fld id="{A3F6A66D-3231-4B47-ADF7-976215983DB6}" type="datetimeFigureOut">
+            <a:fld id="{B05740B9-E3C6-4C7C-A2EA-16EBC5D7C804}" type="datetime1">
               <a:rPr lang="en-NZ" smtClean="0"/>
-              <a:t>21/09/2024</a:t>
+              <a:t>26/09/2024</a:t>
             </a:fld>
             <a:endParaRPr lang="en-NZ"/>
           </a:p>
@@ -3470,9 +3964,9 @@
           <a:bodyPr/>
           <a:lstStyle/>
           <a:p>
-            <a:fld id="{A3F6A66D-3231-4B47-ADF7-976215983DB6}" type="datetimeFigureOut">
+            <a:fld id="{7F7A93E3-8E57-4E1F-B6A6-44FB3C00BCF0}" type="datetime1">
               <a:rPr lang="en-NZ" smtClean="0"/>
-              <a:t>21/09/2024</a:t>
+              <a:t>26/09/2024</a:t>
             </a:fld>
             <a:endParaRPr lang="en-NZ"/>
           </a:p>
@@ -3717,9 +4211,9 @@
           <a:bodyPr/>
           <a:lstStyle/>
           <a:p>
-            <a:fld id="{A3F6A66D-3231-4B47-ADF7-976215983DB6}" type="datetimeFigureOut">
+            <a:fld id="{49788324-9239-4A6A-B263-18CF364C18E6}" type="datetime1">
               <a:rPr lang="en-NZ" smtClean="0"/>
-              <a:t>21/09/2024</a:t>
+              <a:t>26/09/2024</a:t>
             </a:fld>
             <a:endParaRPr lang="en-NZ"/>
           </a:p>
@@ -4009,9 +4503,9 @@
           <a:bodyPr/>
           <a:lstStyle/>
           <a:p>
-            <a:fld id="{A3F6A66D-3231-4B47-ADF7-976215983DB6}" type="datetimeFigureOut">
+            <a:fld id="{4224155E-B995-4A63-957A-09BAD2FBC677}" type="datetime1">
               <a:rPr lang="en-NZ" smtClean="0"/>
-              <a:t>21/09/2024</a:t>
+              <a:t>26/09/2024</a:t>
             </a:fld>
             <a:endParaRPr lang="en-NZ"/>
           </a:p>
@@ -4453,9 +4947,9 @@
           <a:bodyPr/>
           <a:lstStyle/>
           <a:p>
-            <a:fld id="{A3F6A66D-3231-4B47-ADF7-976215983DB6}" type="datetimeFigureOut">
+            <a:fld id="{94852875-0C79-4139-AC32-AABE6788AEEA}" type="datetime1">
               <a:rPr lang="en-NZ" smtClean="0"/>
-              <a:t>21/09/2024</a:t>
+              <a:t>26/09/2024</a:t>
             </a:fld>
             <a:endParaRPr lang="en-NZ"/>
           </a:p>
@@ -4571,9 +5065,9 @@
           <a:bodyPr/>
           <a:lstStyle/>
           <a:p>
-            <a:fld id="{A3F6A66D-3231-4B47-ADF7-976215983DB6}" type="datetimeFigureOut">
+            <a:fld id="{670F642C-953D-4942-A0BD-F75D51C3B3D0}" type="datetime1">
               <a:rPr lang="en-NZ" smtClean="0"/>
-              <a:t>21/09/2024</a:t>
+              <a:t>26/09/2024</a:t>
             </a:fld>
             <a:endParaRPr lang="en-NZ"/>
           </a:p>
@@ -4666,9 +5160,9 @@
           <a:bodyPr/>
           <a:lstStyle/>
           <a:p>
-            <a:fld id="{A3F6A66D-3231-4B47-ADF7-976215983DB6}" type="datetimeFigureOut">
+            <a:fld id="{F0942B63-0C58-44B7-A52C-10399CE2763E}" type="datetime1">
               <a:rPr lang="en-NZ" smtClean="0"/>
-              <a:t>21/09/2024</a:t>
+              <a:t>26/09/2024</a:t>
             </a:fld>
             <a:endParaRPr lang="en-NZ"/>
           </a:p>
@@ -4945,9 +5439,9 @@
           <a:bodyPr/>
           <a:lstStyle/>
           <a:p>
-            <a:fld id="{A3F6A66D-3231-4B47-ADF7-976215983DB6}" type="datetimeFigureOut">
+            <a:fld id="{0F087F2A-8ED5-40BC-A804-86A9632A31D7}" type="datetime1">
               <a:rPr lang="en-NZ" smtClean="0"/>
-              <a:t>21/09/2024</a:t>
+              <a:t>26/09/2024</a:t>
             </a:fld>
             <a:endParaRPr lang="en-NZ"/>
           </a:p>
@@ -5220,9 +5714,9 @@
           <a:bodyPr/>
           <a:lstStyle/>
           <a:p>
-            <a:fld id="{A3F6A66D-3231-4B47-ADF7-976215983DB6}" type="datetimeFigureOut">
+            <a:fld id="{5D2796AF-1BE4-4202-AFC4-0C711630C0B7}" type="datetime1">
               <a:rPr lang="en-NZ" smtClean="0"/>
-              <a:t>21/09/2024</a:t>
+              <a:t>26/09/2024</a:t>
             </a:fld>
             <a:endParaRPr lang="en-NZ"/>
           </a:p>
@@ -5649,9 +6143,9 @@
             </a:lvl1pPr>
           </a:lstStyle>
           <a:p>
-            <a:fld id="{A3F6A66D-3231-4B47-ADF7-976215983DB6}" type="datetimeFigureOut">
+            <a:fld id="{F4BE01E5-D6DC-4CBF-AB22-D83052A50459}" type="datetime1">
               <a:rPr lang="en-NZ" smtClean="0"/>
-              <a:t>21/09/2024</a:t>
+              <a:t>26/09/2024</a:t>
             </a:fld>
             <a:endParaRPr lang="en-NZ"/>
           </a:p>
@@ -5763,6 +6257,7 @@
     <p:sldLayoutId id="2147483676" r:id="rId16"/>
     <p:sldLayoutId id="2147483677" r:id="rId17"/>
   </p:sldLayoutIdLst>
+  <p:hf hdr="0" ftr="0" dt="0"/>
   <p:txStyles>
     <p:titleStyle>
       <a:lvl1pPr algn="l" defTabSz="457200" rtl="0" eaLnBrk="1" latinLnBrk="0" hangingPunct="1">
@@ -7348,7 +7843,15 @@
           <a:bodyPr/>
           <a:lstStyle/>
           <a:p>
-            <a:endParaRPr lang="en-NZ"/>
+            <a:r>
+              <a:rPr lang="nl-NL" dirty="0" err="1"/>
+              <a:t>Table</a:t>
+            </a:r>
+            <a:r>
+              <a:rPr lang="nl-NL" dirty="0"/>
+              <a:t> of contents</a:t>
+            </a:r>
+            <a:endParaRPr lang="en-NZ" dirty="0"/>
           </a:p>
         </p:txBody>
       </p:sp>
@@ -7373,6 +7876,104 @@
           <a:bodyPr/>
           <a:lstStyle/>
           <a:p>
+            <a:r>
+              <a:rPr lang="nl-NL" dirty="0" err="1"/>
+              <a:t>What</a:t>
+            </a:r>
+            <a:r>
+              <a:rPr lang="nl-NL" dirty="0"/>
+              <a:t> is a compiler/</a:t>
+            </a:r>
+            <a:r>
+              <a:rPr lang="nl-NL" dirty="0" err="1"/>
+              <a:t>interpreter</a:t>
+            </a:r>
+            <a:r>
+              <a:rPr lang="nl-NL" dirty="0"/>
+              <a:t>?</a:t>
+            </a:r>
+          </a:p>
+          <a:p>
+            <a:r>
+              <a:rPr lang="nl-NL" dirty="0"/>
+              <a:t>How does a compiler/</a:t>
+            </a:r>
+            <a:r>
+              <a:rPr lang="nl-NL" dirty="0" err="1"/>
+              <a:t>interpreter</a:t>
+            </a:r>
+            <a:r>
+              <a:rPr lang="nl-NL" dirty="0"/>
+              <a:t> </a:t>
+            </a:r>
+            <a:r>
+              <a:rPr lang="nl-NL" dirty="0" err="1"/>
+              <a:t>work</a:t>
+            </a:r>
+            <a:r>
+              <a:rPr lang="nl-NL" dirty="0"/>
+              <a:t>?</a:t>
+            </a:r>
+          </a:p>
+          <a:p>
+            <a:r>
+              <a:rPr lang="en-NZ" dirty="0"/>
+              <a:t>What is JIT compiler?</a:t>
+            </a:r>
+          </a:p>
+          <a:p>
+            <a:r>
+              <a:rPr lang="en-NZ" dirty="0"/>
+              <a:t>What are the pros and cons of using </a:t>
+            </a:r>
+            <a:r>
+              <a:rPr lang="en-NZ" dirty="0" err="1"/>
+              <a:t>jit</a:t>
+            </a:r>
+            <a:r>
+              <a:rPr lang="en-NZ" dirty="0"/>
+              <a:t> compiler?</a:t>
+            </a:r>
+          </a:p>
+          <a:p>
+            <a:r>
+              <a:rPr lang="en-NZ" dirty="0"/>
+              <a:t>What are use cases for JIT compiler?</a:t>
+            </a:r>
+          </a:p>
+          <a:p>
+            <a:r>
+              <a:rPr lang="en-NZ" dirty="0"/>
+              <a:t>Future for JIT compiler?</a:t>
+            </a:r>
+          </a:p>
+        </p:txBody>
+      </p:sp>
+      <p:sp>
+        <p:nvSpPr>
+          <p:cNvPr id="4" name="Slide Number Placeholder 3">
+            <a:extLst>
+              <a:ext uri="{FF2B5EF4-FFF2-40B4-BE49-F238E27FC236}">
+                <a16:creationId xmlns:a16="http://schemas.microsoft.com/office/drawing/2014/main" id="{A10BA2C5-9C46-E931-A5A3-07C6C32EDA93}"/>
+              </a:ext>
+            </a:extLst>
+          </p:cNvPr>
+          <p:cNvSpPr>
+            <a:spLocks noGrp="1"/>
+          </p:cNvSpPr>
+          <p:nvPr>
+            <p:ph type="sldNum" sz="quarter" idx="12"/>
+          </p:nvPr>
+        </p:nvSpPr>
+        <p:spPr/>
+        <p:txBody>
+          <a:bodyPr/>
+          <a:lstStyle/>
+          <a:p>
+            <a:fld id="{7E50A921-1625-4E66-8B53-913CC32CAF35}" type="slidenum">
+              <a:rPr lang="en-NZ" smtClean="0"/>
+              <a:t>2</a:t>
+            </a:fld>
             <a:endParaRPr lang="en-NZ"/>
           </a:p>
         </p:txBody>
@@ -7381,6 +7982,832 @@
     <p:extLst>
       <p:ext uri="{BB962C8B-B14F-4D97-AF65-F5344CB8AC3E}">
         <p14:creationId xmlns:p14="http://schemas.microsoft.com/office/powerpoint/2010/main" val="543737575"/>
+      </p:ext>
+    </p:extLst>
+  </p:cSld>
+  <p:clrMapOvr>
+    <a:masterClrMapping/>
+  </p:clrMapOvr>
+</p:sld>
+</file>
+
+<file path=ppt/slides/slide3.xml><?xml version="1.0" encoding="utf-8"?>
+<p:sld xmlns:a="http://schemas.openxmlformats.org/drawingml/2006/main" xmlns:r="http://schemas.openxmlformats.org/officeDocument/2006/relationships" xmlns:p="http://schemas.openxmlformats.org/presentationml/2006/main">
+  <p:cSld>
+    <p:spTree>
+      <p:nvGrpSpPr>
+        <p:cNvPr id="1" name=""/>
+        <p:cNvGrpSpPr/>
+        <p:nvPr/>
+      </p:nvGrpSpPr>
+      <p:grpSpPr>
+        <a:xfrm>
+          <a:off x="0" y="0"/>
+          <a:ext cx="0" cy="0"/>
+          <a:chOff x="0" y="0"/>
+          <a:chExt cx="0" cy="0"/>
+        </a:xfrm>
+      </p:grpSpPr>
+      <p:sp>
+        <p:nvSpPr>
+          <p:cNvPr id="2" name="Title 1">
+            <a:extLst>
+              <a:ext uri="{FF2B5EF4-FFF2-40B4-BE49-F238E27FC236}">
+                <a16:creationId xmlns:a16="http://schemas.microsoft.com/office/drawing/2014/main" id="{F6802B09-E94F-1FD7-978C-AF7DBFB6DC77}"/>
+              </a:ext>
+            </a:extLst>
+          </p:cNvPr>
+          <p:cNvSpPr>
+            <a:spLocks noGrp="1"/>
+          </p:cNvSpPr>
+          <p:nvPr>
+            <p:ph type="title"/>
+          </p:nvPr>
+        </p:nvSpPr>
+        <p:spPr/>
+        <p:txBody>
+          <a:bodyPr/>
+          <a:lstStyle/>
+          <a:p>
+            <a:r>
+              <a:rPr lang="nl-NL" dirty="0" err="1"/>
+              <a:t>What</a:t>
+            </a:r>
+            <a:r>
+              <a:rPr lang="nl-NL" dirty="0"/>
+              <a:t> is a compiler/</a:t>
+            </a:r>
+            <a:r>
+              <a:rPr lang="nl-NL" dirty="0" err="1"/>
+              <a:t>interpreter</a:t>
+            </a:r>
+            <a:r>
+              <a:rPr lang="nl-NL" dirty="0"/>
+              <a:t>?</a:t>
+            </a:r>
+            <a:endParaRPr lang="en-NZ" dirty="0"/>
+          </a:p>
+        </p:txBody>
+      </p:sp>
+      <p:sp>
+        <p:nvSpPr>
+          <p:cNvPr id="3" name="Content Placeholder 2">
+            <a:extLst>
+              <a:ext uri="{FF2B5EF4-FFF2-40B4-BE49-F238E27FC236}">
+                <a16:creationId xmlns:a16="http://schemas.microsoft.com/office/drawing/2014/main" id="{91504E55-31FE-4F28-997D-0782973E912B}"/>
+              </a:ext>
+            </a:extLst>
+          </p:cNvPr>
+          <p:cNvSpPr>
+            <a:spLocks noGrp="1"/>
+          </p:cNvSpPr>
+          <p:nvPr>
+            <p:ph idx="1"/>
+          </p:nvPr>
+        </p:nvSpPr>
+        <p:spPr/>
+        <p:txBody>
+          <a:bodyPr/>
+          <a:lstStyle/>
+          <a:p>
+            <a:endParaRPr lang="en-NZ" dirty="0"/>
+          </a:p>
+        </p:txBody>
+      </p:sp>
+      <p:sp>
+        <p:nvSpPr>
+          <p:cNvPr id="4" name="Slide Number Placeholder 3">
+            <a:extLst>
+              <a:ext uri="{FF2B5EF4-FFF2-40B4-BE49-F238E27FC236}">
+                <a16:creationId xmlns:a16="http://schemas.microsoft.com/office/drawing/2014/main" id="{640E8D7F-DF52-64A5-B10D-A39ADB9E66A8}"/>
+              </a:ext>
+            </a:extLst>
+          </p:cNvPr>
+          <p:cNvSpPr>
+            <a:spLocks noGrp="1"/>
+          </p:cNvSpPr>
+          <p:nvPr>
+            <p:ph type="sldNum" sz="quarter" idx="12"/>
+          </p:nvPr>
+        </p:nvSpPr>
+        <p:spPr/>
+        <p:txBody>
+          <a:bodyPr/>
+          <a:lstStyle/>
+          <a:p>
+            <a:fld id="{7E50A921-1625-4E66-8B53-913CC32CAF35}" type="slidenum">
+              <a:rPr lang="en-NZ" smtClean="0"/>
+              <a:t>3</a:t>
+            </a:fld>
+            <a:endParaRPr lang="en-NZ"/>
+          </a:p>
+        </p:txBody>
+      </p:sp>
+    </p:spTree>
+    <p:extLst>
+      <p:ext uri="{BB962C8B-B14F-4D97-AF65-F5344CB8AC3E}">
+        <p14:creationId xmlns:p14="http://schemas.microsoft.com/office/powerpoint/2010/main" val="2995959217"/>
+      </p:ext>
+    </p:extLst>
+  </p:cSld>
+  <p:clrMapOvr>
+    <a:masterClrMapping/>
+  </p:clrMapOvr>
+</p:sld>
+</file>
+
+<file path=ppt/slides/slide4.xml><?xml version="1.0" encoding="utf-8"?>
+<p:sld xmlns:a="http://schemas.openxmlformats.org/drawingml/2006/main" xmlns:r="http://schemas.openxmlformats.org/officeDocument/2006/relationships" xmlns:p="http://schemas.openxmlformats.org/presentationml/2006/main">
+  <p:cSld>
+    <p:spTree>
+      <p:nvGrpSpPr>
+        <p:cNvPr id="1" name=""/>
+        <p:cNvGrpSpPr/>
+        <p:nvPr/>
+      </p:nvGrpSpPr>
+      <p:grpSpPr>
+        <a:xfrm>
+          <a:off x="0" y="0"/>
+          <a:ext cx="0" cy="0"/>
+          <a:chOff x="0" y="0"/>
+          <a:chExt cx="0" cy="0"/>
+        </a:xfrm>
+      </p:grpSpPr>
+      <p:sp>
+        <p:nvSpPr>
+          <p:cNvPr id="2" name="Title 1">
+            <a:extLst>
+              <a:ext uri="{FF2B5EF4-FFF2-40B4-BE49-F238E27FC236}">
+                <a16:creationId xmlns:a16="http://schemas.microsoft.com/office/drawing/2014/main" id="{0D579919-C6E2-9567-7090-CAE53ABB98F2}"/>
+              </a:ext>
+            </a:extLst>
+          </p:cNvPr>
+          <p:cNvSpPr>
+            <a:spLocks noGrp="1"/>
+          </p:cNvSpPr>
+          <p:nvPr>
+            <p:ph type="title"/>
+          </p:nvPr>
+        </p:nvSpPr>
+        <p:spPr/>
+        <p:txBody>
+          <a:bodyPr/>
+          <a:lstStyle/>
+          <a:p>
+            <a:r>
+              <a:rPr lang="nl-NL" dirty="0"/>
+              <a:t>How does a compiler/</a:t>
+            </a:r>
+            <a:r>
+              <a:rPr lang="nl-NL" dirty="0" err="1"/>
+              <a:t>interpreter</a:t>
+            </a:r>
+            <a:r>
+              <a:rPr lang="nl-NL" dirty="0"/>
+              <a:t> </a:t>
+            </a:r>
+            <a:r>
+              <a:rPr lang="nl-NL" dirty="0" err="1"/>
+              <a:t>work</a:t>
+            </a:r>
+            <a:r>
+              <a:rPr lang="nl-NL" dirty="0"/>
+              <a:t>?</a:t>
+            </a:r>
+            <a:br>
+              <a:rPr lang="nl-NL" dirty="0"/>
+            </a:br>
+            <a:endParaRPr lang="en-NZ" dirty="0"/>
+          </a:p>
+        </p:txBody>
+      </p:sp>
+      <p:sp>
+        <p:nvSpPr>
+          <p:cNvPr id="3" name="Content Placeholder 2">
+            <a:extLst>
+              <a:ext uri="{FF2B5EF4-FFF2-40B4-BE49-F238E27FC236}">
+                <a16:creationId xmlns:a16="http://schemas.microsoft.com/office/drawing/2014/main" id="{59AB64B0-F168-3D1C-B910-94794BA52546}"/>
+              </a:ext>
+            </a:extLst>
+          </p:cNvPr>
+          <p:cNvSpPr>
+            <a:spLocks noGrp="1"/>
+          </p:cNvSpPr>
+          <p:nvPr>
+            <p:ph idx="1"/>
+          </p:nvPr>
+        </p:nvSpPr>
+        <p:spPr/>
+        <p:txBody>
+          <a:bodyPr/>
+          <a:lstStyle/>
+          <a:p>
+            <a:endParaRPr lang="en-NZ"/>
+          </a:p>
+        </p:txBody>
+      </p:sp>
+      <p:sp>
+        <p:nvSpPr>
+          <p:cNvPr id="4" name="Slide Number Placeholder 3">
+            <a:extLst>
+              <a:ext uri="{FF2B5EF4-FFF2-40B4-BE49-F238E27FC236}">
+                <a16:creationId xmlns:a16="http://schemas.microsoft.com/office/drawing/2014/main" id="{DC8EA71F-443D-78BF-0A22-98AF5F78F492}"/>
+              </a:ext>
+            </a:extLst>
+          </p:cNvPr>
+          <p:cNvSpPr>
+            <a:spLocks noGrp="1"/>
+          </p:cNvSpPr>
+          <p:nvPr>
+            <p:ph type="sldNum" sz="quarter" idx="12"/>
+          </p:nvPr>
+        </p:nvSpPr>
+        <p:spPr/>
+        <p:txBody>
+          <a:bodyPr/>
+          <a:lstStyle/>
+          <a:p>
+            <a:fld id="{7E50A921-1625-4E66-8B53-913CC32CAF35}" type="slidenum">
+              <a:rPr lang="en-NZ" smtClean="0"/>
+              <a:t>4</a:t>
+            </a:fld>
+            <a:endParaRPr lang="en-NZ"/>
+          </a:p>
+        </p:txBody>
+      </p:sp>
+    </p:spTree>
+    <p:extLst>
+      <p:ext uri="{BB962C8B-B14F-4D97-AF65-F5344CB8AC3E}">
+        <p14:creationId xmlns:p14="http://schemas.microsoft.com/office/powerpoint/2010/main" val="1192826150"/>
+      </p:ext>
+    </p:extLst>
+  </p:cSld>
+  <p:clrMapOvr>
+    <a:masterClrMapping/>
+  </p:clrMapOvr>
+</p:sld>
+</file>
+
+<file path=ppt/slides/slide5.xml><?xml version="1.0" encoding="utf-8"?>
+<p:sld xmlns:a="http://schemas.openxmlformats.org/drawingml/2006/main" xmlns:r="http://schemas.openxmlformats.org/officeDocument/2006/relationships" xmlns:p="http://schemas.openxmlformats.org/presentationml/2006/main">
+  <p:cSld>
+    <p:spTree>
+      <p:nvGrpSpPr>
+        <p:cNvPr id="1" name=""/>
+        <p:cNvGrpSpPr/>
+        <p:nvPr/>
+      </p:nvGrpSpPr>
+      <p:grpSpPr>
+        <a:xfrm>
+          <a:off x="0" y="0"/>
+          <a:ext cx="0" cy="0"/>
+          <a:chOff x="0" y="0"/>
+          <a:chExt cx="0" cy="0"/>
+        </a:xfrm>
+      </p:grpSpPr>
+      <p:sp>
+        <p:nvSpPr>
+          <p:cNvPr id="2" name="Title 1">
+            <a:extLst>
+              <a:ext uri="{FF2B5EF4-FFF2-40B4-BE49-F238E27FC236}">
+                <a16:creationId xmlns:a16="http://schemas.microsoft.com/office/drawing/2014/main" id="{0E3D4BE5-9B71-A8EB-F825-B02C792C5B66}"/>
+              </a:ext>
+            </a:extLst>
+          </p:cNvPr>
+          <p:cNvSpPr>
+            <a:spLocks noGrp="1"/>
+          </p:cNvSpPr>
+          <p:nvPr>
+            <p:ph type="title"/>
+          </p:nvPr>
+        </p:nvSpPr>
+        <p:spPr/>
+        <p:txBody>
+          <a:bodyPr/>
+          <a:lstStyle/>
+          <a:p>
+            <a:r>
+              <a:rPr lang="en-NZ" dirty="0"/>
+              <a:t>What is JIT compiler?</a:t>
+            </a:r>
+            <a:br>
+              <a:rPr lang="en-NZ" dirty="0"/>
+            </a:br>
+            <a:endParaRPr lang="en-NZ" dirty="0"/>
+          </a:p>
+        </p:txBody>
+      </p:sp>
+      <p:sp>
+        <p:nvSpPr>
+          <p:cNvPr id="3" name="Content Placeholder 2">
+            <a:extLst>
+              <a:ext uri="{FF2B5EF4-FFF2-40B4-BE49-F238E27FC236}">
+                <a16:creationId xmlns:a16="http://schemas.microsoft.com/office/drawing/2014/main" id="{E852FD16-92F0-9BEB-02E1-C40C9711ABB0}"/>
+              </a:ext>
+            </a:extLst>
+          </p:cNvPr>
+          <p:cNvSpPr>
+            <a:spLocks noGrp="1"/>
+          </p:cNvSpPr>
+          <p:nvPr>
+            <p:ph idx="1"/>
+          </p:nvPr>
+        </p:nvSpPr>
+        <p:spPr/>
+        <p:txBody>
+          <a:bodyPr/>
+          <a:lstStyle/>
+          <a:p>
+            <a:endParaRPr lang="en-NZ"/>
+          </a:p>
+        </p:txBody>
+      </p:sp>
+      <p:sp>
+        <p:nvSpPr>
+          <p:cNvPr id="4" name="Slide Number Placeholder 3">
+            <a:extLst>
+              <a:ext uri="{FF2B5EF4-FFF2-40B4-BE49-F238E27FC236}">
+                <a16:creationId xmlns:a16="http://schemas.microsoft.com/office/drawing/2014/main" id="{D8D52B4C-6702-2465-EEDA-4E62AD0F7D8D}"/>
+              </a:ext>
+            </a:extLst>
+          </p:cNvPr>
+          <p:cNvSpPr>
+            <a:spLocks noGrp="1"/>
+          </p:cNvSpPr>
+          <p:nvPr>
+            <p:ph type="sldNum" sz="quarter" idx="12"/>
+          </p:nvPr>
+        </p:nvSpPr>
+        <p:spPr/>
+        <p:txBody>
+          <a:bodyPr/>
+          <a:lstStyle/>
+          <a:p>
+            <a:fld id="{7E50A921-1625-4E66-8B53-913CC32CAF35}" type="slidenum">
+              <a:rPr lang="en-NZ" smtClean="0"/>
+              <a:t>5</a:t>
+            </a:fld>
+            <a:endParaRPr lang="en-NZ"/>
+          </a:p>
+        </p:txBody>
+      </p:sp>
+    </p:spTree>
+    <p:extLst>
+      <p:ext uri="{BB962C8B-B14F-4D97-AF65-F5344CB8AC3E}">
+        <p14:creationId xmlns:p14="http://schemas.microsoft.com/office/powerpoint/2010/main" val="2644708043"/>
+      </p:ext>
+    </p:extLst>
+  </p:cSld>
+  <p:clrMapOvr>
+    <a:masterClrMapping/>
+  </p:clrMapOvr>
+</p:sld>
+</file>
+
+<file path=ppt/slides/slide6.xml><?xml version="1.0" encoding="utf-8"?>
+<p:sld xmlns:a="http://schemas.openxmlformats.org/drawingml/2006/main" xmlns:r="http://schemas.openxmlformats.org/officeDocument/2006/relationships" xmlns:p="http://schemas.openxmlformats.org/presentationml/2006/main">
+  <p:cSld>
+    <p:spTree>
+      <p:nvGrpSpPr>
+        <p:cNvPr id="1" name=""/>
+        <p:cNvGrpSpPr/>
+        <p:nvPr/>
+      </p:nvGrpSpPr>
+      <p:grpSpPr>
+        <a:xfrm>
+          <a:off x="0" y="0"/>
+          <a:ext cx="0" cy="0"/>
+          <a:chOff x="0" y="0"/>
+          <a:chExt cx="0" cy="0"/>
+        </a:xfrm>
+      </p:grpSpPr>
+      <p:sp>
+        <p:nvSpPr>
+          <p:cNvPr id="2" name="Title 1">
+            <a:extLst>
+              <a:ext uri="{FF2B5EF4-FFF2-40B4-BE49-F238E27FC236}">
+                <a16:creationId xmlns:a16="http://schemas.microsoft.com/office/drawing/2014/main" id="{2C5B0782-7159-8F98-2E27-954D7DE52950}"/>
+              </a:ext>
+            </a:extLst>
+          </p:cNvPr>
+          <p:cNvSpPr>
+            <a:spLocks noGrp="1"/>
+          </p:cNvSpPr>
+          <p:nvPr>
+            <p:ph type="title"/>
+          </p:nvPr>
+        </p:nvSpPr>
+        <p:spPr/>
+        <p:txBody>
+          <a:bodyPr/>
+          <a:lstStyle/>
+          <a:p>
+            <a:r>
+              <a:rPr lang="en-NZ" dirty="0"/>
+              <a:t>What are the pros and cons of using </a:t>
+            </a:r>
+            <a:r>
+              <a:rPr lang="en-NZ" dirty="0" err="1"/>
+              <a:t>jit</a:t>
+            </a:r>
+            <a:r>
+              <a:rPr lang="en-NZ" dirty="0"/>
+              <a:t> compiler?</a:t>
+            </a:r>
+            <a:br>
+              <a:rPr lang="en-NZ" dirty="0"/>
+            </a:br>
+            <a:endParaRPr lang="en-NZ" dirty="0"/>
+          </a:p>
+        </p:txBody>
+      </p:sp>
+      <p:sp>
+        <p:nvSpPr>
+          <p:cNvPr id="3" name="Content Placeholder 2">
+            <a:extLst>
+              <a:ext uri="{FF2B5EF4-FFF2-40B4-BE49-F238E27FC236}">
+                <a16:creationId xmlns:a16="http://schemas.microsoft.com/office/drawing/2014/main" id="{D51D5A20-6689-5701-4875-1C2864E9ABF5}"/>
+              </a:ext>
+            </a:extLst>
+          </p:cNvPr>
+          <p:cNvSpPr>
+            <a:spLocks noGrp="1"/>
+          </p:cNvSpPr>
+          <p:nvPr>
+            <p:ph idx="1"/>
+          </p:nvPr>
+        </p:nvSpPr>
+        <p:spPr/>
+        <p:txBody>
+          <a:bodyPr/>
+          <a:lstStyle/>
+          <a:p>
+            <a:endParaRPr lang="en-NZ"/>
+          </a:p>
+        </p:txBody>
+      </p:sp>
+      <p:sp>
+        <p:nvSpPr>
+          <p:cNvPr id="4" name="Slide Number Placeholder 3">
+            <a:extLst>
+              <a:ext uri="{FF2B5EF4-FFF2-40B4-BE49-F238E27FC236}">
+                <a16:creationId xmlns:a16="http://schemas.microsoft.com/office/drawing/2014/main" id="{4B759760-66FA-71E0-4642-931E9CE7B77B}"/>
+              </a:ext>
+            </a:extLst>
+          </p:cNvPr>
+          <p:cNvSpPr>
+            <a:spLocks noGrp="1"/>
+          </p:cNvSpPr>
+          <p:nvPr>
+            <p:ph type="sldNum" sz="quarter" idx="12"/>
+          </p:nvPr>
+        </p:nvSpPr>
+        <p:spPr/>
+        <p:txBody>
+          <a:bodyPr/>
+          <a:lstStyle/>
+          <a:p>
+            <a:fld id="{7E50A921-1625-4E66-8B53-913CC32CAF35}" type="slidenum">
+              <a:rPr lang="en-NZ" smtClean="0"/>
+              <a:t>6</a:t>
+            </a:fld>
+            <a:endParaRPr lang="en-NZ"/>
+          </a:p>
+        </p:txBody>
+      </p:sp>
+    </p:spTree>
+    <p:extLst>
+      <p:ext uri="{BB962C8B-B14F-4D97-AF65-F5344CB8AC3E}">
+        <p14:creationId xmlns:p14="http://schemas.microsoft.com/office/powerpoint/2010/main" val="1517301832"/>
+      </p:ext>
+    </p:extLst>
+  </p:cSld>
+  <p:clrMapOvr>
+    <a:masterClrMapping/>
+  </p:clrMapOvr>
+</p:sld>
+</file>
+
+<file path=ppt/slides/slide7.xml><?xml version="1.0" encoding="utf-8"?>
+<p:sld xmlns:a="http://schemas.openxmlformats.org/drawingml/2006/main" xmlns:r="http://schemas.openxmlformats.org/officeDocument/2006/relationships" xmlns:p="http://schemas.openxmlformats.org/presentationml/2006/main">
+  <p:cSld>
+    <p:spTree>
+      <p:nvGrpSpPr>
+        <p:cNvPr id="1" name=""/>
+        <p:cNvGrpSpPr/>
+        <p:nvPr/>
+      </p:nvGrpSpPr>
+      <p:grpSpPr>
+        <a:xfrm>
+          <a:off x="0" y="0"/>
+          <a:ext cx="0" cy="0"/>
+          <a:chOff x="0" y="0"/>
+          <a:chExt cx="0" cy="0"/>
+        </a:xfrm>
+      </p:grpSpPr>
+      <p:sp>
+        <p:nvSpPr>
+          <p:cNvPr id="2" name="Title 1">
+            <a:extLst>
+              <a:ext uri="{FF2B5EF4-FFF2-40B4-BE49-F238E27FC236}">
+                <a16:creationId xmlns:a16="http://schemas.microsoft.com/office/drawing/2014/main" id="{800C4E1B-00E5-859C-2C85-775346947D8A}"/>
+              </a:ext>
+            </a:extLst>
+          </p:cNvPr>
+          <p:cNvSpPr>
+            <a:spLocks noGrp="1"/>
+          </p:cNvSpPr>
+          <p:nvPr>
+            <p:ph type="title"/>
+          </p:nvPr>
+        </p:nvSpPr>
+        <p:spPr/>
+        <p:txBody>
+          <a:bodyPr/>
+          <a:lstStyle/>
+          <a:p>
+            <a:r>
+              <a:rPr lang="en-NZ" dirty="0"/>
+              <a:t>What are use cases for JIT compiler?</a:t>
+            </a:r>
+            <a:br>
+              <a:rPr lang="en-NZ" dirty="0"/>
+            </a:br>
+            <a:endParaRPr lang="en-NZ" dirty="0"/>
+          </a:p>
+        </p:txBody>
+      </p:sp>
+      <p:sp>
+        <p:nvSpPr>
+          <p:cNvPr id="3" name="Content Placeholder 2">
+            <a:extLst>
+              <a:ext uri="{FF2B5EF4-FFF2-40B4-BE49-F238E27FC236}">
+                <a16:creationId xmlns:a16="http://schemas.microsoft.com/office/drawing/2014/main" id="{B8821958-52F2-AEE7-8259-A83E79BB8E03}"/>
+              </a:ext>
+            </a:extLst>
+          </p:cNvPr>
+          <p:cNvSpPr>
+            <a:spLocks noGrp="1"/>
+          </p:cNvSpPr>
+          <p:nvPr>
+            <p:ph idx="1"/>
+          </p:nvPr>
+        </p:nvSpPr>
+        <p:spPr/>
+        <p:txBody>
+          <a:bodyPr/>
+          <a:lstStyle/>
+          <a:p>
+            <a:endParaRPr lang="en-NZ"/>
+          </a:p>
+        </p:txBody>
+      </p:sp>
+      <p:sp>
+        <p:nvSpPr>
+          <p:cNvPr id="4" name="Slide Number Placeholder 3">
+            <a:extLst>
+              <a:ext uri="{FF2B5EF4-FFF2-40B4-BE49-F238E27FC236}">
+                <a16:creationId xmlns:a16="http://schemas.microsoft.com/office/drawing/2014/main" id="{ACC79FBC-675A-A878-9411-07F35A13335F}"/>
+              </a:ext>
+            </a:extLst>
+          </p:cNvPr>
+          <p:cNvSpPr>
+            <a:spLocks noGrp="1"/>
+          </p:cNvSpPr>
+          <p:nvPr>
+            <p:ph type="sldNum" sz="quarter" idx="12"/>
+          </p:nvPr>
+        </p:nvSpPr>
+        <p:spPr/>
+        <p:txBody>
+          <a:bodyPr/>
+          <a:lstStyle/>
+          <a:p>
+            <a:fld id="{7E50A921-1625-4E66-8B53-913CC32CAF35}" type="slidenum">
+              <a:rPr lang="en-NZ" smtClean="0"/>
+              <a:t>7</a:t>
+            </a:fld>
+            <a:endParaRPr lang="en-NZ"/>
+          </a:p>
+        </p:txBody>
+      </p:sp>
+    </p:spTree>
+    <p:extLst>
+      <p:ext uri="{BB962C8B-B14F-4D97-AF65-F5344CB8AC3E}">
+        <p14:creationId xmlns:p14="http://schemas.microsoft.com/office/powerpoint/2010/main" val="3655054582"/>
+      </p:ext>
+    </p:extLst>
+  </p:cSld>
+  <p:clrMapOvr>
+    <a:masterClrMapping/>
+  </p:clrMapOvr>
+</p:sld>
+</file>
+
+<file path=ppt/slides/slide8.xml><?xml version="1.0" encoding="utf-8"?>
+<p:sld xmlns:a="http://schemas.openxmlformats.org/drawingml/2006/main" xmlns:r="http://schemas.openxmlformats.org/officeDocument/2006/relationships" xmlns:p="http://schemas.openxmlformats.org/presentationml/2006/main">
+  <p:cSld>
+    <p:spTree>
+      <p:nvGrpSpPr>
+        <p:cNvPr id="1" name=""/>
+        <p:cNvGrpSpPr/>
+        <p:nvPr/>
+      </p:nvGrpSpPr>
+      <p:grpSpPr>
+        <a:xfrm>
+          <a:off x="0" y="0"/>
+          <a:ext cx="0" cy="0"/>
+          <a:chOff x="0" y="0"/>
+          <a:chExt cx="0" cy="0"/>
+        </a:xfrm>
+      </p:grpSpPr>
+      <p:sp>
+        <p:nvSpPr>
+          <p:cNvPr id="2" name="Title 1">
+            <a:extLst>
+              <a:ext uri="{FF2B5EF4-FFF2-40B4-BE49-F238E27FC236}">
+                <a16:creationId xmlns:a16="http://schemas.microsoft.com/office/drawing/2014/main" id="{38748AEC-27DB-9458-5620-025583B84467}"/>
+              </a:ext>
+            </a:extLst>
+          </p:cNvPr>
+          <p:cNvSpPr>
+            <a:spLocks noGrp="1"/>
+          </p:cNvSpPr>
+          <p:nvPr>
+            <p:ph type="title"/>
+          </p:nvPr>
+        </p:nvSpPr>
+        <p:spPr/>
+        <p:txBody>
+          <a:bodyPr/>
+          <a:lstStyle/>
+          <a:p>
+            <a:r>
+              <a:rPr lang="en-NZ" dirty="0"/>
+              <a:t>Future for JIT compiler?</a:t>
+            </a:r>
+            <a:br>
+              <a:rPr lang="en-NZ" dirty="0"/>
+            </a:br>
+            <a:endParaRPr lang="en-NZ" dirty="0"/>
+          </a:p>
+        </p:txBody>
+      </p:sp>
+      <p:sp>
+        <p:nvSpPr>
+          <p:cNvPr id="3" name="Content Placeholder 2">
+            <a:extLst>
+              <a:ext uri="{FF2B5EF4-FFF2-40B4-BE49-F238E27FC236}">
+                <a16:creationId xmlns:a16="http://schemas.microsoft.com/office/drawing/2014/main" id="{92B70313-9A05-94E6-E335-058598671C3A}"/>
+              </a:ext>
+            </a:extLst>
+          </p:cNvPr>
+          <p:cNvSpPr>
+            <a:spLocks noGrp="1"/>
+          </p:cNvSpPr>
+          <p:nvPr>
+            <p:ph idx="1"/>
+          </p:nvPr>
+        </p:nvSpPr>
+        <p:spPr/>
+        <p:txBody>
+          <a:bodyPr/>
+          <a:lstStyle/>
+          <a:p>
+            <a:endParaRPr lang="en-NZ"/>
+          </a:p>
+        </p:txBody>
+      </p:sp>
+      <p:sp>
+        <p:nvSpPr>
+          <p:cNvPr id="4" name="Slide Number Placeholder 3">
+            <a:extLst>
+              <a:ext uri="{FF2B5EF4-FFF2-40B4-BE49-F238E27FC236}">
+                <a16:creationId xmlns:a16="http://schemas.microsoft.com/office/drawing/2014/main" id="{01678E4D-5CC8-8C31-F1BF-8F9DC6C510D1}"/>
+              </a:ext>
+            </a:extLst>
+          </p:cNvPr>
+          <p:cNvSpPr>
+            <a:spLocks noGrp="1"/>
+          </p:cNvSpPr>
+          <p:nvPr>
+            <p:ph type="sldNum" sz="quarter" idx="12"/>
+          </p:nvPr>
+        </p:nvSpPr>
+        <p:spPr/>
+        <p:txBody>
+          <a:bodyPr/>
+          <a:lstStyle/>
+          <a:p>
+            <a:fld id="{7E50A921-1625-4E66-8B53-913CC32CAF35}" type="slidenum">
+              <a:rPr lang="en-NZ" smtClean="0"/>
+              <a:t>8</a:t>
+            </a:fld>
+            <a:endParaRPr lang="en-NZ"/>
+          </a:p>
+        </p:txBody>
+      </p:sp>
+    </p:spTree>
+    <p:extLst>
+      <p:ext uri="{BB962C8B-B14F-4D97-AF65-F5344CB8AC3E}">
+        <p14:creationId xmlns:p14="http://schemas.microsoft.com/office/powerpoint/2010/main" val="808733467"/>
+      </p:ext>
+    </p:extLst>
+  </p:cSld>
+  <p:clrMapOvr>
+    <a:masterClrMapping/>
+  </p:clrMapOvr>
+</p:sld>
+</file>
+
+<file path=ppt/slides/slide9.xml><?xml version="1.0" encoding="utf-8"?>
+<p:sld xmlns:a="http://schemas.openxmlformats.org/drawingml/2006/main" xmlns:r="http://schemas.openxmlformats.org/officeDocument/2006/relationships" xmlns:p="http://schemas.openxmlformats.org/presentationml/2006/main">
+  <p:cSld>
+    <p:spTree>
+      <p:nvGrpSpPr>
+        <p:cNvPr id="1" name=""/>
+        <p:cNvGrpSpPr/>
+        <p:nvPr/>
+      </p:nvGrpSpPr>
+      <p:grpSpPr>
+        <a:xfrm>
+          <a:off x="0" y="0"/>
+          <a:ext cx="0" cy="0"/>
+          <a:chOff x="0" y="0"/>
+          <a:chExt cx="0" cy="0"/>
+        </a:xfrm>
+      </p:grpSpPr>
+      <p:sp>
+        <p:nvSpPr>
+          <p:cNvPr id="2" name="Title 1">
+            <a:extLst>
+              <a:ext uri="{FF2B5EF4-FFF2-40B4-BE49-F238E27FC236}">
+                <a16:creationId xmlns:a16="http://schemas.microsoft.com/office/drawing/2014/main" id="{220305A0-C5E7-D7B2-2FDF-5333EC4E6D1A}"/>
+              </a:ext>
+            </a:extLst>
+          </p:cNvPr>
+          <p:cNvSpPr>
+            <a:spLocks noGrp="1"/>
+          </p:cNvSpPr>
+          <p:nvPr>
+            <p:ph type="title"/>
+          </p:nvPr>
+        </p:nvSpPr>
+        <p:spPr>
+          <a:xfrm>
+            <a:off x="3608767" y="3013038"/>
+            <a:ext cx="9404723" cy="1400530"/>
+          </a:xfrm>
+        </p:spPr>
+        <p:txBody>
+          <a:bodyPr/>
+          <a:lstStyle/>
+          <a:p>
+            <a:r>
+              <a:rPr lang="nl-NL" dirty="0" err="1"/>
+              <a:t>Questions</a:t>
+            </a:r>
+            <a:r>
+              <a:rPr lang="nl-NL" dirty="0"/>
+              <a:t>?</a:t>
+            </a:r>
+            <a:endParaRPr lang="en-NZ" dirty="0"/>
+          </a:p>
+        </p:txBody>
+      </p:sp>
+      <p:sp>
+        <p:nvSpPr>
+          <p:cNvPr id="4" name="Slide Number Placeholder 3">
+            <a:extLst>
+              <a:ext uri="{FF2B5EF4-FFF2-40B4-BE49-F238E27FC236}">
+                <a16:creationId xmlns:a16="http://schemas.microsoft.com/office/drawing/2014/main" id="{6271BA6B-DFB5-693C-FAC6-10508B35CB42}"/>
+              </a:ext>
+            </a:extLst>
+          </p:cNvPr>
+          <p:cNvSpPr>
+            <a:spLocks noGrp="1"/>
+          </p:cNvSpPr>
+          <p:nvPr>
+            <p:ph type="sldNum" sz="quarter" idx="12"/>
+          </p:nvPr>
+        </p:nvSpPr>
+        <p:spPr/>
+        <p:txBody>
+          <a:bodyPr/>
+          <a:lstStyle/>
+          <a:p>
+            <a:fld id="{7E50A921-1625-4E66-8B53-913CC32CAF35}" type="slidenum">
+              <a:rPr lang="en-NZ" smtClean="0"/>
+              <a:t>9</a:t>
+            </a:fld>
+            <a:endParaRPr lang="en-NZ"/>
+          </a:p>
+        </p:txBody>
+      </p:sp>
+    </p:spTree>
+    <p:extLst>
+      <p:ext uri="{BB962C8B-B14F-4D97-AF65-F5344CB8AC3E}">
+        <p14:creationId xmlns:p14="http://schemas.microsoft.com/office/powerpoint/2010/main" val="2403430344"/>
       </p:ext>
     </p:extLst>
   </p:cSld>
@@ -7654,4 +9081,319 @@
     </a:ext>
   </a:extLst>
 </a:theme>
+</file>
+
+<file path=ppt/theme/theme2.xml><?xml version="1.0" encoding="utf-8"?>
+<a:theme xmlns:a="http://schemas.openxmlformats.org/drawingml/2006/main" name="Office Theme">
+  <a:themeElements>
+    <a:clrScheme name="Office">
+      <a:dk1>
+        <a:sysClr val="windowText" lastClr="000000"/>
+      </a:dk1>
+      <a:lt1>
+        <a:sysClr val="window" lastClr="FFFFFF"/>
+      </a:lt1>
+      <a:dk2>
+        <a:srgbClr val="0E2841"/>
+      </a:dk2>
+      <a:lt2>
+        <a:srgbClr val="E8E8E8"/>
+      </a:lt2>
+      <a:accent1>
+        <a:srgbClr val="156082"/>
+      </a:accent1>
+      <a:accent2>
+        <a:srgbClr val="E97132"/>
+      </a:accent2>
+      <a:accent3>
+        <a:srgbClr val="196B24"/>
+      </a:accent3>
+      <a:accent4>
+        <a:srgbClr val="0F9ED5"/>
+      </a:accent4>
+      <a:accent5>
+        <a:srgbClr val="A02B93"/>
+      </a:accent5>
+      <a:accent6>
+        <a:srgbClr val="4EA72E"/>
+      </a:accent6>
+      <a:hlink>
+        <a:srgbClr val="467886"/>
+      </a:hlink>
+      <a:folHlink>
+        <a:srgbClr val="96607D"/>
+      </a:folHlink>
+    </a:clrScheme>
+    <a:fontScheme name="Office">
+      <a:majorFont>
+        <a:latin typeface="Aptos Display" panose="02110004020202020204"/>
+        <a:ea typeface=""/>
+        <a:cs typeface=""/>
+        <a:font script="Jpan" typeface="游ゴシック Light"/>
+        <a:font script="Hang" typeface="맑은 고딕"/>
+        <a:font script="Hans" typeface="等线 Light"/>
+        <a:font script="Hant" typeface="新細明體"/>
+        <a:font script="Arab" typeface="Times New Roman"/>
+        <a:font script="Hebr" typeface="Times New Roman"/>
+        <a:font script="Thai" typeface="Angsana New"/>
+        <a:font script="Ethi" typeface="Nyala"/>
+        <a:font script="Beng" typeface="Vrinda"/>
+        <a:font script="Gujr" typeface="Shruti"/>
+        <a:font script="Khmr" typeface="MoolBoran"/>
+        <a:font script="Knda" typeface="Tunga"/>
+        <a:font script="Guru" typeface="Raavi"/>
+        <a:font script="Cans" typeface="Euphemia"/>
+        <a:font script="Cher" typeface="Plantagenet Cherokee"/>
+        <a:font script="Yiii" typeface="Microsoft Yi Baiti"/>
+        <a:font script="Tibt" typeface="Microsoft Himalaya"/>
+        <a:font script="Thaa" typeface="MV Boli"/>
+        <a:font script="Deva" typeface="Mangal"/>
+        <a:font script="Telu" typeface="Gautami"/>
+        <a:font script="Taml" typeface="Latha"/>
+        <a:font script="Syrc" typeface="Estrangelo Edessa"/>
+        <a:font script="Orya" typeface="Kalinga"/>
+        <a:font script="Mlym" typeface="Kartika"/>
+        <a:font script="Laoo" typeface="DokChampa"/>
+        <a:font script="Sinh" typeface="Iskoola Pota"/>
+        <a:font script="Mong" typeface="Mongolian Baiti"/>
+        <a:font script="Viet" typeface="Times New Roman"/>
+        <a:font script="Uigh" typeface="Microsoft Uighur"/>
+        <a:font script="Geor" typeface="Sylfaen"/>
+        <a:font script="Armn" typeface="Arial"/>
+        <a:font script="Bugi" typeface="Leelawadee UI"/>
+        <a:font script="Bopo" typeface="Microsoft JhengHei"/>
+        <a:font script="Java" typeface="Javanese Text"/>
+        <a:font script="Lisu" typeface="Segoe UI"/>
+        <a:font script="Mymr" typeface="Myanmar Text"/>
+        <a:font script="Nkoo" typeface="Ebrima"/>
+        <a:font script="Olck" typeface="Nirmala UI"/>
+        <a:font script="Osma" typeface="Ebrima"/>
+        <a:font script="Phag" typeface="Phagspa"/>
+        <a:font script="Syrn" typeface="Estrangelo Edessa"/>
+        <a:font script="Syrj" typeface="Estrangelo Edessa"/>
+        <a:font script="Syre" typeface="Estrangelo Edessa"/>
+        <a:font script="Sora" typeface="Nirmala UI"/>
+        <a:font script="Tale" typeface="Microsoft Tai Le"/>
+        <a:font script="Talu" typeface="Microsoft New Tai Lue"/>
+        <a:font script="Tfng" typeface="Ebrima"/>
+      </a:majorFont>
+      <a:minorFont>
+        <a:latin typeface="Aptos" panose="02110004020202020204"/>
+        <a:ea typeface=""/>
+        <a:cs typeface=""/>
+        <a:font script="Jpan" typeface="游ゴシック"/>
+        <a:font script="Hang" typeface="맑은 고딕"/>
+        <a:font script="Hans" typeface="等线"/>
+        <a:font script="Hant" typeface="新細明體"/>
+        <a:font script="Arab" typeface="Arial"/>
+        <a:font script="Hebr" typeface="Arial"/>
+        <a:font script="Thai" typeface="Cordia New"/>
+        <a:font script="Ethi" typeface="Nyala"/>
+        <a:font script="Beng" typeface="Vrinda"/>
+        <a:font script="Gujr" typeface="Shruti"/>
+        <a:font script="Khmr" typeface="DaunPenh"/>
+        <a:font script="Knda" typeface="Tunga"/>
+        <a:font script="Guru" typeface="Raavi"/>
+        <a:font script="Cans" typeface="Euphemia"/>
+        <a:font script="Cher" typeface="Plantagenet Cherokee"/>
+        <a:font script="Yiii" typeface="Microsoft Yi Baiti"/>
+        <a:font script="Tibt" typeface="Microsoft Himalaya"/>
+        <a:font script="Thaa" typeface="MV Boli"/>
+        <a:font script="Deva" typeface="Mangal"/>
+        <a:font script="Telu" typeface="Gautami"/>
+        <a:font script="Taml" typeface="Latha"/>
+        <a:font script="Syrc" typeface="Estrangelo Edessa"/>
+        <a:font script="Orya" typeface="Kalinga"/>
+        <a:font script="Mlym" typeface="Kartika"/>
+        <a:font script="Laoo" typeface="DokChampa"/>
+        <a:font script="Sinh" typeface="Iskoola Pota"/>
+        <a:font script="Mong" typeface="Mongolian Baiti"/>
+        <a:font script="Viet" typeface="Arial"/>
+        <a:font script="Uigh" typeface="Microsoft Uighur"/>
+        <a:font script="Geor" typeface="Sylfaen"/>
+        <a:font script="Armn" typeface="Arial"/>
+        <a:font script="Bugi" typeface="Leelawadee UI"/>
+        <a:font script="Bopo" typeface="Microsoft JhengHei"/>
+        <a:font script="Java" typeface="Javanese Text"/>
+        <a:font script="Lisu" typeface="Segoe UI"/>
+        <a:font script="Mymr" typeface="Myanmar Text"/>
+        <a:font script="Nkoo" typeface="Ebrima"/>
+        <a:font script="Olck" typeface="Nirmala UI"/>
+        <a:font script="Osma" typeface="Ebrima"/>
+        <a:font script="Phag" typeface="Phagspa"/>
+        <a:font script="Syrn" typeface="Estrangelo Edessa"/>
+        <a:font script="Syrj" typeface="Estrangelo Edessa"/>
+        <a:font script="Syre" typeface="Estrangelo Edessa"/>
+        <a:font script="Sora" typeface="Nirmala UI"/>
+        <a:font script="Tale" typeface="Microsoft Tai Le"/>
+        <a:font script="Talu" typeface="Microsoft New Tai Lue"/>
+        <a:font script="Tfng" typeface="Ebrima"/>
+      </a:minorFont>
+    </a:fontScheme>
+    <a:fmtScheme name="Office">
+      <a:fillStyleLst>
+        <a:solidFill>
+          <a:schemeClr val="phClr"/>
+        </a:solidFill>
+        <a:gradFill rotWithShape="1">
+          <a:gsLst>
+            <a:gs pos="0">
+              <a:schemeClr val="phClr">
+                <a:lumMod val="110000"/>
+                <a:satMod val="105000"/>
+                <a:tint val="67000"/>
+              </a:schemeClr>
+            </a:gs>
+            <a:gs pos="50000">
+              <a:schemeClr val="phClr">
+                <a:lumMod val="105000"/>
+                <a:satMod val="103000"/>
+                <a:tint val="73000"/>
+              </a:schemeClr>
+            </a:gs>
+            <a:gs pos="100000">
+              <a:schemeClr val="phClr">
+                <a:lumMod val="105000"/>
+                <a:satMod val="109000"/>
+                <a:tint val="81000"/>
+              </a:schemeClr>
+            </a:gs>
+          </a:gsLst>
+          <a:lin ang="5400000" scaled="0"/>
+        </a:gradFill>
+        <a:gradFill rotWithShape="1">
+          <a:gsLst>
+            <a:gs pos="0">
+              <a:schemeClr val="phClr">
+                <a:satMod val="103000"/>
+                <a:lumMod val="102000"/>
+                <a:tint val="94000"/>
+              </a:schemeClr>
+            </a:gs>
+            <a:gs pos="50000">
+              <a:schemeClr val="phClr">
+                <a:satMod val="110000"/>
+                <a:lumMod val="100000"/>
+                <a:shade val="100000"/>
+              </a:schemeClr>
+            </a:gs>
+            <a:gs pos="100000">
+              <a:schemeClr val="phClr">
+                <a:lumMod val="99000"/>
+                <a:satMod val="120000"/>
+                <a:shade val="78000"/>
+              </a:schemeClr>
+            </a:gs>
+          </a:gsLst>
+          <a:lin ang="5400000" scaled="0"/>
+        </a:gradFill>
+      </a:fillStyleLst>
+      <a:lnStyleLst>
+        <a:ln w="12700" cap="flat" cmpd="sng" algn="ctr">
+          <a:solidFill>
+            <a:schemeClr val="phClr"/>
+          </a:solidFill>
+          <a:prstDash val="solid"/>
+          <a:miter lim="800000"/>
+        </a:ln>
+        <a:ln w="19050" cap="flat" cmpd="sng" algn="ctr">
+          <a:solidFill>
+            <a:schemeClr val="phClr"/>
+          </a:solidFill>
+          <a:prstDash val="solid"/>
+          <a:miter lim="800000"/>
+        </a:ln>
+        <a:ln w="25400" cap="flat" cmpd="sng" algn="ctr">
+          <a:solidFill>
+            <a:schemeClr val="phClr"/>
+          </a:solidFill>
+          <a:prstDash val="solid"/>
+          <a:miter lim="800000"/>
+        </a:ln>
+      </a:lnStyleLst>
+      <a:effectStyleLst>
+        <a:effectStyle>
+          <a:effectLst/>
+        </a:effectStyle>
+        <a:effectStyle>
+          <a:effectLst/>
+        </a:effectStyle>
+        <a:effectStyle>
+          <a:effectLst>
+            <a:outerShdw blurRad="57150" dist="19050" dir="5400000" algn="ctr" rotWithShape="0">
+              <a:srgbClr val="000000">
+                <a:alpha val="63000"/>
+              </a:srgbClr>
+            </a:outerShdw>
+          </a:effectLst>
+        </a:effectStyle>
+      </a:effectStyleLst>
+      <a:bgFillStyleLst>
+        <a:solidFill>
+          <a:schemeClr val="phClr"/>
+        </a:solidFill>
+        <a:solidFill>
+          <a:schemeClr val="phClr">
+            <a:tint val="95000"/>
+            <a:satMod val="170000"/>
+          </a:schemeClr>
+        </a:solidFill>
+        <a:gradFill rotWithShape="1">
+          <a:gsLst>
+            <a:gs pos="0">
+              <a:schemeClr val="phClr">
+                <a:tint val="93000"/>
+                <a:satMod val="150000"/>
+                <a:shade val="98000"/>
+                <a:lumMod val="102000"/>
+              </a:schemeClr>
+            </a:gs>
+            <a:gs pos="50000">
+              <a:schemeClr val="phClr">
+                <a:tint val="98000"/>
+                <a:satMod val="130000"/>
+                <a:shade val="90000"/>
+                <a:lumMod val="103000"/>
+              </a:schemeClr>
+            </a:gs>
+            <a:gs pos="100000">
+              <a:schemeClr val="phClr">
+                <a:shade val="63000"/>
+                <a:satMod val="120000"/>
+              </a:schemeClr>
+            </a:gs>
+          </a:gsLst>
+          <a:lin ang="5400000" scaled="0"/>
+        </a:gradFill>
+      </a:bgFillStyleLst>
+    </a:fmtScheme>
+  </a:themeElements>
+  <a:objectDefaults>
+    <a:lnDef>
+      <a:spPr/>
+      <a:bodyPr/>
+      <a:lstStyle/>
+      <a:style>
+        <a:lnRef idx="2">
+          <a:schemeClr val="accent1"/>
+        </a:lnRef>
+        <a:fillRef idx="0">
+          <a:schemeClr val="accent1"/>
+        </a:fillRef>
+        <a:effectRef idx="1">
+          <a:schemeClr val="accent1"/>
+        </a:effectRef>
+        <a:fontRef idx="minor">
+          <a:schemeClr val="tx1"/>
+        </a:fontRef>
+      </a:style>
+    </a:lnDef>
+  </a:objectDefaults>
+  <a:extraClrSchemeLst/>
+  <a:extLst>
+    <a:ext uri="{05A4C25C-085E-4340-85A3-A5531E510DB2}">
+      <thm15:themeFamily xmlns:thm15="http://schemas.microsoft.com/office/thememl/2012/main" name="Office Theme" id="{2E142A2C-CD16-42D6-873A-C26D2A0506FA}" vid="{1BDDFF52-6CD6-40A5-AB3C-68EB2F1E4D0A}"/>
+    </a:ext>
+  </a:extLst>
+</a:theme>
 </file>
</xml_diff>

<commit_message>
new updates on documentation
</commit_message>
<xml_diff>
--- a/documents/presentation/presentation jit compiler.pptx
+++ b/documents/presentation/presentation jit compiler.pptx
@@ -5,7 +5,7 @@
     <p:sldMasterId id="2147483660" r:id="rId1"/>
   </p:sldMasterIdLst>
   <p:notesMasterIdLst>
-    <p:notesMasterId r:id="rId11"/>
+    <p:notesMasterId r:id="rId12"/>
   </p:notesMasterIdLst>
   <p:sldIdLst>
     <p:sldId id="256" r:id="rId2"/>
@@ -17,6 +17,7 @@
     <p:sldId id="262" r:id="rId8"/>
     <p:sldId id="263" r:id="rId9"/>
     <p:sldId id="264" r:id="rId10"/>
+    <p:sldId id="265" r:id="rId11"/>
   </p:sldIdLst>
   <p:sldSz cx="12192000" cy="6858000"/>
   <p:notesSz cx="6858000" cy="9144000"/>
@@ -135,8 +136,8 @@
 <pc:chgInfo xmlns:a="http://schemas.openxmlformats.org/drawingml/2006/main" xmlns:r="http://schemas.openxmlformats.org/officeDocument/2006/relationships" xmlns:ac="http://schemas.microsoft.com/office/drawing/2013/main/command" xmlns:pc="http://schemas.microsoft.com/office/powerpoint/2013/main/command">
   <pc:docChgLst>
     <pc:chgData name="Arauz Bonilla,Jorge J.U." userId="1bf2599c-1c01-48b4-bae8-52167a7d20f0" providerId="ADAL" clId="{624A80EA-D9D4-4B65-BDA5-67D086C5850A}"/>
-    <pc:docChg chg="custSel addSld modSld">
-      <pc:chgData name="Arauz Bonilla,Jorge J.U." userId="1bf2599c-1c01-48b4-bae8-52167a7d20f0" providerId="ADAL" clId="{624A80EA-D9D4-4B65-BDA5-67D086C5850A}" dt="2024-09-26T11:00:35.895" v="537" actId="478"/>
+    <pc:docChg chg="custSel addSld modSld sldOrd">
+      <pc:chgData name="Arauz Bonilla,Jorge J.U." userId="1bf2599c-1c01-48b4-bae8-52167a7d20f0" providerId="ADAL" clId="{624A80EA-D9D4-4B65-BDA5-67D086C5850A}" dt="2024-09-30T09:23:10.167" v="549"/>
       <pc:docMkLst>
         <pc:docMk/>
       </pc:docMkLst>
@@ -339,6 +340,21 @@
           </ac:spMkLst>
         </pc:spChg>
       </pc:sldChg>
+      <pc:sldChg chg="modSp new mod ord">
+        <pc:chgData name="Arauz Bonilla,Jorge J.U." userId="1bf2599c-1c01-48b4-bae8-52167a7d20f0" providerId="ADAL" clId="{624A80EA-D9D4-4B65-BDA5-67D086C5850A}" dt="2024-09-30T09:23:10.167" v="549"/>
+        <pc:sldMkLst>
+          <pc:docMk/>
+          <pc:sldMk cId="2472288588" sldId="265"/>
+        </pc:sldMkLst>
+        <pc:spChg chg="mod">
+          <ac:chgData name="Arauz Bonilla,Jorge J.U." userId="1bf2599c-1c01-48b4-bae8-52167a7d20f0" providerId="ADAL" clId="{624A80EA-D9D4-4B65-BDA5-67D086C5850A}" dt="2024-09-30T09:19:01.899" v="547" actId="122"/>
+          <ac:spMkLst>
+            <pc:docMk/>
+            <pc:sldMk cId="2472288588" sldId="265"/>
+            <ac:spMk id="2" creationId="{58FD6306-A2FE-5588-A9A2-5227B6217ED8}"/>
+          </ac:spMkLst>
+        </pc:spChg>
+      </pc:sldChg>
     </pc:docChg>
   </pc:docChgLst>
 </pc:chgInfo>
@@ -426,7 +442,7 @@
           <a:p>
             <a:fld id="{7097D9E5-16FE-4A2E-9805-C519DE9D3040}" type="datetimeFigureOut">
               <a:rPr lang="en-NZ" smtClean="0"/>
-              <a:t>26/09/2024</a:t>
+              <a:t>30/09/2024</a:t>
             </a:fld>
             <a:endParaRPr lang="en-NZ"/>
           </a:p>
@@ -880,7 +896,7 @@
           <a:p>
             <a:fld id="{131A0DB0-A85B-4487-8F34-6C89C5E4FE9D}" type="datetime1">
               <a:rPr lang="en-NZ" smtClean="0"/>
-              <a:t>26/09/2024</a:t>
+              <a:t>30/09/2024</a:t>
             </a:fld>
             <a:endParaRPr lang="en-NZ"/>
           </a:p>
@@ -1155,7 +1171,7 @@
           <a:p>
             <a:fld id="{5323748D-C940-46E8-A8FE-39A302589491}" type="datetime1">
               <a:rPr lang="en-NZ" smtClean="0"/>
-              <a:t>26/09/2024</a:t>
+              <a:t>30/09/2024</a:t>
             </a:fld>
             <a:endParaRPr lang="en-NZ"/>
           </a:p>
@@ -1349,7 +1365,7 @@
           <a:p>
             <a:fld id="{8E1F1FAA-C845-4339-889E-28EF06EE40FF}" type="datetime1">
               <a:rPr lang="en-NZ" smtClean="0"/>
-              <a:t>26/09/2024</a:t>
+              <a:t>30/09/2024</a:t>
             </a:fld>
             <a:endParaRPr lang="en-NZ"/>
           </a:p>
@@ -1622,7 +1638,7 @@
           <a:p>
             <a:fld id="{944BABD2-5B36-4C22-8FAE-825B3CD25B81}" type="datetime1">
               <a:rPr lang="en-NZ" smtClean="0"/>
-              <a:t>26/09/2024</a:t>
+              <a:t>30/09/2024</a:t>
             </a:fld>
             <a:endParaRPr lang="en-NZ"/>
           </a:p>
@@ -1963,7 +1979,7 @@
           <a:p>
             <a:fld id="{7E84032B-D658-433F-842C-DAFAE1FBCD74}" type="datetime1">
               <a:rPr lang="en-NZ" smtClean="0"/>
-              <a:t>26/09/2024</a:t>
+              <a:t>30/09/2024</a:t>
             </a:fld>
             <a:endParaRPr lang="en-NZ"/>
           </a:p>
@@ -2586,7 +2602,7 @@
           <a:p>
             <a:fld id="{BE0BD24D-BB39-48BC-8468-64E039742EBA}" type="datetime1">
               <a:rPr lang="en-NZ" smtClean="0"/>
-              <a:t>26/09/2024</a:t>
+              <a:t>30/09/2024</a:t>
             </a:fld>
             <a:endParaRPr lang="en-NZ"/>
           </a:p>
@@ -3446,7 +3462,7 @@
           <a:p>
             <a:fld id="{1BEEC8BB-492B-4068-A56A-07D34DE636F2}" type="datetime1">
               <a:rPr lang="en-NZ" smtClean="0"/>
-              <a:t>26/09/2024</a:t>
+              <a:t>30/09/2024</a:t>
             </a:fld>
             <a:endParaRPr lang="en-NZ"/>
           </a:p>
@@ -3616,7 +3632,7 @@
           <a:p>
             <a:fld id="{511142B1-8092-47B7-9305-FA1D52CEA1CE}" type="datetime1">
               <a:rPr lang="en-NZ" smtClean="0"/>
-              <a:t>26/09/2024</a:t>
+              <a:t>30/09/2024</a:t>
             </a:fld>
             <a:endParaRPr lang="en-NZ"/>
           </a:p>
@@ -3796,7 +3812,7 @@
           <a:p>
             <a:fld id="{B05740B9-E3C6-4C7C-A2EA-16EBC5D7C804}" type="datetime1">
               <a:rPr lang="en-NZ" smtClean="0"/>
-              <a:t>26/09/2024</a:t>
+              <a:t>30/09/2024</a:t>
             </a:fld>
             <a:endParaRPr lang="en-NZ"/>
           </a:p>
@@ -3966,7 +3982,7 @@
           <a:p>
             <a:fld id="{7F7A93E3-8E57-4E1F-B6A6-44FB3C00BCF0}" type="datetime1">
               <a:rPr lang="en-NZ" smtClean="0"/>
-              <a:t>26/09/2024</a:t>
+              <a:t>30/09/2024</a:t>
             </a:fld>
             <a:endParaRPr lang="en-NZ"/>
           </a:p>
@@ -4213,7 +4229,7 @@
           <a:p>
             <a:fld id="{49788324-9239-4A6A-B263-18CF364C18E6}" type="datetime1">
               <a:rPr lang="en-NZ" smtClean="0"/>
-              <a:t>26/09/2024</a:t>
+              <a:t>30/09/2024</a:t>
             </a:fld>
             <a:endParaRPr lang="en-NZ"/>
           </a:p>
@@ -4505,7 +4521,7 @@
           <a:p>
             <a:fld id="{4224155E-B995-4A63-957A-09BAD2FBC677}" type="datetime1">
               <a:rPr lang="en-NZ" smtClean="0"/>
-              <a:t>26/09/2024</a:t>
+              <a:t>30/09/2024</a:t>
             </a:fld>
             <a:endParaRPr lang="en-NZ"/>
           </a:p>
@@ -4949,7 +4965,7 @@
           <a:p>
             <a:fld id="{94852875-0C79-4139-AC32-AABE6788AEEA}" type="datetime1">
               <a:rPr lang="en-NZ" smtClean="0"/>
-              <a:t>26/09/2024</a:t>
+              <a:t>30/09/2024</a:t>
             </a:fld>
             <a:endParaRPr lang="en-NZ"/>
           </a:p>
@@ -5067,7 +5083,7 @@
           <a:p>
             <a:fld id="{670F642C-953D-4942-A0BD-F75D51C3B3D0}" type="datetime1">
               <a:rPr lang="en-NZ" smtClean="0"/>
-              <a:t>26/09/2024</a:t>
+              <a:t>30/09/2024</a:t>
             </a:fld>
             <a:endParaRPr lang="en-NZ"/>
           </a:p>
@@ -5162,7 +5178,7 @@
           <a:p>
             <a:fld id="{F0942B63-0C58-44B7-A52C-10399CE2763E}" type="datetime1">
               <a:rPr lang="en-NZ" smtClean="0"/>
-              <a:t>26/09/2024</a:t>
+              <a:t>30/09/2024</a:t>
             </a:fld>
             <a:endParaRPr lang="en-NZ"/>
           </a:p>
@@ -5441,7 +5457,7 @@
           <a:p>
             <a:fld id="{0F087F2A-8ED5-40BC-A804-86A9632A31D7}" type="datetime1">
               <a:rPr lang="en-NZ" smtClean="0"/>
-              <a:t>26/09/2024</a:t>
+              <a:t>30/09/2024</a:t>
             </a:fld>
             <a:endParaRPr lang="en-NZ"/>
           </a:p>
@@ -5716,7 +5732,7 @@
           <a:p>
             <a:fld id="{5D2796AF-1BE4-4202-AFC4-0C711630C0B7}" type="datetime1">
               <a:rPr lang="en-NZ" smtClean="0"/>
-              <a:t>26/09/2024</a:t>
+              <a:t>30/09/2024</a:t>
             </a:fld>
             <a:endParaRPr lang="en-NZ"/>
           </a:p>
@@ -6145,7 +6161,7 @@
           <a:p>
             <a:fld id="{F4BE01E5-D6DC-4CBF-AB22-D83052A50459}" type="datetime1">
               <a:rPr lang="en-NZ" smtClean="0"/>
-              <a:t>26/09/2024</a:t>
+              <a:t>30/09/2024</a:t>
             </a:fld>
             <a:endParaRPr lang="en-NZ"/>
           </a:p>
@@ -7801,6 +7817,125 @@
   </p:cSld>
   <p:clrMapOvr>
     <a:overrideClrMapping bg1="lt1" tx1="dk1" bg2="lt2" tx2="dk2" accent1="accent1" accent2="accent2" accent3="accent3" accent4="accent4" accent5="accent5" accent6="accent6" hlink="hlink" folHlink="folHlink"/>
+  </p:clrMapOvr>
+</p:sld>
+</file>
+
+<file path=ppt/slides/slide10.xml><?xml version="1.0" encoding="utf-8"?>
+<p:sld xmlns:a="http://schemas.openxmlformats.org/drawingml/2006/main" xmlns:r="http://schemas.openxmlformats.org/officeDocument/2006/relationships" xmlns:p="http://schemas.openxmlformats.org/presentationml/2006/main">
+  <p:cSld>
+    <p:spTree>
+      <p:nvGrpSpPr>
+        <p:cNvPr id="1" name=""/>
+        <p:cNvGrpSpPr/>
+        <p:nvPr/>
+      </p:nvGrpSpPr>
+      <p:grpSpPr>
+        <a:xfrm>
+          <a:off x="0" y="0"/>
+          <a:ext cx="0" cy="0"/>
+          <a:chOff x="0" y="0"/>
+          <a:chExt cx="0" cy="0"/>
+        </a:xfrm>
+      </p:grpSpPr>
+      <p:sp>
+        <p:nvSpPr>
+          <p:cNvPr id="2" name="Title 1">
+            <a:extLst>
+              <a:ext uri="{FF2B5EF4-FFF2-40B4-BE49-F238E27FC236}">
+                <a16:creationId xmlns:a16="http://schemas.microsoft.com/office/drawing/2014/main" id="{58FD6306-A2FE-5588-A9A2-5227B6217ED8}"/>
+              </a:ext>
+            </a:extLst>
+          </p:cNvPr>
+          <p:cNvSpPr>
+            <a:spLocks noGrp="1"/>
+          </p:cNvSpPr>
+          <p:nvPr>
+            <p:ph type="title"/>
+          </p:nvPr>
+        </p:nvSpPr>
+        <p:spPr>
+          <a:xfrm>
+            <a:off x="646111" y="609600"/>
+            <a:ext cx="9404723" cy="1243647"/>
+          </a:xfrm>
+        </p:spPr>
+        <p:txBody>
+          <a:bodyPr/>
+          <a:lstStyle/>
+          <a:p>
+            <a:pPr algn="ctr"/>
+            <a:r>
+              <a:rPr lang="nl-NL" dirty="0"/>
+              <a:t>QUIZZ</a:t>
+            </a:r>
+            <a:endParaRPr lang="en-NZ" dirty="0"/>
+          </a:p>
+        </p:txBody>
+      </p:sp>
+      <p:sp>
+        <p:nvSpPr>
+          <p:cNvPr id="3" name="Content Placeholder 2">
+            <a:extLst>
+              <a:ext uri="{FF2B5EF4-FFF2-40B4-BE49-F238E27FC236}">
+                <a16:creationId xmlns:a16="http://schemas.microsoft.com/office/drawing/2014/main" id="{3CC6FE6A-D1BE-5E00-3755-D21452ACABE4}"/>
+              </a:ext>
+            </a:extLst>
+          </p:cNvPr>
+          <p:cNvSpPr>
+            <a:spLocks noGrp="1"/>
+          </p:cNvSpPr>
+          <p:nvPr>
+            <p:ph idx="1"/>
+          </p:nvPr>
+        </p:nvSpPr>
+        <p:spPr/>
+        <p:txBody>
+          <a:bodyPr/>
+          <a:lstStyle/>
+          <a:p>
+            <a:endParaRPr lang="en-NZ" dirty="0"/>
+          </a:p>
+        </p:txBody>
+      </p:sp>
+      <p:sp>
+        <p:nvSpPr>
+          <p:cNvPr id="4" name="Slide Number Placeholder 3">
+            <a:extLst>
+              <a:ext uri="{FF2B5EF4-FFF2-40B4-BE49-F238E27FC236}">
+                <a16:creationId xmlns:a16="http://schemas.microsoft.com/office/drawing/2014/main" id="{8E01D2F4-88A9-81DC-49C0-E43D79C3E06D}"/>
+              </a:ext>
+            </a:extLst>
+          </p:cNvPr>
+          <p:cNvSpPr>
+            <a:spLocks noGrp="1"/>
+          </p:cNvSpPr>
+          <p:nvPr>
+            <p:ph type="sldNum" sz="quarter" idx="12"/>
+          </p:nvPr>
+        </p:nvSpPr>
+        <p:spPr/>
+        <p:txBody>
+          <a:bodyPr/>
+          <a:lstStyle/>
+          <a:p>
+            <a:fld id="{7E50A921-1625-4E66-8B53-913CC32CAF35}" type="slidenum">
+              <a:rPr lang="en-NZ" smtClean="0"/>
+              <a:t>10</a:t>
+            </a:fld>
+            <a:endParaRPr lang="en-NZ"/>
+          </a:p>
+        </p:txBody>
+      </p:sp>
+    </p:spTree>
+    <p:extLst>
+      <p:ext uri="{BB962C8B-B14F-4D97-AF65-F5344CB8AC3E}">
+        <p14:creationId xmlns:p14="http://schemas.microsoft.com/office/powerpoint/2010/main" val="2472288588"/>
+      </p:ext>
+    </p:extLst>
+  </p:cSld>
+  <p:clrMapOvr>
+    <a:masterClrMapping/>
   </p:clrMapOvr>
 </p:sld>
 </file>

</xml_diff>

<commit_message>
added almost completed presentation
</commit_message>
<xml_diff>
--- a/documents/presentation/presentation jit compiler.pptx
+++ b/documents/presentation/presentation jit compiler.pptx
@@ -5,7 +5,7 @@
     <p:sldMasterId id="2147483660" r:id="rId1"/>
   </p:sldMasterIdLst>
   <p:notesMasterIdLst>
-    <p:notesMasterId r:id="rId12"/>
+    <p:notesMasterId r:id="rId18"/>
   </p:notesMasterIdLst>
   <p:sldIdLst>
     <p:sldId id="256" r:id="rId2"/>
@@ -15,9 +15,15 @@
     <p:sldId id="260" r:id="rId6"/>
     <p:sldId id="261" r:id="rId7"/>
     <p:sldId id="262" r:id="rId8"/>
-    <p:sldId id="263" r:id="rId9"/>
-    <p:sldId id="264" r:id="rId10"/>
-    <p:sldId id="265" r:id="rId11"/>
+    <p:sldId id="266" r:id="rId9"/>
+    <p:sldId id="267" r:id="rId10"/>
+    <p:sldId id="268" r:id="rId11"/>
+    <p:sldId id="269" r:id="rId12"/>
+    <p:sldId id="270" r:id="rId13"/>
+    <p:sldId id="263" r:id="rId14"/>
+    <p:sldId id="264" r:id="rId15"/>
+    <p:sldId id="265" r:id="rId16"/>
+    <p:sldId id="271" r:id="rId17"/>
   </p:sldIdLst>
   <p:sldSz cx="12192000" cy="6858000"/>
   <p:notesSz cx="6858000" cy="9144000"/>
@@ -127,9 +133,188 @@
 <file path=ppt/revisionInfo.xml><?xml version="1.0" encoding="utf-8"?>
 <p1510:revInfo xmlns:a="http://schemas.openxmlformats.org/drawingml/2006/main" xmlns:r="http://schemas.openxmlformats.org/officeDocument/2006/relationships" xmlns:p1510="http://schemas.microsoft.com/office/powerpoint/2015/10/main">
   <p1510:revLst>
-    <p1510:client id="{CBF1F94B-CAFA-4242-A61D-98552A672ACE}" v="103" dt="2024-10-14T09:35:01.384"/>
+    <p1510:client id="{3BC882D7-0369-453F-A1BB-621FEF4F8646}" v="4" dt="2024-10-21T11:20:55.348"/>
   </p1510:revLst>
 </p1510:revInfo>
+</file>
+
+<file path=ppt/changesInfos/changesInfo1.xml><?xml version="1.0" encoding="utf-8"?>
+<pc:chgInfo xmlns:a="http://schemas.openxmlformats.org/drawingml/2006/main" xmlns:r="http://schemas.openxmlformats.org/officeDocument/2006/relationships" xmlns:ac="http://schemas.microsoft.com/office/drawing/2013/main/command" xmlns:pc="http://schemas.microsoft.com/office/powerpoint/2013/main/command">
+  <pc:docChgLst>
+    <pc:chgData name="Arauz Bonilla,Jorge J.U." userId="1bf2599c-1c01-48b4-bae8-52167a7d20f0" providerId="ADAL" clId="{3BC882D7-0369-453F-A1BB-621FEF4F8646}"/>
+    <pc:docChg chg="custSel addSld modSld sldOrd">
+      <pc:chgData name="Arauz Bonilla,Jorge J.U." userId="1bf2599c-1c01-48b4-bae8-52167a7d20f0" providerId="ADAL" clId="{3BC882D7-0369-453F-A1BB-621FEF4F8646}" dt="2024-10-21T11:22:44.592" v="996" actId="1076"/>
+      <pc:docMkLst>
+        <pc:docMk/>
+      </pc:docMkLst>
+      <pc:sldChg chg="modSp mod">
+        <pc:chgData name="Arauz Bonilla,Jorge J.U." userId="1bf2599c-1c01-48b4-bae8-52167a7d20f0" providerId="ADAL" clId="{3BC882D7-0369-453F-A1BB-621FEF4F8646}" dt="2024-10-21T09:49:36.148" v="103"/>
+        <pc:sldMkLst>
+          <pc:docMk/>
+          <pc:sldMk cId="543737575" sldId="257"/>
+        </pc:sldMkLst>
+        <pc:spChg chg="mod">
+          <ac:chgData name="Arauz Bonilla,Jorge J.U." userId="1bf2599c-1c01-48b4-bae8-52167a7d20f0" providerId="ADAL" clId="{3BC882D7-0369-453F-A1BB-621FEF4F8646}" dt="2024-10-21T09:49:36.148" v="103"/>
+          <ac:spMkLst>
+            <pc:docMk/>
+            <pc:sldMk cId="543737575" sldId="257"/>
+            <ac:spMk id="3" creationId="{EACC5093-29E8-7CAE-3E9B-05E3508EF747}"/>
+          </ac:spMkLst>
+        </pc:spChg>
+      </pc:sldChg>
+      <pc:sldChg chg="ord">
+        <pc:chgData name="Arauz Bonilla,Jorge J.U." userId="1bf2599c-1c01-48b4-bae8-52167a7d20f0" providerId="ADAL" clId="{3BC882D7-0369-453F-A1BB-621FEF4F8646}" dt="2024-10-21T10:16:00.588" v="107"/>
+        <pc:sldMkLst>
+          <pc:docMk/>
+          <pc:sldMk cId="1517301832" sldId="261"/>
+        </pc:sldMkLst>
+      </pc:sldChg>
+      <pc:sldChg chg="ord">
+        <pc:chgData name="Arauz Bonilla,Jorge J.U." userId="1bf2599c-1c01-48b4-bae8-52167a7d20f0" providerId="ADAL" clId="{3BC882D7-0369-453F-A1BB-621FEF4F8646}" dt="2024-10-21T10:15:47.571" v="105"/>
+        <pc:sldMkLst>
+          <pc:docMk/>
+          <pc:sldMk cId="3655054582" sldId="262"/>
+        </pc:sldMkLst>
+      </pc:sldChg>
+      <pc:sldChg chg="modSp mod">
+        <pc:chgData name="Arauz Bonilla,Jorge J.U." userId="1bf2599c-1c01-48b4-bae8-52167a7d20f0" providerId="ADAL" clId="{3BC882D7-0369-453F-A1BB-621FEF4F8646}" dt="2024-10-21T11:22:27.020" v="957" actId="20577"/>
+        <pc:sldMkLst>
+          <pc:docMk/>
+          <pc:sldMk cId="2403430344" sldId="264"/>
+        </pc:sldMkLst>
+        <pc:spChg chg="mod">
+          <ac:chgData name="Arauz Bonilla,Jorge J.U." userId="1bf2599c-1c01-48b4-bae8-52167a7d20f0" providerId="ADAL" clId="{3BC882D7-0369-453F-A1BB-621FEF4F8646}" dt="2024-10-21T11:22:27.020" v="957" actId="20577"/>
+          <ac:spMkLst>
+            <pc:docMk/>
+            <pc:sldMk cId="2403430344" sldId="264"/>
+            <ac:spMk id="2" creationId="{220305A0-C5E7-D7B2-2FDF-5333EC4E6D1A}"/>
+          </ac:spMkLst>
+        </pc:spChg>
+      </pc:sldChg>
+      <pc:sldChg chg="modSp mod">
+        <pc:chgData name="Arauz Bonilla,Jorge J.U." userId="1bf2599c-1c01-48b4-bae8-52167a7d20f0" providerId="ADAL" clId="{3BC882D7-0369-453F-A1BB-621FEF4F8646}" dt="2024-10-21T11:22:06.501" v="939" actId="20577"/>
+        <pc:sldMkLst>
+          <pc:docMk/>
+          <pc:sldMk cId="2472288588" sldId="265"/>
+        </pc:sldMkLst>
+        <pc:spChg chg="mod">
+          <ac:chgData name="Arauz Bonilla,Jorge J.U." userId="1bf2599c-1c01-48b4-bae8-52167a7d20f0" providerId="ADAL" clId="{3BC882D7-0369-453F-A1BB-621FEF4F8646}" dt="2024-10-21T11:22:06.501" v="939" actId="20577"/>
+          <ac:spMkLst>
+            <pc:docMk/>
+            <pc:sldMk cId="2472288588" sldId="265"/>
+            <ac:spMk id="3" creationId="{3CC6FE6A-D1BE-5E00-3755-D21452ACABE4}"/>
+          </ac:spMkLst>
+        </pc:spChg>
+      </pc:sldChg>
+      <pc:sldChg chg="modSp new mod">
+        <pc:chgData name="Arauz Bonilla,Jorge J.U." userId="1bf2599c-1c01-48b4-bae8-52167a7d20f0" providerId="ADAL" clId="{3BC882D7-0369-453F-A1BB-621FEF4F8646}" dt="2024-10-21T10:23:22.404" v="604" actId="20577"/>
+        <pc:sldMkLst>
+          <pc:docMk/>
+          <pc:sldMk cId="3993358039" sldId="266"/>
+        </pc:sldMkLst>
+        <pc:spChg chg="mod">
+          <ac:chgData name="Arauz Bonilla,Jorge J.U." userId="1bf2599c-1c01-48b4-bae8-52167a7d20f0" providerId="ADAL" clId="{3BC882D7-0369-453F-A1BB-621FEF4F8646}" dt="2024-10-21T10:16:31.195" v="124" actId="20577"/>
+          <ac:spMkLst>
+            <pc:docMk/>
+            <pc:sldMk cId="3993358039" sldId="266"/>
+            <ac:spMk id="2" creationId="{C20A54BA-69C1-CC93-2155-FA03F78A8062}"/>
+          </ac:spMkLst>
+        </pc:spChg>
+        <pc:spChg chg="mod">
+          <ac:chgData name="Arauz Bonilla,Jorge J.U." userId="1bf2599c-1c01-48b4-bae8-52167a7d20f0" providerId="ADAL" clId="{3BC882D7-0369-453F-A1BB-621FEF4F8646}" dt="2024-10-21T10:23:22.404" v="604" actId="20577"/>
+          <ac:spMkLst>
+            <pc:docMk/>
+            <pc:sldMk cId="3993358039" sldId="266"/>
+            <ac:spMk id="3" creationId="{B175DF82-4CFD-13E9-E711-AEA65E88C0A4}"/>
+          </ac:spMkLst>
+        </pc:spChg>
+      </pc:sldChg>
+      <pc:sldChg chg="modSp new mod">
+        <pc:chgData name="Arauz Bonilla,Jorge J.U." userId="1bf2599c-1c01-48b4-bae8-52167a7d20f0" providerId="ADAL" clId="{3BC882D7-0369-453F-A1BB-621FEF4F8646}" dt="2024-10-21T11:03:14.273" v="730" actId="20577"/>
+        <pc:sldMkLst>
+          <pc:docMk/>
+          <pc:sldMk cId="2463297231" sldId="267"/>
+        </pc:sldMkLst>
+        <pc:spChg chg="mod">
+          <ac:chgData name="Arauz Bonilla,Jorge J.U." userId="1bf2599c-1c01-48b4-bae8-52167a7d20f0" providerId="ADAL" clId="{3BC882D7-0369-453F-A1BB-621FEF4F8646}" dt="2024-10-21T11:03:14.273" v="730" actId="20577"/>
+          <ac:spMkLst>
+            <pc:docMk/>
+            <pc:sldMk cId="2463297231" sldId="267"/>
+            <ac:spMk id="2" creationId="{05A6F548-FBE1-EF41-8DE4-E0597C356C03}"/>
+          </ac:spMkLst>
+        </pc:spChg>
+      </pc:sldChg>
+      <pc:sldChg chg="modSp new mod">
+        <pc:chgData name="Arauz Bonilla,Jorge J.U." userId="1bf2599c-1c01-48b4-bae8-52167a7d20f0" providerId="ADAL" clId="{3BC882D7-0369-453F-A1BB-621FEF4F8646}" dt="2024-10-21T11:01:39.570" v="667" actId="20577"/>
+        <pc:sldMkLst>
+          <pc:docMk/>
+          <pc:sldMk cId="2688258274" sldId="268"/>
+        </pc:sldMkLst>
+        <pc:spChg chg="mod">
+          <ac:chgData name="Arauz Bonilla,Jorge J.U." userId="1bf2599c-1c01-48b4-bae8-52167a7d20f0" providerId="ADAL" clId="{3BC882D7-0369-453F-A1BB-621FEF4F8646}" dt="2024-10-21T11:01:39.570" v="667" actId="20577"/>
+          <ac:spMkLst>
+            <pc:docMk/>
+            <pc:sldMk cId="2688258274" sldId="268"/>
+            <ac:spMk id="2" creationId="{959D6C6B-7FE0-84BC-1F65-870B3C79618B}"/>
+          </ac:spMkLst>
+        </pc:spChg>
+      </pc:sldChg>
+      <pc:sldChg chg="modSp new mod">
+        <pc:chgData name="Arauz Bonilla,Jorge J.U." userId="1bf2599c-1c01-48b4-bae8-52167a7d20f0" providerId="ADAL" clId="{3BC882D7-0369-453F-A1BB-621FEF4F8646}" dt="2024-10-21T11:02:05.420" v="705" actId="20577"/>
+        <pc:sldMkLst>
+          <pc:docMk/>
+          <pc:sldMk cId="3047595345" sldId="269"/>
+        </pc:sldMkLst>
+        <pc:spChg chg="mod">
+          <ac:chgData name="Arauz Bonilla,Jorge J.U." userId="1bf2599c-1c01-48b4-bae8-52167a7d20f0" providerId="ADAL" clId="{3BC882D7-0369-453F-A1BB-621FEF4F8646}" dt="2024-10-21T11:02:05.420" v="705" actId="20577"/>
+          <ac:spMkLst>
+            <pc:docMk/>
+            <pc:sldMk cId="3047595345" sldId="269"/>
+            <ac:spMk id="2" creationId="{1A3F3BC8-5975-B61F-D2E9-FA45B654B4C0}"/>
+          </ac:spMkLst>
+        </pc:spChg>
+      </pc:sldChg>
+      <pc:sldChg chg="modSp new mod">
+        <pc:chgData name="Arauz Bonilla,Jorge J.U." userId="1bf2599c-1c01-48b4-bae8-52167a7d20f0" providerId="ADAL" clId="{3BC882D7-0369-453F-A1BB-621FEF4F8646}" dt="2024-10-21T11:03:12.033" v="729" actId="20577"/>
+        <pc:sldMkLst>
+          <pc:docMk/>
+          <pc:sldMk cId="673258430" sldId="270"/>
+        </pc:sldMkLst>
+        <pc:spChg chg="mod">
+          <ac:chgData name="Arauz Bonilla,Jorge J.U." userId="1bf2599c-1c01-48b4-bae8-52167a7d20f0" providerId="ADAL" clId="{3BC882D7-0369-453F-A1BB-621FEF4F8646}" dt="2024-10-21T11:03:12.033" v="729" actId="20577"/>
+          <ac:spMkLst>
+            <pc:docMk/>
+            <pc:sldMk cId="673258430" sldId="270"/>
+            <ac:spMk id="2" creationId="{DA94C212-4A6F-D94A-3E6E-CB2924B454DB}"/>
+          </ac:spMkLst>
+        </pc:spChg>
+      </pc:sldChg>
+      <pc:sldChg chg="delSp modSp new mod">
+        <pc:chgData name="Arauz Bonilla,Jorge J.U." userId="1bf2599c-1c01-48b4-bae8-52167a7d20f0" providerId="ADAL" clId="{3BC882D7-0369-453F-A1BB-621FEF4F8646}" dt="2024-10-21T11:22:44.592" v="996" actId="1076"/>
+        <pc:sldMkLst>
+          <pc:docMk/>
+          <pc:sldMk cId="2731243771" sldId="271"/>
+        </pc:sldMkLst>
+        <pc:spChg chg="mod">
+          <ac:chgData name="Arauz Bonilla,Jorge J.U." userId="1bf2599c-1c01-48b4-bae8-52167a7d20f0" providerId="ADAL" clId="{3BC882D7-0369-453F-A1BB-621FEF4F8646}" dt="2024-10-21T11:22:44.592" v="996" actId="1076"/>
+          <ac:spMkLst>
+            <pc:docMk/>
+            <pc:sldMk cId="2731243771" sldId="271"/>
+            <ac:spMk id="2" creationId="{0DC1F5F1-E9B3-388B-F2F4-A727DA0B29C5}"/>
+          </ac:spMkLst>
+        </pc:spChg>
+        <pc:spChg chg="del">
+          <ac:chgData name="Arauz Bonilla,Jorge J.U." userId="1bf2599c-1c01-48b4-bae8-52167a7d20f0" providerId="ADAL" clId="{3BC882D7-0369-453F-A1BB-621FEF4F8646}" dt="2024-10-21T11:22:19.458" v="941" actId="478"/>
+          <ac:spMkLst>
+            <pc:docMk/>
+            <pc:sldMk cId="2731243771" sldId="271"/>
+            <ac:spMk id="3" creationId="{C0B5152A-AAFC-9989-852E-326C74102662}"/>
+          </ac:spMkLst>
+        </pc:spChg>
+      </pc:sldChg>
+    </pc:docChg>
+  </pc:docChgLst>
+</pc:chgInfo>
 </file>
 
 <file path=ppt/notesMasters/notesMaster1.xml><?xml version="1.0" encoding="utf-8"?>
@@ -214,7 +399,7 @@
           <a:p>
             <a:fld id="{7097D9E5-16FE-4A2E-9805-C519DE9D3040}" type="datetimeFigureOut">
               <a:rPr lang="en-NZ" smtClean="0"/>
-              <a:t>16/10/2024</a:t>
+              <a:t>21/10/2024</a:t>
             </a:fld>
             <a:endParaRPr lang="en-NZ"/>
           </a:p>
@@ -666,7 +851,7 @@
           <a:p>
             <a:fld id="{131A0DB0-A85B-4487-8F34-6C89C5E4FE9D}" type="datetime1">
               <a:rPr lang="en-NZ" smtClean="0"/>
-              <a:t>16/10/2024</a:t>
+              <a:t>21/10/2024</a:t>
             </a:fld>
             <a:endParaRPr lang="en-NZ"/>
           </a:p>
@@ -939,7 +1124,7 @@
           <a:p>
             <a:fld id="{5323748D-C940-46E8-A8FE-39A302589491}" type="datetime1">
               <a:rPr lang="en-NZ" smtClean="0"/>
-              <a:t>16/10/2024</a:t>
+              <a:t>21/10/2024</a:t>
             </a:fld>
             <a:endParaRPr lang="en-NZ"/>
           </a:p>
@@ -1132,7 +1317,7 @@
           <a:p>
             <a:fld id="{8E1F1FAA-C845-4339-889E-28EF06EE40FF}" type="datetime1">
               <a:rPr lang="en-NZ" smtClean="0"/>
-              <a:t>16/10/2024</a:t>
+              <a:t>21/10/2024</a:t>
             </a:fld>
             <a:endParaRPr lang="en-NZ"/>
           </a:p>
@@ -1404,7 +1589,7 @@
           <a:p>
             <a:fld id="{944BABD2-5B36-4C22-8FAE-825B3CD25B81}" type="datetime1">
               <a:rPr lang="en-NZ" smtClean="0"/>
-              <a:t>16/10/2024</a:t>
+              <a:t>21/10/2024</a:t>
             </a:fld>
             <a:endParaRPr lang="en-NZ"/>
           </a:p>
@@ -1744,7 +1929,7 @@
           <a:p>
             <a:fld id="{7E84032B-D658-433F-842C-DAFAE1FBCD74}" type="datetime1">
               <a:rPr lang="en-NZ" smtClean="0"/>
-              <a:t>16/10/2024</a:t>
+              <a:t>21/10/2024</a:t>
             </a:fld>
             <a:endParaRPr lang="en-NZ"/>
           </a:p>
@@ -2366,7 +2551,7 @@
           <a:p>
             <a:fld id="{BE0BD24D-BB39-48BC-8468-64E039742EBA}" type="datetime1">
               <a:rPr lang="en-NZ" smtClean="0"/>
-              <a:t>16/10/2024</a:t>
+              <a:t>21/10/2024</a:t>
             </a:fld>
             <a:endParaRPr lang="en-NZ"/>
           </a:p>
@@ -3222,7 +3407,7 @@
           <a:p>
             <a:fld id="{1BEEC8BB-492B-4068-A56A-07D34DE636F2}" type="datetime1">
               <a:rPr lang="en-NZ" smtClean="0"/>
-              <a:t>16/10/2024</a:t>
+              <a:t>21/10/2024</a:t>
             </a:fld>
             <a:endParaRPr lang="en-NZ"/>
           </a:p>
@@ -3390,7 +3575,7 @@
           <a:p>
             <a:fld id="{511142B1-8092-47B7-9305-FA1D52CEA1CE}" type="datetime1">
               <a:rPr lang="en-NZ" smtClean="0"/>
-              <a:t>16/10/2024</a:t>
+              <a:t>21/10/2024</a:t>
             </a:fld>
             <a:endParaRPr lang="en-NZ"/>
           </a:p>
@@ -3568,7 +3753,7 @@
           <a:p>
             <a:fld id="{B05740B9-E3C6-4C7C-A2EA-16EBC5D7C804}" type="datetime1">
               <a:rPr lang="en-NZ" smtClean="0"/>
-              <a:t>16/10/2024</a:t>
+              <a:t>21/10/2024</a:t>
             </a:fld>
             <a:endParaRPr lang="en-NZ"/>
           </a:p>
@@ -3736,7 +3921,7 @@
           <a:p>
             <a:fld id="{7F7A93E3-8E57-4E1F-B6A6-44FB3C00BCF0}" type="datetime1">
               <a:rPr lang="en-NZ" smtClean="0"/>
-              <a:t>16/10/2024</a:t>
+              <a:t>21/10/2024</a:t>
             </a:fld>
             <a:endParaRPr lang="en-NZ"/>
           </a:p>
@@ -3757,7 +3942,7 @@
           <a:bodyPr/>
           <a:lstStyle/>
           <a:p>
-            <a:endParaRPr lang="en-NZ"/>
+            <a:endParaRPr lang="en-NZ" dirty="0"/>
           </a:p>
         </p:txBody>
       </p:sp>
@@ -3780,7 +3965,7 @@
               <a:rPr lang="en-NZ" smtClean="0"/>
               <a:t>‹#›</a:t>
             </a:fld>
-            <a:endParaRPr lang="en-NZ"/>
+            <a:endParaRPr lang="en-NZ" dirty="0"/>
           </a:p>
         </p:txBody>
       </p:sp>
@@ -3982,7 +4167,7 @@
           <a:p>
             <a:fld id="{49788324-9239-4A6A-B263-18CF364C18E6}" type="datetime1">
               <a:rPr lang="en-NZ" smtClean="0"/>
-              <a:t>16/10/2024</a:t>
+              <a:t>21/10/2024</a:t>
             </a:fld>
             <a:endParaRPr lang="en-NZ"/>
           </a:p>
@@ -4271,7 +4456,7 @@
           <a:p>
             <a:fld id="{4224155E-B995-4A63-957A-09BAD2FBC677}" type="datetime1">
               <a:rPr lang="en-NZ" smtClean="0"/>
-              <a:t>16/10/2024</a:t>
+              <a:t>21/10/2024</a:t>
             </a:fld>
             <a:endParaRPr lang="en-NZ"/>
           </a:p>
@@ -4712,7 +4897,7 @@
           <a:p>
             <a:fld id="{94852875-0C79-4139-AC32-AABE6788AEEA}" type="datetime1">
               <a:rPr lang="en-NZ" smtClean="0"/>
-              <a:t>16/10/2024</a:t>
+              <a:t>21/10/2024</a:t>
             </a:fld>
             <a:endParaRPr lang="en-NZ"/>
           </a:p>
@@ -4829,7 +5014,7 @@
           <a:p>
             <a:fld id="{670F642C-953D-4942-A0BD-F75D51C3B3D0}" type="datetime1">
               <a:rPr lang="en-NZ" smtClean="0"/>
-              <a:t>16/10/2024</a:t>
+              <a:t>21/10/2024</a:t>
             </a:fld>
             <a:endParaRPr lang="en-NZ"/>
           </a:p>
@@ -4924,7 +5109,7 @@
           <a:p>
             <a:fld id="{F0942B63-0C58-44B7-A52C-10399CE2763E}" type="datetime1">
               <a:rPr lang="en-NZ" smtClean="0"/>
-              <a:t>16/10/2024</a:t>
+              <a:t>21/10/2024</a:t>
             </a:fld>
             <a:endParaRPr lang="en-NZ"/>
           </a:p>
@@ -5201,7 +5386,7 @@
           <a:p>
             <a:fld id="{0F087F2A-8ED5-40BC-A804-86A9632A31D7}" type="datetime1">
               <a:rPr lang="en-NZ" smtClean="0"/>
-              <a:t>16/10/2024</a:t>
+              <a:t>21/10/2024</a:t>
             </a:fld>
             <a:endParaRPr lang="en-NZ"/>
           </a:p>
@@ -5474,7 +5659,7 @@
           <a:p>
             <a:fld id="{5D2796AF-1BE4-4202-AFC4-0C711630C0B7}" type="datetime1">
               <a:rPr lang="en-NZ" smtClean="0"/>
-              <a:t>16/10/2024</a:t>
+              <a:t>21/10/2024</a:t>
             </a:fld>
             <a:endParaRPr lang="en-NZ"/>
           </a:p>
@@ -5901,7 +6086,7 @@
           <a:p>
             <a:fld id="{F4BE01E5-D6DC-4CBF-AB22-D83052A50459}" type="datetime1">
               <a:rPr lang="en-NZ" smtClean="0"/>
-              <a:t>16/10/2024</a:t>
+              <a:t>21/10/2024</a:t>
             </a:fld>
             <a:endParaRPr lang="en-NZ"/>
           </a:p>
@@ -7583,6 +7768,582 @@
           <p:cNvPr id="2" name="Title 1">
             <a:extLst>
               <a:ext uri="{FF2B5EF4-FFF2-40B4-BE49-F238E27FC236}">
+                <a16:creationId xmlns:a16="http://schemas.microsoft.com/office/drawing/2014/main" id="{959D6C6B-7FE0-84BC-1F65-870B3C79618B}"/>
+              </a:ext>
+            </a:extLst>
+          </p:cNvPr>
+          <p:cNvSpPr>
+            <a:spLocks noGrp="1"/>
+          </p:cNvSpPr>
+          <p:nvPr>
+            <p:ph type="title"/>
+          </p:nvPr>
+        </p:nvSpPr>
+        <p:spPr/>
+        <p:txBody>
+          <a:bodyPr/>
+          <a:lstStyle/>
+          <a:p>
+            <a:r>
+              <a:rPr lang="nl-NL" dirty="0" err="1"/>
+              <a:t>Exercise</a:t>
+            </a:r>
+            <a:r>
+              <a:rPr lang="nl-NL" dirty="0"/>
+              <a:t> 2 - </a:t>
+            </a:r>
+            <a:r>
+              <a:rPr lang="nl-NL" dirty="0" err="1"/>
+              <a:t>JavaScript</a:t>
+            </a:r>
+            <a:endParaRPr lang="en-NZ" dirty="0"/>
+          </a:p>
+        </p:txBody>
+      </p:sp>
+      <p:sp>
+        <p:nvSpPr>
+          <p:cNvPr id="3" name="Content Placeholder 2">
+            <a:extLst>
+              <a:ext uri="{FF2B5EF4-FFF2-40B4-BE49-F238E27FC236}">
+                <a16:creationId xmlns:a16="http://schemas.microsoft.com/office/drawing/2014/main" id="{830CA39D-88C5-96C4-BB6A-B20527EA9E4E}"/>
+              </a:ext>
+            </a:extLst>
+          </p:cNvPr>
+          <p:cNvSpPr>
+            <a:spLocks noGrp="1"/>
+          </p:cNvSpPr>
+          <p:nvPr>
+            <p:ph idx="1"/>
+          </p:nvPr>
+        </p:nvSpPr>
+        <p:spPr/>
+        <p:txBody>
+          <a:bodyPr/>
+          <a:lstStyle/>
+          <a:p>
+            <a:endParaRPr lang="en-NZ"/>
+          </a:p>
+        </p:txBody>
+      </p:sp>
+      <p:sp>
+        <p:nvSpPr>
+          <p:cNvPr id="4" name="Slide Number Placeholder 3">
+            <a:extLst>
+              <a:ext uri="{FF2B5EF4-FFF2-40B4-BE49-F238E27FC236}">
+                <a16:creationId xmlns:a16="http://schemas.microsoft.com/office/drawing/2014/main" id="{BD39EB12-B755-9A05-6979-0898709505E8}"/>
+              </a:ext>
+            </a:extLst>
+          </p:cNvPr>
+          <p:cNvSpPr>
+            <a:spLocks noGrp="1"/>
+          </p:cNvSpPr>
+          <p:nvPr>
+            <p:ph type="sldNum" sz="quarter" idx="12"/>
+          </p:nvPr>
+        </p:nvSpPr>
+        <p:spPr/>
+        <p:txBody>
+          <a:bodyPr/>
+          <a:lstStyle/>
+          <a:p>
+            <a:fld id="{7E50A921-1625-4E66-8B53-913CC32CAF35}" type="slidenum">
+              <a:rPr lang="en-NZ" smtClean="0"/>
+              <a:t>10</a:t>
+            </a:fld>
+            <a:endParaRPr lang="en-NZ" dirty="0"/>
+          </a:p>
+        </p:txBody>
+      </p:sp>
+    </p:spTree>
+    <p:extLst>
+      <p:ext uri="{BB962C8B-B14F-4D97-AF65-F5344CB8AC3E}">
+        <p14:creationId xmlns:p14="http://schemas.microsoft.com/office/powerpoint/2010/main" val="2688258274"/>
+      </p:ext>
+    </p:extLst>
+  </p:cSld>
+  <p:clrMapOvr>
+    <a:masterClrMapping/>
+  </p:clrMapOvr>
+</p:sld>
+</file>
+
+<file path=ppt/slides/slide11.xml><?xml version="1.0" encoding="utf-8"?>
+<p:sld xmlns:a="http://schemas.openxmlformats.org/drawingml/2006/main" xmlns:r="http://schemas.openxmlformats.org/officeDocument/2006/relationships" xmlns:p="http://schemas.openxmlformats.org/presentationml/2006/main">
+  <p:cSld>
+    <p:spTree>
+      <p:nvGrpSpPr>
+        <p:cNvPr id="1" name=""/>
+        <p:cNvGrpSpPr/>
+        <p:nvPr/>
+      </p:nvGrpSpPr>
+      <p:grpSpPr>
+        <a:xfrm>
+          <a:off x="0" y="0"/>
+          <a:ext cx="0" cy="0"/>
+          <a:chOff x="0" y="0"/>
+          <a:chExt cx="0" cy="0"/>
+        </a:xfrm>
+      </p:grpSpPr>
+      <p:sp>
+        <p:nvSpPr>
+          <p:cNvPr id="2" name="Title 1">
+            <a:extLst>
+              <a:ext uri="{FF2B5EF4-FFF2-40B4-BE49-F238E27FC236}">
+                <a16:creationId xmlns:a16="http://schemas.microsoft.com/office/drawing/2014/main" id="{1A3F3BC8-5975-B61F-D2E9-FA45B654B4C0}"/>
+              </a:ext>
+            </a:extLst>
+          </p:cNvPr>
+          <p:cNvSpPr>
+            <a:spLocks noGrp="1"/>
+          </p:cNvSpPr>
+          <p:nvPr>
+            <p:ph type="title"/>
+          </p:nvPr>
+        </p:nvSpPr>
+        <p:spPr/>
+        <p:txBody>
+          <a:bodyPr/>
+          <a:lstStyle/>
+          <a:p>
+            <a:r>
+              <a:rPr lang="nl-NL" dirty="0" err="1"/>
+              <a:t>Excersie</a:t>
+            </a:r>
+            <a:r>
+              <a:rPr lang="nl-NL" dirty="0"/>
+              <a:t> 3 – PHP</a:t>
+            </a:r>
+            <a:endParaRPr lang="en-NZ" dirty="0"/>
+          </a:p>
+        </p:txBody>
+      </p:sp>
+      <p:sp>
+        <p:nvSpPr>
+          <p:cNvPr id="3" name="Content Placeholder 2">
+            <a:extLst>
+              <a:ext uri="{FF2B5EF4-FFF2-40B4-BE49-F238E27FC236}">
+                <a16:creationId xmlns:a16="http://schemas.microsoft.com/office/drawing/2014/main" id="{51DB1B88-F333-912A-5F37-A164C78EF6BC}"/>
+              </a:ext>
+            </a:extLst>
+          </p:cNvPr>
+          <p:cNvSpPr>
+            <a:spLocks noGrp="1"/>
+          </p:cNvSpPr>
+          <p:nvPr>
+            <p:ph idx="1"/>
+          </p:nvPr>
+        </p:nvSpPr>
+        <p:spPr/>
+        <p:txBody>
+          <a:bodyPr/>
+          <a:lstStyle/>
+          <a:p>
+            <a:endParaRPr lang="en-NZ" dirty="0"/>
+          </a:p>
+        </p:txBody>
+      </p:sp>
+      <p:sp>
+        <p:nvSpPr>
+          <p:cNvPr id="4" name="Slide Number Placeholder 3">
+            <a:extLst>
+              <a:ext uri="{FF2B5EF4-FFF2-40B4-BE49-F238E27FC236}">
+                <a16:creationId xmlns:a16="http://schemas.microsoft.com/office/drawing/2014/main" id="{59E2BEEB-8AB5-038B-4658-FDF3480490A6}"/>
+              </a:ext>
+            </a:extLst>
+          </p:cNvPr>
+          <p:cNvSpPr>
+            <a:spLocks noGrp="1"/>
+          </p:cNvSpPr>
+          <p:nvPr>
+            <p:ph type="sldNum" sz="quarter" idx="12"/>
+          </p:nvPr>
+        </p:nvSpPr>
+        <p:spPr/>
+        <p:txBody>
+          <a:bodyPr/>
+          <a:lstStyle/>
+          <a:p>
+            <a:fld id="{7E50A921-1625-4E66-8B53-913CC32CAF35}" type="slidenum">
+              <a:rPr lang="en-NZ" smtClean="0"/>
+              <a:t>11</a:t>
+            </a:fld>
+            <a:endParaRPr lang="en-NZ" dirty="0"/>
+          </a:p>
+        </p:txBody>
+      </p:sp>
+    </p:spTree>
+    <p:extLst>
+      <p:ext uri="{BB962C8B-B14F-4D97-AF65-F5344CB8AC3E}">
+        <p14:creationId xmlns:p14="http://schemas.microsoft.com/office/powerpoint/2010/main" val="3047595345"/>
+      </p:ext>
+    </p:extLst>
+  </p:cSld>
+  <p:clrMapOvr>
+    <a:masterClrMapping/>
+  </p:clrMapOvr>
+</p:sld>
+</file>
+
+<file path=ppt/slides/slide12.xml><?xml version="1.0" encoding="utf-8"?>
+<p:sld xmlns:a="http://schemas.openxmlformats.org/drawingml/2006/main" xmlns:r="http://schemas.openxmlformats.org/officeDocument/2006/relationships" xmlns:p="http://schemas.openxmlformats.org/presentationml/2006/main">
+  <p:cSld>
+    <p:spTree>
+      <p:nvGrpSpPr>
+        <p:cNvPr id="1" name=""/>
+        <p:cNvGrpSpPr/>
+        <p:nvPr/>
+      </p:nvGrpSpPr>
+      <p:grpSpPr>
+        <a:xfrm>
+          <a:off x="0" y="0"/>
+          <a:ext cx="0" cy="0"/>
+          <a:chOff x="0" y="0"/>
+          <a:chExt cx="0" cy="0"/>
+        </a:xfrm>
+      </p:grpSpPr>
+      <p:sp>
+        <p:nvSpPr>
+          <p:cNvPr id="2" name="Title 1">
+            <a:extLst>
+              <a:ext uri="{FF2B5EF4-FFF2-40B4-BE49-F238E27FC236}">
+                <a16:creationId xmlns:a16="http://schemas.microsoft.com/office/drawing/2014/main" id="{DA94C212-4A6F-D94A-3E6E-CB2924B454DB}"/>
+              </a:ext>
+            </a:extLst>
+          </p:cNvPr>
+          <p:cNvSpPr>
+            <a:spLocks noGrp="1"/>
+          </p:cNvSpPr>
+          <p:nvPr>
+            <p:ph type="title"/>
+          </p:nvPr>
+        </p:nvSpPr>
+        <p:spPr/>
+        <p:txBody>
+          <a:bodyPr/>
+          <a:lstStyle/>
+          <a:p>
+            <a:r>
+              <a:rPr lang="nl-NL" dirty="0" err="1"/>
+              <a:t>Exercise</a:t>
+            </a:r>
+            <a:r>
+              <a:rPr lang="nl-NL" dirty="0"/>
+              <a:t> 4 - Python</a:t>
+            </a:r>
+            <a:endParaRPr lang="en-NZ" dirty="0"/>
+          </a:p>
+        </p:txBody>
+      </p:sp>
+      <p:sp>
+        <p:nvSpPr>
+          <p:cNvPr id="3" name="Content Placeholder 2">
+            <a:extLst>
+              <a:ext uri="{FF2B5EF4-FFF2-40B4-BE49-F238E27FC236}">
+                <a16:creationId xmlns:a16="http://schemas.microsoft.com/office/drawing/2014/main" id="{D4300626-F85A-F87B-9539-1FA12BE50E7A}"/>
+              </a:ext>
+            </a:extLst>
+          </p:cNvPr>
+          <p:cNvSpPr>
+            <a:spLocks noGrp="1"/>
+          </p:cNvSpPr>
+          <p:nvPr>
+            <p:ph idx="1"/>
+          </p:nvPr>
+        </p:nvSpPr>
+        <p:spPr/>
+        <p:txBody>
+          <a:bodyPr/>
+          <a:lstStyle/>
+          <a:p>
+            <a:endParaRPr lang="en-NZ"/>
+          </a:p>
+        </p:txBody>
+      </p:sp>
+      <p:sp>
+        <p:nvSpPr>
+          <p:cNvPr id="4" name="Slide Number Placeholder 3">
+            <a:extLst>
+              <a:ext uri="{FF2B5EF4-FFF2-40B4-BE49-F238E27FC236}">
+                <a16:creationId xmlns:a16="http://schemas.microsoft.com/office/drawing/2014/main" id="{5DCAB298-8DFB-E3AE-EE91-DB20E68BFB19}"/>
+              </a:ext>
+            </a:extLst>
+          </p:cNvPr>
+          <p:cNvSpPr>
+            <a:spLocks noGrp="1"/>
+          </p:cNvSpPr>
+          <p:nvPr>
+            <p:ph type="sldNum" sz="quarter" idx="12"/>
+          </p:nvPr>
+        </p:nvSpPr>
+        <p:spPr/>
+        <p:txBody>
+          <a:bodyPr/>
+          <a:lstStyle/>
+          <a:p>
+            <a:fld id="{7E50A921-1625-4E66-8B53-913CC32CAF35}" type="slidenum">
+              <a:rPr lang="en-NZ" smtClean="0"/>
+              <a:t>12</a:t>
+            </a:fld>
+            <a:endParaRPr lang="en-NZ" dirty="0"/>
+          </a:p>
+        </p:txBody>
+      </p:sp>
+    </p:spTree>
+    <p:extLst>
+      <p:ext uri="{BB962C8B-B14F-4D97-AF65-F5344CB8AC3E}">
+        <p14:creationId xmlns:p14="http://schemas.microsoft.com/office/powerpoint/2010/main" val="673258430"/>
+      </p:ext>
+    </p:extLst>
+  </p:cSld>
+  <p:clrMapOvr>
+    <a:masterClrMapping/>
+  </p:clrMapOvr>
+</p:sld>
+</file>
+
+<file path=ppt/slides/slide13.xml><?xml version="1.0" encoding="utf-8"?>
+<p:sld xmlns:a="http://schemas.openxmlformats.org/drawingml/2006/main" xmlns:r="http://schemas.openxmlformats.org/officeDocument/2006/relationships" xmlns:p="http://schemas.openxmlformats.org/presentationml/2006/main">
+  <p:cSld>
+    <p:spTree>
+      <p:nvGrpSpPr>
+        <p:cNvPr id="1" name=""/>
+        <p:cNvGrpSpPr/>
+        <p:nvPr/>
+      </p:nvGrpSpPr>
+      <p:grpSpPr>
+        <a:xfrm>
+          <a:off x="0" y="0"/>
+          <a:ext cx="0" cy="0"/>
+          <a:chOff x="0" y="0"/>
+          <a:chExt cx="0" cy="0"/>
+        </a:xfrm>
+      </p:grpSpPr>
+      <p:sp>
+        <p:nvSpPr>
+          <p:cNvPr id="2" name="Title 1">
+            <a:extLst>
+              <a:ext uri="{FF2B5EF4-FFF2-40B4-BE49-F238E27FC236}">
+                <a16:creationId xmlns:a16="http://schemas.microsoft.com/office/drawing/2014/main" id="{38748AEC-27DB-9458-5620-025583B84467}"/>
+              </a:ext>
+            </a:extLst>
+          </p:cNvPr>
+          <p:cNvSpPr>
+            <a:spLocks noGrp="1"/>
+          </p:cNvSpPr>
+          <p:nvPr>
+            <p:ph type="title"/>
+          </p:nvPr>
+        </p:nvSpPr>
+        <p:spPr/>
+        <p:txBody>
+          <a:bodyPr/>
+          <a:lstStyle/>
+          <a:p>
+            <a:r>
+              <a:rPr lang="en-NZ"/>
+              <a:t>Future for JIT compiler?</a:t>
+            </a:r>
+            <a:br>
+              <a:rPr lang="en-NZ"/>
+            </a:br>
+            <a:endParaRPr lang="en-NZ"/>
+          </a:p>
+        </p:txBody>
+      </p:sp>
+      <p:sp>
+        <p:nvSpPr>
+          <p:cNvPr id="3" name="Content Placeholder 2">
+            <a:extLst>
+              <a:ext uri="{FF2B5EF4-FFF2-40B4-BE49-F238E27FC236}">
+                <a16:creationId xmlns:a16="http://schemas.microsoft.com/office/drawing/2014/main" id="{92B70313-9A05-94E6-E335-058598671C3A}"/>
+              </a:ext>
+            </a:extLst>
+          </p:cNvPr>
+          <p:cNvSpPr>
+            <a:spLocks noGrp="1"/>
+          </p:cNvSpPr>
+          <p:nvPr>
+            <p:ph idx="1"/>
+          </p:nvPr>
+        </p:nvSpPr>
+        <p:spPr/>
+        <p:txBody>
+          <a:bodyPr/>
+          <a:lstStyle/>
+          <a:p>
+            <a:endParaRPr lang="en-NZ"/>
+          </a:p>
+        </p:txBody>
+      </p:sp>
+      <p:sp>
+        <p:nvSpPr>
+          <p:cNvPr id="4" name="Slide Number Placeholder 3">
+            <a:extLst>
+              <a:ext uri="{FF2B5EF4-FFF2-40B4-BE49-F238E27FC236}">
+                <a16:creationId xmlns:a16="http://schemas.microsoft.com/office/drawing/2014/main" id="{01678E4D-5CC8-8C31-F1BF-8F9DC6C510D1}"/>
+              </a:ext>
+            </a:extLst>
+          </p:cNvPr>
+          <p:cNvSpPr>
+            <a:spLocks noGrp="1"/>
+          </p:cNvSpPr>
+          <p:nvPr>
+            <p:ph type="sldNum" sz="quarter" idx="12"/>
+          </p:nvPr>
+        </p:nvSpPr>
+        <p:spPr/>
+        <p:txBody>
+          <a:bodyPr/>
+          <a:lstStyle/>
+          <a:p>
+            <a:fld id="{7E50A921-1625-4E66-8B53-913CC32CAF35}" type="slidenum">
+              <a:rPr lang="en-NZ" smtClean="0"/>
+              <a:t>13</a:t>
+            </a:fld>
+            <a:endParaRPr lang="en-NZ"/>
+          </a:p>
+        </p:txBody>
+      </p:sp>
+    </p:spTree>
+    <p:extLst>
+      <p:ext uri="{BB962C8B-B14F-4D97-AF65-F5344CB8AC3E}">
+        <p14:creationId xmlns:p14="http://schemas.microsoft.com/office/powerpoint/2010/main" val="808733467"/>
+      </p:ext>
+    </p:extLst>
+  </p:cSld>
+  <p:clrMapOvr>
+    <a:masterClrMapping/>
+  </p:clrMapOvr>
+</p:sld>
+</file>
+
+<file path=ppt/slides/slide14.xml><?xml version="1.0" encoding="utf-8"?>
+<p:sld xmlns:a="http://schemas.openxmlformats.org/drawingml/2006/main" xmlns:r="http://schemas.openxmlformats.org/officeDocument/2006/relationships" xmlns:p="http://schemas.openxmlformats.org/presentationml/2006/main">
+  <p:cSld>
+    <p:spTree>
+      <p:nvGrpSpPr>
+        <p:cNvPr id="1" name=""/>
+        <p:cNvGrpSpPr/>
+        <p:nvPr/>
+      </p:nvGrpSpPr>
+      <p:grpSpPr>
+        <a:xfrm>
+          <a:off x="0" y="0"/>
+          <a:ext cx="0" cy="0"/>
+          <a:chOff x="0" y="0"/>
+          <a:chExt cx="0" cy="0"/>
+        </a:xfrm>
+      </p:grpSpPr>
+      <p:sp>
+        <p:nvSpPr>
+          <p:cNvPr id="2" name="Title 1">
+            <a:extLst>
+              <a:ext uri="{FF2B5EF4-FFF2-40B4-BE49-F238E27FC236}">
+                <a16:creationId xmlns:a16="http://schemas.microsoft.com/office/drawing/2014/main" id="{220305A0-C5E7-D7B2-2FDF-5333EC4E6D1A}"/>
+              </a:ext>
+            </a:extLst>
+          </p:cNvPr>
+          <p:cNvSpPr>
+            <a:spLocks noGrp="1"/>
+          </p:cNvSpPr>
+          <p:nvPr>
+            <p:ph type="title"/>
+          </p:nvPr>
+        </p:nvSpPr>
+        <p:spPr>
+          <a:xfrm>
+            <a:off x="3608767" y="3013038"/>
+            <a:ext cx="9404723" cy="1400530"/>
+          </a:xfrm>
+        </p:spPr>
+        <p:txBody>
+          <a:bodyPr/>
+          <a:lstStyle/>
+          <a:p>
+            <a:r>
+              <a:rPr lang="nl-NL" dirty="0" err="1"/>
+              <a:t>Questions</a:t>
+            </a:r>
+            <a:r>
+              <a:rPr lang="nl-NL" dirty="0"/>
+              <a:t> </a:t>
+            </a:r>
+            <a:r>
+              <a:rPr lang="nl-NL" dirty="0" err="1"/>
+              <a:t>so</a:t>
+            </a:r>
+            <a:r>
+              <a:rPr lang="nl-NL" dirty="0"/>
+              <a:t> far?</a:t>
+            </a:r>
+            <a:endParaRPr lang="en-NZ" dirty="0"/>
+          </a:p>
+        </p:txBody>
+      </p:sp>
+      <p:sp>
+        <p:nvSpPr>
+          <p:cNvPr id="4" name="Slide Number Placeholder 3">
+            <a:extLst>
+              <a:ext uri="{FF2B5EF4-FFF2-40B4-BE49-F238E27FC236}">
+                <a16:creationId xmlns:a16="http://schemas.microsoft.com/office/drawing/2014/main" id="{6271BA6B-DFB5-693C-FAC6-10508B35CB42}"/>
+              </a:ext>
+            </a:extLst>
+          </p:cNvPr>
+          <p:cNvSpPr>
+            <a:spLocks noGrp="1"/>
+          </p:cNvSpPr>
+          <p:nvPr>
+            <p:ph type="sldNum" sz="quarter" idx="12"/>
+          </p:nvPr>
+        </p:nvSpPr>
+        <p:spPr/>
+        <p:txBody>
+          <a:bodyPr/>
+          <a:lstStyle/>
+          <a:p>
+            <a:fld id="{7E50A921-1625-4E66-8B53-913CC32CAF35}" type="slidenum">
+              <a:rPr lang="en-NZ" smtClean="0"/>
+              <a:t>14</a:t>
+            </a:fld>
+            <a:endParaRPr lang="en-NZ"/>
+          </a:p>
+        </p:txBody>
+      </p:sp>
+    </p:spTree>
+    <p:extLst>
+      <p:ext uri="{BB962C8B-B14F-4D97-AF65-F5344CB8AC3E}">
+        <p14:creationId xmlns:p14="http://schemas.microsoft.com/office/powerpoint/2010/main" val="2403430344"/>
+      </p:ext>
+    </p:extLst>
+  </p:cSld>
+  <p:clrMapOvr>
+    <a:masterClrMapping/>
+  </p:clrMapOvr>
+</p:sld>
+</file>
+
+<file path=ppt/slides/slide15.xml><?xml version="1.0" encoding="utf-8"?>
+<p:sld xmlns:a="http://schemas.openxmlformats.org/drawingml/2006/main" xmlns:r="http://schemas.openxmlformats.org/officeDocument/2006/relationships" xmlns:p="http://schemas.openxmlformats.org/presentationml/2006/main">
+  <p:cSld>
+    <p:spTree>
+      <p:nvGrpSpPr>
+        <p:cNvPr id="1" name=""/>
+        <p:cNvGrpSpPr/>
+        <p:nvPr/>
+      </p:nvGrpSpPr>
+      <p:grpSpPr>
+        <a:xfrm>
+          <a:off x="0" y="0"/>
+          <a:ext cx="0" cy="0"/>
+          <a:chOff x="0" y="0"/>
+          <a:chExt cx="0" cy="0"/>
+        </a:xfrm>
+      </p:grpSpPr>
+      <p:sp>
+        <p:nvSpPr>
+          <p:cNvPr id="2" name="Title 1">
+            <a:extLst>
+              <a:ext uri="{FF2B5EF4-FFF2-40B4-BE49-F238E27FC236}">
                 <a16:creationId xmlns:a16="http://schemas.microsoft.com/office/drawing/2014/main" id="{58FD6306-A2FE-5588-A9A2-5227B6217ED8}"/>
               </a:ext>
             </a:extLst>
@@ -7635,9 +8396,176 @@
           <a:lstStyle/>
           <a:p>
             <a:r>
-              <a:rPr lang="en-NZ"/>
-              <a:t>Test</a:t>
-            </a:r>
+              <a:rPr lang="nl-NL" dirty="0"/>
+              <a:t>Follow </a:t>
+            </a:r>
+            <a:r>
+              <a:rPr lang="nl-NL" dirty="0" err="1"/>
+              <a:t>the</a:t>
+            </a:r>
+            <a:r>
+              <a:rPr lang="nl-NL" dirty="0"/>
+              <a:t> steps </a:t>
+            </a:r>
+            <a:r>
+              <a:rPr lang="nl-NL" dirty="0" err="1"/>
+              <a:t>to</a:t>
+            </a:r>
+            <a:r>
+              <a:rPr lang="nl-NL" dirty="0"/>
+              <a:t> </a:t>
+            </a:r>
+            <a:r>
+              <a:rPr lang="nl-NL" dirty="0" err="1"/>
+              <a:t>join</a:t>
+            </a:r>
+            <a:r>
+              <a:rPr lang="nl-NL" dirty="0"/>
+              <a:t> </a:t>
+            </a:r>
+            <a:r>
+              <a:rPr lang="nl-NL" dirty="0" err="1"/>
+              <a:t>the</a:t>
+            </a:r>
+            <a:r>
+              <a:rPr lang="nl-NL" dirty="0"/>
+              <a:t> </a:t>
+            </a:r>
+            <a:r>
+              <a:rPr lang="nl-NL" dirty="0" err="1"/>
+              <a:t>quizz</a:t>
+            </a:r>
+            <a:r>
+              <a:rPr lang="nl-NL" dirty="0"/>
+              <a:t> game:</a:t>
+            </a:r>
+          </a:p>
+          <a:p>
+            <a:pPr marL="457200" indent="-457200">
+              <a:buFont typeface="+mj-lt"/>
+              <a:buAutoNum type="arabicPeriod"/>
+            </a:pPr>
+            <a:r>
+              <a:rPr lang="nl-NL" dirty="0"/>
+              <a:t>Go </a:t>
+            </a:r>
+            <a:r>
+              <a:rPr lang="nl-NL" dirty="0" err="1"/>
+              <a:t>to</a:t>
+            </a:r>
+            <a:r>
+              <a:rPr lang="nl-NL" dirty="0"/>
+              <a:t> link: </a:t>
+            </a:r>
+            <a:r>
+              <a:rPr lang="nl-NL" dirty="0">
+                <a:hlinkClick r:id="rId2"/>
+              </a:rPr>
+              <a:t>https://quizizz.com/join</a:t>
+            </a:r>
+            <a:endParaRPr lang="nl-NL" dirty="0"/>
+          </a:p>
+          <a:p>
+            <a:pPr marL="457200" indent="-457200">
+              <a:buFont typeface="+mj-lt"/>
+              <a:buAutoNum type="arabicPeriod"/>
+            </a:pPr>
+            <a:r>
+              <a:rPr lang="nl-NL" dirty="0"/>
+              <a:t>Enter code: </a:t>
+            </a:r>
+            <a:r>
+              <a:rPr lang="nl-NL" dirty="0" err="1"/>
+              <a:t>xxxx</a:t>
+            </a:r>
+            <a:endParaRPr lang="nl-NL" dirty="0"/>
+          </a:p>
+          <a:p>
+            <a:pPr marL="457200" indent="-457200">
+              <a:buFont typeface="+mj-lt"/>
+              <a:buAutoNum type="arabicPeriod"/>
+            </a:pPr>
+            <a:r>
+              <a:rPr lang="nl-NL" dirty="0" err="1"/>
+              <a:t>Enjoy</a:t>
+            </a:r>
+            <a:r>
+              <a:rPr lang="nl-NL" dirty="0"/>
+              <a:t> </a:t>
+            </a:r>
+            <a:r>
+              <a:rPr lang="nl-NL" dirty="0" err="1"/>
+              <a:t>the</a:t>
+            </a:r>
+            <a:r>
+              <a:rPr lang="nl-NL" dirty="0"/>
+              <a:t> </a:t>
+            </a:r>
+            <a:r>
+              <a:rPr lang="nl-NL" dirty="0" err="1"/>
+              <a:t>quizz</a:t>
+            </a:r>
+            <a:r>
+              <a:rPr lang="nl-NL" dirty="0"/>
+              <a:t> game and </a:t>
+            </a:r>
+            <a:r>
+              <a:rPr lang="nl-NL" dirty="0" err="1"/>
+              <a:t>see</a:t>
+            </a:r>
+            <a:r>
+              <a:rPr lang="nl-NL" dirty="0"/>
+              <a:t> </a:t>
+            </a:r>
+            <a:r>
+              <a:rPr lang="nl-NL" dirty="0" err="1"/>
+              <a:t>how</a:t>
+            </a:r>
+            <a:r>
+              <a:rPr lang="nl-NL" dirty="0"/>
+              <a:t> </a:t>
+            </a:r>
+            <a:r>
+              <a:rPr lang="nl-NL" dirty="0" err="1"/>
+              <a:t>much</a:t>
+            </a:r>
+            <a:r>
+              <a:rPr lang="nl-NL" dirty="0"/>
+              <a:t> </a:t>
+            </a:r>
+            <a:r>
+              <a:rPr lang="nl-NL" dirty="0" err="1"/>
+              <a:t>you</a:t>
+            </a:r>
+            <a:r>
+              <a:rPr lang="nl-NL" dirty="0"/>
+              <a:t> </a:t>
+            </a:r>
+            <a:r>
+              <a:rPr lang="nl-NL" dirty="0" err="1"/>
+              <a:t>now</a:t>
+            </a:r>
+            <a:r>
+              <a:rPr lang="nl-NL" dirty="0"/>
+              <a:t> </a:t>
+            </a:r>
+            <a:r>
+              <a:rPr lang="nl-NL" dirty="0" err="1"/>
+              <a:t>know</a:t>
+            </a:r>
+            <a:r>
+              <a:rPr lang="nl-NL" dirty="0"/>
+              <a:t> </a:t>
+            </a:r>
+            <a:r>
+              <a:rPr lang="nl-NL" dirty="0" err="1"/>
+              <a:t>about</a:t>
+            </a:r>
+            <a:r>
+              <a:rPr lang="nl-NL" dirty="0"/>
+              <a:t> JIT compiler.</a:t>
+            </a:r>
+            <a:endParaRPr lang="en-NZ" dirty="0"/>
           </a:p>
         </p:txBody>
       </p:sp>
@@ -7664,7 +8592,7 @@
           <a:p>
             <a:fld id="{7E50A921-1625-4E66-8B53-913CC32CAF35}" type="slidenum">
               <a:rPr lang="en-NZ" smtClean="0"/>
-              <a:t>10</a:t>
+              <a:t>15</a:t>
             </a:fld>
             <a:endParaRPr lang="en-NZ"/>
           </a:p>
@@ -7674,6 +8602,128 @@
     <p:extLst>
       <p:ext uri="{BB962C8B-B14F-4D97-AF65-F5344CB8AC3E}">
         <p14:creationId xmlns:p14="http://schemas.microsoft.com/office/powerpoint/2010/main" val="2472288588"/>
+      </p:ext>
+    </p:extLst>
+  </p:cSld>
+  <p:clrMapOvr>
+    <a:masterClrMapping/>
+  </p:clrMapOvr>
+</p:sld>
+</file>
+
+<file path=ppt/slides/slide16.xml><?xml version="1.0" encoding="utf-8"?>
+<p:sld xmlns:a="http://schemas.openxmlformats.org/drawingml/2006/main" xmlns:r="http://schemas.openxmlformats.org/officeDocument/2006/relationships" xmlns:p="http://schemas.openxmlformats.org/presentationml/2006/main">
+  <p:cSld>
+    <p:spTree>
+      <p:nvGrpSpPr>
+        <p:cNvPr id="1" name=""/>
+        <p:cNvGrpSpPr/>
+        <p:nvPr/>
+      </p:nvGrpSpPr>
+      <p:grpSpPr>
+        <a:xfrm>
+          <a:off x="0" y="0"/>
+          <a:ext cx="0" cy="0"/>
+          <a:chOff x="0" y="0"/>
+          <a:chExt cx="0" cy="0"/>
+        </a:xfrm>
+      </p:grpSpPr>
+      <p:sp>
+        <p:nvSpPr>
+          <p:cNvPr id="2" name="Title 1">
+            <a:extLst>
+              <a:ext uri="{FF2B5EF4-FFF2-40B4-BE49-F238E27FC236}">
+                <a16:creationId xmlns:a16="http://schemas.microsoft.com/office/drawing/2014/main" id="{0DC1F5F1-E9B3-388B-F2F4-A727DA0B29C5}"/>
+              </a:ext>
+            </a:extLst>
+          </p:cNvPr>
+          <p:cNvSpPr>
+            <a:spLocks noGrp="1"/>
+          </p:cNvSpPr>
+          <p:nvPr>
+            <p:ph type="title"/>
+          </p:nvPr>
+        </p:nvSpPr>
+        <p:spPr>
+          <a:xfrm>
+            <a:off x="947817" y="2728735"/>
+            <a:ext cx="9404723" cy="1400530"/>
+          </a:xfrm>
+        </p:spPr>
+        <p:txBody>
+          <a:bodyPr/>
+          <a:lstStyle/>
+          <a:p>
+            <a:pPr algn="ctr"/>
+            <a:r>
+              <a:rPr lang="nl-NL" dirty="0" err="1"/>
+              <a:t>Thank</a:t>
+            </a:r>
+            <a:r>
+              <a:rPr lang="nl-NL" dirty="0"/>
+              <a:t> </a:t>
+            </a:r>
+            <a:r>
+              <a:rPr lang="nl-NL" dirty="0" err="1"/>
+              <a:t>you</a:t>
+            </a:r>
+            <a:r>
+              <a:rPr lang="nl-NL" dirty="0"/>
+              <a:t> </a:t>
+            </a:r>
+            <a:r>
+              <a:rPr lang="nl-NL" dirty="0" err="1"/>
+              <a:t>for</a:t>
+            </a:r>
+            <a:r>
+              <a:rPr lang="nl-NL" dirty="0"/>
+              <a:t> </a:t>
+            </a:r>
+            <a:r>
+              <a:rPr lang="nl-NL" dirty="0" err="1"/>
+              <a:t>your</a:t>
+            </a:r>
+            <a:r>
+              <a:rPr lang="nl-NL" dirty="0"/>
+              <a:t> attention.</a:t>
+            </a:r>
+            <a:endParaRPr lang="en-NZ" dirty="0"/>
+          </a:p>
+        </p:txBody>
+      </p:sp>
+      <p:sp>
+        <p:nvSpPr>
+          <p:cNvPr id="4" name="Slide Number Placeholder 3">
+            <a:extLst>
+              <a:ext uri="{FF2B5EF4-FFF2-40B4-BE49-F238E27FC236}">
+                <a16:creationId xmlns:a16="http://schemas.microsoft.com/office/drawing/2014/main" id="{0AD92AA6-2E8A-6582-404D-D5137E8A5B21}"/>
+              </a:ext>
+            </a:extLst>
+          </p:cNvPr>
+          <p:cNvSpPr>
+            <a:spLocks noGrp="1"/>
+          </p:cNvSpPr>
+          <p:nvPr>
+            <p:ph type="sldNum" sz="quarter" idx="12"/>
+          </p:nvPr>
+        </p:nvSpPr>
+        <p:spPr/>
+        <p:txBody>
+          <a:bodyPr/>
+          <a:lstStyle/>
+          <a:p>
+            <a:fld id="{7E50A921-1625-4E66-8B53-913CC32CAF35}" type="slidenum">
+              <a:rPr lang="en-NZ" smtClean="0"/>
+              <a:t>16</a:t>
+            </a:fld>
+            <a:endParaRPr lang="en-NZ" dirty="0"/>
+          </a:p>
+        </p:txBody>
+      </p:sp>
+    </p:spTree>
+    <p:extLst>
+      <p:ext uri="{BB962C8B-B14F-4D97-AF65-F5344CB8AC3E}">
+        <p14:creationId xmlns:p14="http://schemas.microsoft.com/office/powerpoint/2010/main" val="2731243771"/>
       </p:ext>
     </p:extLst>
   </p:cSld>
@@ -7722,14 +8772,14 @@
           <a:lstStyle/>
           <a:p>
             <a:r>
-              <a:rPr lang="nl-NL" err="1"/>
+              <a:rPr lang="nl-NL" dirty="0" err="1"/>
               <a:t>Table</a:t>
             </a:r>
             <a:r>
-              <a:rPr lang="nl-NL"/>
+              <a:rPr lang="nl-NL" dirty="0"/>
               <a:t> of contents</a:t>
             </a:r>
-            <a:endParaRPr lang="en-NZ"/>
+            <a:endParaRPr lang="en-NZ" dirty="0"/>
           </a:p>
         </p:txBody>
       </p:sp>
@@ -7749,80 +8799,136 @@
             <p:ph idx="1"/>
           </p:nvPr>
         </p:nvSpPr>
-        <p:spPr/>
+        <p:spPr>
+          <a:xfrm>
+            <a:off x="745179" y="1586574"/>
+            <a:ext cx="10445560" cy="4195481"/>
+          </a:xfrm>
+        </p:spPr>
         <p:txBody>
           <a:bodyPr/>
           <a:lstStyle/>
           <a:p>
             <a:r>
-              <a:rPr lang="nl-NL" err="1"/>
+              <a:rPr lang="nl-NL" dirty="0" err="1"/>
               <a:t>What</a:t>
             </a:r>
             <a:r>
-              <a:rPr lang="nl-NL"/>
+              <a:rPr lang="nl-NL" dirty="0"/>
               <a:t> is a compiler/</a:t>
             </a:r>
             <a:r>
-              <a:rPr lang="nl-NL" err="1"/>
+              <a:rPr lang="nl-NL" dirty="0" err="1"/>
               <a:t>interpreter</a:t>
             </a:r>
             <a:r>
-              <a:rPr lang="nl-NL"/>
-              <a:t>?</a:t>
-            </a:r>
-          </a:p>
-          <a:p>
-            <a:r>
-              <a:rPr lang="nl-NL"/>
+              <a:rPr lang="nl-NL" dirty="0"/>
+              <a:t>(no laptops, </a:t>
+            </a:r>
+            <a:r>
+              <a:rPr lang="nl-NL" dirty="0" err="1"/>
+              <a:t>only</a:t>
+            </a:r>
+            <a:r>
+              <a:rPr lang="nl-NL" dirty="0"/>
+              <a:t> public </a:t>
+            </a:r>
+            <a:r>
+              <a:rPr lang="en-US" dirty="0"/>
+              <a:t>knowledge</a:t>
+            </a:r>
+            <a:r>
+              <a:rPr lang="nl-NL" dirty="0"/>
+              <a:t>)?</a:t>
+            </a:r>
+          </a:p>
+          <a:p>
+            <a:r>
+              <a:rPr lang="nl-NL" dirty="0"/>
               <a:t>How does a compiler/</a:t>
             </a:r>
             <a:r>
-              <a:rPr lang="nl-NL" err="1"/>
+              <a:rPr lang="nl-NL" dirty="0" err="1"/>
               <a:t>interpreter</a:t>
             </a:r>
             <a:r>
-              <a:rPr lang="nl-NL"/>
+              <a:rPr lang="nl-NL" dirty="0"/>
               <a:t> </a:t>
             </a:r>
             <a:r>
-              <a:rPr lang="nl-NL" err="1"/>
+              <a:rPr lang="nl-NL" dirty="0" err="1"/>
               <a:t>work</a:t>
             </a:r>
             <a:r>
-              <a:rPr lang="nl-NL"/>
-              <a:t>?</a:t>
-            </a:r>
-          </a:p>
-          <a:p>
-            <a:r>
-              <a:rPr lang="en-NZ"/>
+              <a:rPr lang="nl-NL" dirty="0"/>
+              <a:t> (no laptops, </a:t>
+            </a:r>
+            <a:r>
+              <a:rPr lang="nl-NL" dirty="0" err="1"/>
+              <a:t>only</a:t>
+            </a:r>
+            <a:r>
+              <a:rPr lang="nl-NL" dirty="0"/>
+              <a:t> public </a:t>
+            </a:r>
+            <a:r>
+              <a:rPr lang="en-US" dirty="0"/>
+              <a:t>knowledge</a:t>
+            </a:r>
+            <a:r>
+              <a:rPr lang="nl-NL" dirty="0"/>
+              <a:t>)?</a:t>
+            </a:r>
+          </a:p>
+          <a:p>
+            <a:r>
+              <a:rPr lang="en-NZ" dirty="0"/>
               <a:t>What is JIT compiler?</a:t>
             </a:r>
           </a:p>
           <a:p>
             <a:r>
-              <a:rPr lang="en-NZ"/>
+              <a:rPr lang="en-NZ" dirty="0"/>
               <a:t>What are the pros and cons of using </a:t>
             </a:r>
             <a:r>
-              <a:rPr lang="en-NZ" err="1"/>
+              <a:rPr lang="en-NZ" dirty="0" err="1"/>
               <a:t>jit</a:t>
             </a:r>
             <a:r>
-              <a:rPr lang="en-NZ"/>
+              <a:rPr lang="en-NZ" dirty="0"/>
               <a:t> compiler?</a:t>
             </a:r>
           </a:p>
           <a:p>
             <a:r>
-              <a:rPr lang="en-NZ"/>
+              <a:rPr lang="en-NZ" dirty="0"/>
               <a:t>What are use cases for JIT compiler?</a:t>
             </a:r>
           </a:p>
           <a:p>
             <a:r>
-              <a:rPr lang="en-NZ"/>
+              <a:rPr lang="en-NZ" dirty="0"/>
+              <a:t>Exercises(GitHub)</a:t>
+            </a:r>
+          </a:p>
+          <a:p>
+            <a:r>
+              <a:rPr lang="en-NZ" dirty="0" err="1"/>
+              <a:t>Quizz</a:t>
+            </a:r>
+            <a:endParaRPr lang="en-NZ" dirty="0"/>
+          </a:p>
+          <a:p>
+            <a:r>
+              <a:rPr lang="en-NZ" dirty="0"/>
               <a:t>Future for JIT compiler?</a:t>
+            </a:r>
+          </a:p>
+          <a:p>
+            <a:r>
+              <a:rPr lang="en-NZ" dirty="0"/>
+              <a:t>Questions</a:t>
             </a:r>
           </a:p>
         </p:txBody>
@@ -7852,7 +8958,7 @@
               <a:rPr lang="en-NZ" smtClean="0"/>
               <a:t>2</a:t>
             </a:fld>
-            <a:endParaRPr lang="en-NZ"/>
+            <a:endParaRPr lang="en-NZ" dirty="0"/>
           </a:p>
         </p:txBody>
       </p:sp>
@@ -8321,21 +9427,21 @@
           <a:lstStyle/>
           <a:p>
             <a:r>
-              <a:rPr lang="en-NZ"/>
+              <a:rPr lang="en-NZ" dirty="0"/>
               <a:t>What are the pros and cons of using </a:t>
             </a:r>
             <a:r>
-              <a:rPr lang="en-NZ" err="1"/>
+              <a:rPr lang="en-NZ" dirty="0" err="1"/>
               <a:t>jit</a:t>
             </a:r>
             <a:r>
-              <a:rPr lang="en-NZ"/>
+              <a:rPr lang="en-NZ" dirty="0"/>
               <a:t> compiler?</a:t>
             </a:r>
             <a:br>
-              <a:rPr lang="en-NZ"/>
+              <a:rPr lang="en-NZ" dirty="0"/>
             </a:br>
-            <a:endParaRPr lang="en-NZ"/>
+            <a:endParaRPr lang="en-NZ" dirty="0"/>
           </a:p>
         </p:txBody>
       </p:sp>
@@ -8544,7 +9650,7 @@
           <p:cNvPr id="2" name="Title 1">
             <a:extLst>
               <a:ext uri="{FF2B5EF4-FFF2-40B4-BE49-F238E27FC236}">
-                <a16:creationId xmlns:a16="http://schemas.microsoft.com/office/drawing/2014/main" id="{38748AEC-27DB-9458-5620-025583B84467}"/>
+                <a16:creationId xmlns:a16="http://schemas.microsoft.com/office/drawing/2014/main" id="{C20A54BA-69C1-CC93-2155-FA03F78A8062}"/>
               </a:ext>
             </a:extLst>
           </p:cNvPr>
@@ -8561,13 +9667,10 @@
           <a:lstStyle/>
           <a:p>
             <a:r>
-              <a:rPr lang="en-NZ"/>
-              <a:t>Future for JIT compiler?</a:t>
-            </a:r>
-            <a:br>
-              <a:rPr lang="en-NZ"/>
-            </a:br>
-            <a:endParaRPr lang="en-NZ"/>
+              <a:rPr lang="en-NZ" dirty="0" err="1"/>
+              <a:t>Exersices</a:t>
+            </a:r>
+            <a:endParaRPr lang="en-NZ" dirty="0"/>
           </a:p>
         </p:txBody>
       </p:sp>
@@ -8576,7 +9679,7 @@
           <p:cNvPr id="3" name="Content Placeholder 2">
             <a:extLst>
               <a:ext uri="{FF2B5EF4-FFF2-40B4-BE49-F238E27FC236}">
-                <a16:creationId xmlns:a16="http://schemas.microsoft.com/office/drawing/2014/main" id="{92B70313-9A05-94E6-E335-058598671C3A}"/>
+                <a16:creationId xmlns:a16="http://schemas.microsoft.com/office/drawing/2014/main" id="{B175DF82-4CFD-13E9-E711-AEA65E88C0A4}"/>
               </a:ext>
             </a:extLst>
           </p:cNvPr>
@@ -8592,7 +9695,156 @@
           <a:bodyPr/>
           <a:lstStyle/>
           <a:p>
-            <a:endParaRPr lang="en-NZ"/>
+            <a:r>
+              <a:rPr lang="nl-NL" dirty="0"/>
+              <a:t>In order </a:t>
+            </a:r>
+            <a:r>
+              <a:rPr lang="nl-NL" dirty="0" err="1"/>
+              <a:t>to</a:t>
+            </a:r>
+            <a:r>
+              <a:rPr lang="nl-NL" dirty="0"/>
+              <a:t> do </a:t>
+            </a:r>
+            <a:r>
+              <a:rPr lang="nl-NL" dirty="0" err="1"/>
+              <a:t>the</a:t>
+            </a:r>
+            <a:r>
+              <a:rPr lang="nl-NL" dirty="0"/>
+              <a:t> </a:t>
+            </a:r>
+            <a:r>
+              <a:rPr lang="nl-NL" dirty="0" err="1"/>
+              <a:t>exersices</a:t>
+            </a:r>
+            <a:r>
+              <a:rPr lang="nl-NL" dirty="0"/>
+              <a:t> </a:t>
+            </a:r>
+            <a:r>
+              <a:rPr lang="nl-NL" dirty="0" err="1"/>
+              <a:t>provided</a:t>
+            </a:r>
+            <a:r>
+              <a:rPr lang="nl-NL" dirty="0"/>
+              <a:t> </a:t>
+            </a:r>
+            <a:r>
+              <a:rPr lang="nl-NL" dirty="0" err="1"/>
+              <a:t>by</a:t>
+            </a:r>
+            <a:r>
+              <a:rPr lang="nl-NL" dirty="0"/>
+              <a:t> </a:t>
+            </a:r>
+            <a:r>
+              <a:rPr lang="nl-NL" dirty="0" err="1"/>
+              <a:t>us</a:t>
+            </a:r>
+            <a:r>
+              <a:rPr lang="nl-NL" dirty="0"/>
+              <a:t>, </a:t>
+            </a:r>
+            <a:r>
+              <a:rPr lang="nl-NL" dirty="0" err="1"/>
+              <a:t>please</a:t>
+            </a:r>
+            <a:r>
+              <a:rPr lang="nl-NL" dirty="0"/>
+              <a:t> follow </a:t>
+            </a:r>
+            <a:r>
+              <a:rPr lang="nl-NL" dirty="0" err="1"/>
+              <a:t>the</a:t>
+            </a:r>
+            <a:r>
+              <a:rPr lang="nl-NL" dirty="0"/>
+              <a:t> </a:t>
+            </a:r>
+            <a:r>
+              <a:rPr lang="nl-NL" dirty="0" err="1"/>
+              <a:t>following</a:t>
+            </a:r>
+            <a:r>
+              <a:rPr lang="nl-NL" dirty="0"/>
+              <a:t> steps:</a:t>
+            </a:r>
+          </a:p>
+          <a:p>
+            <a:pPr marL="457200" indent="-457200">
+              <a:buFont typeface="+mj-lt"/>
+              <a:buAutoNum type="arabicPeriod"/>
+            </a:pPr>
+            <a:r>
+              <a:rPr lang="en-NZ" dirty="0"/>
+              <a:t>Go to: </a:t>
+            </a:r>
+            <a:r>
+              <a:rPr lang="en-NZ" dirty="0">
+                <a:hlinkClick r:id="rId2"/>
+              </a:rPr>
+              <a:t>https://github.com/sebivenlo/esd-2024-jit-compiler</a:t>
+            </a:r>
+            <a:endParaRPr lang="en-NZ" dirty="0"/>
+          </a:p>
+          <a:p>
+            <a:pPr marL="457200" indent="-457200">
+              <a:buFont typeface="+mj-lt"/>
+              <a:buAutoNum type="arabicPeriod"/>
+            </a:pPr>
+            <a:r>
+              <a:rPr lang="en-NZ" dirty="0"/>
+              <a:t>Clone the repository and open </a:t>
+            </a:r>
+            <a:r>
+              <a:rPr lang="en-NZ" dirty="0" err="1"/>
+              <a:t>VSCode</a:t>
+            </a:r>
+            <a:endParaRPr lang="en-NZ" dirty="0"/>
+          </a:p>
+          <a:p>
+            <a:pPr marL="457200" indent="-457200">
+              <a:buFont typeface="+mj-lt"/>
+              <a:buAutoNum type="arabicPeriod"/>
+            </a:pPr>
+            <a:r>
+              <a:rPr lang="en-NZ" dirty="0"/>
+              <a:t>Install all Docker images using </a:t>
+            </a:r>
+            <a:r>
+              <a:rPr lang="en-NZ" dirty="0" err="1"/>
+              <a:t>devContainer</a:t>
+            </a:r>
+            <a:r>
+              <a:rPr lang="en-NZ" dirty="0"/>
+              <a:t> dependency(ask us if you need help)</a:t>
+            </a:r>
+          </a:p>
+          <a:p>
+            <a:pPr marL="457200" indent="-457200">
+              <a:buFont typeface="+mj-lt"/>
+              <a:buAutoNum type="arabicPeriod"/>
+            </a:pPr>
+            <a:r>
+              <a:rPr lang="en-NZ" dirty="0"/>
+              <a:t>Wait for everyone to finish the installation</a:t>
+            </a:r>
+          </a:p>
+          <a:p>
+            <a:pPr marL="457200" indent="-457200">
+              <a:buFont typeface="+mj-lt"/>
+              <a:buAutoNum type="arabicPeriod"/>
+            </a:pPr>
+            <a:endParaRPr lang="en-NZ" dirty="0"/>
+          </a:p>
+          <a:p>
+            <a:pPr marL="457200" indent="-457200">
+              <a:buFont typeface="+mj-lt"/>
+              <a:buAutoNum type="arabicPeriod"/>
+            </a:pPr>
+            <a:endParaRPr lang="en-NZ" dirty="0"/>
           </a:p>
         </p:txBody>
       </p:sp>
@@ -8601,7 +9853,7 @@
           <p:cNvPr id="4" name="Slide Number Placeholder 3">
             <a:extLst>
               <a:ext uri="{FF2B5EF4-FFF2-40B4-BE49-F238E27FC236}">
-                <a16:creationId xmlns:a16="http://schemas.microsoft.com/office/drawing/2014/main" id="{01678E4D-5CC8-8C31-F1BF-8F9DC6C510D1}"/>
+                <a16:creationId xmlns:a16="http://schemas.microsoft.com/office/drawing/2014/main" id="{8EDC8A37-FB29-04DF-14BA-575D2468193C}"/>
               </a:ext>
             </a:extLst>
           </p:cNvPr>
@@ -8621,14 +9873,14 @@
               <a:rPr lang="en-NZ" smtClean="0"/>
               <a:t>8</a:t>
             </a:fld>
-            <a:endParaRPr lang="en-NZ"/>
+            <a:endParaRPr lang="en-NZ" dirty="0"/>
           </a:p>
         </p:txBody>
       </p:sp>
     </p:spTree>
     <p:extLst>
       <p:ext uri="{BB962C8B-B14F-4D97-AF65-F5344CB8AC3E}">
-        <p14:creationId xmlns:p14="http://schemas.microsoft.com/office/powerpoint/2010/main" val="808733467"/>
+        <p14:creationId xmlns:p14="http://schemas.microsoft.com/office/powerpoint/2010/main" val="3993358039"/>
       </p:ext>
     </p:extLst>
   </p:cSld>
@@ -8660,7 +9912,7 @@
           <p:cNvPr id="2" name="Title 1">
             <a:extLst>
               <a:ext uri="{FF2B5EF4-FFF2-40B4-BE49-F238E27FC236}">
-                <a16:creationId xmlns:a16="http://schemas.microsoft.com/office/drawing/2014/main" id="{220305A0-C5E7-D7B2-2FDF-5333EC4E6D1A}"/>
+                <a16:creationId xmlns:a16="http://schemas.microsoft.com/office/drawing/2014/main" id="{05A6F548-FBE1-EF41-8DE4-E0597C356C03}"/>
               </a:ext>
             </a:extLst>
           </p:cNvPr>
@@ -8671,25 +9923,45 @@
             <p:ph type="title"/>
           </p:nvPr>
         </p:nvSpPr>
-        <p:spPr>
-          <a:xfrm>
-            <a:off x="3608767" y="3013038"/>
-            <a:ext cx="9404723" cy="1400530"/>
-          </a:xfrm>
-        </p:spPr>
+        <p:spPr/>
         <p:txBody>
           <a:bodyPr/>
           <a:lstStyle/>
           <a:p>
             <a:r>
-              <a:rPr lang="nl-NL" err="1"/>
-              <a:t>Questions</a:t>
-            </a:r>
-            <a:r>
-              <a:rPr lang="nl-NL"/>
-              <a:t>?</a:t>
-            </a:r>
-            <a:endParaRPr lang="en-NZ"/>
+              <a:rPr lang="nl-NL" dirty="0" err="1"/>
+              <a:t>Exercise</a:t>
+            </a:r>
+            <a:r>
+              <a:rPr lang="nl-NL" dirty="0"/>
+              <a:t> 1 - JAVA</a:t>
+            </a:r>
+            <a:endParaRPr lang="en-NZ" dirty="0"/>
+          </a:p>
+        </p:txBody>
+      </p:sp>
+      <p:sp>
+        <p:nvSpPr>
+          <p:cNvPr id="3" name="Content Placeholder 2">
+            <a:extLst>
+              <a:ext uri="{FF2B5EF4-FFF2-40B4-BE49-F238E27FC236}">
+                <a16:creationId xmlns:a16="http://schemas.microsoft.com/office/drawing/2014/main" id="{CC04F95A-E780-B6DF-5EB4-14E92BF2E6E7}"/>
+              </a:ext>
+            </a:extLst>
+          </p:cNvPr>
+          <p:cNvSpPr>
+            <a:spLocks noGrp="1"/>
+          </p:cNvSpPr>
+          <p:nvPr>
+            <p:ph idx="1"/>
+          </p:nvPr>
+        </p:nvSpPr>
+        <p:spPr/>
+        <p:txBody>
+          <a:bodyPr/>
+          <a:lstStyle/>
+          <a:p>
+            <a:endParaRPr lang="en-NZ" dirty="0"/>
           </a:p>
         </p:txBody>
       </p:sp>
@@ -8698,7 +9970,7 @@
           <p:cNvPr id="4" name="Slide Number Placeholder 3">
             <a:extLst>
               <a:ext uri="{FF2B5EF4-FFF2-40B4-BE49-F238E27FC236}">
-                <a16:creationId xmlns:a16="http://schemas.microsoft.com/office/drawing/2014/main" id="{6271BA6B-DFB5-693C-FAC6-10508B35CB42}"/>
+                <a16:creationId xmlns:a16="http://schemas.microsoft.com/office/drawing/2014/main" id="{1B52D211-E54C-292A-D2FE-77A3D056DD01}"/>
               </a:ext>
             </a:extLst>
           </p:cNvPr>
@@ -8718,14 +9990,14 @@
               <a:rPr lang="en-NZ" smtClean="0"/>
               <a:t>9</a:t>
             </a:fld>
-            <a:endParaRPr lang="en-NZ"/>
+            <a:endParaRPr lang="en-NZ" dirty="0"/>
           </a:p>
         </p:txBody>
       </p:sp>
     </p:spTree>
     <p:extLst>
       <p:ext uri="{BB962C8B-B14F-4D97-AF65-F5344CB8AC3E}">
-        <p14:creationId xmlns:p14="http://schemas.microsoft.com/office/powerpoint/2010/main" val="2403430344"/>
+        <p14:creationId xmlns:p14="http://schemas.microsoft.com/office/powerpoint/2010/main" val="2463297231"/>
       </p:ext>
     </p:extLst>
   </p:cSld>

</xml_diff>

<commit_message>
added keywords for the speeches
Hello Thijs, I just created the keywords we are going to present. Please, take a look at it
</commit_message>
<xml_diff>
--- a/documents/presentation/presentation jit compiler.pptx
+++ b/documents/presentation/presentation jit compiler.pptx
@@ -12,11 +12,11 @@
     <p:sldId id="257" r:id="rId3"/>
     <p:sldId id="258" r:id="rId4"/>
     <p:sldId id="273" r:id="rId5"/>
-    <p:sldId id="274" r:id="rId6"/>
-    <p:sldId id="259" r:id="rId7"/>
-    <p:sldId id="260" r:id="rId8"/>
-    <p:sldId id="261" r:id="rId9"/>
-    <p:sldId id="272" r:id="rId10"/>
+    <p:sldId id="260" r:id="rId6"/>
+    <p:sldId id="274" r:id="rId7"/>
+    <p:sldId id="261" r:id="rId8"/>
+    <p:sldId id="272" r:id="rId9"/>
+    <p:sldId id="259" r:id="rId10"/>
     <p:sldId id="262" r:id="rId11"/>
     <p:sldId id="275" r:id="rId12"/>
     <p:sldId id="266" r:id="rId13"/>
@@ -137,7 +137,7 @@
 <file path=ppt/revisionInfo.xml><?xml version="1.0" encoding="utf-8"?>
 <p1510:revInfo xmlns:a="http://schemas.openxmlformats.org/drawingml/2006/main" xmlns:r="http://schemas.openxmlformats.org/officeDocument/2006/relationships" xmlns:p1510="http://schemas.microsoft.com/office/powerpoint/2015/10/main">
   <p1510:revLst>
-    <p1510:client id="{3BC882D7-0369-453F-A1BB-621FEF4F8646}" v="4" dt="2024-10-21T11:20:55.348"/>
+    <p1510:client id="{3BC882D7-0369-453F-A1BB-621FEF4F8646}" v="6" dt="2024-10-28T13:59:32.241"/>
   </p1510:revLst>
 </p1510:revInfo>
 </file>
@@ -147,18 +147,18 @@
   <pc:docChgLst>
     <pc:chgData name="Arauz Bonilla,Jorge J.U." userId="1bf2599c-1c01-48b4-bae8-52167a7d20f0" providerId="ADAL" clId="{3BC882D7-0369-453F-A1BB-621FEF4F8646}"/>
     <pc:docChg chg="undo custSel addSld modSld sldOrd">
-      <pc:chgData name="Arauz Bonilla,Jorge J.U." userId="1bf2599c-1c01-48b4-bae8-52167a7d20f0" providerId="ADAL" clId="{3BC882D7-0369-453F-A1BB-621FEF4F8646}" dt="2024-10-28T13:40:02.443" v="1260" actId="20577"/>
+      <pc:chgData name="Arauz Bonilla,Jorge J.U." userId="1bf2599c-1c01-48b4-bae8-52167a7d20f0" providerId="ADAL" clId="{3BC882D7-0369-453F-A1BB-621FEF4F8646}" dt="2024-11-03T10:32:39.292" v="1297" actId="27636"/>
       <pc:docMkLst>
         <pc:docMk/>
       </pc:docMkLst>
       <pc:sldChg chg="modSp mod">
-        <pc:chgData name="Arauz Bonilla,Jorge J.U." userId="1bf2599c-1c01-48b4-bae8-52167a7d20f0" providerId="ADAL" clId="{3BC882D7-0369-453F-A1BB-621FEF4F8646}" dt="2024-10-28T13:40:02.443" v="1260" actId="20577"/>
+        <pc:chgData name="Arauz Bonilla,Jorge J.U." userId="1bf2599c-1c01-48b4-bae8-52167a7d20f0" providerId="ADAL" clId="{3BC882D7-0369-453F-A1BB-621FEF4F8646}" dt="2024-11-03T10:32:39.292" v="1297" actId="27636"/>
         <pc:sldMkLst>
           <pc:docMk/>
           <pc:sldMk cId="543737575" sldId="257"/>
         </pc:sldMkLst>
         <pc:spChg chg="mod">
-          <ac:chgData name="Arauz Bonilla,Jorge J.U." userId="1bf2599c-1c01-48b4-bae8-52167a7d20f0" providerId="ADAL" clId="{3BC882D7-0369-453F-A1BB-621FEF4F8646}" dt="2024-10-28T13:40:02.443" v="1260" actId="20577"/>
+          <ac:chgData name="Arauz Bonilla,Jorge J.U." userId="1bf2599c-1c01-48b4-bae8-52167a7d20f0" providerId="ADAL" clId="{3BC882D7-0369-453F-A1BB-621FEF4F8646}" dt="2024-11-03T10:32:39.292" v="1297" actId="27636"/>
           <ac:spMkLst>
             <pc:docMk/>
             <pc:sldMk cId="543737575" sldId="257"/>
@@ -167,7 +167,14 @@
         </pc:spChg>
       </pc:sldChg>
       <pc:sldChg chg="ord">
-        <pc:chgData name="Arauz Bonilla,Jorge J.U." userId="1bf2599c-1c01-48b4-bae8-52167a7d20f0" providerId="ADAL" clId="{3BC882D7-0369-453F-A1BB-621FEF4F8646}" dt="2024-10-21T10:16:00.588" v="107"/>
+        <pc:chgData name="Arauz Bonilla,Jorge J.U." userId="1bf2599c-1c01-48b4-bae8-52167a7d20f0" providerId="ADAL" clId="{3BC882D7-0369-453F-A1BB-621FEF4F8646}" dt="2024-10-28T13:58:26.266" v="1262"/>
+        <pc:sldMkLst>
+          <pc:docMk/>
+          <pc:sldMk cId="2644708043" sldId="260"/>
+        </pc:sldMkLst>
+      </pc:sldChg>
+      <pc:sldChg chg="ord">
+        <pc:chgData name="Arauz Bonilla,Jorge J.U." userId="1bf2599c-1c01-48b4-bae8-52167a7d20f0" providerId="ADAL" clId="{3BC882D7-0369-453F-A1BB-621FEF4F8646}" dt="2024-10-28T13:58:53.072" v="1264"/>
         <pc:sldMkLst>
           <pc:docMk/>
           <pc:sldMk cId="1517301832" sldId="261"/>
@@ -315,6 +322,13 @@
             <ac:spMk id="3" creationId="{C0B5152A-AAFC-9989-852E-326C74102662}"/>
           </ac:spMkLst>
         </pc:spChg>
+      </pc:sldChg>
+      <pc:sldChg chg="ord">
+        <pc:chgData name="Arauz Bonilla,Jorge J.U." userId="1bf2599c-1c01-48b4-bae8-52167a7d20f0" providerId="ADAL" clId="{3BC882D7-0369-453F-A1BB-621FEF4F8646}" dt="2024-10-28T13:58:56.991" v="1266"/>
+        <pc:sldMkLst>
+          <pc:docMk/>
+          <pc:sldMk cId="3320594642" sldId="272"/>
+        </pc:sldMkLst>
       </pc:sldChg>
     </pc:docChg>
   </pc:docChgLst>
@@ -3696,7 +3710,7 @@
           <a:p>
             <a:fld id="{7097D9E5-16FE-4A2E-9805-C519DE9D3040}" type="datetimeFigureOut">
               <a:rPr lang="en-NZ" smtClean="0"/>
-              <a:t>28/10/2024</a:t>
+              <a:t>3/11/2024</a:t>
             </a:fld>
             <a:endParaRPr lang="en-NZ"/>
           </a:p>
@@ -4148,7 +4162,7 @@
           <a:p>
             <a:fld id="{131A0DB0-A85B-4487-8F34-6C89C5E4FE9D}" type="datetime1">
               <a:rPr lang="en-NZ" smtClean="0"/>
-              <a:t>28/10/2024</a:t>
+              <a:t>3/11/2024</a:t>
             </a:fld>
             <a:endParaRPr lang="en-NZ"/>
           </a:p>
@@ -4421,7 +4435,7 @@
           <a:p>
             <a:fld id="{5323748D-C940-46E8-A8FE-39A302589491}" type="datetime1">
               <a:rPr lang="en-NZ" smtClean="0"/>
-              <a:t>28/10/2024</a:t>
+              <a:t>3/11/2024</a:t>
             </a:fld>
             <a:endParaRPr lang="en-NZ"/>
           </a:p>
@@ -4614,7 +4628,7 @@
           <a:p>
             <a:fld id="{8E1F1FAA-C845-4339-889E-28EF06EE40FF}" type="datetime1">
               <a:rPr lang="en-NZ" smtClean="0"/>
-              <a:t>28/10/2024</a:t>
+              <a:t>3/11/2024</a:t>
             </a:fld>
             <a:endParaRPr lang="en-NZ"/>
           </a:p>
@@ -4886,7 +4900,7 @@
           <a:p>
             <a:fld id="{944BABD2-5B36-4C22-8FAE-825B3CD25B81}" type="datetime1">
               <a:rPr lang="en-NZ" smtClean="0"/>
-              <a:t>28/10/2024</a:t>
+              <a:t>3/11/2024</a:t>
             </a:fld>
             <a:endParaRPr lang="en-NZ"/>
           </a:p>
@@ -5226,7 +5240,7 @@
           <a:p>
             <a:fld id="{7E84032B-D658-433F-842C-DAFAE1FBCD74}" type="datetime1">
               <a:rPr lang="en-NZ" smtClean="0"/>
-              <a:t>28/10/2024</a:t>
+              <a:t>3/11/2024</a:t>
             </a:fld>
             <a:endParaRPr lang="en-NZ"/>
           </a:p>
@@ -5848,7 +5862,7 @@
           <a:p>
             <a:fld id="{BE0BD24D-BB39-48BC-8468-64E039742EBA}" type="datetime1">
               <a:rPr lang="en-NZ" smtClean="0"/>
-              <a:t>28/10/2024</a:t>
+              <a:t>3/11/2024</a:t>
             </a:fld>
             <a:endParaRPr lang="en-NZ"/>
           </a:p>
@@ -6704,7 +6718,7 @@
           <a:p>
             <a:fld id="{1BEEC8BB-492B-4068-A56A-07D34DE636F2}" type="datetime1">
               <a:rPr lang="en-NZ" smtClean="0"/>
-              <a:t>28/10/2024</a:t>
+              <a:t>3/11/2024</a:t>
             </a:fld>
             <a:endParaRPr lang="en-NZ"/>
           </a:p>
@@ -6872,7 +6886,7 @@
           <a:p>
             <a:fld id="{511142B1-8092-47B7-9305-FA1D52CEA1CE}" type="datetime1">
               <a:rPr lang="en-NZ" smtClean="0"/>
-              <a:t>28/10/2024</a:t>
+              <a:t>3/11/2024</a:t>
             </a:fld>
             <a:endParaRPr lang="en-NZ"/>
           </a:p>
@@ -7050,7 +7064,7 @@
           <a:p>
             <a:fld id="{B05740B9-E3C6-4C7C-A2EA-16EBC5D7C804}" type="datetime1">
               <a:rPr lang="en-NZ" smtClean="0"/>
-              <a:t>28/10/2024</a:t>
+              <a:t>3/11/2024</a:t>
             </a:fld>
             <a:endParaRPr lang="en-NZ"/>
           </a:p>
@@ -7218,7 +7232,7 @@
           <a:p>
             <a:fld id="{7F7A93E3-8E57-4E1F-B6A6-44FB3C00BCF0}" type="datetime1">
               <a:rPr lang="en-NZ" smtClean="0"/>
-              <a:t>28/10/2024</a:t>
+              <a:t>3/11/2024</a:t>
             </a:fld>
             <a:endParaRPr lang="en-NZ"/>
           </a:p>
@@ -7464,7 +7478,7 @@
           <a:p>
             <a:fld id="{49788324-9239-4A6A-B263-18CF364C18E6}" type="datetime1">
               <a:rPr lang="en-NZ" smtClean="0"/>
-              <a:t>28/10/2024</a:t>
+              <a:t>3/11/2024</a:t>
             </a:fld>
             <a:endParaRPr lang="en-NZ"/>
           </a:p>
@@ -7753,7 +7767,7 @@
           <a:p>
             <a:fld id="{4224155E-B995-4A63-957A-09BAD2FBC677}" type="datetime1">
               <a:rPr lang="en-NZ" smtClean="0"/>
-              <a:t>28/10/2024</a:t>
+              <a:t>3/11/2024</a:t>
             </a:fld>
             <a:endParaRPr lang="en-NZ"/>
           </a:p>
@@ -8194,7 +8208,7 @@
           <a:p>
             <a:fld id="{94852875-0C79-4139-AC32-AABE6788AEEA}" type="datetime1">
               <a:rPr lang="en-NZ" smtClean="0"/>
-              <a:t>28/10/2024</a:t>
+              <a:t>3/11/2024</a:t>
             </a:fld>
             <a:endParaRPr lang="en-NZ"/>
           </a:p>
@@ -8311,7 +8325,7 @@
           <a:p>
             <a:fld id="{670F642C-953D-4942-A0BD-F75D51C3B3D0}" type="datetime1">
               <a:rPr lang="en-NZ" smtClean="0"/>
-              <a:t>28/10/2024</a:t>
+              <a:t>3/11/2024</a:t>
             </a:fld>
             <a:endParaRPr lang="en-NZ"/>
           </a:p>
@@ -8406,7 +8420,7 @@
           <a:p>
             <a:fld id="{F0942B63-0C58-44B7-A52C-10399CE2763E}" type="datetime1">
               <a:rPr lang="en-NZ" smtClean="0"/>
-              <a:t>28/10/2024</a:t>
+              <a:t>3/11/2024</a:t>
             </a:fld>
             <a:endParaRPr lang="en-NZ"/>
           </a:p>
@@ -8683,7 +8697,7 @@
           <a:p>
             <a:fld id="{0F087F2A-8ED5-40BC-A804-86A9632A31D7}" type="datetime1">
               <a:rPr lang="en-NZ" smtClean="0"/>
-              <a:t>28/10/2024</a:t>
+              <a:t>3/11/2024</a:t>
             </a:fld>
             <a:endParaRPr lang="en-NZ"/>
           </a:p>
@@ -8956,7 +8970,7 @@
           <a:p>
             <a:fld id="{5D2796AF-1BE4-4202-AFC4-0C711630C0B7}" type="datetime1">
               <a:rPr lang="en-NZ" smtClean="0"/>
-              <a:t>28/10/2024</a:t>
+              <a:t>3/11/2024</a:t>
             </a:fld>
             <a:endParaRPr lang="en-NZ"/>
           </a:p>
@@ -9383,7 +9397,7 @@
           <a:p>
             <a:fld id="{F4BE01E5-D6DC-4CBF-AB22-D83052A50459}" type="datetime1">
               <a:rPr lang="en-NZ" smtClean="0"/>
-              <a:t>28/10/2024</a:t>
+              <a:t>3/11/2024</a:t>
             </a:fld>
             <a:endParaRPr lang="en-NZ"/>
           </a:p>
@@ -15013,30 +15027,30 @@
           </a:p>
           <a:p>
             <a:r>
+              <a:rPr lang="en-NZ" dirty="0"/>
+              <a:t>Future for JIT compiler? </a:t>
+            </a:r>
+            <a:r>
+              <a:rPr lang="en-NZ"/>
+              <a:t>2 min(Thijs)</a:t>
+            </a:r>
+            <a:endParaRPr lang="en-NZ" dirty="0"/>
+          </a:p>
+          <a:p>
+            <a:r>
               <a:rPr lang="en-NZ" dirty="0" err="1"/>
               <a:t>Quizz</a:t>
             </a:r>
             <a:r>
               <a:rPr lang="en-NZ" dirty="0"/>
-              <a:t> 5 min(Jorge)</a:t>
+              <a:t> 5/Reflection min(Jorge)</a:t>
             </a:r>
           </a:p>
           <a:p>
             <a:r>
               <a:rPr lang="en-NZ" dirty="0"/>
-              <a:t>Future for JIT compiler? 2 min(Thijs)</a:t>
-            </a:r>
-          </a:p>
-          <a:p>
-            <a:r>
-              <a:rPr lang="en-NZ" dirty="0"/>
-              <a:t>Questions 5 min</a:t>
-            </a:r>
-            <a:r>
-              <a:rPr lang="en-NZ"/>
-              <a:t>(Thijs)</a:t>
-            </a:r>
-            <a:endParaRPr lang="en-NZ" dirty="0"/>
+              <a:t>Questions 5 min(Thijs)</a:t>
+            </a:r>
           </a:p>
         </p:txBody>
       </p:sp>
@@ -15509,6 +15523,164 @@
 </file>
 
 <file path=ppt/slides/slide5.xml><?xml version="1.0" encoding="utf-8"?>
+<p:sld xmlns:a="http://schemas.openxmlformats.org/drawingml/2006/main" xmlns:r="http://schemas.openxmlformats.org/officeDocument/2006/relationships" xmlns:p="http://schemas.openxmlformats.org/presentationml/2006/main">
+  <p:cSld>
+    <p:spTree>
+      <p:nvGrpSpPr>
+        <p:cNvPr id="1" name=""/>
+        <p:cNvGrpSpPr/>
+        <p:nvPr/>
+      </p:nvGrpSpPr>
+      <p:grpSpPr>
+        <a:xfrm>
+          <a:off x="0" y="0"/>
+          <a:ext cx="0" cy="0"/>
+          <a:chOff x="0" y="0"/>
+          <a:chExt cx="0" cy="0"/>
+        </a:xfrm>
+      </p:grpSpPr>
+      <p:sp>
+        <p:nvSpPr>
+          <p:cNvPr id="2" name="Title 1">
+            <a:extLst>
+              <a:ext uri="{FF2B5EF4-FFF2-40B4-BE49-F238E27FC236}">
+                <a16:creationId xmlns:a16="http://schemas.microsoft.com/office/drawing/2014/main" id="{0E3D4BE5-9B71-A8EB-F825-B02C792C5B66}"/>
+              </a:ext>
+            </a:extLst>
+          </p:cNvPr>
+          <p:cNvSpPr>
+            <a:spLocks noGrp="1"/>
+          </p:cNvSpPr>
+          <p:nvPr>
+            <p:ph type="title"/>
+          </p:nvPr>
+        </p:nvSpPr>
+        <p:spPr/>
+        <p:txBody>
+          <a:bodyPr/>
+          <a:lstStyle/>
+          <a:p>
+            <a:r>
+              <a:rPr lang="en-NZ"/>
+              <a:t>What is JIT compiler?</a:t>
+            </a:r>
+            <a:br>
+              <a:rPr lang="en-NZ"/>
+            </a:br>
+            <a:endParaRPr lang="en-NZ"/>
+          </a:p>
+        </p:txBody>
+      </p:sp>
+      <p:sp>
+        <p:nvSpPr>
+          <p:cNvPr id="3" name="Content Placeholder 2">
+            <a:extLst>
+              <a:ext uri="{FF2B5EF4-FFF2-40B4-BE49-F238E27FC236}">
+                <a16:creationId xmlns:a16="http://schemas.microsoft.com/office/drawing/2014/main" id="{E852FD16-92F0-9BEB-02E1-C40C9711ABB0}"/>
+              </a:ext>
+            </a:extLst>
+          </p:cNvPr>
+          <p:cNvSpPr>
+            <a:spLocks noGrp="1"/>
+          </p:cNvSpPr>
+          <p:nvPr>
+            <p:ph idx="1"/>
+          </p:nvPr>
+        </p:nvSpPr>
+        <p:spPr/>
+        <p:txBody>
+          <a:bodyPr/>
+          <a:lstStyle/>
+          <a:p>
+            <a:r>
+              <a:rPr lang="en-NZ" b="0" i="0" dirty="0">
+                <a:solidFill>
+                  <a:srgbClr val="CCCCCC"/>
+                </a:solidFill>
+                <a:effectLst/>
+                <a:latin typeface="-apple-system"/>
+              </a:rPr>
+              <a:t>John McCarthy in 1960.</a:t>
+            </a:r>
+          </a:p>
+          <a:p>
+            <a:r>
+              <a:rPr lang="en-NZ" b="0" i="0" dirty="0">
+                <a:solidFill>
+                  <a:srgbClr val="CCCCCC"/>
+                </a:solidFill>
+                <a:effectLst/>
+                <a:latin typeface="-apple-system"/>
+              </a:rPr>
+              <a:t>method for improving the performance of interpreted programs.</a:t>
+            </a:r>
+            <a:endParaRPr lang="en-NZ" dirty="0">
+              <a:solidFill>
+                <a:srgbClr val="CCCCCC"/>
+              </a:solidFill>
+              <a:latin typeface="-apple-system"/>
+            </a:endParaRPr>
+          </a:p>
+          <a:p>
+            <a:r>
+              <a:rPr lang="en-NZ" b="0" i="0" dirty="0">
+                <a:solidFill>
+                  <a:srgbClr val="CCCCCC"/>
+                </a:solidFill>
+                <a:effectLst/>
+                <a:latin typeface="-apple-system"/>
+              </a:rPr>
+              <a:t>dynamic compilation</a:t>
+            </a:r>
+          </a:p>
+          <a:p>
+            <a:endParaRPr lang="en-NZ" dirty="0"/>
+          </a:p>
+        </p:txBody>
+      </p:sp>
+      <p:sp>
+        <p:nvSpPr>
+          <p:cNvPr id="4" name="Slide Number Placeholder 3">
+            <a:extLst>
+              <a:ext uri="{FF2B5EF4-FFF2-40B4-BE49-F238E27FC236}">
+                <a16:creationId xmlns:a16="http://schemas.microsoft.com/office/drawing/2014/main" id="{D8D52B4C-6702-2465-EEDA-4E62AD0F7D8D}"/>
+              </a:ext>
+            </a:extLst>
+          </p:cNvPr>
+          <p:cNvSpPr>
+            <a:spLocks noGrp="1"/>
+          </p:cNvSpPr>
+          <p:nvPr>
+            <p:ph type="sldNum" sz="quarter" idx="12"/>
+          </p:nvPr>
+        </p:nvSpPr>
+        <p:spPr/>
+        <p:txBody>
+          <a:bodyPr/>
+          <a:lstStyle/>
+          <a:p>
+            <a:fld id="{7E50A921-1625-4E66-8B53-913CC32CAF35}" type="slidenum">
+              <a:rPr lang="en-NZ" smtClean="0"/>
+              <a:t>5</a:t>
+            </a:fld>
+            <a:endParaRPr lang="en-NZ"/>
+          </a:p>
+        </p:txBody>
+      </p:sp>
+    </p:spTree>
+    <p:extLst>
+      <p:ext uri="{BB962C8B-B14F-4D97-AF65-F5344CB8AC3E}">
+        <p14:creationId xmlns:p14="http://schemas.microsoft.com/office/powerpoint/2010/main" val="2644708043"/>
+      </p:ext>
+    </p:extLst>
+  </p:cSld>
+  <p:clrMapOvr>
+    <a:masterClrMapping/>
+  </p:clrMapOvr>
+</p:sld>
+</file>
+
+<file path=ppt/slides/slide6.xml><?xml version="1.0" encoding="utf-8"?>
 <p:sld xmlns:a="http://schemas.openxmlformats.org/drawingml/2006/main" xmlns:r="http://schemas.openxmlformats.org/officeDocument/2006/relationships" xmlns:p="http://schemas.openxmlformats.org/presentationml/2006/main">
   <p:cSld>
     <p:bg>
@@ -16053,7 +16225,7 @@
                   <a:spcPts val="600"/>
                 </a:spcAft>
               </a:pPr>
-              <a:t>5</a:t>
+              <a:t>6</a:t>
             </a:fld>
             <a:endParaRPr lang="en-US">
               <a:solidFill>
@@ -16978,7 +17150,321 @@
 </p:sld>
 </file>
 
-<file path=ppt/slides/slide6.xml><?xml version="1.0" encoding="utf-8"?>
+<file path=ppt/slides/slide7.xml><?xml version="1.0" encoding="utf-8"?>
+<p:sld xmlns:a="http://schemas.openxmlformats.org/drawingml/2006/main" xmlns:r="http://schemas.openxmlformats.org/officeDocument/2006/relationships" xmlns:p="http://schemas.openxmlformats.org/presentationml/2006/main">
+  <p:cSld>
+    <p:spTree>
+      <p:nvGrpSpPr>
+        <p:cNvPr id="1" name=""/>
+        <p:cNvGrpSpPr/>
+        <p:nvPr/>
+      </p:nvGrpSpPr>
+      <p:grpSpPr>
+        <a:xfrm>
+          <a:off x="0" y="0"/>
+          <a:ext cx="0" cy="0"/>
+          <a:chOff x="0" y="0"/>
+          <a:chExt cx="0" cy="0"/>
+        </a:xfrm>
+      </p:grpSpPr>
+      <p:sp>
+        <p:nvSpPr>
+          <p:cNvPr id="2" name="Title 1">
+            <a:extLst>
+              <a:ext uri="{FF2B5EF4-FFF2-40B4-BE49-F238E27FC236}">
+                <a16:creationId xmlns:a16="http://schemas.microsoft.com/office/drawing/2014/main" id="{2C5B0782-7159-8F98-2E27-954D7DE52950}"/>
+              </a:ext>
+            </a:extLst>
+          </p:cNvPr>
+          <p:cNvSpPr>
+            <a:spLocks noGrp="1"/>
+          </p:cNvSpPr>
+          <p:nvPr>
+            <p:ph type="title"/>
+          </p:nvPr>
+        </p:nvSpPr>
+        <p:spPr/>
+        <p:txBody>
+          <a:bodyPr/>
+          <a:lstStyle/>
+          <a:p>
+            <a:r>
+              <a:rPr lang="en-NZ" dirty="0"/>
+              <a:t>What are the pros and cons of using </a:t>
+            </a:r>
+            <a:r>
+              <a:rPr lang="en-NZ" dirty="0" err="1"/>
+              <a:t>jit</a:t>
+            </a:r>
+            <a:r>
+              <a:rPr lang="en-NZ" dirty="0"/>
+              <a:t> compiler?</a:t>
+            </a:r>
+            <a:br>
+              <a:rPr lang="en-NZ" dirty="0"/>
+            </a:br>
+            <a:endParaRPr lang="en-NZ" dirty="0"/>
+          </a:p>
+        </p:txBody>
+      </p:sp>
+      <p:pic>
+        <p:nvPicPr>
+          <p:cNvPr id="6" name="Content Placeholder 5">
+            <a:extLst>
+              <a:ext uri="{FF2B5EF4-FFF2-40B4-BE49-F238E27FC236}">
+                <a16:creationId xmlns:a16="http://schemas.microsoft.com/office/drawing/2014/main" id="{9198E327-5F69-98F7-42A8-D56940396A9B}"/>
+              </a:ext>
+            </a:extLst>
+          </p:cNvPr>
+          <p:cNvPicPr>
+            <a:picLocks noGrp="1" noChangeAspect="1"/>
+          </p:cNvPicPr>
+          <p:nvPr>
+            <p:ph idx="1"/>
+          </p:nvPr>
+        </p:nvPicPr>
+        <p:blipFill>
+          <a:blip r:embed="rId2"/>
+          <a:stretch>
+            <a:fillRect/>
+          </a:stretch>
+        </p:blipFill>
+        <p:spPr>
+          <a:xfrm>
+            <a:off x="1257956" y="2169039"/>
+            <a:ext cx="6439797" cy="3924251"/>
+          </a:xfrm>
+        </p:spPr>
+      </p:pic>
+      <p:sp>
+        <p:nvSpPr>
+          <p:cNvPr id="4" name="Slide Number Placeholder 3">
+            <a:extLst>
+              <a:ext uri="{FF2B5EF4-FFF2-40B4-BE49-F238E27FC236}">
+                <a16:creationId xmlns:a16="http://schemas.microsoft.com/office/drawing/2014/main" id="{4B759760-66FA-71E0-4642-931E9CE7B77B}"/>
+              </a:ext>
+            </a:extLst>
+          </p:cNvPr>
+          <p:cNvSpPr>
+            <a:spLocks noGrp="1"/>
+          </p:cNvSpPr>
+          <p:nvPr>
+            <p:ph type="sldNum" sz="quarter" idx="12"/>
+          </p:nvPr>
+        </p:nvSpPr>
+        <p:spPr/>
+        <p:txBody>
+          <a:bodyPr/>
+          <a:lstStyle/>
+          <a:p>
+            <a:fld id="{7E50A921-1625-4E66-8B53-913CC32CAF35}" type="slidenum">
+              <a:rPr lang="en-NZ" smtClean="0"/>
+              <a:t>7</a:t>
+            </a:fld>
+            <a:endParaRPr lang="en-NZ"/>
+          </a:p>
+        </p:txBody>
+      </p:sp>
+    </p:spTree>
+    <p:extLst>
+      <p:ext uri="{BB962C8B-B14F-4D97-AF65-F5344CB8AC3E}">
+        <p14:creationId xmlns:p14="http://schemas.microsoft.com/office/powerpoint/2010/main" val="1517301832"/>
+      </p:ext>
+    </p:extLst>
+  </p:cSld>
+  <p:clrMapOvr>
+    <a:masterClrMapping/>
+  </p:clrMapOvr>
+</p:sld>
+</file>
+
+<file path=ppt/slides/slide8.xml><?xml version="1.0" encoding="utf-8"?>
+<p:sld xmlns:a="http://schemas.openxmlformats.org/drawingml/2006/main" xmlns:r="http://schemas.openxmlformats.org/officeDocument/2006/relationships" xmlns:p="http://schemas.openxmlformats.org/presentationml/2006/main">
+  <p:cSld>
+    <p:spTree>
+      <p:nvGrpSpPr>
+        <p:cNvPr id="1" name=""/>
+        <p:cNvGrpSpPr/>
+        <p:nvPr/>
+      </p:nvGrpSpPr>
+      <p:grpSpPr>
+        <a:xfrm>
+          <a:off x="0" y="0"/>
+          <a:ext cx="0" cy="0"/>
+          <a:chOff x="0" y="0"/>
+          <a:chExt cx="0" cy="0"/>
+        </a:xfrm>
+      </p:grpSpPr>
+      <p:sp>
+        <p:nvSpPr>
+          <p:cNvPr id="2" name="Title 1">
+            <a:extLst>
+              <a:ext uri="{FF2B5EF4-FFF2-40B4-BE49-F238E27FC236}">
+                <a16:creationId xmlns:a16="http://schemas.microsoft.com/office/drawing/2014/main" id="{7199E9BE-75A2-88F8-8363-E9DE542D6337}"/>
+              </a:ext>
+            </a:extLst>
+          </p:cNvPr>
+          <p:cNvSpPr>
+            <a:spLocks noGrp="1"/>
+          </p:cNvSpPr>
+          <p:nvPr>
+            <p:ph type="title"/>
+          </p:nvPr>
+        </p:nvSpPr>
+        <p:spPr/>
+        <p:txBody>
+          <a:bodyPr/>
+          <a:lstStyle/>
+          <a:p>
+            <a:r>
+              <a:rPr lang="nl-NL" dirty="0"/>
+              <a:t>Warming-up JIT Compiler</a:t>
+            </a:r>
+            <a:endParaRPr lang="en-NZ" dirty="0"/>
+          </a:p>
+        </p:txBody>
+      </p:sp>
+      <p:pic>
+        <p:nvPicPr>
+          <p:cNvPr id="6" name="Content Placeholder 5">
+            <a:extLst>
+              <a:ext uri="{FF2B5EF4-FFF2-40B4-BE49-F238E27FC236}">
+                <a16:creationId xmlns:a16="http://schemas.microsoft.com/office/drawing/2014/main" id="{75FF1D53-F5DE-55E9-A8D0-D7DB6070161C}"/>
+              </a:ext>
+            </a:extLst>
+          </p:cNvPr>
+          <p:cNvPicPr>
+            <a:picLocks noGrp="1" noChangeAspect="1"/>
+          </p:cNvPicPr>
+          <p:nvPr>
+            <p:ph idx="1"/>
+          </p:nvPr>
+        </p:nvPicPr>
+        <p:blipFill>
+          <a:blip r:embed="rId2"/>
+          <a:stretch>
+            <a:fillRect/>
+          </a:stretch>
+        </p:blipFill>
+        <p:spPr>
+          <a:xfrm>
+            <a:off x="3940718" y="1776266"/>
+            <a:ext cx="7921598" cy="4195762"/>
+          </a:xfrm>
+        </p:spPr>
+      </p:pic>
+      <p:sp>
+        <p:nvSpPr>
+          <p:cNvPr id="4" name="Slide Number Placeholder 3">
+            <a:extLst>
+              <a:ext uri="{FF2B5EF4-FFF2-40B4-BE49-F238E27FC236}">
+                <a16:creationId xmlns:a16="http://schemas.microsoft.com/office/drawing/2014/main" id="{1EFE48DA-6124-56D2-CB04-6BDF7D2E7185}"/>
+              </a:ext>
+            </a:extLst>
+          </p:cNvPr>
+          <p:cNvSpPr>
+            <a:spLocks noGrp="1"/>
+          </p:cNvSpPr>
+          <p:nvPr>
+            <p:ph type="sldNum" sz="quarter" idx="12"/>
+          </p:nvPr>
+        </p:nvSpPr>
+        <p:spPr/>
+        <p:txBody>
+          <a:bodyPr/>
+          <a:lstStyle/>
+          <a:p>
+            <a:fld id="{7E50A921-1625-4E66-8B53-913CC32CAF35}" type="slidenum">
+              <a:rPr lang="en-NZ" smtClean="0"/>
+              <a:t>8</a:t>
+            </a:fld>
+            <a:endParaRPr lang="en-NZ" dirty="0"/>
+          </a:p>
+        </p:txBody>
+      </p:sp>
+      <p:sp>
+        <p:nvSpPr>
+          <p:cNvPr id="7" name="TextBox 6">
+            <a:extLst>
+              <a:ext uri="{FF2B5EF4-FFF2-40B4-BE49-F238E27FC236}">
+                <a16:creationId xmlns:a16="http://schemas.microsoft.com/office/drawing/2014/main" id="{035B0EC6-F59D-2596-0EEB-C17029CD9AC8}"/>
+              </a:ext>
+            </a:extLst>
+          </p:cNvPr>
+          <p:cNvSpPr txBox="1"/>
+          <p:nvPr/>
+        </p:nvSpPr>
+        <p:spPr>
+          <a:xfrm>
+            <a:off x="795528" y="2011680"/>
+            <a:ext cx="2697480" cy="923330"/>
+          </a:xfrm>
+          <a:prstGeom prst="rect">
+            <a:avLst/>
+          </a:prstGeom>
+          <a:noFill/>
+        </p:spPr>
+        <p:txBody>
+          <a:bodyPr wrap="square" rtlCol="0">
+            <a:spAutoFit/>
+          </a:bodyPr>
+          <a:lstStyle/>
+          <a:p>
+            <a:pPr marL="285750" indent="-285750">
+              <a:buFont typeface="Arial" panose="020B0604020202020204" pitchFamily="34" charset="0"/>
+              <a:buChar char="•"/>
+            </a:pPr>
+            <a:r>
+              <a:rPr lang="nl-NL" dirty="0" err="1"/>
+              <a:t>Initial</a:t>
+            </a:r>
+            <a:r>
+              <a:rPr lang="nl-NL" dirty="0"/>
+              <a:t> delay</a:t>
+            </a:r>
+          </a:p>
+          <a:p>
+            <a:pPr marL="285750" indent="-285750">
+              <a:buFont typeface="Arial" panose="020B0604020202020204" pitchFamily="34" charset="0"/>
+              <a:buChar char="•"/>
+            </a:pPr>
+            <a:r>
+              <a:rPr lang="nl-NL" dirty="0"/>
+              <a:t>More CPU </a:t>
+            </a:r>
+            <a:r>
+              <a:rPr lang="nl-NL" dirty="0" err="1"/>
+              <a:t>usage</a:t>
+            </a:r>
+            <a:endParaRPr lang="nl-NL" dirty="0"/>
+          </a:p>
+          <a:p>
+            <a:pPr marL="285750" indent="-285750">
+              <a:buFont typeface="Arial" panose="020B0604020202020204" pitchFamily="34" charset="0"/>
+              <a:buChar char="•"/>
+            </a:pPr>
+            <a:r>
+              <a:rPr lang="nl-NL" dirty="0"/>
+              <a:t>Memory overhead</a:t>
+            </a:r>
+            <a:endParaRPr lang="en-NZ" dirty="0"/>
+          </a:p>
+        </p:txBody>
+      </p:sp>
+    </p:spTree>
+    <p:extLst>
+      <p:ext uri="{BB962C8B-B14F-4D97-AF65-F5344CB8AC3E}">
+        <p14:creationId xmlns:p14="http://schemas.microsoft.com/office/powerpoint/2010/main" val="3320594642"/>
+      </p:ext>
+    </p:extLst>
+  </p:cSld>
+  <p:clrMapOvr>
+    <a:masterClrMapping/>
+  </p:clrMapOvr>
+</p:sld>
+</file>
+
+<file path=ppt/slides/slide9.xml><?xml version="1.0" encoding="utf-8"?>
 <p:sld xmlns:a="http://schemas.openxmlformats.org/drawingml/2006/main" xmlns:r="http://schemas.openxmlformats.org/officeDocument/2006/relationships" xmlns:p="http://schemas.openxmlformats.org/presentationml/2006/main">
   <p:cSld>
     <p:bg>
@@ -18072,7 +18558,7 @@
                   <a:spcPts val="600"/>
                 </a:spcAft>
               </a:pPr>
-              <a:t>6</a:t>
+              <a:t>9</a:t>
             </a:fld>
             <a:endParaRPr lang="en-NZ">
               <a:solidFill>
@@ -18154,478 +18640,6 @@
   </p:cSld>
   <p:clrMapOvr>
     <a:overrideClrMapping bg1="lt1" tx1="dk1" bg2="lt2" tx2="dk2" accent1="accent1" accent2="accent2" accent3="accent3" accent4="accent4" accent5="accent5" accent6="accent6" hlink="hlink" folHlink="folHlink"/>
-  </p:clrMapOvr>
-</p:sld>
-</file>
-
-<file path=ppt/slides/slide7.xml><?xml version="1.0" encoding="utf-8"?>
-<p:sld xmlns:a="http://schemas.openxmlformats.org/drawingml/2006/main" xmlns:r="http://schemas.openxmlformats.org/officeDocument/2006/relationships" xmlns:p="http://schemas.openxmlformats.org/presentationml/2006/main">
-  <p:cSld>
-    <p:spTree>
-      <p:nvGrpSpPr>
-        <p:cNvPr id="1" name=""/>
-        <p:cNvGrpSpPr/>
-        <p:nvPr/>
-      </p:nvGrpSpPr>
-      <p:grpSpPr>
-        <a:xfrm>
-          <a:off x="0" y="0"/>
-          <a:ext cx="0" cy="0"/>
-          <a:chOff x="0" y="0"/>
-          <a:chExt cx="0" cy="0"/>
-        </a:xfrm>
-      </p:grpSpPr>
-      <p:sp>
-        <p:nvSpPr>
-          <p:cNvPr id="2" name="Title 1">
-            <a:extLst>
-              <a:ext uri="{FF2B5EF4-FFF2-40B4-BE49-F238E27FC236}">
-                <a16:creationId xmlns:a16="http://schemas.microsoft.com/office/drawing/2014/main" id="{0E3D4BE5-9B71-A8EB-F825-B02C792C5B66}"/>
-              </a:ext>
-            </a:extLst>
-          </p:cNvPr>
-          <p:cNvSpPr>
-            <a:spLocks noGrp="1"/>
-          </p:cNvSpPr>
-          <p:nvPr>
-            <p:ph type="title"/>
-          </p:nvPr>
-        </p:nvSpPr>
-        <p:spPr/>
-        <p:txBody>
-          <a:bodyPr/>
-          <a:lstStyle/>
-          <a:p>
-            <a:r>
-              <a:rPr lang="en-NZ"/>
-              <a:t>What is JIT compiler?</a:t>
-            </a:r>
-            <a:br>
-              <a:rPr lang="en-NZ"/>
-            </a:br>
-            <a:endParaRPr lang="en-NZ"/>
-          </a:p>
-        </p:txBody>
-      </p:sp>
-      <p:sp>
-        <p:nvSpPr>
-          <p:cNvPr id="3" name="Content Placeholder 2">
-            <a:extLst>
-              <a:ext uri="{FF2B5EF4-FFF2-40B4-BE49-F238E27FC236}">
-                <a16:creationId xmlns:a16="http://schemas.microsoft.com/office/drawing/2014/main" id="{E852FD16-92F0-9BEB-02E1-C40C9711ABB0}"/>
-              </a:ext>
-            </a:extLst>
-          </p:cNvPr>
-          <p:cNvSpPr>
-            <a:spLocks noGrp="1"/>
-          </p:cNvSpPr>
-          <p:nvPr>
-            <p:ph idx="1"/>
-          </p:nvPr>
-        </p:nvSpPr>
-        <p:spPr/>
-        <p:txBody>
-          <a:bodyPr/>
-          <a:lstStyle/>
-          <a:p>
-            <a:r>
-              <a:rPr lang="en-NZ" b="0" i="0" dirty="0">
-                <a:solidFill>
-                  <a:srgbClr val="CCCCCC"/>
-                </a:solidFill>
-                <a:effectLst/>
-                <a:latin typeface="-apple-system"/>
-              </a:rPr>
-              <a:t>John McCarthy in 1960.</a:t>
-            </a:r>
-          </a:p>
-          <a:p>
-            <a:r>
-              <a:rPr lang="en-NZ" b="0" i="0" dirty="0">
-                <a:solidFill>
-                  <a:srgbClr val="CCCCCC"/>
-                </a:solidFill>
-                <a:effectLst/>
-                <a:latin typeface="-apple-system"/>
-              </a:rPr>
-              <a:t>method for improving the performance of interpreted programs.</a:t>
-            </a:r>
-            <a:endParaRPr lang="en-NZ" dirty="0">
-              <a:solidFill>
-                <a:srgbClr val="CCCCCC"/>
-              </a:solidFill>
-              <a:latin typeface="-apple-system"/>
-            </a:endParaRPr>
-          </a:p>
-          <a:p>
-            <a:r>
-              <a:rPr lang="en-NZ" b="0" i="0" dirty="0">
-                <a:solidFill>
-                  <a:srgbClr val="CCCCCC"/>
-                </a:solidFill>
-                <a:effectLst/>
-                <a:latin typeface="-apple-system"/>
-              </a:rPr>
-              <a:t>dynamic compilation</a:t>
-            </a:r>
-          </a:p>
-          <a:p>
-            <a:endParaRPr lang="en-NZ" dirty="0"/>
-          </a:p>
-        </p:txBody>
-      </p:sp>
-      <p:sp>
-        <p:nvSpPr>
-          <p:cNvPr id="4" name="Slide Number Placeholder 3">
-            <a:extLst>
-              <a:ext uri="{FF2B5EF4-FFF2-40B4-BE49-F238E27FC236}">
-                <a16:creationId xmlns:a16="http://schemas.microsoft.com/office/drawing/2014/main" id="{D8D52B4C-6702-2465-EEDA-4E62AD0F7D8D}"/>
-              </a:ext>
-            </a:extLst>
-          </p:cNvPr>
-          <p:cNvSpPr>
-            <a:spLocks noGrp="1"/>
-          </p:cNvSpPr>
-          <p:nvPr>
-            <p:ph type="sldNum" sz="quarter" idx="12"/>
-          </p:nvPr>
-        </p:nvSpPr>
-        <p:spPr/>
-        <p:txBody>
-          <a:bodyPr/>
-          <a:lstStyle/>
-          <a:p>
-            <a:fld id="{7E50A921-1625-4E66-8B53-913CC32CAF35}" type="slidenum">
-              <a:rPr lang="en-NZ" smtClean="0"/>
-              <a:t>7</a:t>
-            </a:fld>
-            <a:endParaRPr lang="en-NZ"/>
-          </a:p>
-        </p:txBody>
-      </p:sp>
-    </p:spTree>
-    <p:extLst>
-      <p:ext uri="{BB962C8B-B14F-4D97-AF65-F5344CB8AC3E}">
-        <p14:creationId xmlns:p14="http://schemas.microsoft.com/office/powerpoint/2010/main" val="2644708043"/>
-      </p:ext>
-    </p:extLst>
-  </p:cSld>
-  <p:clrMapOvr>
-    <a:masterClrMapping/>
-  </p:clrMapOvr>
-</p:sld>
-</file>
-
-<file path=ppt/slides/slide8.xml><?xml version="1.0" encoding="utf-8"?>
-<p:sld xmlns:a="http://schemas.openxmlformats.org/drawingml/2006/main" xmlns:r="http://schemas.openxmlformats.org/officeDocument/2006/relationships" xmlns:p="http://schemas.openxmlformats.org/presentationml/2006/main">
-  <p:cSld>
-    <p:spTree>
-      <p:nvGrpSpPr>
-        <p:cNvPr id="1" name=""/>
-        <p:cNvGrpSpPr/>
-        <p:nvPr/>
-      </p:nvGrpSpPr>
-      <p:grpSpPr>
-        <a:xfrm>
-          <a:off x="0" y="0"/>
-          <a:ext cx="0" cy="0"/>
-          <a:chOff x="0" y="0"/>
-          <a:chExt cx="0" cy="0"/>
-        </a:xfrm>
-      </p:grpSpPr>
-      <p:sp>
-        <p:nvSpPr>
-          <p:cNvPr id="2" name="Title 1">
-            <a:extLst>
-              <a:ext uri="{FF2B5EF4-FFF2-40B4-BE49-F238E27FC236}">
-                <a16:creationId xmlns:a16="http://schemas.microsoft.com/office/drawing/2014/main" id="{2C5B0782-7159-8F98-2E27-954D7DE52950}"/>
-              </a:ext>
-            </a:extLst>
-          </p:cNvPr>
-          <p:cNvSpPr>
-            <a:spLocks noGrp="1"/>
-          </p:cNvSpPr>
-          <p:nvPr>
-            <p:ph type="title"/>
-          </p:nvPr>
-        </p:nvSpPr>
-        <p:spPr/>
-        <p:txBody>
-          <a:bodyPr/>
-          <a:lstStyle/>
-          <a:p>
-            <a:r>
-              <a:rPr lang="en-NZ" dirty="0"/>
-              <a:t>What are the pros and cons of using </a:t>
-            </a:r>
-            <a:r>
-              <a:rPr lang="en-NZ" dirty="0" err="1"/>
-              <a:t>jit</a:t>
-            </a:r>
-            <a:r>
-              <a:rPr lang="en-NZ" dirty="0"/>
-              <a:t> compiler?</a:t>
-            </a:r>
-            <a:br>
-              <a:rPr lang="en-NZ" dirty="0"/>
-            </a:br>
-            <a:endParaRPr lang="en-NZ" dirty="0"/>
-          </a:p>
-        </p:txBody>
-      </p:sp>
-      <p:pic>
-        <p:nvPicPr>
-          <p:cNvPr id="6" name="Content Placeholder 5">
-            <a:extLst>
-              <a:ext uri="{FF2B5EF4-FFF2-40B4-BE49-F238E27FC236}">
-                <a16:creationId xmlns:a16="http://schemas.microsoft.com/office/drawing/2014/main" id="{9198E327-5F69-98F7-42A8-D56940396A9B}"/>
-              </a:ext>
-            </a:extLst>
-          </p:cNvPr>
-          <p:cNvPicPr>
-            <a:picLocks noGrp="1" noChangeAspect="1"/>
-          </p:cNvPicPr>
-          <p:nvPr>
-            <p:ph idx="1"/>
-          </p:nvPr>
-        </p:nvPicPr>
-        <p:blipFill>
-          <a:blip r:embed="rId2"/>
-          <a:stretch>
-            <a:fillRect/>
-          </a:stretch>
-        </p:blipFill>
-        <p:spPr>
-          <a:xfrm>
-            <a:off x="1257956" y="2169039"/>
-            <a:ext cx="6439797" cy="3924251"/>
-          </a:xfrm>
-        </p:spPr>
-      </p:pic>
-      <p:sp>
-        <p:nvSpPr>
-          <p:cNvPr id="4" name="Slide Number Placeholder 3">
-            <a:extLst>
-              <a:ext uri="{FF2B5EF4-FFF2-40B4-BE49-F238E27FC236}">
-                <a16:creationId xmlns:a16="http://schemas.microsoft.com/office/drawing/2014/main" id="{4B759760-66FA-71E0-4642-931E9CE7B77B}"/>
-              </a:ext>
-            </a:extLst>
-          </p:cNvPr>
-          <p:cNvSpPr>
-            <a:spLocks noGrp="1"/>
-          </p:cNvSpPr>
-          <p:nvPr>
-            <p:ph type="sldNum" sz="quarter" idx="12"/>
-          </p:nvPr>
-        </p:nvSpPr>
-        <p:spPr/>
-        <p:txBody>
-          <a:bodyPr/>
-          <a:lstStyle/>
-          <a:p>
-            <a:fld id="{7E50A921-1625-4E66-8B53-913CC32CAF35}" type="slidenum">
-              <a:rPr lang="en-NZ" smtClean="0"/>
-              <a:t>8</a:t>
-            </a:fld>
-            <a:endParaRPr lang="en-NZ"/>
-          </a:p>
-        </p:txBody>
-      </p:sp>
-    </p:spTree>
-    <p:extLst>
-      <p:ext uri="{BB962C8B-B14F-4D97-AF65-F5344CB8AC3E}">
-        <p14:creationId xmlns:p14="http://schemas.microsoft.com/office/powerpoint/2010/main" val="1517301832"/>
-      </p:ext>
-    </p:extLst>
-  </p:cSld>
-  <p:clrMapOvr>
-    <a:masterClrMapping/>
-  </p:clrMapOvr>
-</p:sld>
-</file>
-
-<file path=ppt/slides/slide9.xml><?xml version="1.0" encoding="utf-8"?>
-<p:sld xmlns:a="http://schemas.openxmlformats.org/drawingml/2006/main" xmlns:r="http://schemas.openxmlformats.org/officeDocument/2006/relationships" xmlns:p="http://schemas.openxmlformats.org/presentationml/2006/main">
-  <p:cSld>
-    <p:spTree>
-      <p:nvGrpSpPr>
-        <p:cNvPr id="1" name=""/>
-        <p:cNvGrpSpPr/>
-        <p:nvPr/>
-      </p:nvGrpSpPr>
-      <p:grpSpPr>
-        <a:xfrm>
-          <a:off x="0" y="0"/>
-          <a:ext cx="0" cy="0"/>
-          <a:chOff x="0" y="0"/>
-          <a:chExt cx="0" cy="0"/>
-        </a:xfrm>
-      </p:grpSpPr>
-      <p:sp>
-        <p:nvSpPr>
-          <p:cNvPr id="2" name="Title 1">
-            <a:extLst>
-              <a:ext uri="{FF2B5EF4-FFF2-40B4-BE49-F238E27FC236}">
-                <a16:creationId xmlns:a16="http://schemas.microsoft.com/office/drawing/2014/main" id="{7199E9BE-75A2-88F8-8363-E9DE542D6337}"/>
-              </a:ext>
-            </a:extLst>
-          </p:cNvPr>
-          <p:cNvSpPr>
-            <a:spLocks noGrp="1"/>
-          </p:cNvSpPr>
-          <p:nvPr>
-            <p:ph type="title"/>
-          </p:nvPr>
-        </p:nvSpPr>
-        <p:spPr/>
-        <p:txBody>
-          <a:bodyPr/>
-          <a:lstStyle/>
-          <a:p>
-            <a:r>
-              <a:rPr lang="nl-NL" dirty="0"/>
-              <a:t>Warming-up JIT Compiler</a:t>
-            </a:r>
-            <a:endParaRPr lang="en-NZ" dirty="0"/>
-          </a:p>
-        </p:txBody>
-      </p:sp>
-      <p:pic>
-        <p:nvPicPr>
-          <p:cNvPr id="6" name="Content Placeholder 5">
-            <a:extLst>
-              <a:ext uri="{FF2B5EF4-FFF2-40B4-BE49-F238E27FC236}">
-                <a16:creationId xmlns:a16="http://schemas.microsoft.com/office/drawing/2014/main" id="{75FF1D53-F5DE-55E9-A8D0-D7DB6070161C}"/>
-              </a:ext>
-            </a:extLst>
-          </p:cNvPr>
-          <p:cNvPicPr>
-            <a:picLocks noGrp="1" noChangeAspect="1"/>
-          </p:cNvPicPr>
-          <p:nvPr>
-            <p:ph idx="1"/>
-          </p:nvPr>
-        </p:nvPicPr>
-        <p:blipFill>
-          <a:blip r:embed="rId2"/>
-          <a:stretch>
-            <a:fillRect/>
-          </a:stretch>
-        </p:blipFill>
-        <p:spPr>
-          <a:xfrm>
-            <a:off x="3940718" y="1776266"/>
-            <a:ext cx="7921598" cy="4195762"/>
-          </a:xfrm>
-        </p:spPr>
-      </p:pic>
-      <p:sp>
-        <p:nvSpPr>
-          <p:cNvPr id="4" name="Slide Number Placeholder 3">
-            <a:extLst>
-              <a:ext uri="{FF2B5EF4-FFF2-40B4-BE49-F238E27FC236}">
-                <a16:creationId xmlns:a16="http://schemas.microsoft.com/office/drawing/2014/main" id="{1EFE48DA-6124-56D2-CB04-6BDF7D2E7185}"/>
-              </a:ext>
-            </a:extLst>
-          </p:cNvPr>
-          <p:cNvSpPr>
-            <a:spLocks noGrp="1"/>
-          </p:cNvSpPr>
-          <p:nvPr>
-            <p:ph type="sldNum" sz="quarter" idx="12"/>
-          </p:nvPr>
-        </p:nvSpPr>
-        <p:spPr/>
-        <p:txBody>
-          <a:bodyPr/>
-          <a:lstStyle/>
-          <a:p>
-            <a:fld id="{7E50A921-1625-4E66-8B53-913CC32CAF35}" type="slidenum">
-              <a:rPr lang="en-NZ" smtClean="0"/>
-              <a:t>9</a:t>
-            </a:fld>
-            <a:endParaRPr lang="en-NZ" dirty="0"/>
-          </a:p>
-        </p:txBody>
-      </p:sp>
-      <p:sp>
-        <p:nvSpPr>
-          <p:cNvPr id="7" name="TextBox 6">
-            <a:extLst>
-              <a:ext uri="{FF2B5EF4-FFF2-40B4-BE49-F238E27FC236}">
-                <a16:creationId xmlns:a16="http://schemas.microsoft.com/office/drawing/2014/main" id="{035B0EC6-F59D-2596-0EEB-C17029CD9AC8}"/>
-              </a:ext>
-            </a:extLst>
-          </p:cNvPr>
-          <p:cNvSpPr txBox="1"/>
-          <p:nvPr/>
-        </p:nvSpPr>
-        <p:spPr>
-          <a:xfrm>
-            <a:off x="795528" y="2011680"/>
-            <a:ext cx="2697480" cy="923330"/>
-          </a:xfrm>
-          <a:prstGeom prst="rect">
-            <a:avLst/>
-          </a:prstGeom>
-          <a:noFill/>
-        </p:spPr>
-        <p:txBody>
-          <a:bodyPr wrap="square" rtlCol="0">
-            <a:spAutoFit/>
-          </a:bodyPr>
-          <a:lstStyle/>
-          <a:p>
-            <a:pPr marL="285750" indent="-285750">
-              <a:buFont typeface="Arial" panose="020B0604020202020204" pitchFamily="34" charset="0"/>
-              <a:buChar char="•"/>
-            </a:pPr>
-            <a:r>
-              <a:rPr lang="nl-NL" dirty="0" err="1"/>
-              <a:t>Initial</a:t>
-            </a:r>
-            <a:r>
-              <a:rPr lang="nl-NL" dirty="0"/>
-              <a:t> delay</a:t>
-            </a:r>
-          </a:p>
-          <a:p>
-            <a:pPr marL="285750" indent="-285750">
-              <a:buFont typeface="Arial" panose="020B0604020202020204" pitchFamily="34" charset="0"/>
-              <a:buChar char="•"/>
-            </a:pPr>
-            <a:r>
-              <a:rPr lang="nl-NL" dirty="0"/>
-              <a:t>More CPU </a:t>
-            </a:r>
-            <a:r>
-              <a:rPr lang="nl-NL" dirty="0" err="1"/>
-              <a:t>usage</a:t>
-            </a:r>
-            <a:endParaRPr lang="nl-NL" dirty="0"/>
-          </a:p>
-          <a:p>
-            <a:pPr marL="285750" indent="-285750">
-              <a:buFont typeface="Arial" panose="020B0604020202020204" pitchFamily="34" charset="0"/>
-              <a:buChar char="•"/>
-            </a:pPr>
-            <a:r>
-              <a:rPr lang="nl-NL" dirty="0"/>
-              <a:t>Memory overhead</a:t>
-            </a:r>
-            <a:endParaRPr lang="en-NZ" dirty="0"/>
-          </a:p>
-        </p:txBody>
-      </p:sp>
-    </p:spTree>
-    <p:extLst>
-      <p:ext uri="{BB962C8B-B14F-4D97-AF65-F5344CB8AC3E}">
-        <p14:creationId xmlns:p14="http://schemas.microsoft.com/office/powerpoint/2010/main" val="3320594642"/>
-      </p:ext>
-    </p:extLst>
-  </p:cSld>
-  <p:clrMapOvr>
-    <a:masterClrMapping/>
   </p:clrMapOvr>
 </p:sld>
 </file>

</xml_diff>

<commit_message>
added QR in exercises sheet
</commit_message>
<xml_diff>
--- a/documents/presentation/presentation jit compiler.pptx
+++ b/documents/presentation/presentation jit compiler.pptx
@@ -5,7 +5,7 @@
     <p:sldMasterId id="2147483660" r:id="rId1"/>
   </p:sldMasterIdLst>
   <p:notesMasterIdLst>
-    <p:notesMasterId r:id="rId18"/>
+    <p:notesMasterId r:id="rId19"/>
   </p:notesMasterIdLst>
   <p:sldIdLst>
     <p:sldId id="256" r:id="rId2"/>
@@ -13,17 +13,18 @@
     <p:sldId id="258" r:id="rId4"/>
     <p:sldId id="273" r:id="rId5"/>
     <p:sldId id="259" r:id="rId6"/>
-    <p:sldId id="260" r:id="rId7"/>
-    <p:sldId id="261" r:id="rId8"/>
-    <p:sldId id="272" r:id="rId9"/>
-    <p:sldId id="262" r:id="rId10"/>
-    <p:sldId id="275" r:id="rId11"/>
-    <p:sldId id="266" r:id="rId12"/>
-    <p:sldId id="263" r:id="rId13"/>
-    <p:sldId id="264" r:id="rId14"/>
-    <p:sldId id="265" r:id="rId15"/>
-    <p:sldId id="276" r:id="rId16"/>
-    <p:sldId id="271" r:id="rId17"/>
+    <p:sldId id="277" r:id="rId7"/>
+    <p:sldId id="260" r:id="rId8"/>
+    <p:sldId id="261" r:id="rId9"/>
+    <p:sldId id="272" r:id="rId10"/>
+    <p:sldId id="262" r:id="rId11"/>
+    <p:sldId id="275" r:id="rId12"/>
+    <p:sldId id="266" r:id="rId13"/>
+    <p:sldId id="263" r:id="rId14"/>
+    <p:sldId id="264" r:id="rId15"/>
+    <p:sldId id="265" r:id="rId16"/>
+    <p:sldId id="276" r:id="rId17"/>
+    <p:sldId id="271" r:id="rId18"/>
   </p:sldIdLst>
   <p:sldSz cx="12192000" cy="6858000"/>
   <p:notesSz cx="6858000" cy="9144000"/>
@@ -13817,6 +13818,1144 @@
 <file path=ppt/slides/slide10.xml><?xml version="1.0" encoding="utf-8"?>
 <p:sld xmlns:a="http://schemas.openxmlformats.org/drawingml/2006/main" xmlns:r="http://schemas.openxmlformats.org/officeDocument/2006/relationships" xmlns:p="http://schemas.openxmlformats.org/presentationml/2006/main">
   <p:cSld>
+    <p:bg>
+      <p:bgPr>
+        <a:solidFill>
+          <a:schemeClr val="bg1"/>
+        </a:solidFill>
+        <a:effectLst/>
+      </p:bgPr>
+    </p:bg>
+    <p:spTree>
+      <p:nvGrpSpPr>
+        <p:cNvPr id="1" name=""/>
+        <p:cNvGrpSpPr/>
+        <p:nvPr/>
+      </p:nvGrpSpPr>
+      <p:grpSpPr>
+        <a:xfrm>
+          <a:off x="0" y="0"/>
+          <a:ext cx="0" cy="0"/>
+          <a:chOff x="0" y="0"/>
+          <a:chExt cx="0" cy="0"/>
+        </a:xfrm>
+      </p:grpSpPr>
+      <p:sp>
+        <p:nvSpPr>
+          <p:cNvPr id="10" name="Rectangle 9">
+            <a:extLst>
+              <a:ext uri="{FF2B5EF4-FFF2-40B4-BE49-F238E27FC236}">
+                <a16:creationId xmlns:a16="http://schemas.microsoft.com/office/drawing/2014/main" id="{4E78424C-6FD0-41F8-9CAA-5DC19C42359F}"/>
+              </a:ext>
+              <a:ext uri="{C183D7F6-B498-43B3-948B-1728B52AA6E4}">
+                <adec:decorative xmlns:adec="http://schemas.microsoft.com/office/drawing/2017/decorative" val="1"/>
+              </a:ext>
+            </a:extLst>
+          </p:cNvPr>
+          <p:cNvSpPr>
+            <a:spLocks noGrp="1" noRot="1" noChangeAspect="1" noMove="1" noResize="1" noEditPoints="1" noAdjustHandles="1" noChangeArrowheads="1" noChangeShapeType="1" noTextEdit="1"/>
+          </p:cNvSpPr>
+          <p:nvPr>
+            <p:extLst>
+              <p:ext uri="{386F3935-93C4-4BCD-93E2-E3B085C9AB24}">
+                <p16:designElem xmlns:p16="http://schemas.microsoft.com/office/powerpoint/2015/main" val="1"/>
+              </p:ext>
+            </p:extLst>
+          </p:nvPr>
+        </p:nvSpPr>
+        <p:spPr>
+          <a:xfrm>
+            <a:off x="0" y="-1"/>
+            <a:ext cx="12192000" cy="6858001"/>
+          </a:xfrm>
+          <a:prstGeom prst="rect">
+            <a:avLst/>
+          </a:prstGeom>
+          <a:ln>
+            <a:noFill/>
+          </a:ln>
+        </p:spPr>
+        <p:style>
+          <a:lnRef idx="2">
+            <a:schemeClr val="accent1">
+              <a:shade val="50000"/>
+            </a:schemeClr>
+          </a:lnRef>
+          <a:fillRef idx="1003">
+            <a:schemeClr val="dk2"/>
+          </a:fillRef>
+          <a:effectRef idx="0">
+            <a:schemeClr val="accent1"/>
+          </a:effectRef>
+          <a:fontRef idx="minor">
+            <a:schemeClr val="lt1"/>
+          </a:fontRef>
+        </p:style>
+        <p:txBody>
+          <a:bodyPr rtlCol="0" anchor="ctr"/>
+          <a:lstStyle/>
+          <a:p>
+            <a:pPr algn="ctr"/>
+            <a:endParaRPr lang="en-US"/>
+          </a:p>
+        </p:txBody>
+      </p:sp>
+      <p:sp>
+        <p:nvSpPr>
+          <p:cNvPr id="2" name="Title 1">
+            <a:extLst>
+              <a:ext uri="{FF2B5EF4-FFF2-40B4-BE49-F238E27FC236}">
+                <a16:creationId xmlns:a16="http://schemas.microsoft.com/office/drawing/2014/main" id="{800C4E1B-00E5-859C-2C85-775346947D8A}"/>
+              </a:ext>
+            </a:extLst>
+          </p:cNvPr>
+          <p:cNvSpPr>
+            <a:spLocks noGrp="1"/>
+          </p:cNvSpPr>
+          <p:nvPr>
+            <p:ph type="title"/>
+          </p:nvPr>
+        </p:nvSpPr>
+        <p:spPr>
+          <a:xfrm>
+            <a:off x="643855" y="1447800"/>
+            <a:ext cx="3108626" cy="4572000"/>
+          </a:xfrm>
+        </p:spPr>
+        <p:txBody>
+          <a:bodyPr anchor="ctr">
+            <a:normAutofit/>
+          </a:bodyPr>
+          <a:lstStyle/>
+          <a:p>
+            <a:r>
+              <a:rPr lang="en-NZ" sz="3200">
+                <a:solidFill>
+                  <a:srgbClr val="F2F2F2"/>
+                </a:solidFill>
+              </a:rPr>
+              <a:t>What are use cases for JIT compiler?</a:t>
+            </a:r>
+            <a:br>
+              <a:rPr lang="en-NZ" sz="3200">
+                <a:solidFill>
+                  <a:srgbClr val="F2F2F2"/>
+                </a:solidFill>
+              </a:rPr>
+            </a:br>
+            <a:endParaRPr lang="en-NZ" sz="3200">
+              <a:solidFill>
+                <a:srgbClr val="F2F2F2"/>
+              </a:solidFill>
+            </a:endParaRPr>
+          </a:p>
+        </p:txBody>
+      </p:sp>
+      <p:sp>
+        <p:nvSpPr>
+          <p:cNvPr id="12" name="Freeform: Shape 11">
+            <a:extLst>
+              <a:ext uri="{FF2B5EF4-FFF2-40B4-BE49-F238E27FC236}">
+                <a16:creationId xmlns:a16="http://schemas.microsoft.com/office/drawing/2014/main" id="{DD136760-57DC-4301-8BEA-B71AD2D13905}"/>
+              </a:ext>
+              <a:ext uri="{C183D7F6-B498-43B3-948B-1728B52AA6E4}">
+                <adec:decorative xmlns:adec="http://schemas.microsoft.com/office/drawing/2017/decorative" val="1"/>
+              </a:ext>
+            </a:extLst>
+          </p:cNvPr>
+          <p:cNvSpPr>
+            <a:spLocks noGrp="1" noRot="1" noChangeAspect="1" noMove="1" noResize="1" noEditPoints="1" noAdjustHandles="1" noChangeArrowheads="1" noChangeShapeType="1" noTextEdit="1"/>
+          </p:cNvSpPr>
+          <p:nvPr>
+            <p:extLst>
+              <p:ext uri="{386F3935-93C4-4BCD-93E2-E3B085C9AB24}">
+                <p16:designElem xmlns:p16="http://schemas.microsoft.com/office/powerpoint/2015/main" val="1"/>
+              </p:ext>
+            </p:extLst>
+          </p:nvPr>
+        </p:nvSpPr>
+        <p:spPr>
+          <a:xfrm>
+            <a:off x="4161310" y="0"/>
+            <a:ext cx="8030690" cy="6858000"/>
+          </a:xfrm>
+          <a:custGeom>
+            <a:avLst/>
+            <a:gdLst>
+              <a:gd name="connsiteX0" fmla="*/ 1176 w 8030690"/>
+              <a:gd name="connsiteY0" fmla="*/ 0 h 6858000"/>
+              <a:gd name="connsiteX1" fmla="*/ 1344715 w 8030690"/>
+              <a:gd name="connsiteY1" fmla="*/ 0 h 6858000"/>
+              <a:gd name="connsiteX2" fmla="*/ 1344715 w 8030690"/>
+              <a:gd name="connsiteY2" fmla="*/ 0 h 6858000"/>
+              <a:gd name="connsiteX3" fmla="*/ 8030690 w 8030690"/>
+              <a:gd name="connsiteY3" fmla="*/ 0 h 6858000"/>
+              <a:gd name="connsiteX4" fmla="*/ 8030690 w 8030690"/>
+              <a:gd name="connsiteY4" fmla="*/ 6858000 h 6858000"/>
+              <a:gd name="connsiteX5" fmla="*/ 477746 w 8030690"/>
+              <a:gd name="connsiteY5" fmla="*/ 6858000 h 6858000"/>
+              <a:gd name="connsiteX6" fmla="*/ 477746 w 8030690"/>
+              <a:gd name="connsiteY6" fmla="*/ 6858000 h 6858000"/>
+              <a:gd name="connsiteX7" fmla="*/ 0 w 8030690"/>
+              <a:gd name="connsiteY7" fmla="*/ 6858000 h 6858000"/>
+              <a:gd name="connsiteX8" fmla="*/ 5883 w 8030690"/>
+              <a:gd name="connsiteY8" fmla="*/ 6817538 h 6858000"/>
+              <a:gd name="connsiteX9" fmla="*/ 23196 w 8030690"/>
+              <a:gd name="connsiteY9" fmla="*/ 6698894 h 6858000"/>
+              <a:gd name="connsiteX10" fmla="*/ 35298 w 8030690"/>
+              <a:gd name="connsiteY10" fmla="*/ 6612483 h 6858000"/>
+              <a:gd name="connsiteX11" fmla="*/ 48073 w 8030690"/>
+              <a:gd name="connsiteY11" fmla="*/ 6509613 h 6858000"/>
+              <a:gd name="connsiteX12" fmla="*/ 63369 w 8030690"/>
+              <a:gd name="connsiteY12" fmla="*/ 6387541 h 6858000"/>
+              <a:gd name="connsiteX13" fmla="*/ 79506 w 8030690"/>
+              <a:gd name="connsiteY13" fmla="*/ 6252438 h 6858000"/>
+              <a:gd name="connsiteX14" fmla="*/ 96483 w 8030690"/>
+              <a:gd name="connsiteY14" fmla="*/ 6100191 h 6858000"/>
+              <a:gd name="connsiteX15" fmla="*/ 114468 w 8030690"/>
+              <a:gd name="connsiteY15" fmla="*/ 5934227 h 6858000"/>
+              <a:gd name="connsiteX16" fmla="*/ 132454 w 8030690"/>
+              <a:gd name="connsiteY16" fmla="*/ 5753862 h 6858000"/>
+              <a:gd name="connsiteX17" fmla="*/ 150775 w 8030690"/>
+              <a:gd name="connsiteY17" fmla="*/ 5561838 h 6858000"/>
+              <a:gd name="connsiteX18" fmla="*/ 167752 w 8030690"/>
+              <a:gd name="connsiteY18" fmla="*/ 5354726 h 6858000"/>
+              <a:gd name="connsiteX19" fmla="*/ 184057 w 8030690"/>
+              <a:gd name="connsiteY19" fmla="*/ 5138013 h 6858000"/>
+              <a:gd name="connsiteX20" fmla="*/ 198849 w 8030690"/>
+              <a:gd name="connsiteY20" fmla="*/ 4908956 h 6858000"/>
+              <a:gd name="connsiteX21" fmla="*/ 212968 w 8030690"/>
+              <a:gd name="connsiteY21" fmla="*/ 4670298 h 6858000"/>
+              <a:gd name="connsiteX22" fmla="*/ 226248 w 8030690"/>
+              <a:gd name="connsiteY22" fmla="*/ 4421352 h 6858000"/>
+              <a:gd name="connsiteX23" fmla="*/ 230954 w 8030690"/>
+              <a:gd name="connsiteY23" fmla="*/ 4293793 h 6858000"/>
+              <a:gd name="connsiteX24" fmla="*/ 236165 w 8030690"/>
+              <a:gd name="connsiteY24" fmla="*/ 4163491 h 6858000"/>
+              <a:gd name="connsiteX25" fmla="*/ 241039 w 8030690"/>
+              <a:gd name="connsiteY25" fmla="*/ 4031132 h 6858000"/>
+              <a:gd name="connsiteX26" fmla="*/ 244233 w 8030690"/>
+              <a:gd name="connsiteY26" fmla="*/ 3898087 h 6858000"/>
+              <a:gd name="connsiteX27" fmla="*/ 247091 w 8030690"/>
+              <a:gd name="connsiteY27" fmla="*/ 3762298 h 6858000"/>
+              <a:gd name="connsiteX28" fmla="*/ 250116 w 8030690"/>
+              <a:gd name="connsiteY28" fmla="*/ 3625138 h 6858000"/>
+              <a:gd name="connsiteX29" fmla="*/ 252133 w 8030690"/>
+              <a:gd name="connsiteY29" fmla="*/ 3485235 h 6858000"/>
+              <a:gd name="connsiteX30" fmla="*/ 252133 w 8030690"/>
+              <a:gd name="connsiteY30" fmla="*/ 3343960 h 6858000"/>
+              <a:gd name="connsiteX31" fmla="*/ 253142 w 8030690"/>
+              <a:gd name="connsiteY31" fmla="*/ 3201314 h 6858000"/>
+              <a:gd name="connsiteX32" fmla="*/ 252133 w 8030690"/>
+              <a:gd name="connsiteY32" fmla="*/ 3057296 h 6858000"/>
+              <a:gd name="connsiteX33" fmla="*/ 250116 w 8030690"/>
+              <a:gd name="connsiteY33" fmla="*/ 2911221 h 6858000"/>
+              <a:gd name="connsiteX34" fmla="*/ 248267 w 8030690"/>
+              <a:gd name="connsiteY34" fmla="*/ 2765145 h 6858000"/>
+              <a:gd name="connsiteX35" fmla="*/ 244233 w 8030690"/>
+              <a:gd name="connsiteY35" fmla="*/ 2617013 h 6858000"/>
+              <a:gd name="connsiteX36" fmla="*/ 240031 w 8030690"/>
+              <a:gd name="connsiteY36" fmla="*/ 2467508 h 6858000"/>
+              <a:gd name="connsiteX37" fmla="*/ 235156 w 8030690"/>
+              <a:gd name="connsiteY37" fmla="*/ 2318004 h 6858000"/>
+              <a:gd name="connsiteX38" fmla="*/ 228265 w 8030690"/>
+              <a:gd name="connsiteY38" fmla="*/ 2167128 h 6858000"/>
+              <a:gd name="connsiteX39" fmla="*/ 220028 w 8030690"/>
+              <a:gd name="connsiteY39" fmla="*/ 2014880 h 6858000"/>
+              <a:gd name="connsiteX40" fmla="*/ 212128 w 8030690"/>
+              <a:gd name="connsiteY40" fmla="*/ 1861947 h 6858000"/>
+              <a:gd name="connsiteX41" fmla="*/ 202043 w 8030690"/>
+              <a:gd name="connsiteY41" fmla="*/ 1709013 h 6858000"/>
+              <a:gd name="connsiteX42" fmla="*/ 189940 w 8030690"/>
+              <a:gd name="connsiteY42" fmla="*/ 1554023 h 6858000"/>
+              <a:gd name="connsiteX43" fmla="*/ 177838 w 8030690"/>
+              <a:gd name="connsiteY43" fmla="*/ 1401089 h 6858000"/>
+              <a:gd name="connsiteX44" fmla="*/ 163886 w 8030690"/>
+              <a:gd name="connsiteY44" fmla="*/ 1245413 h 6858000"/>
+              <a:gd name="connsiteX45" fmla="*/ 148590 w 8030690"/>
+              <a:gd name="connsiteY45" fmla="*/ 1089050 h 6858000"/>
+              <a:gd name="connsiteX46" fmla="*/ 132454 w 8030690"/>
+              <a:gd name="connsiteY46" fmla="*/ 934745 h 6858000"/>
+              <a:gd name="connsiteX47" fmla="*/ 113628 w 8030690"/>
+              <a:gd name="connsiteY47" fmla="*/ 778383 h 6858000"/>
+              <a:gd name="connsiteX48" fmla="*/ 93457 w 8030690"/>
+              <a:gd name="connsiteY48" fmla="*/ 622706 h 6858000"/>
+              <a:gd name="connsiteX49" fmla="*/ 73454 w 8030690"/>
+              <a:gd name="connsiteY49" fmla="*/ 466344 h 6858000"/>
+              <a:gd name="connsiteX50" fmla="*/ 50090 w 8030690"/>
+              <a:gd name="connsiteY50" fmla="*/ 310667 h 6858000"/>
+              <a:gd name="connsiteX51" fmla="*/ 26222 w 8030690"/>
+              <a:gd name="connsiteY51" fmla="*/ 155676 h 6858000"/>
+            </a:gdLst>
+            <a:ahLst/>
+            <a:cxnLst>
+              <a:cxn ang="0">
+                <a:pos x="connsiteX0" y="connsiteY0"/>
+              </a:cxn>
+              <a:cxn ang="0">
+                <a:pos x="connsiteX1" y="connsiteY1"/>
+              </a:cxn>
+              <a:cxn ang="0">
+                <a:pos x="connsiteX2" y="connsiteY2"/>
+              </a:cxn>
+              <a:cxn ang="0">
+                <a:pos x="connsiteX3" y="connsiteY3"/>
+              </a:cxn>
+              <a:cxn ang="0">
+                <a:pos x="connsiteX4" y="connsiteY4"/>
+              </a:cxn>
+              <a:cxn ang="0">
+                <a:pos x="connsiteX5" y="connsiteY5"/>
+              </a:cxn>
+              <a:cxn ang="0">
+                <a:pos x="connsiteX6" y="connsiteY6"/>
+              </a:cxn>
+              <a:cxn ang="0">
+                <a:pos x="connsiteX7" y="connsiteY7"/>
+              </a:cxn>
+              <a:cxn ang="0">
+                <a:pos x="connsiteX8" y="connsiteY8"/>
+              </a:cxn>
+              <a:cxn ang="0">
+                <a:pos x="connsiteX9" y="connsiteY9"/>
+              </a:cxn>
+              <a:cxn ang="0">
+                <a:pos x="connsiteX10" y="connsiteY10"/>
+              </a:cxn>
+              <a:cxn ang="0">
+                <a:pos x="connsiteX11" y="connsiteY11"/>
+              </a:cxn>
+              <a:cxn ang="0">
+                <a:pos x="connsiteX12" y="connsiteY12"/>
+              </a:cxn>
+              <a:cxn ang="0">
+                <a:pos x="connsiteX13" y="connsiteY13"/>
+              </a:cxn>
+              <a:cxn ang="0">
+                <a:pos x="connsiteX14" y="connsiteY14"/>
+              </a:cxn>
+              <a:cxn ang="0">
+                <a:pos x="connsiteX15" y="connsiteY15"/>
+              </a:cxn>
+              <a:cxn ang="0">
+                <a:pos x="connsiteX16" y="connsiteY16"/>
+              </a:cxn>
+              <a:cxn ang="0">
+                <a:pos x="connsiteX17" y="connsiteY17"/>
+              </a:cxn>
+              <a:cxn ang="0">
+                <a:pos x="connsiteX18" y="connsiteY18"/>
+              </a:cxn>
+              <a:cxn ang="0">
+                <a:pos x="connsiteX19" y="connsiteY19"/>
+              </a:cxn>
+              <a:cxn ang="0">
+                <a:pos x="connsiteX20" y="connsiteY20"/>
+              </a:cxn>
+              <a:cxn ang="0">
+                <a:pos x="connsiteX21" y="connsiteY21"/>
+              </a:cxn>
+              <a:cxn ang="0">
+                <a:pos x="connsiteX22" y="connsiteY22"/>
+              </a:cxn>
+              <a:cxn ang="0">
+                <a:pos x="connsiteX23" y="connsiteY23"/>
+              </a:cxn>
+              <a:cxn ang="0">
+                <a:pos x="connsiteX24" y="connsiteY24"/>
+              </a:cxn>
+              <a:cxn ang="0">
+                <a:pos x="connsiteX25" y="connsiteY25"/>
+              </a:cxn>
+              <a:cxn ang="0">
+                <a:pos x="connsiteX26" y="connsiteY26"/>
+              </a:cxn>
+              <a:cxn ang="0">
+                <a:pos x="connsiteX27" y="connsiteY27"/>
+              </a:cxn>
+              <a:cxn ang="0">
+                <a:pos x="connsiteX28" y="connsiteY28"/>
+              </a:cxn>
+              <a:cxn ang="0">
+                <a:pos x="connsiteX29" y="connsiteY29"/>
+              </a:cxn>
+              <a:cxn ang="0">
+                <a:pos x="connsiteX30" y="connsiteY30"/>
+              </a:cxn>
+              <a:cxn ang="0">
+                <a:pos x="connsiteX31" y="connsiteY31"/>
+              </a:cxn>
+              <a:cxn ang="0">
+                <a:pos x="connsiteX32" y="connsiteY32"/>
+              </a:cxn>
+              <a:cxn ang="0">
+                <a:pos x="connsiteX33" y="connsiteY33"/>
+              </a:cxn>
+              <a:cxn ang="0">
+                <a:pos x="connsiteX34" y="connsiteY34"/>
+              </a:cxn>
+              <a:cxn ang="0">
+                <a:pos x="connsiteX35" y="connsiteY35"/>
+              </a:cxn>
+              <a:cxn ang="0">
+                <a:pos x="connsiteX36" y="connsiteY36"/>
+              </a:cxn>
+              <a:cxn ang="0">
+                <a:pos x="connsiteX37" y="connsiteY37"/>
+              </a:cxn>
+              <a:cxn ang="0">
+                <a:pos x="connsiteX38" y="connsiteY38"/>
+              </a:cxn>
+              <a:cxn ang="0">
+                <a:pos x="connsiteX39" y="connsiteY39"/>
+              </a:cxn>
+              <a:cxn ang="0">
+                <a:pos x="connsiteX40" y="connsiteY40"/>
+              </a:cxn>
+              <a:cxn ang="0">
+                <a:pos x="connsiteX41" y="connsiteY41"/>
+              </a:cxn>
+              <a:cxn ang="0">
+                <a:pos x="connsiteX42" y="connsiteY42"/>
+              </a:cxn>
+              <a:cxn ang="0">
+                <a:pos x="connsiteX43" y="connsiteY43"/>
+              </a:cxn>
+              <a:cxn ang="0">
+                <a:pos x="connsiteX44" y="connsiteY44"/>
+              </a:cxn>
+              <a:cxn ang="0">
+                <a:pos x="connsiteX45" y="connsiteY45"/>
+              </a:cxn>
+              <a:cxn ang="0">
+                <a:pos x="connsiteX46" y="connsiteY46"/>
+              </a:cxn>
+              <a:cxn ang="0">
+                <a:pos x="connsiteX47" y="connsiteY47"/>
+              </a:cxn>
+              <a:cxn ang="0">
+                <a:pos x="connsiteX48" y="connsiteY48"/>
+              </a:cxn>
+              <a:cxn ang="0">
+                <a:pos x="connsiteX49" y="connsiteY49"/>
+              </a:cxn>
+              <a:cxn ang="0">
+                <a:pos x="connsiteX50" y="connsiteY50"/>
+              </a:cxn>
+              <a:cxn ang="0">
+                <a:pos x="connsiteX51" y="connsiteY51"/>
+              </a:cxn>
+            </a:cxnLst>
+            <a:rect l="l" t="t" r="r" b="b"/>
+            <a:pathLst>
+              <a:path w="8030690" h="6858000">
+                <a:moveTo>
+                  <a:pt x="1176" y="0"/>
+                </a:moveTo>
+                <a:lnTo>
+                  <a:pt x="1344715" y="0"/>
+                </a:lnTo>
+                <a:lnTo>
+                  <a:pt x="1344715" y="0"/>
+                </a:lnTo>
+                <a:lnTo>
+                  <a:pt x="8030690" y="0"/>
+                </a:lnTo>
+                <a:lnTo>
+                  <a:pt x="8030690" y="6858000"/>
+                </a:lnTo>
+                <a:lnTo>
+                  <a:pt x="477746" y="6858000"/>
+                </a:lnTo>
+                <a:lnTo>
+                  <a:pt x="477746" y="6858000"/>
+                </a:lnTo>
+                <a:lnTo>
+                  <a:pt x="0" y="6858000"/>
+                </a:lnTo>
+                <a:lnTo>
+                  <a:pt x="5883" y="6817538"/>
+                </a:lnTo>
+                <a:lnTo>
+                  <a:pt x="23196" y="6698894"/>
+                </a:lnTo>
+                <a:lnTo>
+                  <a:pt x="35298" y="6612483"/>
+                </a:lnTo>
+                <a:lnTo>
+                  <a:pt x="48073" y="6509613"/>
+                </a:lnTo>
+                <a:lnTo>
+                  <a:pt x="63369" y="6387541"/>
+                </a:lnTo>
+                <a:lnTo>
+                  <a:pt x="79506" y="6252438"/>
+                </a:lnTo>
+                <a:lnTo>
+                  <a:pt x="96483" y="6100191"/>
+                </a:lnTo>
+                <a:lnTo>
+                  <a:pt x="114468" y="5934227"/>
+                </a:lnTo>
+                <a:lnTo>
+                  <a:pt x="132454" y="5753862"/>
+                </a:lnTo>
+                <a:lnTo>
+                  <a:pt x="150775" y="5561838"/>
+                </a:lnTo>
+                <a:lnTo>
+                  <a:pt x="167752" y="5354726"/>
+                </a:lnTo>
+                <a:lnTo>
+                  <a:pt x="184057" y="5138013"/>
+                </a:lnTo>
+                <a:lnTo>
+                  <a:pt x="198849" y="4908956"/>
+                </a:lnTo>
+                <a:lnTo>
+                  <a:pt x="212968" y="4670298"/>
+                </a:lnTo>
+                <a:lnTo>
+                  <a:pt x="226248" y="4421352"/>
+                </a:lnTo>
+                <a:lnTo>
+                  <a:pt x="230954" y="4293793"/>
+                </a:lnTo>
+                <a:lnTo>
+                  <a:pt x="236165" y="4163491"/>
+                </a:lnTo>
+                <a:lnTo>
+                  <a:pt x="241039" y="4031132"/>
+                </a:lnTo>
+                <a:lnTo>
+                  <a:pt x="244233" y="3898087"/>
+                </a:lnTo>
+                <a:lnTo>
+                  <a:pt x="247091" y="3762298"/>
+                </a:lnTo>
+                <a:lnTo>
+                  <a:pt x="250116" y="3625138"/>
+                </a:lnTo>
+                <a:lnTo>
+                  <a:pt x="252133" y="3485235"/>
+                </a:lnTo>
+                <a:lnTo>
+                  <a:pt x="252133" y="3343960"/>
+                </a:lnTo>
+                <a:lnTo>
+                  <a:pt x="253142" y="3201314"/>
+                </a:lnTo>
+                <a:lnTo>
+                  <a:pt x="252133" y="3057296"/>
+                </a:lnTo>
+                <a:lnTo>
+                  <a:pt x="250116" y="2911221"/>
+                </a:lnTo>
+                <a:lnTo>
+                  <a:pt x="248267" y="2765145"/>
+                </a:lnTo>
+                <a:lnTo>
+                  <a:pt x="244233" y="2617013"/>
+                </a:lnTo>
+                <a:lnTo>
+                  <a:pt x="240031" y="2467508"/>
+                </a:lnTo>
+                <a:lnTo>
+                  <a:pt x="235156" y="2318004"/>
+                </a:lnTo>
+                <a:lnTo>
+                  <a:pt x="228265" y="2167128"/>
+                </a:lnTo>
+                <a:lnTo>
+                  <a:pt x="220028" y="2014880"/>
+                </a:lnTo>
+                <a:lnTo>
+                  <a:pt x="212128" y="1861947"/>
+                </a:lnTo>
+                <a:lnTo>
+                  <a:pt x="202043" y="1709013"/>
+                </a:lnTo>
+                <a:lnTo>
+                  <a:pt x="189940" y="1554023"/>
+                </a:lnTo>
+                <a:lnTo>
+                  <a:pt x="177838" y="1401089"/>
+                </a:lnTo>
+                <a:lnTo>
+                  <a:pt x="163886" y="1245413"/>
+                </a:lnTo>
+                <a:lnTo>
+                  <a:pt x="148590" y="1089050"/>
+                </a:lnTo>
+                <a:lnTo>
+                  <a:pt x="132454" y="934745"/>
+                </a:lnTo>
+                <a:lnTo>
+                  <a:pt x="113628" y="778383"/>
+                </a:lnTo>
+                <a:lnTo>
+                  <a:pt x="93457" y="622706"/>
+                </a:lnTo>
+                <a:lnTo>
+                  <a:pt x="73454" y="466344"/>
+                </a:lnTo>
+                <a:lnTo>
+                  <a:pt x="50090" y="310667"/>
+                </a:lnTo>
+                <a:lnTo>
+                  <a:pt x="26222" y="155676"/>
+                </a:lnTo>
+                <a:close/>
+              </a:path>
+            </a:pathLst>
+          </a:custGeom>
+          <a:solidFill>
+            <a:schemeClr val="bg1"/>
+          </a:solidFill>
+          <a:ln>
+            <a:noFill/>
+          </a:ln>
+        </p:spPr>
+        <p:style>
+          <a:lnRef idx="2">
+            <a:schemeClr val="accent1">
+              <a:shade val="50000"/>
+            </a:schemeClr>
+          </a:lnRef>
+          <a:fillRef idx="1">
+            <a:schemeClr val="accent1"/>
+          </a:fillRef>
+          <a:effectRef idx="0">
+            <a:schemeClr val="accent1"/>
+          </a:effectRef>
+          <a:fontRef idx="minor">
+            <a:schemeClr val="lt1"/>
+          </a:fontRef>
+        </p:style>
+        <p:txBody>
+          <a:bodyPr wrap="square" rtlCol="0" anchor="ctr">
+            <a:noAutofit/>
+          </a:bodyPr>
+          <a:lstStyle/>
+          <a:p>
+            <a:pPr algn="ctr"/>
+            <a:endParaRPr lang="en-US"/>
+          </a:p>
+        </p:txBody>
+      </p:sp>
+      <p:sp>
+        <p:nvSpPr>
+          <p:cNvPr id="14" name="Freeform 11">
+            <a:extLst>
+              <a:ext uri="{FF2B5EF4-FFF2-40B4-BE49-F238E27FC236}">
+                <a16:creationId xmlns:a16="http://schemas.microsoft.com/office/drawing/2014/main" id="{BDC58DEA-1307-4F44-AD47-E613D8B76A89}"/>
+              </a:ext>
+              <a:ext uri="{C183D7F6-B498-43B3-948B-1728B52AA6E4}">
+                <adec:decorative xmlns:adec="http://schemas.microsoft.com/office/drawing/2017/decorative" val="1"/>
+              </a:ext>
+            </a:extLst>
+          </p:cNvPr>
+          <p:cNvSpPr>
+            <a:spLocks noGrp="1" noRot="1" noChangeAspect="1" noMove="1" noResize="1" noEditPoints="1" noAdjustHandles="1" noChangeArrowheads="1" noChangeShapeType="1" noTextEdit="1"/>
+          </p:cNvSpPr>
+          <p:nvPr>
+            <p:extLst>
+              <p:ext uri="{386F3935-93C4-4BCD-93E2-E3B085C9AB24}">
+                <p16:designElem xmlns:p16="http://schemas.microsoft.com/office/powerpoint/2015/main" val="1"/>
+              </p:ext>
+            </p:extLst>
+          </p:nvPr>
+        </p:nvSpPr>
+        <p:spPr>
+          <a:xfrm>
+            <a:off x="3948110" y="-1"/>
+            <a:ext cx="559472" cy="3709642"/>
+          </a:xfrm>
+          <a:custGeom>
+            <a:avLst/>
+            <a:gdLst>
+              <a:gd name="connsiteX0" fmla="*/ 0 w 559472"/>
+              <a:gd name="connsiteY0" fmla="*/ 0 h 3709642"/>
+              <a:gd name="connsiteX1" fmla="*/ 473952 w 559472"/>
+              <a:gd name="connsiteY1" fmla="*/ 0 h 3709642"/>
+              <a:gd name="connsiteX2" fmla="*/ 485840 w 559472"/>
+              <a:gd name="connsiteY2" fmla="*/ 161194 h 3709642"/>
+              <a:gd name="connsiteX3" fmla="*/ 523949 w 559472"/>
+              <a:gd name="connsiteY3" fmla="*/ 3672197 h 3709642"/>
+              <a:gd name="connsiteX4" fmla="*/ 454748 w 559472"/>
+              <a:gd name="connsiteY4" fmla="*/ 3709642 h 3709642"/>
+              <a:gd name="connsiteX5" fmla="*/ 448224 w 559472"/>
+              <a:gd name="connsiteY5" fmla="*/ 3510471 h 3709642"/>
+              <a:gd name="connsiteX6" fmla="*/ 443564 w 559472"/>
+              <a:gd name="connsiteY6" fmla="*/ 3408563 h 3709642"/>
+              <a:gd name="connsiteX7" fmla="*/ 438902 w 559472"/>
+              <a:gd name="connsiteY7" fmla="*/ 3304407 h 3709642"/>
+              <a:gd name="connsiteX8" fmla="*/ 433941 w 559472"/>
+              <a:gd name="connsiteY8" fmla="*/ 3198777 h 3709642"/>
+              <a:gd name="connsiteX9" fmla="*/ 427584 w 559472"/>
+              <a:gd name="connsiteY9" fmla="*/ 3092510 h 3709642"/>
+              <a:gd name="connsiteX10" fmla="*/ 420988 w 559472"/>
+              <a:gd name="connsiteY10" fmla="*/ 2984390 h 3709642"/>
+              <a:gd name="connsiteX11" fmla="*/ 414330 w 559472"/>
+              <a:gd name="connsiteY11" fmla="*/ 2874401 h 3709642"/>
+              <a:gd name="connsiteX12" fmla="*/ 406840 w 559472"/>
+              <a:gd name="connsiteY12" fmla="*/ 2762980 h 3709642"/>
+              <a:gd name="connsiteX13" fmla="*/ 397745 w 559472"/>
+              <a:gd name="connsiteY13" fmla="*/ 2650566 h 3709642"/>
+              <a:gd name="connsiteX14" fmla="*/ 389154 w 559472"/>
+              <a:gd name="connsiteY14" fmla="*/ 2536612 h 3709642"/>
+              <a:gd name="connsiteX15" fmla="*/ 379225 w 559472"/>
+              <a:gd name="connsiteY15" fmla="*/ 2421642 h 3709642"/>
+              <a:gd name="connsiteX16" fmla="*/ 368316 w 559472"/>
+              <a:gd name="connsiteY16" fmla="*/ 2305627 h 3709642"/>
+              <a:gd name="connsiteX17" fmla="*/ 357466 w 559472"/>
+              <a:gd name="connsiteY17" fmla="*/ 2189233 h 3709642"/>
+              <a:gd name="connsiteX18" fmla="*/ 344982 w 559472"/>
+              <a:gd name="connsiteY18" fmla="*/ 2071473 h 3709642"/>
+              <a:gd name="connsiteX19" fmla="*/ 332466 w 559472"/>
+              <a:gd name="connsiteY19" fmla="*/ 1952216 h 3709642"/>
+              <a:gd name="connsiteX20" fmla="*/ 319121 w 559472"/>
+              <a:gd name="connsiteY20" fmla="*/ 1833776 h 3709642"/>
+              <a:gd name="connsiteX21" fmla="*/ 304408 w 559472"/>
+              <a:gd name="connsiteY21" fmla="*/ 1713948 h 3709642"/>
+              <a:gd name="connsiteX22" fmla="*/ 288685 w 559472"/>
+              <a:gd name="connsiteY22" fmla="*/ 1592703 h 3709642"/>
+              <a:gd name="connsiteX23" fmla="*/ 273050 w 559472"/>
+              <a:gd name="connsiteY23" fmla="*/ 1471451 h 3709642"/>
+              <a:gd name="connsiteX24" fmla="*/ 255813 w 559472"/>
+              <a:gd name="connsiteY24" fmla="*/ 1350328 h 3709642"/>
+              <a:gd name="connsiteX25" fmla="*/ 237060 w 559472"/>
+              <a:gd name="connsiteY25" fmla="*/ 1227080 h 3709642"/>
+              <a:gd name="connsiteX26" fmla="*/ 218488 w 559472"/>
+              <a:gd name="connsiteY26" fmla="*/ 1106065 h 3709642"/>
+              <a:gd name="connsiteX27" fmla="*/ 198221 w 559472"/>
+              <a:gd name="connsiteY27" fmla="*/ 982940 h 3709642"/>
+              <a:gd name="connsiteX28" fmla="*/ 177152 w 559472"/>
+              <a:gd name="connsiteY28" fmla="*/ 858755 h 3709642"/>
+              <a:gd name="connsiteX29" fmla="*/ 155551 w 559472"/>
+              <a:gd name="connsiteY29" fmla="*/ 736861 h 3709642"/>
+              <a:gd name="connsiteX30" fmla="*/ 131782 w 559472"/>
+              <a:gd name="connsiteY30" fmla="*/ 613645 h 3709642"/>
+              <a:gd name="connsiteX31" fmla="*/ 107123 w 559472"/>
+              <a:gd name="connsiteY31" fmla="*/ 490500 h 3709642"/>
+              <a:gd name="connsiteX32" fmla="*/ 82552 w 559472"/>
+              <a:gd name="connsiteY32" fmla="*/ 367348 h 3709642"/>
+              <a:gd name="connsiteX33" fmla="*/ 55608 w 559472"/>
+              <a:gd name="connsiteY33" fmla="*/ 244762 h 3709642"/>
+              <a:gd name="connsiteX34" fmla="*/ 28130 w 559472"/>
+              <a:gd name="connsiteY34" fmla="*/ 122220 h 3709642"/>
+              <a:gd name="connsiteX35" fmla="*/ 0 w 559472"/>
+              <a:gd name="connsiteY35" fmla="*/ 0 h 3709642"/>
+            </a:gdLst>
+            <a:ahLst/>
+            <a:cxnLst>
+              <a:cxn ang="0">
+                <a:pos x="connsiteX0" y="connsiteY0"/>
+              </a:cxn>
+              <a:cxn ang="0">
+                <a:pos x="connsiteX1" y="connsiteY1"/>
+              </a:cxn>
+              <a:cxn ang="0">
+                <a:pos x="connsiteX2" y="connsiteY2"/>
+              </a:cxn>
+              <a:cxn ang="0">
+                <a:pos x="connsiteX3" y="connsiteY3"/>
+              </a:cxn>
+              <a:cxn ang="0">
+                <a:pos x="connsiteX4" y="connsiteY4"/>
+              </a:cxn>
+              <a:cxn ang="0">
+                <a:pos x="connsiteX5" y="connsiteY5"/>
+              </a:cxn>
+              <a:cxn ang="0">
+                <a:pos x="connsiteX6" y="connsiteY6"/>
+              </a:cxn>
+              <a:cxn ang="0">
+                <a:pos x="connsiteX7" y="connsiteY7"/>
+              </a:cxn>
+              <a:cxn ang="0">
+                <a:pos x="connsiteX8" y="connsiteY8"/>
+              </a:cxn>
+              <a:cxn ang="0">
+                <a:pos x="connsiteX9" y="connsiteY9"/>
+              </a:cxn>
+              <a:cxn ang="0">
+                <a:pos x="connsiteX10" y="connsiteY10"/>
+              </a:cxn>
+              <a:cxn ang="0">
+                <a:pos x="connsiteX11" y="connsiteY11"/>
+              </a:cxn>
+              <a:cxn ang="0">
+                <a:pos x="connsiteX12" y="connsiteY12"/>
+              </a:cxn>
+              <a:cxn ang="0">
+                <a:pos x="connsiteX13" y="connsiteY13"/>
+              </a:cxn>
+              <a:cxn ang="0">
+                <a:pos x="connsiteX14" y="connsiteY14"/>
+              </a:cxn>
+              <a:cxn ang="0">
+                <a:pos x="connsiteX15" y="connsiteY15"/>
+              </a:cxn>
+              <a:cxn ang="0">
+                <a:pos x="connsiteX16" y="connsiteY16"/>
+              </a:cxn>
+              <a:cxn ang="0">
+                <a:pos x="connsiteX17" y="connsiteY17"/>
+              </a:cxn>
+              <a:cxn ang="0">
+                <a:pos x="connsiteX18" y="connsiteY18"/>
+              </a:cxn>
+              <a:cxn ang="0">
+                <a:pos x="connsiteX19" y="connsiteY19"/>
+              </a:cxn>
+              <a:cxn ang="0">
+                <a:pos x="connsiteX20" y="connsiteY20"/>
+              </a:cxn>
+              <a:cxn ang="0">
+                <a:pos x="connsiteX21" y="connsiteY21"/>
+              </a:cxn>
+              <a:cxn ang="0">
+                <a:pos x="connsiteX22" y="connsiteY22"/>
+              </a:cxn>
+              <a:cxn ang="0">
+                <a:pos x="connsiteX23" y="connsiteY23"/>
+              </a:cxn>
+              <a:cxn ang="0">
+                <a:pos x="connsiteX24" y="connsiteY24"/>
+              </a:cxn>
+              <a:cxn ang="0">
+                <a:pos x="connsiteX25" y="connsiteY25"/>
+              </a:cxn>
+              <a:cxn ang="0">
+                <a:pos x="connsiteX26" y="connsiteY26"/>
+              </a:cxn>
+              <a:cxn ang="0">
+                <a:pos x="connsiteX27" y="connsiteY27"/>
+              </a:cxn>
+              <a:cxn ang="0">
+                <a:pos x="connsiteX28" y="connsiteY28"/>
+              </a:cxn>
+              <a:cxn ang="0">
+                <a:pos x="connsiteX29" y="connsiteY29"/>
+              </a:cxn>
+              <a:cxn ang="0">
+                <a:pos x="connsiteX30" y="connsiteY30"/>
+              </a:cxn>
+              <a:cxn ang="0">
+                <a:pos x="connsiteX31" y="connsiteY31"/>
+              </a:cxn>
+              <a:cxn ang="0">
+                <a:pos x="connsiteX32" y="connsiteY32"/>
+              </a:cxn>
+              <a:cxn ang="0">
+                <a:pos x="connsiteX33" y="connsiteY33"/>
+              </a:cxn>
+              <a:cxn ang="0">
+                <a:pos x="connsiteX34" y="connsiteY34"/>
+              </a:cxn>
+              <a:cxn ang="0">
+                <a:pos x="connsiteX35" y="connsiteY35"/>
+              </a:cxn>
+            </a:cxnLst>
+            <a:rect l="l" t="t" r="r" b="b"/>
+            <a:pathLst>
+              <a:path w="559472" h="3709642">
+                <a:moveTo>
+                  <a:pt x="0" y="0"/>
+                </a:moveTo>
+                <a:lnTo>
+                  <a:pt x="473952" y="0"/>
+                </a:lnTo>
+                <a:lnTo>
+                  <a:pt x="485840" y="161194"/>
+                </a:lnTo>
+                <a:cubicBezTo>
+                  <a:pt x="552063" y="1147770"/>
+                  <a:pt x="592441" y="3086737"/>
+                  <a:pt x="523949" y="3672197"/>
+                </a:cubicBezTo>
+                <a:cubicBezTo>
+                  <a:pt x="500842" y="3684557"/>
+                  <a:pt x="477855" y="3697282"/>
+                  <a:pt x="454748" y="3709642"/>
+                </a:cubicBezTo>
+                <a:lnTo>
+                  <a:pt x="448224" y="3510471"/>
+                </a:lnTo>
+                <a:lnTo>
+                  <a:pt x="443564" y="3408563"/>
+                </a:lnTo>
+                <a:lnTo>
+                  <a:pt x="438902" y="3304407"/>
+                </a:lnTo>
+                <a:lnTo>
+                  <a:pt x="433941" y="3198777"/>
+                </a:lnTo>
+                <a:lnTo>
+                  <a:pt x="427584" y="3092510"/>
+                </a:lnTo>
+                <a:lnTo>
+                  <a:pt x="420988" y="2984390"/>
+                </a:lnTo>
+                <a:lnTo>
+                  <a:pt x="414330" y="2874401"/>
+                </a:lnTo>
+                <a:lnTo>
+                  <a:pt x="406840" y="2762980"/>
+                </a:lnTo>
+                <a:lnTo>
+                  <a:pt x="397745" y="2650566"/>
+                </a:lnTo>
+                <a:lnTo>
+                  <a:pt x="389154" y="2536612"/>
+                </a:lnTo>
+                <a:lnTo>
+                  <a:pt x="379225" y="2421642"/>
+                </a:lnTo>
+                <a:lnTo>
+                  <a:pt x="368316" y="2305627"/>
+                </a:lnTo>
+                <a:lnTo>
+                  <a:pt x="357466" y="2189233"/>
+                </a:lnTo>
+                <a:lnTo>
+                  <a:pt x="344982" y="2071473"/>
+                </a:lnTo>
+                <a:lnTo>
+                  <a:pt x="332466" y="1952216"/>
+                </a:lnTo>
+                <a:lnTo>
+                  <a:pt x="319121" y="1833776"/>
+                </a:lnTo>
+                <a:lnTo>
+                  <a:pt x="304408" y="1713948"/>
+                </a:lnTo>
+                <a:lnTo>
+                  <a:pt x="288685" y="1592703"/>
+                </a:lnTo>
+                <a:lnTo>
+                  <a:pt x="273050" y="1471451"/>
+                </a:lnTo>
+                <a:lnTo>
+                  <a:pt x="255813" y="1350328"/>
+                </a:lnTo>
+                <a:lnTo>
+                  <a:pt x="237060" y="1227080"/>
+                </a:lnTo>
+                <a:lnTo>
+                  <a:pt x="218488" y="1106065"/>
+                </a:lnTo>
+                <a:lnTo>
+                  <a:pt x="198221" y="982940"/>
+                </a:lnTo>
+                <a:lnTo>
+                  <a:pt x="177152" y="858755"/>
+                </a:lnTo>
+                <a:lnTo>
+                  <a:pt x="155551" y="736861"/>
+                </a:lnTo>
+                <a:lnTo>
+                  <a:pt x="131782" y="613645"/>
+                </a:lnTo>
+                <a:lnTo>
+                  <a:pt x="107123" y="490500"/>
+                </a:lnTo>
+                <a:lnTo>
+                  <a:pt x="82552" y="367348"/>
+                </a:lnTo>
+                <a:lnTo>
+                  <a:pt x="55608" y="244762"/>
+                </a:lnTo>
+                <a:lnTo>
+                  <a:pt x="28130" y="122220"/>
+                </a:lnTo>
+                <a:lnTo>
+                  <a:pt x="0" y="0"/>
+                </a:lnTo>
+                <a:close/>
+              </a:path>
+            </a:pathLst>
+          </a:custGeom>
+          <a:solidFill>
+            <a:schemeClr val="bg1">
+              <a:alpha val="20000"/>
+            </a:schemeClr>
+          </a:solidFill>
+          <a:ln>
+            <a:noFill/>
+          </a:ln>
+        </p:spPr>
+        <p:txBody>
+          <a:bodyPr rtlCol="0" anchor="ctr"/>
+          <a:lstStyle/>
+          <a:p>
+            <a:pPr algn="ctr"/>
+            <a:endParaRPr lang="en-US"/>
+          </a:p>
+        </p:txBody>
+      </p:sp>
+      <p:sp>
+        <p:nvSpPr>
+          <p:cNvPr id="16" name="Rectangle 15">
+            <a:extLst>
+              <a:ext uri="{FF2B5EF4-FFF2-40B4-BE49-F238E27FC236}">
+                <a16:creationId xmlns:a16="http://schemas.microsoft.com/office/drawing/2014/main" id="{C99B912D-1E4B-42AF-A2BE-CFEFEC916EE7}"/>
+              </a:ext>
+              <a:ext uri="{C183D7F6-B498-43B3-948B-1728B52AA6E4}">
+                <adec:decorative xmlns:adec="http://schemas.microsoft.com/office/drawing/2017/decorative" val="1"/>
+              </a:ext>
+            </a:extLst>
+          </p:cNvPr>
+          <p:cNvSpPr>
+            <a:spLocks noGrp="1" noRot="1" noChangeAspect="1" noMove="1" noResize="1" noEditPoints="1" noAdjustHandles="1" noChangeArrowheads="1" noChangeShapeType="1" noTextEdit="1"/>
+          </p:cNvSpPr>
+          <p:nvPr>
+            <p:extLst>
+              <p:ext uri="{386F3935-93C4-4BCD-93E2-E3B085C9AB24}">
+                <p16:designElem xmlns:p16="http://schemas.microsoft.com/office/powerpoint/2015/main" val="1"/>
+              </p:ext>
+            </p:extLst>
+          </p:nvPr>
+        </p:nvSpPr>
+        <p:spPr>
+          <a:xfrm>
+            <a:off x="10437812" y="0"/>
+            <a:ext cx="685800" cy="1143000"/>
+          </a:xfrm>
+          <a:prstGeom prst="rect">
+            <a:avLst/>
+          </a:prstGeom>
+          <a:solidFill>
+            <a:schemeClr val="accent1"/>
+          </a:solidFill>
+          <a:ln>
+            <a:noFill/>
+          </a:ln>
+        </p:spPr>
+        <p:style>
+          <a:lnRef idx="1">
+            <a:schemeClr val="accent1"/>
+          </a:lnRef>
+          <a:fillRef idx="3">
+            <a:schemeClr val="accent1"/>
+          </a:fillRef>
+          <a:effectRef idx="2">
+            <a:schemeClr val="accent1"/>
+          </a:effectRef>
+          <a:fontRef idx="minor">
+            <a:schemeClr val="lt1"/>
+          </a:fontRef>
+        </p:style>
+        <p:txBody>
+          <a:bodyPr/>
+          <a:lstStyle/>
+          <a:p>
+            <a:endParaRPr lang="en-NZ"/>
+          </a:p>
+        </p:txBody>
+      </p:sp>
+      <p:sp>
+        <p:nvSpPr>
+          <p:cNvPr id="4" name="Slide Number Placeholder 3">
+            <a:extLst>
+              <a:ext uri="{FF2B5EF4-FFF2-40B4-BE49-F238E27FC236}">
+                <a16:creationId xmlns:a16="http://schemas.microsoft.com/office/drawing/2014/main" id="{ACC79FBC-675A-A878-9411-07F35A13335F}"/>
+              </a:ext>
+            </a:extLst>
+          </p:cNvPr>
+          <p:cNvSpPr>
+            <a:spLocks noGrp="1"/>
+          </p:cNvSpPr>
+          <p:nvPr>
+            <p:ph type="sldNum" sz="quarter" idx="12"/>
+          </p:nvPr>
+        </p:nvSpPr>
+        <p:spPr>
+          <a:xfrm>
+            <a:off x="10352540" y="295729"/>
+            <a:ext cx="838199" cy="767687"/>
+          </a:xfrm>
+        </p:spPr>
+        <p:txBody>
+          <a:bodyPr>
+            <a:normAutofit/>
+          </a:bodyPr>
+          <a:lstStyle/>
+          <a:p>
+            <a:pPr>
+              <a:spcAft>
+                <a:spcPts val="600"/>
+              </a:spcAft>
+            </a:pPr>
+            <a:fld id="{7E50A921-1625-4E66-8B53-913CC32CAF35}" type="slidenum">
+              <a:rPr lang="en-NZ">
+                <a:solidFill>
+                  <a:srgbClr val="FFFFFF"/>
+                </a:solidFill>
+              </a:rPr>
+              <a:pPr>
+                <a:spcAft>
+                  <a:spcPts val="600"/>
+                </a:spcAft>
+              </a:pPr>
+              <a:t>10</a:t>
+            </a:fld>
+            <a:endParaRPr lang="en-NZ">
+              <a:solidFill>
+                <a:srgbClr val="FFFFFF"/>
+              </a:solidFill>
+            </a:endParaRPr>
+          </a:p>
+        </p:txBody>
+      </p:sp>
+      <p:graphicFrame>
+        <p:nvGraphicFramePr>
+          <p:cNvPr id="6" name="Content Placeholder 2">
+            <a:extLst>
+              <a:ext uri="{FF2B5EF4-FFF2-40B4-BE49-F238E27FC236}">
+                <a16:creationId xmlns:a16="http://schemas.microsoft.com/office/drawing/2014/main" id="{E78EF640-816C-0A99-4DED-8251D7DF5C5B}"/>
+              </a:ext>
+            </a:extLst>
+          </p:cNvPr>
+          <p:cNvGraphicFramePr>
+            <a:graphicFrameLocks noGrp="1"/>
+          </p:cNvGraphicFramePr>
+          <p:nvPr>
+            <p:ph idx="1"/>
+            <p:extLst>
+              <p:ext uri="{D42A27DB-BD31-4B8C-83A1-F6EECF244321}">
+                <p14:modId xmlns:p14="http://schemas.microsoft.com/office/powerpoint/2010/main" val="455073143"/>
+              </p:ext>
+            </p:extLst>
+          </p:nvPr>
+        </p:nvGraphicFramePr>
+        <p:xfrm>
+          <a:off x="5048250" y="1447800"/>
+          <a:ext cx="6496050" cy="4572000"/>
+        </p:xfrm>
+        <a:graphic>
+          <a:graphicData uri="http://schemas.openxmlformats.org/drawingml/2006/diagram">
+            <dgm:relIds xmlns:dgm="http://schemas.openxmlformats.org/drawingml/2006/diagram" xmlns:r="http://schemas.openxmlformats.org/officeDocument/2006/relationships" r:dm="rId2" r:lo="rId3" r:qs="rId4" r:cs="rId5"/>
+          </a:graphicData>
+        </a:graphic>
+      </p:graphicFrame>
+    </p:spTree>
+    <p:extLst>
+      <p:ext uri="{BB962C8B-B14F-4D97-AF65-F5344CB8AC3E}">
+        <p14:creationId xmlns:p14="http://schemas.microsoft.com/office/powerpoint/2010/main" val="3655054582"/>
+      </p:ext>
+    </p:extLst>
+  </p:cSld>
+  <p:clrMapOvr>
+    <a:overrideClrMapping bg1="lt1" tx1="dk1" bg2="lt2" tx2="dk2" accent1="accent1" accent2="accent2" accent3="accent3" accent4="accent4" accent5="accent5" accent6="accent6" hlink="hlink" folHlink="folHlink"/>
+  </p:clrMapOvr>
+</p:sld>
+</file>
+
+<file path=ppt/slides/slide11.xml><?xml version="1.0" encoding="utf-8"?>
+<p:sld xmlns:a="http://schemas.openxmlformats.org/drawingml/2006/main" xmlns:r="http://schemas.openxmlformats.org/officeDocument/2006/relationships" xmlns:p="http://schemas.openxmlformats.org/presentationml/2006/main">
+  <p:cSld>
     <p:spTree>
       <p:nvGrpSpPr>
         <p:cNvPr id="1" name=""/>
@@ -13998,7 +15137,7 @@
           <a:p>
             <a:fld id="{7E50A921-1625-4E66-8B53-913CC32CAF35}" type="slidenum">
               <a:rPr lang="en-NZ" smtClean="0"/>
-              <a:t>10</a:t>
+              <a:t>11</a:t>
             </a:fld>
             <a:endParaRPr lang="en-NZ" dirty="0"/>
           </a:p>
@@ -14017,7 +15156,7 @@
 </p:sld>
 </file>
 
-<file path=ppt/slides/slide11.xml><?xml version="1.0" encoding="utf-8"?>
+<file path=ppt/slides/slide12.xml><?xml version="1.0" encoding="utf-8"?>
 <p:sld xmlns:a="http://schemas.openxmlformats.org/drawingml/2006/main" xmlns:r="http://schemas.openxmlformats.org/officeDocument/2006/relationships" xmlns:p="http://schemas.openxmlformats.org/presentationml/2006/main">
   <p:cSld>
     <p:spTree>
@@ -14083,147 +15222,20 @@
           <a:bodyPr/>
           <a:lstStyle/>
           <a:p>
-            <a:r>
-              <a:rPr lang="nl-NL" dirty="0"/>
-              <a:t>In order </a:t>
-            </a:r>
-            <a:r>
-              <a:rPr lang="nl-NL" dirty="0" err="1"/>
-              <a:t>to</a:t>
-            </a:r>
-            <a:r>
-              <a:rPr lang="nl-NL" dirty="0"/>
-              <a:t> do </a:t>
-            </a:r>
-            <a:r>
-              <a:rPr lang="nl-NL" dirty="0" err="1"/>
-              <a:t>the</a:t>
-            </a:r>
-            <a:r>
-              <a:rPr lang="nl-NL" dirty="0"/>
-              <a:t> </a:t>
-            </a:r>
-            <a:r>
-              <a:rPr lang="nl-NL"/>
-              <a:t>exercises</a:t>
-            </a:r>
-            <a:r>
-              <a:rPr lang="nl-NL" dirty="0"/>
-              <a:t> </a:t>
-            </a:r>
-            <a:r>
-              <a:rPr lang="nl-NL" dirty="0" err="1"/>
-              <a:t>provided</a:t>
-            </a:r>
-            <a:r>
-              <a:rPr lang="nl-NL" dirty="0"/>
-              <a:t> </a:t>
-            </a:r>
-            <a:r>
-              <a:rPr lang="nl-NL" dirty="0" err="1"/>
-              <a:t>by</a:t>
-            </a:r>
-            <a:r>
-              <a:rPr lang="nl-NL" dirty="0"/>
-              <a:t> </a:t>
-            </a:r>
-            <a:r>
-              <a:rPr lang="nl-NL" dirty="0" err="1"/>
-              <a:t>us</a:t>
-            </a:r>
-            <a:r>
-              <a:rPr lang="nl-NL" dirty="0"/>
-              <a:t>, </a:t>
-            </a:r>
-            <a:r>
-              <a:rPr lang="nl-NL" dirty="0" err="1"/>
-              <a:t>please</a:t>
-            </a:r>
-            <a:r>
-              <a:rPr lang="nl-NL" dirty="0"/>
-              <a:t> follow </a:t>
-            </a:r>
-            <a:r>
-              <a:rPr lang="nl-NL" dirty="0" err="1"/>
-              <a:t>the</a:t>
-            </a:r>
-            <a:r>
-              <a:rPr lang="nl-NL" dirty="0"/>
-              <a:t> </a:t>
-            </a:r>
-            <a:r>
-              <a:rPr lang="nl-NL" dirty="0" err="1"/>
-              <a:t>following</a:t>
-            </a:r>
-            <a:r>
-              <a:rPr lang="nl-NL" dirty="0"/>
-              <a:t> steps:</a:t>
-            </a:r>
-          </a:p>
-          <a:p>
-            <a:pPr marL="457200" indent="-457200">
-              <a:buFont typeface="+mj-lt"/>
-              <a:buAutoNum type="arabicPeriod"/>
+            <a:pPr marL="0" indent="0">
+              <a:buNone/>
             </a:pPr>
             <a:r>
-              <a:rPr lang="en-NZ" dirty="0"/>
-              <a:t>Go to: </a:t>
-            </a:r>
-            <a:r>
-              <a:rPr lang="en-NZ" dirty="0">
+              <a:rPr lang="en-NZ" sz="7000" dirty="0">
                 <a:hlinkClick r:id="rId2"/>
               </a:rPr>
               <a:t>https://github.com/sebivenlo/esd-2024-jit-compiler</a:t>
             </a:r>
-            <a:endParaRPr lang="en-NZ" dirty="0"/>
-          </a:p>
-          <a:p>
-            <a:pPr marL="457200" indent="-457200">
-              <a:buFont typeface="+mj-lt"/>
-              <a:buAutoNum type="arabicPeriod"/>
-            </a:pPr>
-            <a:r>
-              <a:rPr lang="en-NZ" dirty="0"/>
-              <a:t>Clone the repository and open </a:t>
-            </a:r>
-            <a:r>
-              <a:rPr lang="en-NZ" dirty="0" err="1"/>
-              <a:t>VSCode</a:t>
-            </a:r>
-            <a:endParaRPr lang="en-NZ" dirty="0"/>
-          </a:p>
-          <a:p>
-            <a:pPr marL="457200" indent="-457200">
-              <a:buFont typeface="+mj-lt"/>
-              <a:buAutoNum type="arabicPeriod"/>
-            </a:pPr>
-            <a:r>
-              <a:rPr lang="en-NZ" dirty="0"/>
-              <a:t>Install all Docker images using </a:t>
-            </a:r>
-            <a:r>
-              <a:rPr lang="en-NZ" dirty="0" err="1"/>
-              <a:t>devContainer</a:t>
-            </a:r>
-            <a:r>
-              <a:rPr lang="en-NZ" dirty="0"/>
-              <a:t> dependency(ask us if you need help)</a:t>
-            </a:r>
-          </a:p>
-          <a:p>
-            <a:pPr marL="457200" indent="-457200">
-              <a:buFont typeface="+mj-lt"/>
-              <a:buAutoNum type="arabicPeriod"/>
-            </a:pPr>
-            <a:r>
-              <a:rPr lang="en-NZ" dirty="0"/>
-              <a:t>Wait for everyone to finish the installation</a:t>
-            </a:r>
-          </a:p>
-          <a:p>
-            <a:pPr marL="457200" indent="-457200">
-              <a:buFont typeface="+mj-lt"/>
-              <a:buAutoNum type="arabicPeriod"/>
+            <a:endParaRPr lang="en-NZ" sz="7000" dirty="0"/>
+          </a:p>
+          <a:p>
+            <a:pPr marL="0" indent="0">
+              <a:buNone/>
             </a:pPr>
             <a:endParaRPr lang="en-NZ" dirty="0"/>
           </a:p>
@@ -14259,7 +15271,7 @@
           <a:p>
             <a:fld id="{7E50A921-1625-4E66-8B53-913CC32CAF35}" type="slidenum">
               <a:rPr lang="en-NZ" smtClean="0"/>
-              <a:t>11</a:t>
+              <a:t>12</a:t>
             </a:fld>
             <a:endParaRPr lang="en-NZ" dirty="0"/>
           </a:p>
@@ -14278,7 +15290,7 @@
 </p:sld>
 </file>
 
-<file path=ppt/slides/slide12.xml><?xml version="1.0" encoding="utf-8"?>
+<file path=ppt/slides/slide13.xml><?xml version="1.0" encoding="utf-8"?>
 <p:sld xmlns:a="http://schemas.openxmlformats.org/drawingml/2006/main" xmlns:r="http://schemas.openxmlformats.org/officeDocument/2006/relationships" xmlns:p="http://schemas.openxmlformats.org/presentationml/2006/main">
   <p:cSld>
     <p:bg>
@@ -14887,7 +15899,7 @@
                   <a:spcPts val="600"/>
                 </a:spcAft>
               </a:pPr>
-              <a:t>12</a:t>
+              <a:t>13</a:t>
             </a:fld>
             <a:endParaRPr lang="en-NZ">
               <a:solidFill>
@@ -15458,7 +16470,7 @@
 </p:sld>
 </file>
 
-<file path=ppt/slides/slide13.xml><?xml version="1.0" encoding="utf-8"?>
+<file path=ppt/slides/slide14.xml><?xml version="1.0" encoding="utf-8"?>
 <p:sld xmlns:a="http://schemas.openxmlformats.org/drawingml/2006/main" xmlns:r="http://schemas.openxmlformats.org/officeDocument/2006/relationships" xmlns:p="http://schemas.openxmlformats.org/presentationml/2006/main">
   <p:cSld>
     <p:spTree>
@@ -15544,7 +16556,7 @@
           <a:p>
             <a:fld id="{7E50A921-1625-4E66-8B53-913CC32CAF35}" type="slidenum">
               <a:rPr lang="en-NZ" smtClean="0"/>
-              <a:t>13</a:t>
+              <a:t>14</a:t>
             </a:fld>
             <a:endParaRPr lang="en-NZ"/>
           </a:p>
@@ -15563,7 +16575,7 @@
 </p:sld>
 </file>
 
-<file path=ppt/slides/slide14.xml><?xml version="1.0" encoding="utf-8"?>
+<file path=ppt/slides/slide15.xml><?xml version="1.0" encoding="utf-8"?>
 <p:sld xmlns:a="http://schemas.openxmlformats.org/drawingml/2006/main" xmlns:r="http://schemas.openxmlformats.org/officeDocument/2006/relationships" xmlns:p="http://schemas.openxmlformats.org/presentationml/2006/main">
   <p:cSld>
     <p:spTree>
@@ -15833,7 +16845,7 @@
           <a:p>
             <a:fld id="{7E50A921-1625-4E66-8B53-913CC32CAF35}" type="slidenum">
               <a:rPr lang="en-NZ" smtClean="0"/>
-              <a:t>14</a:t>
+              <a:t>15</a:t>
             </a:fld>
             <a:endParaRPr lang="en-NZ"/>
           </a:p>
@@ -15852,7 +16864,7 @@
 </p:sld>
 </file>
 
-<file path=ppt/slides/slide15.xml><?xml version="1.0" encoding="utf-8"?>
+<file path=ppt/slides/slide16.xml><?xml version="1.0" encoding="utf-8"?>
 <p:sld xmlns:a="http://schemas.openxmlformats.org/drawingml/2006/main" xmlns:r="http://schemas.openxmlformats.org/officeDocument/2006/relationships" xmlns:p="http://schemas.openxmlformats.org/presentationml/2006/main">
   <p:cSld>
     <p:spTree>
@@ -15966,7 +16978,7 @@
           <a:p>
             <a:fld id="{7E50A921-1625-4E66-8B53-913CC32CAF35}" type="slidenum">
               <a:rPr lang="en-NZ" smtClean="0"/>
-              <a:t>15</a:t>
+              <a:t>16</a:t>
             </a:fld>
             <a:endParaRPr lang="en-NZ" dirty="0"/>
           </a:p>
@@ -15985,7 +16997,7 @@
 </p:sld>
 </file>
 
-<file path=ppt/slides/slide16.xml><?xml version="1.0" encoding="utf-8"?>
+<file path=ppt/slides/slide17.xml><?xml version="1.0" encoding="utf-8"?>
 <p:sld xmlns:a="http://schemas.openxmlformats.org/drawingml/2006/main" xmlns:r="http://schemas.openxmlformats.org/officeDocument/2006/relationships" xmlns:p="http://schemas.openxmlformats.org/presentationml/2006/main">
   <p:cSld>
     <p:spTree>
@@ -16088,7 +17100,7 @@
           <a:p>
             <a:fld id="{7E50A921-1625-4E66-8B53-913CC32CAF35}" type="slidenum">
               <a:rPr lang="en-NZ" smtClean="0"/>
-              <a:t>16</a:t>
+              <a:t>17</a:t>
             </a:fld>
             <a:endParaRPr lang="en-NZ" dirty="0"/>
           </a:p>
@@ -17803,7 +18815,7 @@
           </a:bodyPr>
           <a:lstStyle/>
           <a:p>
-            <a:endParaRPr lang="en-US"/>
+            <a:endParaRPr lang="en-US" dirty="0"/>
           </a:p>
         </p:txBody>
       </p:sp>
@@ -17852,6 +18864,160 @@
 </file>
 
 <file path=ppt/slides/slide6.xml><?xml version="1.0" encoding="utf-8"?>
+<p:sld xmlns:a="http://schemas.openxmlformats.org/drawingml/2006/main" xmlns:r="http://schemas.openxmlformats.org/officeDocument/2006/relationships" xmlns:p="http://schemas.openxmlformats.org/presentationml/2006/main">
+  <p:cSld>
+    <p:spTree>
+      <p:nvGrpSpPr>
+        <p:cNvPr id="1" name="">
+          <a:extLst>
+            <a:ext uri="{FF2B5EF4-FFF2-40B4-BE49-F238E27FC236}">
+              <a16:creationId xmlns:a16="http://schemas.microsoft.com/office/drawing/2014/main" id="{F1CC3C87-8424-85D5-D82D-C4B92A36A83A}"/>
+            </a:ext>
+          </a:extLst>
+        </p:cNvPr>
+        <p:cNvGrpSpPr/>
+        <p:nvPr/>
+      </p:nvGrpSpPr>
+      <p:grpSpPr>
+        <a:xfrm>
+          <a:off x="0" y="0"/>
+          <a:ext cx="0" cy="0"/>
+          <a:chOff x="0" y="0"/>
+          <a:chExt cx="0" cy="0"/>
+        </a:xfrm>
+      </p:grpSpPr>
+      <p:sp>
+        <p:nvSpPr>
+          <p:cNvPr id="2" name="Title 1">
+            <a:extLst>
+              <a:ext uri="{FF2B5EF4-FFF2-40B4-BE49-F238E27FC236}">
+                <a16:creationId xmlns:a16="http://schemas.microsoft.com/office/drawing/2014/main" id="{36C2E51D-FA84-C8FF-8BB4-6F33B2922B73}"/>
+              </a:ext>
+            </a:extLst>
+          </p:cNvPr>
+          <p:cNvSpPr>
+            <a:spLocks noGrp="1"/>
+          </p:cNvSpPr>
+          <p:nvPr>
+            <p:ph type="title"/>
+          </p:nvPr>
+        </p:nvSpPr>
+        <p:spPr/>
+        <p:txBody>
+          <a:bodyPr/>
+          <a:lstStyle/>
+          <a:p>
+            <a:r>
+              <a:rPr lang="nl-NL" dirty="0" err="1"/>
+              <a:t>Reality</a:t>
+            </a:r>
+            <a:r>
+              <a:rPr lang="nl-NL" dirty="0"/>
+              <a:t> is more complex - </a:t>
+            </a:r>
+            <a:r>
+              <a:rPr lang="nl-NL" dirty="0" err="1"/>
+              <a:t>hybrid</a:t>
+            </a:r>
+            <a:endParaRPr lang="en-NZ" dirty="0"/>
+          </a:p>
+        </p:txBody>
+      </p:sp>
+      <p:sp>
+        <p:nvSpPr>
+          <p:cNvPr id="3" name="Content Placeholder 2">
+            <a:extLst>
+              <a:ext uri="{FF2B5EF4-FFF2-40B4-BE49-F238E27FC236}">
+                <a16:creationId xmlns:a16="http://schemas.microsoft.com/office/drawing/2014/main" id="{8A960917-3DDD-94AC-F8F2-A0F4C7A53DA6}"/>
+              </a:ext>
+            </a:extLst>
+          </p:cNvPr>
+          <p:cNvSpPr>
+            <a:spLocks noGrp="1"/>
+          </p:cNvSpPr>
+          <p:nvPr>
+            <p:ph idx="1"/>
+          </p:nvPr>
+        </p:nvSpPr>
+        <p:spPr/>
+        <p:txBody>
+          <a:bodyPr/>
+          <a:lstStyle/>
+          <a:p>
+            <a:r>
+              <a:rPr lang="en-NZ" dirty="0"/>
+              <a:t>An interpreter translates source code into machine code line-by-line during execution.</a:t>
+            </a:r>
+          </a:p>
+          <a:p>
+            <a:r>
+              <a:rPr lang="en-NZ" dirty="0"/>
+              <a:t>It does not produce an intermediate executable file; instead, it directly executes the code.</a:t>
+            </a:r>
+          </a:p>
+          <a:p>
+            <a:r>
+              <a:rPr lang="en-NZ" dirty="0"/>
+              <a:t>Each time the program runs, it must be interpreted anew, leading to slower execution compared to compiled code.</a:t>
+            </a:r>
+          </a:p>
+          <a:p>
+            <a:r>
+              <a:rPr lang="en-NZ" dirty="0"/>
+              <a:t>Interpreters are often used in development environments for easier debugging and testing.</a:t>
+            </a:r>
+          </a:p>
+          <a:p>
+            <a:r>
+              <a:rPr lang="en-NZ" dirty="0"/>
+              <a:t>Examples of interpreted languages include Python, JavaScript, and Ruby.</a:t>
+            </a:r>
+          </a:p>
+        </p:txBody>
+      </p:sp>
+      <p:sp>
+        <p:nvSpPr>
+          <p:cNvPr id="4" name="Slide Number Placeholder 3">
+            <a:extLst>
+              <a:ext uri="{FF2B5EF4-FFF2-40B4-BE49-F238E27FC236}">
+                <a16:creationId xmlns:a16="http://schemas.microsoft.com/office/drawing/2014/main" id="{B73F47E7-9BA5-3908-08B9-6A16F12B445C}"/>
+              </a:ext>
+            </a:extLst>
+          </p:cNvPr>
+          <p:cNvSpPr>
+            <a:spLocks noGrp="1"/>
+          </p:cNvSpPr>
+          <p:nvPr>
+            <p:ph type="sldNum" sz="quarter" idx="12"/>
+          </p:nvPr>
+        </p:nvSpPr>
+        <p:spPr/>
+        <p:txBody>
+          <a:bodyPr/>
+          <a:lstStyle/>
+          <a:p>
+            <a:fld id="{7E50A921-1625-4E66-8B53-913CC32CAF35}" type="slidenum">
+              <a:rPr lang="en-NZ" smtClean="0"/>
+              <a:t>6</a:t>
+            </a:fld>
+            <a:endParaRPr lang="en-NZ" dirty="0"/>
+          </a:p>
+        </p:txBody>
+      </p:sp>
+    </p:spTree>
+    <p:extLst>
+      <p:ext uri="{BB962C8B-B14F-4D97-AF65-F5344CB8AC3E}">
+        <p14:creationId xmlns:p14="http://schemas.microsoft.com/office/powerpoint/2010/main" val="2733320088"/>
+      </p:ext>
+    </p:extLst>
+  </p:cSld>
+  <p:clrMapOvr>
+    <a:masterClrMapping/>
+  </p:clrMapOvr>
+</p:sld>
+</file>
+
+<file path=ppt/slides/slide7.xml><?xml version="1.0" encoding="utf-8"?>
 <p:sld xmlns:a="http://schemas.openxmlformats.org/drawingml/2006/main" xmlns:r="http://schemas.openxmlformats.org/officeDocument/2006/relationships" xmlns:p="http://schemas.openxmlformats.org/presentationml/2006/main">
   <p:cSld>
     <p:bg>
@@ -18935,7 +20101,7 @@
                   <a:spcPts val="600"/>
                 </a:spcAft>
               </a:pPr>
-              <a:t>6</a:t>
+              <a:t>7</a:t>
             </a:fld>
             <a:endParaRPr lang="en-NZ">
               <a:solidFill>
@@ -18989,7 +20155,7 @@
 </p:sld>
 </file>
 
-<file path=ppt/slides/slide7.xml><?xml version="1.0" encoding="utf-8"?>
+<file path=ppt/slides/slide8.xml><?xml version="1.0" encoding="utf-8"?>
 <p:sld xmlns:a="http://schemas.openxmlformats.org/drawingml/2006/main" xmlns:r="http://schemas.openxmlformats.org/officeDocument/2006/relationships" xmlns:p="http://schemas.openxmlformats.org/presentationml/2006/main">
   <p:cSld>
     <p:spTree>
@@ -19069,7 +20235,7 @@
           <a:p>
             <a:fld id="{7E50A921-1625-4E66-8B53-913CC32CAF35}" type="slidenum">
               <a:rPr lang="en-NZ" smtClean="0"/>
-              <a:t>7</a:t>
+              <a:t>8</a:t>
             </a:fld>
             <a:endParaRPr lang="en-NZ"/>
           </a:p>
@@ -19277,7 +20443,7 @@
 </p:sld>
 </file>
 
-<file path=ppt/slides/slide8.xml><?xml version="1.0" encoding="utf-8"?>
+<file path=ppt/slides/slide9.xml><?xml version="1.0" encoding="utf-8"?>
 <p:sld xmlns:a="http://schemas.openxmlformats.org/drawingml/2006/main" xmlns:r="http://schemas.openxmlformats.org/officeDocument/2006/relationships" xmlns:p="http://schemas.openxmlformats.org/presentationml/2006/main">
   <p:cSld>
     <p:bg>
@@ -20330,7 +21496,7 @@
                   <a:spcPts val="600"/>
                 </a:spcAft>
               </a:pPr>
-              <a:t>8</a:t>
+              <a:t>9</a:t>
             </a:fld>
             <a:endParaRPr lang="en-US">
               <a:solidFill>
@@ -20437,1144 +21603,6 @@
     <p:extLst>
       <p:ext uri="{BB962C8B-B14F-4D97-AF65-F5344CB8AC3E}">
         <p14:creationId xmlns:p14="http://schemas.microsoft.com/office/powerpoint/2010/main" val="3320594642"/>
-      </p:ext>
-    </p:extLst>
-  </p:cSld>
-  <p:clrMapOvr>
-    <a:overrideClrMapping bg1="lt1" tx1="dk1" bg2="lt2" tx2="dk2" accent1="accent1" accent2="accent2" accent3="accent3" accent4="accent4" accent5="accent5" accent6="accent6" hlink="hlink" folHlink="folHlink"/>
-  </p:clrMapOvr>
-</p:sld>
-</file>
-
-<file path=ppt/slides/slide9.xml><?xml version="1.0" encoding="utf-8"?>
-<p:sld xmlns:a="http://schemas.openxmlformats.org/drawingml/2006/main" xmlns:r="http://schemas.openxmlformats.org/officeDocument/2006/relationships" xmlns:p="http://schemas.openxmlformats.org/presentationml/2006/main">
-  <p:cSld>
-    <p:bg>
-      <p:bgPr>
-        <a:solidFill>
-          <a:schemeClr val="bg1"/>
-        </a:solidFill>
-        <a:effectLst/>
-      </p:bgPr>
-    </p:bg>
-    <p:spTree>
-      <p:nvGrpSpPr>
-        <p:cNvPr id="1" name=""/>
-        <p:cNvGrpSpPr/>
-        <p:nvPr/>
-      </p:nvGrpSpPr>
-      <p:grpSpPr>
-        <a:xfrm>
-          <a:off x="0" y="0"/>
-          <a:ext cx="0" cy="0"/>
-          <a:chOff x="0" y="0"/>
-          <a:chExt cx="0" cy="0"/>
-        </a:xfrm>
-      </p:grpSpPr>
-      <p:sp>
-        <p:nvSpPr>
-          <p:cNvPr id="10" name="Rectangle 9">
-            <a:extLst>
-              <a:ext uri="{FF2B5EF4-FFF2-40B4-BE49-F238E27FC236}">
-                <a16:creationId xmlns:a16="http://schemas.microsoft.com/office/drawing/2014/main" id="{4E78424C-6FD0-41F8-9CAA-5DC19C42359F}"/>
-              </a:ext>
-              <a:ext uri="{C183D7F6-B498-43B3-948B-1728B52AA6E4}">
-                <adec:decorative xmlns:adec="http://schemas.microsoft.com/office/drawing/2017/decorative" val="1"/>
-              </a:ext>
-            </a:extLst>
-          </p:cNvPr>
-          <p:cNvSpPr>
-            <a:spLocks noGrp="1" noRot="1" noChangeAspect="1" noMove="1" noResize="1" noEditPoints="1" noAdjustHandles="1" noChangeArrowheads="1" noChangeShapeType="1" noTextEdit="1"/>
-          </p:cNvSpPr>
-          <p:nvPr>
-            <p:extLst>
-              <p:ext uri="{386F3935-93C4-4BCD-93E2-E3B085C9AB24}">
-                <p16:designElem xmlns:p16="http://schemas.microsoft.com/office/powerpoint/2015/main" val="1"/>
-              </p:ext>
-            </p:extLst>
-          </p:nvPr>
-        </p:nvSpPr>
-        <p:spPr>
-          <a:xfrm>
-            <a:off x="0" y="-1"/>
-            <a:ext cx="12192000" cy="6858001"/>
-          </a:xfrm>
-          <a:prstGeom prst="rect">
-            <a:avLst/>
-          </a:prstGeom>
-          <a:ln>
-            <a:noFill/>
-          </a:ln>
-        </p:spPr>
-        <p:style>
-          <a:lnRef idx="2">
-            <a:schemeClr val="accent1">
-              <a:shade val="50000"/>
-            </a:schemeClr>
-          </a:lnRef>
-          <a:fillRef idx="1003">
-            <a:schemeClr val="dk2"/>
-          </a:fillRef>
-          <a:effectRef idx="0">
-            <a:schemeClr val="accent1"/>
-          </a:effectRef>
-          <a:fontRef idx="minor">
-            <a:schemeClr val="lt1"/>
-          </a:fontRef>
-        </p:style>
-        <p:txBody>
-          <a:bodyPr rtlCol="0" anchor="ctr"/>
-          <a:lstStyle/>
-          <a:p>
-            <a:pPr algn="ctr"/>
-            <a:endParaRPr lang="en-US"/>
-          </a:p>
-        </p:txBody>
-      </p:sp>
-      <p:sp>
-        <p:nvSpPr>
-          <p:cNvPr id="2" name="Title 1">
-            <a:extLst>
-              <a:ext uri="{FF2B5EF4-FFF2-40B4-BE49-F238E27FC236}">
-                <a16:creationId xmlns:a16="http://schemas.microsoft.com/office/drawing/2014/main" id="{800C4E1B-00E5-859C-2C85-775346947D8A}"/>
-              </a:ext>
-            </a:extLst>
-          </p:cNvPr>
-          <p:cNvSpPr>
-            <a:spLocks noGrp="1"/>
-          </p:cNvSpPr>
-          <p:nvPr>
-            <p:ph type="title"/>
-          </p:nvPr>
-        </p:nvSpPr>
-        <p:spPr>
-          <a:xfrm>
-            <a:off x="643855" y="1447800"/>
-            <a:ext cx="3108626" cy="4572000"/>
-          </a:xfrm>
-        </p:spPr>
-        <p:txBody>
-          <a:bodyPr anchor="ctr">
-            <a:normAutofit/>
-          </a:bodyPr>
-          <a:lstStyle/>
-          <a:p>
-            <a:r>
-              <a:rPr lang="en-NZ" sz="3200">
-                <a:solidFill>
-                  <a:srgbClr val="F2F2F2"/>
-                </a:solidFill>
-              </a:rPr>
-              <a:t>What are use cases for JIT compiler?</a:t>
-            </a:r>
-            <a:br>
-              <a:rPr lang="en-NZ" sz="3200">
-                <a:solidFill>
-                  <a:srgbClr val="F2F2F2"/>
-                </a:solidFill>
-              </a:rPr>
-            </a:br>
-            <a:endParaRPr lang="en-NZ" sz="3200">
-              <a:solidFill>
-                <a:srgbClr val="F2F2F2"/>
-              </a:solidFill>
-            </a:endParaRPr>
-          </a:p>
-        </p:txBody>
-      </p:sp>
-      <p:sp>
-        <p:nvSpPr>
-          <p:cNvPr id="12" name="Freeform: Shape 11">
-            <a:extLst>
-              <a:ext uri="{FF2B5EF4-FFF2-40B4-BE49-F238E27FC236}">
-                <a16:creationId xmlns:a16="http://schemas.microsoft.com/office/drawing/2014/main" id="{DD136760-57DC-4301-8BEA-B71AD2D13905}"/>
-              </a:ext>
-              <a:ext uri="{C183D7F6-B498-43B3-948B-1728B52AA6E4}">
-                <adec:decorative xmlns:adec="http://schemas.microsoft.com/office/drawing/2017/decorative" val="1"/>
-              </a:ext>
-            </a:extLst>
-          </p:cNvPr>
-          <p:cNvSpPr>
-            <a:spLocks noGrp="1" noRot="1" noChangeAspect="1" noMove="1" noResize="1" noEditPoints="1" noAdjustHandles="1" noChangeArrowheads="1" noChangeShapeType="1" noTextEdit="1"/>
-          </p:cNvSpPr>
-          <p:nvPr>
-            <p:extLst>
-              <p:ext uri="{386F3935-93C4-4BCD-93E2-E3B085C9AB24}">
-                <p16:designElem xmlns:p16="http://schemas.microsoft.com/office/powerpoint/2015/main" val="1"/>
-              </p:ext>
-            </p:extLst>
-          </p:nvPr>
-        </p:nvSpPr>
-        <p:spPr>
-          <a:xfrm>
-            <a:off x="4161310" y="0"/>
-            <a:ext cx="8030690" cy="6858000"/>
-          </a:xfrm>
-          <a:custGeom>
-            <a:avLst/>
-            <a:gdLst>
-              <a:gd name="connsiteX0" fmla="*/ 1176 w 8030690"/>
-              <a:gd name="connsiteY0" fmla="*/ 0 h 6858000"/>
-              <a:gd name="connsiteX1" fmla="*/ 1344715 w 8030690"/>
-              <a:gd name="connsiteY1" fmla="*/ 0 h 6858000"/>
-              <a:gd name="connsiteX2" fmla="*/ 1344715 w 8030690"/>
-              <a:gd name="connsiteY2" fmla="*/ 0 h 6858000"/>
-              <a:gd name="connsiteX3" fmla="*/ 8030690 w 8030690"/>
-              <a:gd name="connsiteY3" fmla="*/ 0 h 6858000"/>
-              <a:gd name="connsiteX4" fmla="*/ 8030690 w 8030690"/>
-              <a:gd name="connsiteY4" fmla="*/ 6858000 h 6858000"/>
-              <a:gd name="connsiteX5" fmla="*/ 477746 w 8030690"/>
-              <a:gd name="connsiteY5" fmla="*/ 6858000 h 6858000"/>
-              <a:gd name="connsiteX6" fmla="*/ 477746 w 8030690"/>
-              <a:gd name="connsiteY6" fmla="*/ 6858000 h 6858000"/>
-              <a:gd name="connsiteX7" fmla="*/ 0 w 8030690"/>
-              <a:gd name="connsiteY7" fmla="*/ 6858000 h 6858000"/>
-              <a:gd name="connsiteX8" fmla="*/ 5883 w 8030690"/>
-              <a:gd name="connsiteY8" fmla="*/ 6817538 h 6858000"/>
-              <a:gd name="connsiteX9" fmla="*/ 23196 w 8030690"/>
-              <a:gd name="connsiteY9" fmla="*/ 6698894 h 6858000"/>
-              <a:gd name="connsiteX10" fmla="*/ 35298 w 8030690"/>
-              <a:gd name="connsiteY10" fmla="*/ 6612483 h 6858000"/>
-              <a:gd name="connsiteX11" fmla="*/ 48073 w 8030690"/>
-              <a:gd name="connsiteY11" fmla="*/ 6509613 h 6858000"/>
-              <a:gd name="connsiteX12" fmla="*/ 63369 w 8030690"/>
-              <a:gd name="connsiteY12" fmla="*/ 6387541 h 6858000"/>
-              <a:gd name="connsiteX13" fmla="*/ 79506 w 8030690"/>
-              <a:gd name="connsiteY13" fmla="*/ 6252438 h 6858000"/>
-              <a:gd name="connsiteX14" fmla="*/ 96483 w 8030690"/>
-              <a:gd name="connsiteY14" fmla="*/ 6100191 h 6858000"/>
-              <a:gd name="connsiteX15" fmla="*/ 114468 w 8030690"/>
-              <a:gd name="connsiteY15" fmla="*/ 5934227 h 6858000"/>
-              <a:gd name="connsiteX16" fmla="*/ 132454 w 8030690"/>
-              <a:gd name="connsiteY16" fmla="*/ 5753862 h 6858000"/>
-              <a:gd name="connsiteX17" fmla="*/ 150775 w 8030690"/>
-              <a:gd name="connsiteY17" fmla="*/ 5561838 h 6858000"/>
-              <a:gd name="connsiteX18" fmla="*/ 167752 w 8030690"/>
-              <a:gd name="connsiteY18" fmla="*/ 5354726 h 6858000"/>
-              <a:gd name="connsiteX19" fmla="*/ 184057 w 8030690"/>
-              <a:gd name="connsiteY19" fmla="*/ 5138013 h 6858000"/>
-              <a:gd name="connsiteX20" fmla="*/ 198849 w 8030690"/>
-              <a:gd name="connsiteY20" fmla="*/ 4908956 h 6858000"/>
-              <a:gd name="connsiteX21" fmla="*/ 212968 w 8030690"/>
-              <a:gd name="connsiteY21" fmla="*/ 4670298 h 6858000"/>
-              <a:gd name="connsiteX22" fmla="*/ 226248 w 8030690"/>
-              <a:gd name="connsiteY22" fmla="*/ 4421352 h 6858000"/>
-              <a:gd name="connsiteX23" fmla="*/ 230954 w 8030690"/>
-              <a:gd name="connsiteY23" fmla="*/ 4293793 h 6858000"/>
-              <a:gd name="connsiteX24" fmla="*/ 236165 w 8030690"/>
-              <a:gd name="connsiteY24" fmla="*/ 4163491 h 6858000"/>
-              <a:gd name="connsiteX25" fmla="*/ 241039 w 8030690"/>
-              <a:gd name="connsiteY25" fmla="*/ 4031132 h 6858000"/>
-              <a:gd name="connsiteX26" fmla="*/ 244233 w 8030690"/>
-              <a:gd name="connsiteY26" fmla="*/ 3898087 h 6858000"/>
-              <a:gd name="connsiteX27" fmla="*/ 247091 w 8030690"/>
-              <a:gd name="connsiteY27" fmla="*/ 3762298 h 6858000"/>
-              <a:gd name="connsiteX28" fmla="*/ 250116 w 8030690"/>
-              <a:gd name="connsiteY28" fmla="*/ 3625138 h 6858000"/>
-              <a:gd name="connsiteX29" fmla="*/ 252133 w 8030690"/>
-              <a:gd name="connsiteY29" fmla="*/ 3485235 h 6858000"/>
-              <a:gd name="connsiteX30" fmla="*/ 252133 w 8030690"/>
-              <a:gd name="connsiteY30" fmla="*/ 3343960 h 6858000"/>
-              <a:gd name="connsiteX31" fmla="*/ 253142 w 8030690"/>
-              <a:gd name="connsiteY31" fmla="*/ 3201314 h 6858000"/>
-              <a:gd name="connsiteX32" fmla="*/ 252133 w 8030690"/>
-              <a:gd name="connsiteY32" fmla="*/ 3057296 h 6858000"/>
-              <a:gd name="connsiteX33" fmla="*/ 250116 w 8030690"/>
-              <a:gd name="connsiteY33" fmla="*/ 2911221 h 6858000"/>
-              <a:gd name="connsiteX34" fmla="*/ 248267 w 8030690"/>
-              <a:gd name="connsiteY34" fmla="*/ 2765145 h 6858000"/>
-              <a:gd name="connsiteX35" fmla="*/ 244233 w 8030690"/>
-              <a:gd name="connsiteY35" fmla="*/ 2617013 h 6858000"/>
-              <a:gd name="connsiteX36" fmla="*/ 240031 w 8030690"/>
-              <a:gd name="connsiteY36" fmla="*/ 2467508 h 6858000"/>
-              <a:gd name="connsiteX37" fmla="*/ 235156 w 8030690"/>
-              <a:gd name="connsiteY37" fmla="*/ 2318004 h 6858000"/>
-              <a:gd name="connsiteX38" fmla="*/ 228265 w 8030690"/>
-              <a:gd name="connsiteY38" fmla="*/ 2167128 h 6858000"/>
-              <a:gd name="connsiteX39" fmla="*/ 220028 w 8030690"/>
-              <a:gd name="connsiteY39" fmla="*/ 2014880 h 6858000"/>
-              <a:gd name="connsiteX40" fmla="*/ 212128 w 8030690"/>
-              <a:gd name="connsiteY40" fmla="*/ 1861947 h 6858000"/>
-              <a:gd name="connsiteX41" fmla="*/ 202043 w 8030690"/>
-              <a:gd name="connsiteY41" fmla="*/ 1709013 h 6858000"/>
-              <a:gd name="connsiteX42" fmla="*/ 189940 w 8030690"/>
-              <a:gd name="connsiteY42" fmla="*/ 1554023 h 6858000"/>
-              <a:gd name="connsiteX43" fmla="*/ 177838 w 8030690"/>
-              <a:gd name="connsiteY43" fmla="*/ 1401089 h 6858000"/>
-              <a:gd name="connsiteX44" fmla="*/ 163886 w 8030690"/>
-              <a:gd name="connsiteY44" fmla="*/ 1245413 h 6858000"/>
-              <a:gd name="connsiteX45" fmla="*/ 148590 w 8030690"/>
-              <a:gd name="connsiteY45" fmla="*/ 1089050 h 6858000"/>
-              <a:gd name="connsiteX46" fmla="*/ 132454 w 8030690"/>
-              <a:gd name="connsiteY46" fmla="*/ 934745 h 6858000"/>
-              <a:gd name="connsiteX47" fmla="*/ 113628 w 8030690"/>
-              <a:gd name="connsiteY47" fmla="*/ 778383 h 6858000"/>
-              <a:gd name="connsiteX48" fmla="*/ 93457 w 8030690"/>
-              <a:gd name="connsiteY48" fmla="*/ 622706 h 6858000"/>
-              <a:gd name="connsiteX49" fmla="*/ 73454 w 8030690"/>
-              <a:gd name="connsiteY49" fmla="*/ 466344 h 6858000"/>
-              <a:gd name="connsiteX50" fmla="*/ 50090 w 8030690"/>
-              <a:gd name="connsiteY50" fmla="*/ 310667 h 6858000"/>
-              <a:gd name="connsiteX51" fmla="*/ 26222 w 8030690"/>
-              <a:gd name="connsiteY51" fmla="*/ 155676 h 6858000"/>
-            </a:gdLst>
-            <a:ahLst/>
-            <a:cxnLst>
-              <a:cxn ang="0">
-                <a:pos x="connsiteX0" y="connsiteY0"/>
-              </a:cxn>
-              <a:cxn ang="0">
-                <a:pos x="connsiteX1" y="connsiteY1"/>
-              </a:cxn>
-              <a:cxn ang="0">
-                <a:pos x="connsiteX2" y="connsiteY2"/>
-              </a:cxn>
-              <a:cxn ang="0">
-                <a:pos x="connsiteX3" y="connsiteY3"/>
-              </a:cxn>
-              <a:cxn ang="0">
-                <a:pos x="connsiteX4" y="connsiteY4"/>
-              </a:cxn>
-              <a:cxn ang="0">
-                <a:pos x="connsiteX5" y="connsiteY5"/>
-              </a:cxn>
-              <a:cxn ang="0">
-                <a:pos x="connsiteX6" y="connsiteY6"/>
-              </a:cxn>
-              <a:cxn ang="0">
-                <a:pos x="connsiteX7" y="connsiteY7"/>
-              </a:cxn>
-              <a:cxn ang="0">
-                <a:pos x="connsiteX8" y="connsiteY8"/>
-              </a:cxn>
-              <a:cxn ang="0">
-                <a:pos x="connsiteX9" y="connsiteY9"/>
-              </a:cxn>
-              <a:cxn ang="0">
-                <a:pos x="connsiteX10" y="connsiteY10"/>
-              </a:cxn>
-              <a:cxn ang="0">
-                <a:pos x="connsiteX11" y="connsiteY11"/>
-              </a:cxn>
-              <a:cxn ang="0">
-                <a:pos x="connsiteX12" y="connsiteY12"/>
-              </a:cxn>
-              <a:cxn ang="0">
-                <a:pos x="connsiteX13" y="connsiteY13"/>
-              </a:cxn>
-              <a:cxn ang="0">
-                <a:pos x="connsiteX14" y="connsiteY14"/>
-              </a:cxn>
-              <a:cxn ang="0">
-                <a:pos x="connsiteX15" y="connsiteY15"/>
-              </a:cxn>
-              <a:cxn ang="0">
-                <a:pos x="connsiteX16" y="connsiteY16"/>
-              </a:cxn>
-              <a:cxn ang="0">
-                <a:pos x="connsiteX17" y="connsiteY17"/>
-              </a:cxn>
-              <a:cxn ang="0">
-                <a:pos x="connsiteX18" y="connsiteY18"/>
-              </a:cxn>
-              <a:cxn ang="0">
-                <a:pos x="connsiteX19" y="connsiteY19"/>
-              </a:cxn>
-              <a:cxn ang="0">
-                <a:pos x="connsiteX20" y="connsiteY20"/>
-              </a:cxn>
-              <a:cxn ang="0">
-                <a:pos x="connsiteX21" y="connsiteY21"/>
-              </a:cxn>
-              <a:cxn ang="0">
-                <a:pos x="connsiteX22" y="connsiteY22"/>
-              </a:cxn>
-              <a:cxn ang="0">
-                <a:pos x="connsiteX23" y="connsiteY23"/>
-              </a:cxn>
-              <a:cxn ang="0">
-                <a:pos x="connsiteX24" y="connsiteY24"/>
-              </a:cxn>
-              <a:cxn ang="0">
-                <a:pos x="connsiteX25" y="connsiteY25"/>
-              </a:cxn>
-              <a:cxn ang="0">
-                <a:pos x="connsiteX26" y="connsiteY26"/>
-              </a:cxn>
-              <a:cxn ang="0">
-                <a:pos x="connsiteX27" y="connsiteY27"/>
-              </a:cxn>
-              <a:cxn ang="0">
-                <a:pos x="connsiteX28" y="connsiteY28"/>
-              </a:cxn>
-              <a:cxn ang="0">
-                <a:pos x="connsiteX29" y="connsiteY29"/>
-              </a:cxn>
-              <a:cxn ang="0">
-                <a:pos x="connsiteX30" y="connsiteY30"/>
-              </a:cxn>
-              <a:cxn ang="0">
-                <a:pos x="connsiteX31" y="connsiteY31"/>
-              </a:cxn>
-              <a:cxn ang="0">
-                <a:pos x="connsiteX32" y="connsiteY32"/>
-              </a:cxn>
-              <a:cxn ang="0">
-                <a:pos x="connsiteX33" y="connsiteY33"/>
-              </a:cxn>
-              <a:cxn ang="0">
-                <a:pos x="connsiteX34" y="connsiteY34"/>
-              </a:cxn>
-              <a:cxn ang="0">
-                <a:pos x="connsiteX35" y="connsiteY35"/>
-              </a:cxn>
-              <a:cxn ang="0">
-                <a:pos x="connsiteX36" y="connsiteY36"/>
-              </a:cxn>
-              <a:cxn ang="0">
-                <a:pos x="connsiteX37" y="connsiteY37"/>
-              </a:cxn>
-              <a:cxn ang="0">
-                <a:pos x="connsiteX38" y="connsiteY38"/>
-              </a:cxn>
-              <a:cxn ang="0">
-                <a:pos x="connsiteX39" y="connsiteY39"/>
-              </a:cxn>
-              <a:cxn ang="0">
-                <a:pos x="connsiteX40" y="connsiteY40"/>
-              </a:cxn>
-              <a:cxn ang="0">
-                <a:pos x="connsiteX41" y="connsiteY41"/>
-              </a:cxn>
-              <a:cxn ang="0">
-                <a:pos x="connsiteX42" y="connsiteY42"/>
-              </a:cxn>
-              <a:cxn ang="0">
-                <a:pos x="connsiteX43" y="connsiteY43"/>
-              </a:cxn>
-              <a:cxn ang="0">
-                <a:pos x="connsiteX44" y="connsiteY44"/>
-              </a:cxn>
-              <a:cxn ang="0">
-                <a:pos x="connsiteX45" y="connsiteY45"/>
-              </a:cxn>
-              <a:cxn ang="0">
-                <a:pos x="connsiteX46" y="connsiteY46"/>
-              </a:cxn>
-              <a:cxn ang="0">
-                <a:pos x="connsiteX47" y="connsiteY47"/>
-              </a:cxn>
-              <a:cxn ang="0">
-                <a:pos x="connsiteX48" y="connsiteY48"/>
-              </a:cxn>
-              <a:cxn ang="0">
-                <a:pos x="connsiteX49" y="connsiteY49"/>
-              </a:cxn>
-              <a:cxn ang="0">
-                <a:pos x="connsiteX50" y="connsiteY50"/>
-              </a:cxn>
-              <a:cxn ang="0">
-                <a:pos x="connsiteX51" y="connsiteY51"/>
-              </a:cxn>
-            </a:cxnLst>
-            <a:rect l="l" t="t" r="r" b="b"/>
-            <a:pathLst>
-              <a:path w="8030690" h="6858000">
-                <a:moveTo>
-                  <a:pt x="1176" y="0"/>
-                </a:moveTo>
-                <a:lnTo>
-                  <a:pt x="1344715" y="0"/>
-                </a:lnTo>
-                <a:lnTo>
-                  <a:pt x="1344715" y="0"/>
-                </a:lnTo>
-                <a:lnTo>
-                  <a:pt x="8030690" y="0"/>
-                </a:lnTo>
-                <a:lnTo>
-                  <a:pt x="8030690" y="6858000"/>
-                </a:lnTo>
-                <a:lnTo>
-                  <a:pt x="477746" y="6858000"/>
-                </a:lnTo>
-                <a:lnTo>
-                  <a:pt x="477746" y="6858000"/>
-                </a:lnTo>
-                <a:lnTo>
-                  <a:pt x="0" y="6858000"/>
-                </a:lnTo>
-                <a:lnTo>
-                  <a:pt x="5883" y="6817538"/>
-                </a:lnTo>
-                <a:lnTo>
-                  <a:pt x="23196" y="6698894"/>
-                </a:lnTo>
-                <a:lnTo>
-                  <a:pt x="35298" y="6612483"/>
-                </a:lnTo>
-                <a:lnTo>
-                  <a:pt x="48073" y="6509613"/>
-                </a:lnTo>
-                <a:lnTo>
-                  <a:pt x="63369" y="6387541"/>
-                </a:lnTo>
-                <a:lnTo>
-                  <a:pt x="79506" y="6252438"/>
-                </a:lnTo>
-                <a:lnTo>
-                  <a:pt x="96483" y="6100191"/>
-                </a:lnTo>
-                <a:lnTo>
-                  <a:pt x="114468" y="5934227"/>
-                </a:lnTo>
-                <a:lnTo>
-                  <a:pt x="132454" y="5753862"/>
-                </a:lnTo>
-                <a:lnTo>
-                  <a:pt x="150775" y="5561838"/>
-                </a:lnTo>
-                <a:lnTo>
-                  <a:pt x="167752" y="5354726"/>
-                </a:lnTo>
-                <a:lnTo>
-                  <a:pt x="184057" y="5138013"/>
-                </a:lnTo>
-                <a:lnTo>
-                  <a:pt x="198849" y="4908956"/>
-                </a:lnTo>
-                <a:lnTo>
-                  <a:pt x="212968" y="4670298"/>
-                </a:lnTo>
-                <a:lnTo>
-                  <a:pt x="226248" y="4421352"/>
-                </a:lnTo>
-                <a:lnTo>
-                  <a:pt x="230954" y="4293793"/>
-                </a:lnTo>
-                <a:lnTo>
-                  <a:pt x="236165" y="4163491"/>
-                </a:lnTo>
-                <a:lnTo>
-                  <a:pt x="241039" y="4031132"/>
-                </a:lnTo>
-                <a:lnTo>
-                  <a:pt x="244233" y="3898087"/>
-                </a:lnTo>
-                <a:lnTo>
-                  <a:pt x="247091" y="3762298"/>
-                </a:lnTo>
-                <a:lnTo>
-                  <a:pt x="250116" y="3625138"/>
-                </a:lnTo>
-                <a:lnTo>
-                  <a:pt x="252133" y="3485235"/>
-                </a:lnTo>
-                <a:lnTo>
-                  <a:pt x="252133" y="3343960"/>
-                </a:lnTo>
-                <a:lnTo>
-                  <a:pt x="253142" y="3201314"/>
-                </a:lnTo>
-                <a:lnTo>
-                  <a:pt x="252133" y="3057296"/>
-                </a:lnTo>
-                <a:lnTo>
-                  <a:pt x="250116" y="2911221"/>
-                </a:lnTo>
-                <a:lnTo>
-                  <a:pt x="248267" y="2765145"/>
-                </a:lnTo>
-                <a:lnTo>
-                  <a:pt x="244233" y="2617013"/>
-                </a:lnTo>
-                <a:lnTo>
-                  <a:pt x="240031" y="2467508"/>
-                </a:lnTo>
-                <a:lnTo>
-                  <a:pt x="235156" y="2318004"/>
-                </a:lnTo>
-                <a:lnTo>
-                  <a:pt x="228265" y="2167128"/>
-                </a:lnTo>
-                <a:lnTo>
-                  <a:pt x="220028" y="2014880"/>
-                </a:lnTo>
-                <a:lnTo>
-                  <a:pt x="212128" y="1861947"/>
-                </a:lnTo>
-                <a:lnTo>
-                  <a:pt x="202043" y="1709013"/>
-                </a:lnTo>
-                <a:lnTo>
-                  <a:pt x="189940" y="1554023"/>
-                </a:lnTo>
-                <a:lnTo>
-                  <a:pt x="177838" y="1401089"/>
-                </a:lnTo>
-                <a:lnTo>
-                  <a:pt x="163886" y="1245413"/>
-                </a:lnTo>
-                <a:lnTo>
-                  <a:pt x="148590" y="1089050"/>
-                </a:lnTo>
-                <a:lnTo>
-                  <a:pt x="132454" y="934745"/>
-                </a:lnTo>
-                <a:lnTo>
-                  <a:pt x="113628" y="778383"/>
-                </a:lnTo>
-                <a:lnTo>
-                  <a:pt x="93457" y="622706"/>
-                </a:lnTo>
-                <a:lnTo>
-                  <a:pt x="73454" y="466344"/>
-                </a:lnTo>
-                <a:lnTo>
-                  <a:pt x="50090" y="310667"/>
-                </a:lnTo>
-                <a:lnTo>
-                  <a:pt x="26222" y="155676"/>
-                </a:lnTo>
-                <a:close/>
-              </a:path>
-            </a:pathLst>
-          </a:custGeom>
-          <a:solidFill>
-            <a:schemeClr val="bg1"/>
-          </a:solidFill>
-          <a:ln>
-            <a:noFill/>
-          </a:ln>
-        </p:spPr>
-        <p:style>
-          <a:lnRef idx="2">
-            <a:schemeClr val="accent1">
-              <a:shade val="50000"/>
-            </a:schemeClr>
-          </a:lnRef>
-          <a:fillRef idx="1">
-            <a:schemeClr val="accent1"/>
-          </a:fillRef>
-          <a:effectRef idx="0">
-            <a:schemeClr val="accent1"/>
-          </a:effectRef>
-          <a:fontRef idx="minor">
-            <a:schemeClr val="lt1"/>
-          </a:fontRef>
-        </p:style>
-        <p:txBody>
-          <a:bodyPr wrap="square" rtlCol="0" anchor="ctr">
-            <a:noAutofit/>
-          </a:bodyPr>
-          <a:lstStyle/>
-          <a:p>
-            <a:pPr algn="ctr"/>
-            <a:endParaRPr lang="en-US"/>
-          </a:p>
-        </p:txBody>
-      </p:sp>
-      <p:sp>
-        <p:nvSpPr>
-          <p:cNvPr id="14" name="Freeform 11">
-            <a:extLst>
-              <a:ext uri="{FF2B5EF4-FFF2-40B4-BE49-F238E27FC236}">
-                <a16:creationId xmlns:a16="http://schemas.microsoft.com/office/drawing/2014/main" id="{BDC58DEA-1307-4F44-AD47-E613D8B76A89}"/>
-              </a:ext>
-              <a:ext uri="{C183D7F6-B498-43B3-948B-1728B52AA6E4}">
-                <adec:decorative xmlns:adec="http://schemas.microsoft.com/office/drawing/2017/decorative" val="1"/>
-              </a:ext>
-            </a:extLst>
-          </p:cNvPr>
-          <p:cNvSpPr>
-            <a:spLocks noGrp="1" noRot="1" noChangeAspect="1" noMove="1" noResize="1" noEditPoints="1" noAdjustHandles="1" noChangeArrowheads="1" noChangeShapeType="1" noTextEdit="1"/>
-          </p:cNvSpPr>
-          <p:nvPr>
-            <p:extLst>
-              <p:ext uri="{386F3935-93C4-4BCD-93E2-E3B085C9AB24}">
-                <p16:designElem xmlns:p16="http://schemas.microsoft.com/office/powerpoint/2015/main" val="1"/>
-              </p:ext>
-            </p:extLst>
-          </p:nvPr>
-        </p:nvSpPr>
-        <p:spPr>
-          <a:xfrm>
-            <a:off x="3948110" y="-1"/>
-            <a:ext cx="559472" cy="3709642"/>
-          </a:xfrm>
-          <a:custGeom>
-            <a:avLst/>
-            <a:gdLst>
-              <a:gd name="connsiteX0" fmla="*/ 0 w 559472"/>
-              <a:gd name="connsiteY0" fmla="*/ 0 h 3709642"/>
-              <a:gd name="connsiteX1" fmla="*/ 473952 w 559472"/>
-              <a:gd name="connsiteY1" fmla="*/ 0 h 3709642"/>
-              <a:gd name="connsiteX2" fmla="*/ 485840 w 559472"/>
-              <a:gd name="connsiteY2" fmla="*/ 161194 h 3709642"/>
-              <a:gd name="connsiteX3" fmla="*/ 523949 w 559472"/>
-              <a:gd name="connsiteY3" fmla="*/ 3672197 h 3709642"/>
-              <a:gd name="connsiteX4" fmla="*/ 454748 w 559472"/>
-              <a:gd name="connsiteY4" fmla="*/ 3709642 h 3709642"/>
-              <a:gd name="connsiteX5" fmla="*/ 448224 w 559472"/>
-              <a:gd name="connsiteY5" fmla="*/ 3510471 h 3709642"/>
-              <a:gd name="connsiteX6" fmla="*/ 443564 w 559472"/>
-              <a:gd name="connsiteY6" fmla="*/ 3408563 h 3709642"/>
-              <a:gd name="connsiteX7" fmla="*/ 438902 w 559472"/>
-              <a:gd name="connsiteY7" fmla="*/ 3304407 h 3709642"/>
-              <a:gd name="connsiteX8" fmla="*/ 433941 w 559472"/>
-              <a:gd name="connsiteY8" fmla="*/ 3198777 h 3709642"/>
-              <a:gd name="connsiteX9" fmla="*/ 427584 w 559472"/>
-              <a:gd name="connsiteY9" fmla="*/ 3092510 h 3709642"/>
-              <a:gd name="connsiteX10" fmla="*/ 420988 w 559472"/>
-              <a:gd name="connsiteY10" fmla="*/ 2984390 h 3709642"/>
-              <a:gd name="connsiteX11" fmla="*/ 414330 w 559472"/>
-              <a:gd name="connsiteY11" fmla="*/ 2874401 h 3709642"/>
-              <a:gd name="connsiteX12" fmla="*/ 406840 w 559472"/>
-              <a:gd name="connsiteY12" fmla="*/ 2762980 h 3709642"/>
-              <a:gd name="connsiteX13" fmla="*/ 397745 w 559472"/>
-              <a:gd name="connsiteY13" fmla="*/ 2650566 h 3709642"/>
-              <a:gd name="connsiteX14" fmla="*/ 389154 w 559472"/>
-              <a:gd name="connsiteY14" fmla="*/ 2536612 h 3709642"/>
-              <a:gd name="connsiteX15" fmla="*/ 379225 w 559472"/>
-              <a:gd name="connsiteY15" fmla="*/ 2421642 h 3709642"/>
-              <a:gd name="connsiteX16" fmla="*/ 368316 w 559472"/>
-              <a:gd name="connsiteY16" fmla="*/ 2305627 h 3709642"/>
-              <a:gd name="connsiteX17" fmla="*/ 357466 w 559472"/>
-              <a:gd name="connsiteY17" fmla="*/ 2189233 h 3709642"/>
-              <a:gd name="connsiteX18" fmla="*/ 344982 w 559472"/>
-              <a:gd name="connsiteY18" fmla="*/ 2071473 h 3709642"/>
-              <a:gd name="connsiteX19" fmla="*/ 332466 w 559472"/>
-              <a:gd name="connsiteY19" fmla="*/ 1952216 h 3709642"/>
-              <a:gd name="connsiteX20" fmla="*/ 319121 w 559472"/>
-              <a:gd name="connsiteY20" fmla="*/ 1833776 h 3709642"/>
-              <a:gd name="connsiteX21" fmla="*/ 304408 w 559472"/>
-              <a:gd name="connsiteY21" fmla="*/ 1713948 h 3709642"/>
-              <a:gd name="connsiteX22" fmla="*/ 288685 w 559472"/>
-              <a:gd name="connsiteY22" fmla="*/ 1592703 h 3709642"/>
-              <a:gd name="connsiteX23" fmla="*/ 273050 w 559472"/>
-              <a:gd name="connsiteY23" fmla="*/ 1471451 h 3709642"/>
-              <a:gd name="connsiteX24" fmla="*/ 255813 w 559472"/>
-              <a:gd name="connsiteY24" fmla="*/ 1350328 h 3709642"/>
-              <a:gd name="connsiteX25" fmla="*/ 237060 w 559472"/>
-              <a:gd name="connsiteY25" fmla="*/ 1227080 h 3709642"/>
-              <a:gd name="connsiteX26" fmla="*/ 218488 w 559472"/>
-              <a:gd name="connsiteY26" fmla="*/ 1106065 h 3709642"/>
-              <a:gd name="connsiteX27" fmla="*/ 198221 w 559472"/>
-              <a:gd name="connsiteY27" fmla="*/ 982940 h 3709642"/>
-              <a:gd name="connsiteX28" fmla="*/ 177152 w 559472"/>
-              <a:gd name="connsiteY28" fmla="*/ 858755 h 3709642"/>
-              <a:gd name="connsiteX29" fmla="*/ 155551 w 559472"/>
-              <a:gd name="connsiteY29" fmla="*/ 736861 h 3709642"/>
-              <a:gd name="connsiteX30" fmla="*/ 131782 w 559472"/>
-              <a:gd name="connsiteY30" fmla="*/ 613645 h 3709642"/>
-              <a:gd name="connsiteX31" fmla="*/ 107123 w 559472"/>
-              <a:gd name="connsiteY31" fmla="*/ 490500 h 3709642"/>
-              <a:gd name="connsiteX32" fmla="*/ 82552 w 559472"/>
-              <a:gd name="connsiteY32" fmla="*/ 367348 h 3709642"/>
-              <a:gd name="connsiteX33" fmla="*/ 55608 w 559472"/>
-              <a:gd name="connsiteY33" fmla="*/ 244762 h 3709642"/>
-              <a:gd name="connsiteX34" fmla="*/ 28130 w 559472"/>
-              <a:gd name="connsiteY34" fmla="*/ 122220 h 3709642"/>
-              <a:gd name="connsiteX35" fmla="*/ 0 w 559472"/>
-              <a:gd name="connsiteY35" fmla="*/ 0 h 3709642"/>
-            </a:gdLst>
-            <a:ahLst/>
-            <a:cxnLst>
-              <a:cxn ang="0">
-                <a:pos x="connsiteX0" y="connsiteY0"/>
-              </a:cxn>
-              <a:cxn ang="0">
-                <a:pos x="connsiteX1" y="connsiteY1"/>
-              </a:cxn>
-              <a:cxn ang="0">
-                <a:pos x="connsiteX2" y="connsiteY2"/>
-              </a:cxn>
-              <a:cxn ang="0">
-                <a:pos x="connsiteX3" y="connsiteY3"/>
-              </a:cxn>
-              <a:cxn ang="0">
-                <a:pos x="connsiteX4" y="connsiteY4"/>
-              </a:cxn>
-              <a:cxn ang="0">
-                <a:pos x="connsiteX5" y="connsiteY5"/>
-              </a:cxn>
-              <a:cxn ang="0">
-                <a:pos x="connsiteX6" y="connsiteY6"/>
-              </a:cxn>
-              <a:cxn ang="0">
-                <a:pos x="connsiteX7" y="connsiteY7"/>
-              </a:cxn>
-              <a:cxn ang="0">
-                <a:pos x="connsiteX8" y="connsiteY8"/>
-              </a:cxn>
-              <a:cxn ang="0">
-                <a:pos x="connsiteX9" y="connsiteY9"/>
-              </a:cxn>
-              <a:cxn ang="0">
-                <a:pos x="connsiteX10" y="connsiteY10"/>
-              </a:cxn>
-              <a:cxn ang="0">
-                <a:pos x="connsiteX11" y="connsiteY11"/>
-              </a:cxn>
-              <a:cxn ang="0">
-                <a:pos x="connsiteX12" y="connsiteY12"/>
-              </a:cxn>
-              <a:cxn ang="0">
-                <a:pos x="connsiteX13" y="connsiteY13"/>
-              </a:cxn>
-              <a:cxn ang="0">
-                <a:pos x="connsiteX14" y="connsiteY14"/>
-              </a:cxn>
-              <a:cxn ang="0">
-                <a:pos x="connsiteX15" y="connsiteY15"/>
-              </a:cxn>
-              <a:cxn ang="0">
-                <a:pos x="connsiteX16" y="connsiteY16"/>
-              </a:cxn>
-              <a:cxn ang="0">
-                <a:pos x="connsiteX17" y="connsiteY17"/>
-              </a:cxn>
-              <a:cxn ang="0">
-                <a:pos x="connsiteX18" y="connsiteY18"/>
-              </a:cxn>
-              <a:cxn ang="0">
-                <a:pos x="connsiteX19" y="connsiteY19"/>
-              </a:cxn>
-              <a:cxn ang="0">
-                <a:pos x="connsiteX20" y="connsiteY20"/>
-              </a:cxn>
-              <a:cxn ang="0">
-                <a:pos x="connsiteX21" y="connsiteY21"/>
-              </a:cxn>
-              <a:cxn ang="0">
-                <a:pos x="connsiteX22" y="connsiteY22"/>
-              </a:cxn>
-              <a:cxn ang="0">
-                <a:pos x="connsiteX23" y="connsiteY23"/>
-              </a:cxn>
-              <a:cxn ang="0">
-                <a:pos x="connsiteX24" y="connsiteY24"/>
-              </a:cxn>
-              <a:cxn ang="0">
-                <a:pos x="connsiteX25" y="connsiteY25"/>
-              </a:cxn>
-              <a:cxn ang="0">
-                <a:pos x="connsiteX26" y="connsiteY26"/>
-              </a:cxn>
-              <a:cxn ang="0">
-                <a:pos x="connsiteX27" y="connsiteY27"/>
-              </a:cxn>
-              <a:cxn ang="0">
-                <a:pos x="connsiteX28" y="connsiteY28"/>
-              </a:cxn>
-              <a:cxn ang="0">
-                <a:pos x="connsiteX29" y="connsiteY29"/>
-              </a:cxn>
-              <a:cxn ang="0">
-                <a:pos x="connsiteX30" y="connsiteY30"/>
-              </a:cxn>
-              <a:cxn ang="0">
-                <a:pos x="connsiteX31" y="connsiteY31"/>
-              </a:cxn>
-              <a:cxn ang="0">
-                <a:pos x="connsiteX32" y="connsiteY32"/>
-              </a:cxn>
-              <a:cxn ang="0">
-                <a:pos x="connsiteX33" y="connsiteY33"/>
-              </a:cxn>
-              <a:cxn ang="0">
-                <a:pos x="connsiteX34" y="connsiteY34"/>
-              </a:cxn>
-              <a:cxn ang="0">
-                <a:pos x="connsiteX35" y="connsiteY35"/>
-              </a:cxn>
-            </a:cxnLst>
-            <a:rect l="l" t="t" r="r" b="b"/>
-            <a:pathLst>
-              <a:path w="559472" h="3709642">
-                <a:moveTo>
-                  <a:pt x="0" y="0"/>
-                </a:moveTo>
-                <a:lnTo>
-                  <a:pt x="473952" y="0"/>
-                </a:lnTo>
-                <a:lnTo>
-                  <a:pt x="485840" y="161194"/>
-                </a:lnTo>
-                <a:cubicBezTo>
-                  <a:pt x="552063" y="1147770"/>
-                  <a:pt x="592441" y="3086737"/>
-                  <a:pt x="523949" y="3672197"/>
-                </a:cubicBezTo>
-                <a:cubicBezTo>
-                  <a:pt x="500842" y="3684557"/>
-                  <a:pt x="477855" y="3697282"/>
-                  <a:pt x="454748" y="3709642"/>
-                </a:cubicBezTo>
-                <a:lnTo>
-                  <a:pt x="448224" y="3510471"/>
-                </a:lnTo>
-                <a:lnTo>
-                  <a:pt x="443564" y="3408563"/>
-                </a:lnTo>
-                <a:lnTo>
-                  <a:pt x="438902" y="3304407"/>
-                </a:lnTo>
-                <a:lnTo>
-                  <a:pt x="433941" y="3198777"/>
-                </a:lnTo>
-                <a:lnTo>
-                  <a:pt x="427584" y="3092510"/>
-                </a:lnTo>
-                <a:lnTo>
-                  <a:pt x="420988" y="2984390"/>
-                </a:lnTo>
-                <a:lnTo>
-                  <a:pt x="414330" y="2874401"/>
-                </a:lnTo>
-                <a:lnTo>
-                  <a:pt x="406840" y="2762980"/>
-                </a:lnTo>
-                <a:lnTo>
-                  <a:pt x="397745" y="2650566"/>
-                </a:lnTo>
-                <a:lnTo>
-                  <a:pt x="389154" y="2536612"/>
-                </a:lnTo>
-                <a:lnTo>
-                  <a:pt x="379225" y="2421642"/>
-                </a:lnTo>
-                <a:lnTo>
-                  <a:pt x="368316" y="2305627"/>
-                </a:lnTo>
-                <a:lnTo>
-                  <a:pt x="357466" y="2189233"/>
-                </a:lnTo>
-                <a:lnTo>
-                  <a:pt x="344982" y="2071473"/>
-                </a:lnTo>
-                <a:lnTo>
-                  <a:pt x="332466" y="1952216"/>
-                </a:lnTo>
-                <a:lnTo>
-                  <a:pt x="319121" y="1833776"/>
-                </a:lnTo>
-                <a:lnTo>
-                  <a:pt x="304408" y="1713948"/>
-                </a:lnTo>
-                <a:lnTo>
-                  <a:pt x="288685" y="1592703"/>
-                </a:lnTo>
-                <a:lnTo>
-                  <a:pt x="273050" y="1471451"/>
-                </a:lnTo>
-                <a:lnTo>
-                  <a:pt x="255813" y="1350328"/>
-                </a:lnTo>
-                <a:lnTo>
-                  <a:pt x="237060" y="1227080"/>
-                </a:lnTo>
-                <a:lnTo>
-                  <a:pt x="218488" y="1106065"/>
-                </a:lnTo>
-                <a:lnTo>
-                  <a:pt x="198221" y="982940"/>
-                </a:lnTo>
-                <a:lnTo>
-                  <a:pt x="177152" y="858755"/>
-                </a:lnTo>
-                <a:lnTo>
-                  <a:pt x="155551" y="736861"/>
-                </a:lnTo>
-                <a:lnTo>
-                  <a:pt x="131782" y="613645"/>
-                </a:lnTo>
-                <a:lnTo>
-                  <a:pt x="107123" y="490500"/>
-                </a:lnTo>
-                <a:lnTo>
-                  <a:pt x="82552" y="367348"/>
-                </a:lnTo>
-                <a:lnTo>
-                  <a:pt x="55608" y="244762"/>
-                </a:lnTo>
-                <a:lnTo>
-                  <a:pt x="28130" y="122220"/>
-                </a:lnTo>
-                <a:lnTo>
-                  <a:pt x="0" y="0"/>
-                </a:lnTo>
-                <a:close/>
-              </a:path>
-            </a:pathLst>
-          </a:custGeom>
-          <a:solidFill>
-            <a:schemeClr val="bg1">
-              <a:alpha val="20000"/>
-            </a:schemeClr>
-          </a:solidFill>
-          <a:ln>
-            <a:noFill/>
-          </a:ln>
-        </p:spPr>
-        <p:txBody>
-          <a:bodyPr rtlCol="0" anchor="ctr"/>
-          <a:lstStyle/>
-          <a:p>
-            <a:pPr algn="ctr"/>
-            <a:endParaRPr lang="en-US"/>
-          </a:p>
-        </p:txBody>
-      </p:sp>
-      <p:sp>
-        <p:nvSpPr>
-          <p:cNvPr id="16" name="Rectangle 15">
-            <a:extLst>
-              <a:ext uri="{FF2B5EF4-FFF2-40B4-BE49-F238E27FC236}">
-                <a16:creationId xmlns:a16="http://schemas.microsoft.com/office/drawing/2014/main" id="{C99B912D-1E4B-42AF-A2BE-CFEFEC916EE7}"/>
-              </a:ext>
-              <a:ext uri="{C183D7F6-B498-43B3-948B-1728B52AA6E4}">
-                <adec:decorative xmlns:adec="http://schemas.microsoft.com/office/drawing/2017/decorative" val="1"/>
-              </a:ext>
-            </a:extLst>
-          </p:cNvPr>
-          <p:cNvSpPr>
-            <a:spLocks noGrp="1" noRot="1" noChangeAspect="1" noMove="1" noResize="1" noEditPoints="1" noAdjustHandles="1" noChangeArrowheads="1" noChangeShapeType="1" noTextEdit="1"/>
-          </p:cNvSpPr>
-          <p:nvPr>
-            <p:extLst>
-              <p:ext uri="{386F3935-93C4-4BCD-93E2-E3B085C9AB24}">
-                <p16:designElem xmlns:p16="http://schemas.microsoft.com/office/powerpoint/2015/main" val="1"/>
-              </p:ext>
-            </p:extLst>
-          </p:nvPr>
-        </p:nvSpPr>
-        <p:spPr>
-          <a:xfrm>
-            <a:off x="10437812" y="0"/>
-            <a:ext cx="685800" cy="1143000"/>
-          </a:xfrm>
-          <a:prstGeom prst="rect">
-            <a:avLst/>
-          </a:prstGeom>
-          <a:solidFill>
-            <a:schemeClr val="accent1"/>
-          </a:solidFill>
-          <a:ln>
-            <a:noFill/>
-          </a:ln>
-        </p:spPr>
-        <p:style>
-          <a:lnRef idx="1">
-            <a:schemeClr val="accent1"/>
-          </a:lnRef>
-          <a:fillRef idx="3">
-            <a:schemeClr val="accent1"/>
-          </a:fillRef>
-          <a:effectRef idx="2">
-            <a:schemeClr val="accent1"/>
-          </a:effectRef>
-          <a:fontRef idx="minor">
-            <a:schemeClr val="lt1"/>
-          </a:fontRef>
-        </p:style>
-        <p:txBody>
-          <a:bodyPr/>
-          <a:lstStyle/>
-          <a:p>
-            <a:endParaRPr lang="en-NZ"/>
-          </a:p>
-        </p:txBody>
-      </p:sp>
-      <p:sp>
-        <p:nvSpPr>
-          <p:cNvPr id="4" name="Slide Number Placeholder 3">
-            <a:extLst>
-              <a:ext uri="{FF2B5EF4-FFF2-40B4-BE49-F238E27FC236}">
-                <a16:creationId xmlns:a16="http://schemas.microsoft.com/office/drawing/2014/main" id="{ACC79FBC-675A-A878-9411-07F35A13335F}"/>
-              </a:ext>
-            </a:extLst>
-          </p:cNvPr>
-          <p:cNvSpPr>
-            <a:spLocks noGrp="1"/>
-          </p:cNvSpPr>
-          <p:nvPr>
-            <p:ph type="sldNum" sz="quarter" idx="12"/>
-          </p:nvPr>
-        </p:nvSpPr>
-        <p:spPr>
-          <a:xfrm>
-            <a:off x="10352540" y="295729"/>
-            <a:ext cx="838199" cy="767687"/>
-          </a:xfrm>
-        </p:spPr>
-        <p:txBody>
-          <a:bodyPr>
-            <a:normAutofit/>
-          </a:bodyPr>
-          <a:lstStyle/>
-          <a:p>
-            <a:pPr>
-              <a:spcAft>
-                <a:spcPts val="600"/>
-              </a:spcAft>
-            </a:pPr>
-            <a:fld id="{7E50A921-1625-4E66-8B53-913CC32CAF35}" type="slidenum">
-              <a:rPr lang="en-NZ">
-                <a:solidFill>
-                  <a:srgbClr val="FFFFFF"/>
-                </a:solidFill>
-              </a:rPr>
-              <a:pPr>
-                <a:spcAft>
-                  <a:spcPts val="600"/>
-                </a:spcAft>
-              </a:pPr>
-              <a:t>9</a:t>
-            </a:fld>
-            <a:endParaRPr lang="en-NZ">
-              <a:solidFill>
-                <a:srgbClr val="FFFFFF"/>
-              </a:solidFill>
-            </a:endParaRPr>
-          </a:p>
-        </p:txBody>
-      </p:sp>
-      <p:graphicFrame>
-        <p:nvGraphicFramePr>
-          <p:cNvPr id="6" name="Content Placeholder 2">
-            <a:extLst>
-              <a:ext uri="{FF2B5EF4-FFF2-40B4-BE49-F238E27FC236}">
-                <a16:creationId xmlns:a16="http://schemas.microsoft.com/office/drawing/2014/main" id="{E78EF640-816C-0A99-4DED-8251D7DF5C5B}"/>
-              </a:ext>
-            </a:extLst>
-          </p:cNvPr>
-          <p:cNvGraphicFramePr>
-            <a:graphicFrameLocks noGrp="1"/>
-          </p:cNvGraphicFramePr>
-          <p:nvPr>
-            <p:ph idx="1"/>
-            <p:extLst>
-              <p:ext uri="{D42A27DB-BD31-4B8C-83A1-F6EECF244321}">
-                <p14:modId xmlns:p14="http://schemas.microsoft.com/office/powerpoint/2010/main" val="455073143"/>
-              </p:ext>
-            </p:extLst>
-          </p:nvPr>
-        </p:nvGraphicFramePr>
-        <p:xfrm>
-          <a:off x="5048250" y="1447800"/>
-          <a:ext cx="6496050" cy="4572000"/>
-        </p:xfrm>
-        <a:graphic>
-          <a:graphicData uri="http://schemas.openxmlformats.org/drawingml/2006/diagram">
-            <dgm:relIds xmlns:dgm="http://schemas.openxmlformats.org/drawingml/2006/diagram" xmlns:r="http://schemas.openxmlformats.org/officeDocument/2006/relationships" r:dm="rId2" r:lo="rId3" r:qs="rId4" r:cs="rId5"/>
-          </a:graphicData>
-        </a:graphic>
-      </p:graphicFrame>
-    </p:spTree>
-    <p:extLst>
-      <p:ext uri="{BB962C8B-B14F-4D97-AF65-F5344CB8AC3E}">
-        <p14:creationId xmlns:p14="http://schemas.microsoft.com/office/powerpoint/2010/main" val="3655054582"/>
       </p:ext>
     </p:extLst>
   </p:cSld>

</xml_diff>

<commit_message>
modified slides about compiler/interpreter hybrid and future of JIT
</commit_message>
<xml_diff>
--- a/documents/presentation/presentation jit compiler.pptx
+++ b/documents/presentation/presentation jit compiler.pptx
@@ -15217,34 +15217,59 @@
             <p:ph idx="1"/>
           </p:nvPr>
         </p:nvSpPr>
-        <p:spPr/>
+        <p:spPr>
+          <a:xfrm>
+            <a:off x="646112" y="4847869"/>
+            <a:ext cx="10800414" cy="1400530"/>
+          </a:xfrm>
+        </p:spPr>
         <p:txBody>
-          <a:bodyPr/>
+          <a:bodyPr>
+            <a:normAutofit fontScale="70000" lnSpcReduction="20000"/>
+          </a:bodyPr>
           <a:lstStyle/>
           <a:p>
             <a:pPr marL="0" indent="0">
               <a:buNone/>
             </a:pPr>
             <a:r>
-              <a:rPr lang="en-NZ" sz="7000" dirty="0">
-                <a:hlinkClick r:id="rId2"/>
-              </a:rPr>
-              <a:t>https://github.com/sebivenlo/esd-2024-jit-compiler</a:t>
-            </a:r>
-            <a:endParaRPr lang="en-NZ" sz="7000" dirty="0"/>
+              <a:rPr lang="en-NZ" sz="6500" dirty="0" err="1"/>
+              <a:t>github.com</a:t>
+            </a:r>
+            <a:r>
+              <a:rPr lang="en-NZ" sz="6500" dirty="0"/>
+              <a:t>/</a:t>
+            </a:r>
+            <a:r>
+              <a:rPr lang="en-NZ" sz="6500" dirty="0" err="1"/>
+              <a:t>sebivenlo</a:t>
+            </a:r>
+            <a:r>
+              <a:rPr lang="en-NZ" sz="6500" dirty="0"/>
+              <a:t>/</a:t>
+            </a:r>
           </a:p>
           <a:p>
             <a:pPr marL="0" indent="0">
               <a:buNone/>
             </a:pPr>
-            <a:endParaRPr lang="en-NZ" dirty="0"/>
+            <a:r>
+              <a:rPr lang="en-NZ" sz="6500" dirty="0"/>
+              <a:t>esd-2024-jit-compiler</a:t>
+            </a:r>
+          </a:p>
+          <a:p>
+            <a:pPr marL="0" indent="0">
+              <a:buNone/>
+            </a:pPr>
+            <a:endParaRPr lang="en-NZ" sz="4000" dirty="0"/>
           </a:p>
           <a:p>
             <a:pPr marL="457200" indent="-457200">
               <a:buFont typeface="+mj-lt"/>
               <a:buAutoNum type="arabicPeriod"/>
             </a:pPr>
-            <a:endParaRPr lang="en-NZ" dirty="0"/>
+            <a:endParaRPr lang="en-NZ" sz="4000" dirty="0"/>
           </a:p>
         </p:txBody>
       </p:sp>
@@ -15277,6 +15302,42 @@
           </a:p>
         </p:txBody>
       </p:sp>
+      <p:pic>
+        <p:nvPicPr>
+          <p:cNvPr id="6" name="Picture 5" descr="A qr code on a white background&#10;&#10;Description automatically generated">
+            <a:extLst>
+              <a:ext uri="{FF2B5EF4-FFF2-40B4-BE49-F238E27FC236}">
+                <a16:creationId xmlns:a16="http://schemas.microsoft.com/office/drawing/2014/main" id="{437BB80E-6A30-C1FC-5B7A-A69F0BB9113A}"/>
+              </a:ext>
+            </a:extLst>
+          </p:cNvPr>
+          <p:cNvPicPr>
+            <a:picLocks noChangeAspect="1"/>
+          </p:cNvPicPr>
+          <p:nvPr/>
+        </p:nvPicPr>
+        <p:blipFill>
+          <a:blip r:embed="rId2">
+            <a:extLst>
+              <a:ext uri="{28A0092B-C50C-407E-A947-70E740481C1C}">
+                <a14:useLocalDpi xmlns:a14="http://schemas.microsoft.com/office/drawing/2010/main" val="0"/>
+              </a:ext>
+            </a:extLst>
+          </a:blip>
+          <a:stretch>
+            <a:fillRect/>
+          </a:stretch>
+        </p:blipFill>
+        <p:spPr>
+          <a:xfrm>
+            <a:off x="7447402" y="0"/>
+            <a:ext cx="4744598" cy="4744598"/>
+          </a:xfrm>
+          <a:prstGeom prst="rect">
+            <a:avLst/>
+          </a:prstGeom>
+        </p:spPr>
+      </p:pic>
     </p:spTree>
     <p:extLst>
       <p:ext uri="{BB962C8B-B14F-4D97-AF65-F5344CB8AC3E}">
@@ -15833,21 +15894,21 @@
               </a:lnSpc>
             </a:pPr>
             <a:r>
-              <a:rPr lang="en-NZ" sz="3300">
+              <a:rPr lang="en-NZ" sz="3300" dirty="0">
                 <a:solidFill>
                   <a:srgbClr val="EBEBEB"/>
                 </a:solidFill>
               </a:rPr>
-              <a:t>Future for JIT compiler?</a:t>
+              <a:t>What’s the future of JIT?</a:t>
             </a:r>
             <a:br>
-              <a:rPr lang="en-NZ" sz="3300">
+              <a:rPr lang="en-NZ" sz="3300" dirty="0">
                 <a:solidFill>
                   <a:srgbClr val="EBEBEB"/>
                 </a:solidFill>
               </a:rPr>
             </a:br>
-            <a:endParaRPr lang="en-NZ" sz="3300">
+            <a:endParaRPr lang="en-NZ" sz="3300" dirty="0">
               <a:solidFill>
                 <a:srgbClr val="EBEBEB"/>
               </a:solidFill>
@@ -16407,15 +16468,98 @@
           </a:bodyPr>
           <a:lstStyle/>
           <a:p>
-            <a:r>
-              <a:rPr lang="en-US" dirty="0"/>
-              <a:t>Java still in third position</a:t>
-            </a:r>
-          </a:p>
-          <a:p>
-            <a:r>
-              <a:rPr lang="en-US" dirty="0"/>
-              <a:t>1995-2023</a:t>
+            <a:pPr marL="0" indent="0">
+              <a:buNone/>
+            </a:pPr>
+            <a:r>
+              <a:rPr lang="en-US" b="1" dirty="0"/>
+              <a:t>Dynamically vs statically typed</a:t>
+            </a:r>
+          </a:p>
+          <a:p>
+            <a:pPr marL="0" indent="0">
+              <a:buNone/>
+            </a:pPr>
+            <a:r>
+              <a:rPr lang="en-GB" dirty="0">
+                <a:solidFill>
+                  <a:srgbClr val="0E0E0E"/>
+                </a:solidFill>
+                <a:effectLst/>
+                <a:latin typeface=".SF NS"/>
+              </a:rPr>
+              <a:t>JIT compilation reduced the performance gap.</a:t>
+            </a:r>
+          </a:p>
+          <a:p>
+            <a:pPr marL="0" indent="0">
+              <a:buNone/>
+            </a:pPr>
+            <a:endParaRPr lang="en-GB" dirty="0">
+              <a:solidFill>
+                <a:srgbClr val="0E0E0E"/>
+              </a:solidFill>
+              <a:latin typeface=".SF NS"/>
+            </a:endParaRPr>
+          </a:p>
+          <a:p>
+            <a:pPr marL="0" indent="0">
+              <a:buNone/>
+            </a:pPr>
+            <a:r>
+              <a:rPr lang="en-GB" dirty="0">
+                <a:solidFill>
+                  <a:srgbClr val="0E0E0E"/>
+                </a:solidFill>
+                <a:effectLst/>
+                <a:latin typeface=".SF NS"/>
+              </a:rPr>
+              <a:t>Statically typed languages will </a:t>
+            </a:r>
+            <a:r>
+              <a:rPr lang="en-GB" dirty="0">
+                <a:solidFill>
+                  <a:schemeClr val="accent2"/>
+                </a:solidFill>
+                <a:latin typeface=".SF NS"/>
+              </a:rPr>
+              <a:t>die</a:t>
+            </a:r>
+            <a:r>
+              <a:rPr lang="en-GB" dirty="0">
+                <a:solidFill>
+                  <a:srgbClr val="0E0E0E"/>
+                </a:solidFill>
+                <a:latin typeface=".SF NS"/>
+              </a:rPr>
+              <a:t>?</a:t>
+            </a:r>
+          </a:p>
+          <a:p>
+            <a:pPr marL="0" indent="0">
+              <a:buNone/>
+            </a:pPr>
+            <a:endParaRPr lang="en-GB" dirty="0">
+              <a:solidFill>
+                <a:srgbClr val="0E0E0E"/>
+              </a:solidFill>
+              <a:effectLst/>
+              <a:latin typeface=".SF NS"/>
+            </a:endParaRPr>
+          </a:p>
+          <a:p>
+            <a:pPr marL="0" indent="0">
+              <a:buNone/>
+            </a:pPr>
+            <a:r>
+              <a:rPr lang="en-GB" dirty="0">
+                <a:solidFill>
+                  <a:srgbClr val="0E0E0E"/>
+                </a:solidFill>
+                <a:effectLst/>
+                <a:latin typeface=".SF NS"/>
+              </a:rPr>
+              <a:t>No, the world (AI, high performance) need more speed and reliability.</a:t>
             </a:r>
           </a:p>
           <a:p>
@@ -16426,37 +16570,81 @@
           </a:p>
         </p:txBody>
       </p:sp>
-      <p:pic>
-        <p:nvPicPr>
-          <p:cNvPr id="6" name="Content Placeholder 5">
+      <p:sp>
+        <p:nvSpPr>
+          <p:cNvPr id="3" name="TextBox 2">
             <a:extLst>
               <a:ext uri="{FF2B5EF4-FFF2-40B4-BE49-F238E27FC236}">
-                <a16:creationId xmlns:a16="http://schemas.microsoft.com/office/drawing/2014/main" id="{7F60F73D-04EA-E503-AB46-5C11F19C9125}"/>
+                <a16:creationId xmlns:a16="http://schemas.microsoft.com/office/drawing/2014/main" id="{62E9D3B4-4915-F0F6-4871-349480E8387E}"/>
               </a:ext>
             </a:extLst>
           </p:cNvPr>
-          <p:cNvPicPr>
-            <a:picLocks noChangeAspect="1"/>
-          </p:cNvPicPr>
+          <p:cNvSpPr txBox="1"/>
           <p:nvPr/>
-        </p:nvPicPr>
-        <p:blipFill>
-          <a:blip r:embed="rId2"/>
-          <a:stretch>
-            <a:fillRect/>
-          </a:stretch>
-        </p:blipFill>
+        </p:nvSpPr>
         <p:spPr>
           <a:xfrm>
-            <a:off x="6091916" y="3091343"/>
-            <a:ext cx="5451627" cy="2575893"/>
+            <a:off x="7899093" y="3073706"/>
+            <a:ext cx="2930487" cy="646331"/>
           </a:xfrm>
           <a:prstGeom prst="rect">
             <a:avLst/>
           </a:prstGeom>
-          <a:effectLst/>
+          <a:noFill/>
         </p:spPr>
-      </p:pic>
+        <p:txBody>
+          <a:bodyPr wrap="square" rtlCol="0">
+            <a:spAutoFit/>
+          </a:bodyPr>
+          <a:lstStyle/>
+          <a:p>
+            <a:r>
+              <a:rPr lang="en-GB" b="1" dirty="0"/>
+              <a:t>9 oct 2024: </a:t>
+            </a:r>
+            <a:r>
+              <a:rPr lang="en-GB" dirty="0"/>
+              <a:t>Python (default) introduces JIT</a:t>
+            </a:r>
+            <a:endParaRPr lang="en-NL" dirty="0"/>
+          </a:p>
+        </p:txBody>
+      </p:sp>
+      <p:sp>
+        <p:nvSpPr>
+          <p:cNvPr id="5" name="TextBox 4">
+            <a:extLst>
+              <a:ext uri="{FF2B5EF4-FFF2-40B4-BE49-F238E27FC236}">
+                <a16:creationId xmlns:a16="http://schemas.microsoft.com/office/drawing/2014/main" id="{4C4D4528-22E5-12B4-407A-0B74E5AB71B5}"/>
+              </a:ext>
+            </a:extLst>
+          </p:cNvPr>
+          <p:cNvSpPr txBox="1"/>
+          <p:nvPr/>
+        </p:nvSpPr>
+        <p:spPr>
+          <a:xfrm>
+            <a:off x="7899094" y="4939343"/>
+            <a:ext cx="2543354" cy="584775"/>
+          </a:xfrm>
+          <a:prstGeom prst="rect">
+            <a:avLst/>
+          </a:prstGeom>
+          <a:noFill/>
+        </p:spPr>
+        <p:txBody>
+          <a:bodyPr wrap="square" rtlCol="0">
+            <a:spAutoFit/>
+          </a:bodyPr>
+          <a:lstStyle/>
+          <a:p>
+            <a:r>
+              <a:rPr lang="en-NL" sz="3200" dirty="0"/>
+              <a:t>ML/AI in JIT</a:t>
+            </a:r>
+          </a:p>
+        </p:txBody>
+      </p:sp>
     </p:spTree>
     <p:extLst>
       <p:ext uri="{BB962C8B-B14F-4D97-AF65-F5344CB8AC3E}">
@@ -17207,7 +17395,7 @@
             </a:r>
             <a:r>
               <a:rPr lang="nl-NL" dirty="0"/>
-              <a:t>(No laptop) 15 min(Thijs)</a:t>
+              <a:t> 15 min(Thijs)</a:t>
             </a:r>
           </a:p>
           <a:p>
@@ -17281,15 +17469,7 @@
           <a:p>
             <a:r>
               <a:rPr lang="en-NZ" dirty="0"/>
-              <a:t>Exercises(GitHub) 20 min(</a:t>
-            </a:r>
-            <a:r>
-              <a:rPr lang="en-NZ" dirty="0" err="1"/>
-              <a:t>thijs</a:t>
-            </a:r>
-            <a:r>
-              <a:rPr lang="en-NZ" dirty="0"/>
-              <a:t> </a:t>
+              <a:t>Exercises (GitHub) 20 min(Thijs </a:t>
             </a:r>
             <a:r>
               <a:rPr lang="en-NZ" dirty="0" err="1"/>
@@ -17297,27 +17477,14 @@
             </a:r>
             <a:r>
               <a:rPr lang="en-NZ" dirty="0"/>
-              <a:t> </a:t>
-            </a:r>
-            <a:r>
-              <a:rPr lang="en-NZ" dirty="0" err="1"/>
-              <a:t>jorge</a:t>
-            </a:r>
+              <a:t> Jorge)</a:t>
+            </a:r>
+          </a:p>
+          <a:p>
             <a:r>
               <a:rPr lang="en-NZ" dirty="0"/>
-              <a:t>)</a:t>
-            </a:r>
-          </a:p>
-          <a:p>
-            <a:r>
-              <a:rPr lang="en-NZ" dirty="0"/>
-              <a:t>Future for JIT compiler? </a:t>
-            </a:r>
-            <a:r>
-              <a:rPr lang="en-NZ"/>
-              <a:t>2 min(Thijs)</a:t>
-            </a:r>
-            <a:endParaRPr lang="en-NZ" dirty="0"/>
+              <a:t>Future JIT? 2 min(Thijs)</a:t>
+            </a:r>
           </a:p>
           <a:p>
             <a:r>
@@ -18909,11 +19076,19 @@
           <a:p>
             <a:r>
               <a:rPr lang="nl-NL" dirty="0" err="1"/>
-              <a:t>Reality</a:t>
+              <a:t>Compiled</a:t>
             </a:r>
             <a:r>
               <a:rPr lang="nl-NL" dirty="0"/>
-              <a:t> is more complex - </a:t>
+              <a:t>/</a:t>
+            </a:r>
+            <a:r>
+              <a:rPr lang="nl-NL" dirty="0" err="1"/>
+              <a:t>interpreted</a:t>
+            </a:r>
+            <a:r>
+              <a:rPr lang="nl-NL" dirty="0"/>
+              <a:t> - </a:t>
             </a:r>
             <a:r>
               <a:rPr lang="nl-NL" dirty="0" err="1"/>
@@ -18946,32 +19121,76 @@
           <a:p>
             <a:r>
               <a:rPr lang="en-NZ" dirty="0"/>
-              <a:t>An interpreter translates source code into machine code line-by-line during execution.</a:t>
-            </a:r>
-          </a:p>
-          <a:p>
+              <a:t>Statically typed</a:t>
+            </a:r>
+          </a:p>
+          <a:p>
+            <a:pPr lvl="1"/>
             <a:r>
               <a:rPr lang="en-NZ" dirty="0"/>
-              <a:t>It does not produce an intermediate executable file; instead, it directly executes the code.</a:t>
-            </a:r>
-          </a:p>
-          <a:p>
+              <a:t>C / C++ / Rust</a:t>
+            </a:r>
+          </a:p>
+          <a:p>
+            <a:pPr lvl="1"/>
             <a:r>
               <a:rPr lang="en-NZ" dirty="0"/>
-              <a:t>Each time the program runs, it must be interpreted anew, leading to slower execution compared to compiled code.</a:t>
+              <a:t>Java, C# (Virtual Machine)</a:t>
             </a:r>
           </a:p>
           <a:p>
             <a:r>
               <a:rPr lang="en-NZ" dirty="0"/>
-              <a:t>Interpreters are often used in development environments for easier debugging and testing.</a:t>
-            </a:r>
-          </a:p>
-          <a:p>
+              <a:t>Dynamically typed</a:t>
+            </a:r>
+          </a:p>
+          <a:p>
+            <a:pPr lvl="1"/>
             <a:r>
               <a:rPr lang="en-NZ" dirty="0"/>
-              <a:t>Examples of interpreted languages include Python, JavaScript, and Ruby.</a:t>
-            </a:r>
+              <a:t>JavaScript</a:t>
+            </a:r>
+          </a:p>
+          <a:p>
+            <a:pPr lvl="2"/>
+            <a:r>
+              <a:rPr lang="en-NZ" dirty="0"/>
+              <a:t>Engines like V8 (Node.js / Chrome / Edge)</a:t>
+            </a:r>
+          </a:p>
+          <a:p>
+            <a:pPr lvl="1"/>
+            <a:r>
+              <a:rPr lang="en-NZ" dirty="0"/>
+              <a:t>Python (</a:t>
+            </a:r>
+            <a:r>
+              <a:rPr lang="en-NZ" dirty="0" err="1"/>
+              <a:t>CPython</a:t>
+            </a:r>
+            <a:r>
+              <a:rPr lang="en-NZ" dirty="0"/>
+              <a:t> (default) / </a:t>
+            </a:r>
+            <a:r>
+              <a:rPr lang="en-NZ" dirty="0" err="1"/>
+              <a:t>PyPy</a:t>
+            </a:r>
+            <a:r>
+              <a:rPr lang="en-NZ" dirty="0"/>
+              <a:t>), also Virtual Machine</a:t>
+            </a:r>
+          </a:p>
+          <a:p>
+            <a:pPr lvl="1"/>
+            <a:r>
+              <a:rPr lang="en-NZ" dirty="0"/>
+              <a:t>Bash</a:t>
+            </a:r>
+          </a:p>
+          <a:p>
+            <a:pPr lvl="1"/>
+            <a:endParaRPr lang="en-NZ" dirty="0"/>
           </a:p>
         </p:txBody>
       </p:sp>
@@ -19001,6 +19220,45 @@
               <a:t>6</a:t>
             </a:fld>
             <a:endParaRPr lang="en-NZ" dirty="0"/>
+          </a:p>
+        </p:txBody>
+      </p:sp>
+      <p:sp>
+        <p:nvSpPr>
+          <p:cNvPr id="5" name="TextBox 4">
+            <a:extLst>
+              <a:ext uri="{FF2B5EF4-FFF2-40B4-BE49-F238E27FC236}">
+                <a16:creationId xmlns:a16="http://schemas.microsoft.com/office/drawing/2014/main" id="{767A65D4-324D-2AB3-1DDE-87D4231FFD8C}"/>
+              </a:ext>
+            </a:extLst>
+          </p:cNvPr>
+          <p:cNvSpPr txBox="1"/>
+          <p:nvPr/>
+        </p:nvSpPr>
+        <p:spPr>
+          <a:xfrm rot="1614606">
+            <a:off x="8017121" y="3217635"/>
+            <a:ext cx="3316698" cy="646331"/>
+          </a:xfrm>
+          <a:prstGeom prst="rect">
+            <a:avLst/>
+          </a:prstGeom>
+          <a:noFill/>
+        </p:spPr>
+        <p:txBody>
+          <a:bodyPr wrap="square" rtlCol="0">
+            <a:spAutoFit/>
+          </a:bodyPr>
+          <a:lstStyle/>
+          <a:p>
+            <a:r>
+              <a:rPr lang="en-GB" sz="3600" dirty="0"/>
+              <a:t>T</a:t>
+            </a:r>
+            <a:r>
+              <a:rPr lang="en-NL" sz="3600" dirty="0"/>
+              <a:t>ype blurring</a:t>
+            </a:r>
           </a:p>
         </p:txBody>
       </p:sp>

</xml_diff>

<commit_message>
rework of compiler/interpreter slides
</commit_message>
<xml_diff>
--- a/documents/presentation/presentation jit compiler.pptx
+++ b/documents/presentation/presentation jit compiler.pptx
@@ -5,28 +5,30 @@
     <p:sldMasterId id="2147483660" r:id="rId1"/>
   </p:sldMasterIdLst>
   <p:notesMasterIdLst>
-    <p:notesMasterId r:id="rId21"/>
+    <p:notesMasterId r:id="rId23"/>
   </p:notesMasterIdLst>
   <p:sldIdLst>
     <p:sldId id="256" r:id="rId2"/>
     <p:sldId id="257" r:id="rId3"/>
-    <p:sldId id="258" r:id="rId4"/>
-    <p:sldId id="273" r:id="rId5"/>
-    <p:sldId id="259" r:id="rId6"/>
-    <p:sldId id="277" r:id="rId7"/>
-    <p:sldId id="260" r:id="rId8"/>
-    <p:sldId id="278" r:id="rId9"/>
-    <p:sldId id="279" r:id="rId10"/>
-    <p:sldId id="280" r:id="rId11"/>
-    <p:sldId id="272" r:id="rId12"/>
-    <p:sldId id="262" r:id="rId13"/>
-    <p:sldId id="275" r:id="rId14"/>
-    <p:sldId id="266" r:id="rId15"/>
-    <p:sldId id="263" r:id="rId16"/>
-    <p:sldId id="264" r:id="rId17"/>
-    <p:sldId id="265" r:id="rId18"/>
-    <p:sldId id="276" r:id="rId19"/>
-    <p:sldId id="271" r:id="rId20"/>
+    <p:sldId id="281" r:id="rId4"/>
+    <p:sldId id="283" r:id="rId5"/>
+    <p:sldId id="285" r:id="rId6"/>
+    <p:sldId id="259" r:id="rId7"/>
+    <p:sldId id="277" r:id="rId8"/>
+    <p:sldId id="286" r:id="rId9"/>
+    <p:sldId id="260" r:id="rId10"/>
+    <p:sldId id="278" r:id="rId11"/>
+    <p:sldId id="279" r:id="rId12"/>
+    <p:sldId id="280" r:id="rId13"/>
+    <p:sldId id="272" r:id="rId14"/>
+    <p:sldId id="262" r:id="rId15"/>
+    <p:sldId id="275" r:id="rId16"/>
+    <p:sldId id="266" r:id="rId17"/>
+    <p:sldId id="263" r:id="rId18"/>
+    <p:sldId id="264" r:id="rId19"/>
+    <p:sldId id="265" r:id="rId20"/>
+    <p:sldId id="276" r:id="rId21"/>
+    <p:sldId id="271" r:id="rId22"/>
   </p:sldIdLst>
   <p:sldSz cx="12192000" cy="6858000"/>
   <p:notesSz cx="6858000" cy="9144000"/>
@@ -4039,10 +4041,10 @@
     <dgm:cxn modelId="{00118C0E-41F8-42B1-9294-DA77A0FFD583}" srcId="{EE81AFA6-27FF-41A3-9D49-39844592879B}" destId="{43055F87-475A-4349-BF46-3C112773A083}" srcOrd="0" destOrd="0" parTransId="{F3DC87BC-2F02-4C1F-BD00-D62BF37475EA}" sibTransId="{B24257E6-5F2D-441D-8124-8E7CE8BD6AAF}"/>
     <dgm:cxn modelId="{1B24D714-AF52-45FB-99E2-F772105871B2}" srcId="{EE81AFA6-27FF-41A3-9D49-39844592879B}" destId="{40B4C0BD-5778-4109-B79B-DDD6CE582884}" srcOrd="1" destOrd="0" parTransId="{3C4D7026-1144-4A25-8278-91E9B0EAF954}" sibTransId="{836D12A4-6625-4702-A4BE-5367BF649190}"/>
     <dgm:cxn modelId="{36EA7C18-EC4F-4139-AB7A-6341F73833DE}" type="presOf" srcId="{40B4C0BD-5778-4109-B79B-DDD6CE582884}" destId="{E246CA3E-8FFC-40F2-9159-A742849876F3}" srcOrd="0" destOrd="0" presId="urn:microsoft.com/office/officeart/2018/2/layout/IconVerticalSolidList"/>
+    <dgm:cxn modelId="{17504255-0144-4A5B-976E-71694C9FD141}" type="presOf" srcId="{98D4E1C5-BF98-4B05-A292-04BEBE62F190}" destId="{AC54644B-08B8-4F9F-9B59-1337D780ABE8}" srcOrd="0" destOrd="0" presId="urn:microsoft.com/office/officeart/2018/2/layout/IconVerticalSolidList"/>
+    <dgm:cxn modelId="{9988CD59-6AB9-4262-AC14-444AC065572E}" type="presOf" srcId="{43055F87-475A-4349-BF46-3C112773A083}" destId="{DE8F3A38-EAEF-480A-A9C7-312A437CD56C}" srcOrd="0" destOrd="0" presId="urn:microsoft.com/office/officeart/2018/2/layout/IconVerticalSolidList"/>
     <dgm:cxn modelId="{76FD205F-C535-4462-9C5B-881C35C3FF59}" srcId="{EE81AFA6-27FF-41A3-9D49-39844592879B}" destId="{87E3A1B7-1DF5-4A37-B3CF-E79DBA653F33}" srcOrd="3" destOrd="0" parTransId="{2B66999E-A974-4B73-AE42-1FC742E90F4E}" sibTransId="{E01D6190-FE0E-4843-B0FF-FF8C0838E08C}"/>
     <dgm:cxn modelId="{3D2CC265-884A-4399-B13C-B2C814C89564}" srcId="{EE81AFA6-27FF-41A3-9D49-39844592879B}" destId="{98D4E1C5-BF98-4B05-A292-04BEBE62F190}" srcOrd="2" destOrd="0" parTransId="{3296FEEA-597A-426B-81AC-F9E0A366DDE4}" sibTransId="{153DDC19-B6A5-4099-8EF3-F09B7B59BD3C}"/>
-    <dgm:cxn modelId="{17504255-0144-4A5B-976E-71694C9FD141}" type="presOf" srcId="{98D4E1C5-BF98-4B05-A292-04BEBE62F190}" destId="{AC54644B-08B8-4F9F-9B59-1337D780ABE8}" srcOrd="0" destOrd="0" presId="urn:microsoft.com/office/officeart/2018/2/layout/IconVerticalSolidList"/>
-    <dgm:cxn modelId="{9988CD59-6AB9-4262-AC14-444AC065572E}" type="presOf" srcId="{43055F87-475A-4349-BF46-3C112773A083}" destId="{DE8F3A38-EAEF-480A-A9C7-312A437CD56C}" srcOrd="0" destOrd="0" presId="urn:microsoft.com/office/officeart/2018/2/layout/IconVerticalSolidList"/>
     <dgm:cxn modelId="{173E9F91-CCAB-4341-BA93-173D7A3096FB}" type="presOf" srcId="{87E3A1B7-1DF5-4A37-B3CF-E79DBA653F33}" destId="{2C3BF78E-8C8E-44CC-8CE0-4274D4EB949F}" srcOrd="0" destOrd="0" presId="urn:microsoft.com/office/officeart/2018/2/layout/IconVerticalSolidList"/>
     <dgm:cxn modelId="{D7D1D3FE-63F2-49DE-A98D-E0B84D6FC6AA}" type="presOf" srcId="{EE81AFA6-27FF-41A3-9D49-39844592879B}" destId="{0D55F4A2-94B4-4C22-B51F-96B0073DD191}" srcOrd="0" destOrd="0" presId="urn:microsoft.com/office/officeart/2018/2/layout/IconVerticalSolidList"/>
     <dgm:cxn modelId="{8818BDE1-5524-40C2-8C51-D7C92BF513A7}" type="presParOf" srcId="{0D55F4A2-94B4-4C22-B51F-96B0073DD191}" destId="{48C08901-A252-458F-A469-45AC5F3E9734}" srcOrd="0" destOrd="0" presId="urn:microsoft.com/office/officeart/2018/2/layout/IconVerticalSolidList"/>
@@ -16462,6 +16464,296 @@
           <p:cNvPr id="2" name="Title 1">
             <a:extLst>
               <a:ext uri="{FF2B5EF4-FFF2-40B4-BE49-F238E27FC236}">
+                <a16:creationId xmlns:a16="http://schemas.microsoft.com/office/drawing/2014/main" id="{9FBEF56F-545F-37AB-80AF-D4C9FC3C4A36}"/>
+              </a:ext>
+            </a:extLst>
+          </p:cNvPr>
+          <p:cNvSpPr>
+            <a:spLocks noGrp="1"/>
+          </p:cNvSpPr>
+          <p:nvPr>
+            <p:ph type="title"/>
+          </p:nvPr>
+        </p:nvSpPr>
+        <p:spPr/>
+        <p:txBody>
+          <a:bodyPr/>
+          <a:lstStyle/>
+          <a:p>
+            <a:r>
+              <a:rPr lang="nl-NL" dirty="0"/>
+              <a:t>LISP </a:t>
+            </a:r>
+            <a:r>
+              <a:rPr lang="nl-NL" dirty="0" err="1"/>
+              <a:t>programming</a:t>
+            </a:r>
+            <a:r>
+              <a:rPr lang="nl-NL" dirty="0"/>
+              <a:t> </a:t>
+            </a:r>
+            <a:r>
+              <a:rPr lang="nl-NL" dirty="0" err="1"/>
+              <a:t>language</a:t>
+            </a:r>
+            <a:endParaRPr lang="en-NZ" dirty="0"/>
+          </a:p>
+        </p:txBody>
+      </p:sp>
+      <p:pic>
+        <p:nvPicPr>
+          <p:cNvPr id="6" name="Content Placeholder 5">
+            <a:extLst>
+              <a:ext uri="{FF2B5EF4-FFF2-40B4-BE49-F238E27FC236}">
+                <a16:creationId xmlns:a16="http://schemas.microsoft.com/office/drawing/2014/main" id="{0FE6D680-0B9A-72DD-4839-B2961A5AB183}"/>
+              </a:ext>
+            </a:extLst>
+          </p:cNvPr>
+          <p:cNvPicPr>
+            <a:picLocks noGrp="1" noChangeAspect="1"/>
+          </p:cNvPicPr>
+          <p:nvPr>
+            <p:ph idx="1"/>
+          </p:nvPr>
+        </p:nvPicPr>
+        <p:blipFill>
+          <a:blip r:embed="rId2"/>
+          <a:stretch>
+            <a:fillRect/>
+          </a:stretch>
+        </p:blipFill>
+        <p:spPr>
+          <a:xfrm>
+            <a:off x="1103313" y="2271618"/>
+            <a:ext cx="8947150" cy="3757802"/>
+          </a:xfrm>
+        </p:spPr>
+      </p:pic>
+      <p:sp>
+        <p:nvSpPr>
+          <p:cNvPr id="4" name="Slide Number Placeholder 3">
+            <a:extLst>
+              <a:ext uri="{FF2B5EF4-FFF2-40B4-BE49-F238E27FC236}">
+                <a16:creationId xmlns:a16="http://schemas.microsoft.com/office/drawing/2014/main" id="{BDED708F-BA01-7FBC-D76A-6BE51E89683D}"/>
+              </a:ext>
+            </a:extLst>
+          </p:cNvPr>
+          <p:cNvSpPr>
+            <a:spLocks noGrp="1"/>
+          </p:cNvSpPr>
+          <p:nvPr>
+            <p:ph type="sldNum" sz="quarter" idx="12"/>
+          </p:nvPr>
+        </p:nvSpPr>
+        <p:spPr/>
+        <p:txBody>
+          <a:bodyPr/>
+          <a:lstStyle/>
+          <a:p>
+            <a:fld id="{7E50A921-1625-4E66-8B53-913CC32CAF35}" type="slidenum">
+              <a:rPr lang="en-NZ" smtClean="0"/>
+              <a:t>10</a:t>
+            </a:fld>
+            <a:endParaRPr lang="en-NZ" dirty="0"/>
+          </a:p>
+        </p:txBody>
+      </p:sp>
+    </p:spTree>
+    <p:extLst>
+      <p:ext uri="{BB962C8B-B14F-4D97-AF65-F5344CB8AC3E}">
+        <p14:creationId xmlns:p14="http://schemas.microsoft.com/office/powerpoint/2010/main" val="406299684"/>
+      </p:ext>
+    </p:extLst>
+  </p:cSld>
+  <p:clrMapOvr>
+    <a:masterClrMapping/>
+  </p:clrMapOvr>
+</p:sld>
+</file>
+
+<file path=ppt/slides/slide11.xml><?xml version="1.0" encoding="utf-8"?>
+<p:sld xmlns:a="http://schemas.openxmlformats.org/drawingml/2006/main" xmlns:r="http://schemas.openxmlformats.org/officeDocument/2006/relationships" xmlns:p="http://schemas.openxmlformats.org/presentationml/2006/main">
+  <p:cSld>
+    <p:spTree>
+      <p:nvGrpSpPr>
+        <p:cNvPr id="1" name=""/>
+        <p:cNvGrpSpPr/>
+        <p:nvPr/>
+      </p:nvGrpSpPr>
+      <p:grpSpPr>
+        <a:xfrm>
+          <a:off x="0" y="0"/>
+          <a:ext cx="0" cy="0"/>
+          <a:chOff x="0" y="0"/>
+          <a:chExt cx="0" cy="0"/>
+        </a:xfrm>
+      </p:grpSpPr>
+      <p:sp>
+        <p:nvSpPr>
+          <p:cNvPr id="2" name="Title 1">
+            <a:extLst>
+              <a:ext uri="{FF2B5EF4-FFF2-40B4-BE49-F238E27FC236}">
+                <a16:creationId xmlns:a16="http://schemas.microsoft.com/office/drawing/2014/main" id="{0E3D4BE5-9B71-A8EB-F825-B02C792C5B66}"/>
+              </a:ext>
+            </a:extLst>
+          </p:cNvPr>
+          <p:cNvSpPr>
+            <a:spLocks noGrp="1"/>
+          </p:cNvSpPr>
+          <p:nvPr>
+            <p:ph type="title"/>
+          </p:nvPr>
+        </p:nvSpPr>
+        <p:spPr>
+          <a:xfrm>
+            <a:off x="643855" y="1447800"/>
+            <a:ext cx="3108626" cy="4572000"/>
+          </a:xfrm>
+        </p:spPr>
+        <p:txBody>
+          <a:bodyPr anchor="ctr">
+            <a:normAutofit/>
+          </a:bodyPr>
+          <a:lstStyle/>
+          <a:p>
+            <a:r>
+              <a:rPr lang="en-NZ" sz="3200" dirty="0">
+                <a:solidFill>
+                  <a:srgbClr val="F2F2F2"/>
+                </a:solidFill>
+              </a:rPr>
+              <a:t>What is JIT compiler?</a:t>
+            </a:r>
+            <a:br>
+              <a:rPr lang="en-NZ" sz="3200" dirty="0">
+                <a:solidFill>
+                  <a:srgbClr val="F2F2F2"/>
+                </a:solidFill>
+              </a:rPr>
+            </a:br>
+            <a:endParaRPr lang="en-NZ" sz="3200" dirty="0">
+              <a:solidFill>
+                <a:srgbClr val="F2F2F2"/>
+              </a:solidFill>
+            </a:endParaRPr>
+          </a:p>
+        </p:txBody>
+      </p:sp>
+      <p:sp>
+        <p:nvSpPr>
+          <p:cNvPr id="4" name="Slide Number Placeholder 3">
+            <a:extLst>
+              <a:ext uri="{FF2B5EF4-FFF2-40B4-BE49-F238E27FC236}">
+                <a16:creationId xmlns:a16="http://schemas.microsoft.com/office/drawing/2014/main" id="{D8D52B4C-6702-2465-EEDA-4E62AD0F7D8D}"/>
+              </a:ext>
+            </a:extLst>
+          </p:cNvPr>
+          <p:cNvSpPr>
+            <a:spLocks noGrp="1"/>
+          </p:cNvSpPr>
+          <p:nvPr>
+            <p:ph type="sldNum" sz="quarter" idx="12"/>
+          </p:nvPr>
+        </p:nvSpPr>
+        <p:spPr>
+          <a:xfrm>
+            <a:off x="10352540" y="295729"/>
+            <a:ext cx="838199" cy="767687"/>
+          </a:xfrm>
+        </p:spPr>
+        <p:txBody>
+          <a:bodyPr>
+            <a:normAutofit/>
+          </a:bodyPr>
+          <a:lstStyle/>
+          <a:p>
+            <a:pPr>
+              <a:spcAft>
+                <a:spcPts val="600"/>
+              </a:spcAft>
+            </a:pPr>
+            <a:fld id="{7E50A921-1625-4E66-8B53-913CC32CAF35}" type="slidenum">
+              <a:rPr lang="en-NZ">
+                <a:solidFill>
+                  <a:srgbClr val="FFFFFF"/>
+                </a:solidFill>
+              </a:rPr>
+              <a:pPr>
+                <a:spcAft>
+                  <a:spcPts val="600"/>
+                </a:spcAft>
+              </a:pPr>
+              <a:t>11</a:t>
+            </a:fld>
+            <a:endParaRPr lang="en-NZ">
+              <a:solidFill>
+                <a:srgbClr val="FFFFFF"/>
+              </a:solidFill>
+            </a:endParaRPr>
+          </a:p>
+        </p:txBody>
+      </p:sp>
+      <p:graphicFrame>
+        <p:nvGraphicFramePr>
+          <p:cNvPr id="6" name="Content Placeholder 2">
+            <a:extLst>
+              <a:ext uri="{FF2B5EF4-FFF2-40B4-BE49-F238E27FC236}">
+                <a16:creationId xmlns:a16="http://schemas.microsoft.com/office/drawing/2014/main" id="{2502376C-7173-60FD-A3B4-9859A7B3096A}"/>
+              </a:ext>
+            </a:extLst>
+          </p:cNvPr>
+          <p:cNvGraphicFramePr>
+            <a:graphicFrameLocks noGrp="1"/>
+          </p:cNvGraphicFramePr>
+          <p:nvPr>
+            <p:ph idx="1"/>
+          </p:nvPr>
+        </p:nvGraphicFramePr>
+        <p:xfrm>
+          <a:off x="5048250" y="1447800"/>
+          <a:ext cx="6496050" cy="4572000"/>
+        </p:xfrm>
+        <a:graphic>
+          <a:graphicData uri="http://schemas.openxmlformats.org/drawingml/2006/diagram">
+            <dgm:relIds xmlns:dgm="http://schemas.openxmlformats.org/drawingml/2006/diagram" xmlns:r="http://schemas.openxmlformats.org/officeDocument/2006/relationships" r:dm="rId2" r:lo="rId3" r:qs="rId4" r:cs="rId5"/>
+          </a:graphicData>
+        </a:graphic>
+      </p:graphicFrame>
+    </p:spTree>
+    <p:extLst>
+      <p:ext uri="{BB962C8B-B14F-4D97-AF65-F5344CB8AC3E}">
+        <p14:creationId xmlns:p14="http://schemas.microsoft.com/office/powerpoint/2010/main" val="2741470329"/>
+      </p:ext>
+    </p:extLst>
+  </p:cSld>
+  <p:clrMapOvr>
+    <a:masterClrMapping/>
+  </p:clrMapOvr>
+</p:sld>
+</file>
+
+<file path=ppt/slides/slide12.xml><?xml version="1.0" encoding="utf-8"?>
+<p:sld xmlns:a="http://schemas.openxmlformats.org/drawingml/2006/main" xmlns:r="http://schemas.openxmlformats.org/officeDocument/2006/relationships" xmlns:p="http://schemas.openxmlformats.org/presentationml/2006/main">
+  <p:cSld>
+    <p:spTree>
+      <p:nvGrpSpPr>
+        <p:cNvPr id="1" name=""/>
+        <p:cNvGrpSpPr/>
+        <p:nvPr/>
+      </p:nvGrpSpPr>
+      <p:grpSpPr>
+        <a:xfrm>
+          <a:off x="0" y="0"/>
+          <a:ext cx="0" cy="0"/>
+          <a:chOff x="0" y="0"/>
+          <a:chExt cx="0" cy="0"/>
+        </a:xfrm>
+      </p:grpSpPr>
+      <p:sp>
+        <p:nvSpPr>
+          <p:cNvPr id="2" name="Title 1">
+            <a:extLst>
+              <a:ext uri="{FF2B5EF4-FFF2-40B4-BE49-F238E27FC236}">
                 <a16:creationId xmlns:a16="http://schemas.microsoft.com/office/drawing/2014/main" id="{2C5B0782-7159-8F98-2E27-954D7DE52950}"/>
               </a:ext>
             </a:extLst>
@@ -16520,7 +16812,7 @@
           <a:p>
             <a:fld id="{7E50A921-1625-4E66-8B53-913CC32CAF35}" type="slidenum">
               <a:rPr lang="en-NZ" smtClean="0"/>
-              <a:t>10</a:t>
+              <a:t>12</a:t>
             </a:fld>
             <a:endParaRPr lang="en-NZ"/>
           </a:p>
@@ -16728,7 +17020,7 @@
 </p:sld>
 </file>
 
-<file path=ppt/slides/slide11.xml><?xml version="1.0" encoding="utf-8"?>
+<file path=ppt/slides/slide13.xml><?xml version="1.0" encoding="utf-8"?>
 <p:sld xmlns:a="http://schemas.openxmlformats.org/drawingml/2006/main" xmlns:r="http://schemas.openxmlformats.org/officeDocument/2006/relationships" xmlns:p="http://schemas.openxmlformats.org/presentationml/2006/main">
   <p:cSld>
     <p:bg>
@@ -17781,7 +18073,7 @@
                   <a:spcPts val="600"/>
                 </a:spcAft>
               </a:pPr>
-              <a:t>11</a:t>
+              <a:t>13</a:t>
             </a:fld>
             <a:endParaRPr lang="en-US">
               <a:solidFill>
@@ -17897,7 +18189,7 @@
 </p:sld>
 </file>
 
-<file path=ppt/slides/slide12.xml><?xml version="1.0" encoding="utf-8"?>
+<file path=ppt/slides/slide14.xml><?xml version="1.0" encoding="utf-8"?>
 <p:sld xmlns:a="http://schemas.openxmlformats.org/drawingml/2006/main" xmlns:r="http://schemas.openxmlformats.org/officeDocument/2006/relationships" xmlns:p="http://schemas.openxmlformats.org/presentationml/2006/main">
   <p:cSld>
     <p:bg>
@@ -18981,7 +19273,7 @@
                   <a:spcPts val="600"/>
                 </a:spcAft>
               </a:pPr>
-              <a:t>12</a:t>
+              <a:t>14</a:t>
             </a:fld>
             <a:endParaRPr lang="en-NZ">
               <a:solidFill>
@@ -19035,7 +19327,7 @@
 </p:sld>
 </file>
 
-<file path=ppt/slides/slide13.xml><?xml version="1.0" encoding="utf-8"?>
+<file path=ppt/slides/slide15.xml><?xml version="1.0" encoding="utf-8"?>
 <p:sld xmlns:a="http://schemas.openxmlformats.org/drawingml/2006/main" xmlns:r="http://schemas.openxmlformats.org/officeDocument/2006/relationships" xmlns:p="http://schemas.openxmlformats.org/presentationml/2006/main">
   <p:cSld>
     <p:spTree>
@@ -19219,7 +19511,7 @@
           <a:p>
             <a:fld id="{7E50A921-1625-4E66-8B53-913CC32CAF35}" type="slidenum">
               <a:rPr lang="en-NZ" smtClean="0"/>
-              <a:t>13</a:t>
+              <a:t>15</a:t>
             </a:fld>
             <a:endParaRPr lang="en-NZ" dirty="0"/>
           </a:p>
@@ -19238,7 +19530,7 @@
 </p:sld>
 </file>
 
-<file path=ppt/slides/slide14.xml><?xml version="1.0" encoding="utf-8"?>
+<file path=ppt/slides/slide16.xml><?xml version="1.0" encoding="utf-8"?>
 <p:sld xmlns:a="http://schemas.openxmlformats.org/drawingml/2006/main" xmlns:r="http://schemas.openxmlformats.org/officeDocument/2006/relationships" xmlns:p="http://schemas.openxmlformats.org/presentationml/2006/main">
   <p:cSld>
     <p:spTree>
@@ -19378,7 +19670,7 @@
           <a:p>
             <a:fld id="{7E50A921-1625-4E66-8B53-913CC32CAF35}" type="slidenum">
               <a:rPr lang="en-NZ" smtClean="0"/>
-              <a:t>14</a:t>
+              <a:t>16</a:t>
             </a:fld>
             <a:endParaRPr lang="en-NZ" dirty="0"/>
           </a:p>
@@ -19433,7 +19725,7 @@
 </p:sld>
 </file>
 
-<file path=ppt/slides/slide15.xml><?xml version="1.0" encoding="utf-8"?>
+<file path=ppt/slides/slide17.xml><?xml version="1.0" encoding="utf-8"?>
 <p:sld xmlns:a="http://schemas.openxmlformats.org/drawingml/2006/main" xmlns:r="http://schemas.openxmlformats.org/officeDocument/2006/relationships" xmlns:p="http://schemas.openxmlformats.org/presentationml/2006/main">
   <p:cSld>
     <p:bg>
@@ -20042,7 +20334,7 @@
                   <a:spcPts val="600"/>
                 </a:spcAft>
               </a:pPr>
-              <a:t>15</a:t>
+              <a:t>17</a:t>
             </a:fld>
             <a:endParaRPr lang="en-NZ">
               <a:solidFill>
@@ -20740,7 +21032,7 @@
 </p:sld>
 </file>
 
-<file path=ppt/slides/slide16.xml><?xml version="1.0" encoding="utf-8"?>
+<file path=ppt/slides/slide18.xml><?xml version="1.0" encoding="utf-8"?>
 <p:sld xmlns:a="http://schemas.openxmlformats.org/drawingml/2006/main" xmlns:r="http://schemas.openxmlformats.org/officeDocument/2006/relationships" xmlns:p="http://schemas.openxmlformats.org/presentationml/2006/main">
   <p:cSld>
     <p:spTree>
@@ -20826,7 +21118,7 @@
           <a:p>
             <a:fld id="{7E50A921-1625-4E66-8B53-913CC32CAF35}" type="slidenum">
               <a:rPr lang="en-NZ" smtClean="0"/>
-              <a:t>16</a:t>
+              <a:t>18</a:t>
             </a:fld>
             <a:endParaRPr lang="en-NZ"/>
           </a:p>
@@ -20845,7 +21137,7 @@
 </p:sld>
 </file>
 
-<file path=ppt/slides/slide17.xml><?xml version="1.0" encoding="utf-8"?>
+<file path=ppt/slides/slide19.xml><?xml version="1.0" encoding="utf-8"?>
 <p:sld xmlns:a="http://schemas.openxmlformats.org/drawingml/2006/main" xmlns:r="http://schemas.openxmlformats.org/officeDocument/2006/relationships" xmlns:p="http://schemas.openxmlformats.org/presentationml/2006/main">
   <p:cSld>
     <p:spTree>
@@ -21109,7 +21401,7 @@
           <a:p>
             <a:fld id="{7E50A921-1625-4E66-8B53-913CC32CAF35}" type="slidenum">
               <a:rPr lang="en-NZ" smtClean="0"/>
-              <a:t>17</a:t>
+              <a:t>19</a:t>
             </a:fld>
             <a:endParaRPr lang="en-NZ"/>
           </a:p>
@@ -21119,261 +21411,6 @@
     <p:extLst>
       <p:ext uri="{BB962C8B-B14F-4D97-AF65-F5344CB8AC3E}">
         <p14:creationId xmlns:p14="http://schemas.microsoft.com/office/powerpoint/2010/main" val="2472288588"/>
-      </p:ext>
-    </p:extLst>
-  </p:cSld>
-  <p:clrMapOvr>
-    <a:masterClrMapping/>
-  </p:clrMapOvr>
-</p:sld>
-</file>
-
-<file path=ppt/slides/slide18.xml><?xml version="1.0" encoding="utf-8"?>
-<p:sld xmlns:a="http://schemas.openxmlformats.org/drawingml/2006/main" xmlns:r="http://schemas.openxmlformats.org/officeDocument/2006/relationships" xmlns:p="http://schemas.openxmlformats.org/presentationml/2006/main">
-  <p:cSld>
-    <p:spTree>
-      <p:nvGrpSpPr>
-        <p:cNvPr id="1" name=""/>
-        <p:cNvGrpSpPr/>
-        <p:nvPr/>
-      </p:nvGrpSpPr>
-      <p:grpSpPr>
-        <a:xfrm>
-          <a:off x="0" y="0"/>
-          <a:ext cx="0" cy="0"/>
-          <a:chOff x="0" y="0"/>
-          <a:chExt cx="0" cy="0"/>
-        </a:xfrm>
-      </p:grpSpPr>
-      <p:sp>
-        <p:nvSpPr>
-          <p:cNvPr id="2" name="Title 1">
-            <a:extLst>
-              <a:ext uri="{FF2B5EF4-FFF2-40B4-BE49-F238E27FC236}">
-                <a16:creationId xmlns:a16="http://schemas.microsoft.com/office/drawing/2014/main" id="{2CD7E0BE-CA37-0CF2-261E-922D222F6105}"/>
-              </a:ext>
-            </a:extLst>
-          </p:cNvPr>
-          <p:cNvSpPr>
-            <a:spLocks noGrp="1"/>
-          </p:cNvSpPr>
-          <p:nvPr>
-            <p:ph type="title"/>
-          </p:nvPr>
-        </p:nvSpPr>
-        <p:spPr/>
-        <p:txBody>
-          <a:bodyPr/>
-          <a:lstStyle/>
-          <a:p>
-            <a:r>
-              <a:rPr lang="nl-NL" dirty="0" err="1"/>
-              <a:t>Reflection</a:t>
-            </a:r>
-            <a:endParaRPr lang="en-NZ" dirty="0"/>
-          </a:p>
-        </p:txBody>
-      </p:sp>
-      <p:sp>
-        <p:nvSpPr>
-          <p:cNvPr id="3" name="Content Placeholder 2">
-            <a:extLst>
-              <a:ext uri="{FF2B5EF4-FFF2-40B4-BE49-F238E27FC236}">
-                <a16:creationId xmlns:a16="http://schemas.microsoft.com/office/drawing/2014/main" id="{EF48514B-889F-D4B9-BCFE-E2E0041C0F14}"/>
-              </a:ext>
-            </a:extLst>
-          </p:cNvPr>
-          <p:cNvSpPr>
-            <a:spLocks noGrp="1"/>
-          </p:cNvSpPr>
-          <p:nvPr>
-            <p:ph idx="1"/>
-          </p:nvPr>
-        </p:nvSpPr>
-        <p:spPr/>
-        <p:txBody>
-          <a:bodyPr/>
-          <a:lstStyle/>
-          <a:p>
-            <a:r>
-              <a:rPr lang="en-NZ" dirty="0"/>
-              <a:t>Did this workshop help you understand what JIT compilation can offer?</a:t>
-            </a:r>
-          </a:p>
-          <a:p>
-            <a:r>
-              <a:rPr lang="en-NZ" dirty="0"/>
-              <a:t>Is there a specific topic related to JIT compilation that you would like to learn more about or dive deeper into?</a:t>
-            </a:r>
-          </a:p>
-          <a:p>
-            <a:r>
-              <a:rPr lang="en-NZ" dirty="0"/>
-              <a:t>Did you enjoy the workshop</a:t>
-            </a:r>
-            <a:r>
-              <a:rPr lang="en-NZ"/>
-              <a:t>? </a:t>
-            </a:r>
-            <a:endParaRPr lang="en-NZ" dirty="0"/>
-          </a:p>
-        </p:txBody>
-      </p:sp>
-      <p:sp>
-        <p:nvSpPr>
-          <p:cNvPr id="4" name="Slide Number Placeholder 3">
-            <a:extLst>
-              <a:ext uri="{FF2B5EF4-FFF2-40B4-BE49-F238E27FC236}">
-                <a16:creationId xmlns:a16="http://schemas.microsoft.com/office/drawing/2014/main" id="{8F03B50C-9C64-D24C-8D00-56E3F0DDC295}"/>
-              </a:ext>
-            </a:extLst>
-          </p:cNvPr>
-          <p:cNvSpPr>
-            <a:spLocks noGrp="1"/>
-          </p:cNvSpPr>
-          <p:nvPr>
-            <p:ph type="sldNum" sz="quarter" idx="12"/>
-          </p:nvPr>
-        </p:nvSpPr>
-        <p:spPr/>
-        <p:txBody>
-          <a:bodyPr/>
-          <a:lstStyle/>
-          <a:p>
-            <a:fld id="{7E50A921-1625-4E66-8B53-913CC32CAF35}" type="slidenum">
-              <a:rPr lang="en-NZ" smtClean="0"/>
-              <a:t>18</a:t>
-            </a:fld>
-            <a:endParaRPr lang="en-NZ" dirty="0"/>
-          </a:p>
-        </p:txBody>
-      </p:sp>
-    </p:spTree>
-    <p:extLst>
-      <p:ext uri="{BB962C8B-B14F-4D97-AF65-F5344CB8AC3E}">
-        <p14:creationId xmlns:p14="http://schemas.microsoft.com/office/powerpoint/2010/main" val="2575600191"/>
-      </p:ext>
-    </p:extLst>
-  </p:cSld>
-  <p:clrMapOvr>
-    <a:masterClrMapping/>
-  </p:clrMapOvr>
-</p:sld>
-</file>
-
-<file path=ppt/slides/slide19.xml><?xml version="1.0" encoding="utf-8"?>
-<p:sld xmlns:a="http://schemas.openxmlformats.org/drawingml/2006/main" xmlns:r="http://schemas.openxmlformats.org/officeDocument/2006/relationships" xmlns:p="http://schemas.openxmlformats.org/presentationml/2006/main">
-  <p:cSld>
-    <p:spTree>
-      <p:nvGrpSpPr>
-        <p:cNvPr id="1" name=""/>
-        <p:cNvGrpSpPr/>
-        <p:nvPr/>
-      </p:nvGrpSpPr>
-      <p:grpSpPr>
-        <a:xfrm>
-          <a:off x="0" y="0"/>
-          <a:ext cx="0" cy="0"/>
-          <a:chOff x="0" y="0"/>
-          <a:chExt cx="0" cy="0"/>
-        </a:xfrm>
-      </p:grpSpPr>
-      <p:sp>
-        <p:nvSpPr>
-          <p:cNvPr id="2" name="Title 1">
-            <a:extLst>
-              <a:ext uri="{FF2B5EF4-FFF2-40B4-BE49-F238E27FC236}">
-                <a16:creationId xmlns:a16="http://schemas.microsoft.com/office/drawing/2014/main" id="{0DC1F5F1-E9B3-388B-F2F4-A727DA0B29C5}"/>
-              </a:ext>
-            </a:extLst>
-          </p:cNvPr>
-          <p:cNvSpPr>
-            <a:spLocks noGrp="1"/>
-          </p:cNvSpPr>
-          <p:nvPr>
-            <p:ph type="title"/>
-          </p:nvPr>
-        </p:nvSpPr>
-        <p:spPr>
-          <a:xfrm>
-            <a:off x="947817" y="2728735"/>
-            <a:ext cx="9404723" cy="1400530"/>
-          </a:xfrm>
-        </p:spPr>
-        <p:txBody>
-          <a:bodyPr/>
-          <a:lstStyle/>
-          <a:p>
-            <a:pPr algn="ctr"/>
-            <a:r>
-              <a:rPr lang="nl-NL" dirty="0" err="1"/>
-              <a:t>Thank</a:t>
-            </a:r>
-            <a:r>
-              <a:rPr lang="nl-NL" dirty="0"/>
-              <a:t> </a:t>
-            </a:r>
-            <a:r>
-              <a:rPr lang="nl-NL" dirty="0" err="1"/>
-              <a:t>you</a:t>
-            </a:r>
-            <a:r>
-              <a:rPr lang="nl-NL" dirty="0"/>
-              <a:t> </a:t>
-            </a:r>
-            <a:r>
-              <a:rPr lang="nl-NL" dirty="0" err="1"/>
-              <a:t>for</a:t>
-            </a:r>
-            <a:r>
-              <a:rPr lang="nl-NL" dirty="0"/>
-              <a:t> </a:t>
-            </a:r>
-            <a:r>
-              <a:rPr lang="nl-NL" dirty="0" err="1"/>
-              <a:t>your</a:t>
-            </a:r>
-            <a:r>
-              <a:rPr lang="nl-NL" dirty="0"/>
-              <a:t> attention.</a:t>
-            </a:r>
-            <a:endParaRPr lang="en-NZ" dirty="0"/>
-          </a:p>
-        </p:txBody>
-      </p:sp>
-      <p:sp>
-        <p:nvSpPr>
-          <p:cNvPr id="4" name="Slide Number Placeholder 3">
-            <a:extLst>
-              <a:ext uri="{FF2B5EF4-FFF2-40B4-BE49-F238E27FC236}">
-                <a16:creationId xmlns:a16="http://schemas.microsoft.com/office/drawing/2014/main" id="{0AD92AA6-2E8A-6582-404D-D5137E8A5B21}"/>
-              </a:ext>
-            </a:extLst>
-          </p:cNvPr>
-          <p:cNvSpPr>
-            <a:spLocks noGrp="1"/>
-          </p:cNvSpPr>
-          <p:nvPr>
-            <p:ph type="sldNum" sz="quarter" idx="12"/>
-          </p:nvPr>
-        </p:nvSpPr>
-        <p:spPr/>
-        <p:txBody>
-          <a:bodyPr/>
-          <a:lstStyle/>
-          <a:p>
-            <a:fld id="{7E50A921-1625-4E66-8B53-913CC32CAF35}" type="slidenum">
-              <a:rPr lang="en-NZ" smtClean="0"/>
-              <a:t>19</a:t>
-            </a:fld>
-            <a:endParaRPr lang="en-NZ" dirty="0"/>
-          </a:p>
-        </p:txBody>
-      </p:sp>
-    </p:spTree>
-    <p:extLst>
-      <p:ext uri="{BB962C8B-B14F-4D97-AF65-F5344CB8AC3E}">
-        <p14:creationId xmlns:p14="http://schemas.microsoft.com/office/powerpoint/2010/main" val="2731243771"/>
       </p:ext>
     </p:extLst>
   </p:cSld>
@@ -21463,11 +21500,19 @@
           <a:p>
             <a:r>
               <a:rPr lang="nl-NL" dirty="0"/>
-              <a:t>Student </a:t>
+              <a:t>Compiler </a:t>
             </a:r>
             <a:r>
               <a:rPr lang="nl-NL" dirty="0" err="1"/>
-              <a:t>knowledge</a:t>
+              <a:t>vs</a:t>
+            </a:r>
+            <a:r>
+              <a:rPr lang="nl-NL" dirty="0"/>
+              <a:t> </a:t>
+            </a:r>
+            <a:r>
+              <a:rPr lang="nl-NL" dirty="0" err="1"/>
+              <a:t>interpreter</a:t>
             </a:r>
             <a:r>
               <a:rPr lang="nl-NL" dirty="0"/>
@@ -21618,6 +21663,261 @@
     <p:extLst>
       <p:ext uri="{BB962C8B-B14F-4D97-AF65-F5344CB8AC3E}">
         <p14:creationId xmlns:p14="http://schemas.microsoft.com/office/powerpoint/2010/main" val="543737575"/>
+      </p:ext>
+    </p:extLst>
+  </p:cSld>
+  <p:clrMapOvr>
+    <a:masterClrMapping/>
+  </p:clrMapOvr>
+</p:sld>
+</file>
+
+<file path=ppt/slides/slide20.xml><?xml version="1.0" encoding="utf-8"?>
+<p:sld xmlns:a="http://schemas.openxmlformats.org/drawingml/2006/main" xmlns:r="http://schemas.openxmlformats.org/officeDocument/2006/relationships" xmlns:p="http://schemas.openxmlformats.org/presentationml/2006/main">
+  <p:cSld>
+    <p:spTree>
+      <p:nvGrpSpPr>
+        <p:cNvPr id="1" name=""/>
+        <p:cNvGrpSpPr/>
+        <p:nvPr/>
+      </p:nvGrpSpPr>
+      <p:grpSpPr>
+        <a:xfrm>
+          <a:off x="0" y="0"/>
+          <a:ext cx="0" cy="0"/>
+          <a:chOff x="0" y="0"/>
+          <a:chExt cx="0" cy="0"/>
+        </a:xfrm>
+      </p:grpSpPr>
+      <p:sp>
+        <p:nvSpPr>
+          <p:cNvPr id="2" name="Title 1">
+            <a:extLst>
+              <a:ext uri="{FF2B5EF4-FFF2-40B4-BE49-F238E27FC236}">
+                <a16:creationId xmlns:a16="http://schemas.microsoft.com/office/drawing/2014/main" id="{2CD7E0BE-CA37-0CF2-261E-922D222F6105}"/>
+              </a:ext>
+            </a:extLst>
+          </p:cNvPr>
+          <p:cNvSpPr>
+            <a:spLocks noGrp="1"/>
+          </p:cNvSpPr>
+          <p:nvPr>
+            <p:ph type="title"/>
+          </p:nvPr>
+        </p:nvSpPr>
+        <p:spPr/>
+        <p:txBody>
+          <a:bodyPr/>
+          <a:lstStyle/>
+          <a:p>
+            <a:r>
+              <a:rPr lang="nl-NL" dirty="0" err="1"/>
+              <a:t>Reflection</a:t>
+            </a:r>
+            <a:endParaRPr lang="en-NZ" dirty="0"/>
+          </a:p>
+        </p:txBody>
+      </p:sp>
+      <p:sp>
+        <p:nvSpPr>
+          <p:cNvPr id="3" name="Content Placeholder 2">
+            <a:extLst>
+              <a:ext uri="{FF2B5EF4-FFF2-40B4-BE49-F238E27FC236}">
+                <a16:creationId xmlns:a16="http://schemas.microsoft.com/office/drawing/2014/main" id="{EF48514B-889F-D4B9-BCFE-E2E0041C0F14}"/>
+              </a:ext>
+            </a:extLst>
+          </p:cNvPr>
+          <p:cNvSpPr>
+            <a:spLocks noGrp="1"/>
+          </p:cNvSpPr>
+          <p:nvPr>
+            <p:ph idx="1"/>
+          </p:nvPr>
+        </p:nvSpPr>
+        <p:spPr/>
+        <p:txBody>
+          <a:bodyPr/>
+          <a:lstStyle/>
+          <a:p>
+            <a:r>
+              <a:rPr lang="en-NZ" dirty="0"/>
+              <a:t>Did this workshop help you understand what JIT compilation can offer?</a:t>
+            </a:r>
+          </a:p>
+          <a:p>
+            <a:r>
+              <a:rPr lang="en-NZ" dirty="0"/>
+              <a:t>Is there a specific topic related to JIT compilation that you would like to learn more about or dive deeper into?</a:t>
+            </a:r>
+          </a:p>
+          <a:p>
+            <a:r>
+              <a:rPr lang="en-NZ" dirty="0"/>
+              <a:t>Did you enjoy the workshop</a:t>
+            </a:r>
+            <a:r>
+              <a:rPr lang="en-NZ"/>
+              <a:t>? </a:t>
+            </a:r>
+            <a:endParaRPr lang="en-NZ" dirty="0"/>
+          </a:p>
+        </p:txBody>
+      </p:sp>
+      <p:sp>
+        <p:nvSpPr>
+          <p:cNvPr id="4" name="Slide Number Placeholder 3">
+            <a:extLst>
+              <a:ext uri="{FF2B5EF4-FFF2-40B4-BE49-F238E27FC236}">
+                <a16:creationId xmlns:a16="http://schemas.microsoft.com/office/drawing/2014/main" id="{8F03B50C-9C64-D24C-8D00-56E3F0DDC295}"/>
+              </a:ext>
+            </a:extLst>
+          </p:cNvPr>
+          <p:cNvSpPr>
+            <a:spLocks noGrp="1"/>
+          </p:cNvSpPr>
+          <p:nvPr>
+            <p:ph type="sldNum" sz="quarter" idx="12"/>
+          </p:nvPr>
+        </p:nvSpPr>
+        <p:spPr/>
+        <p:txBody>
+          <a:bodyPr/>
+          <a:lstStyle/>
+          <a:p>
+            <a:fld id="{7E50A921-1625-4E66-8B53-913CC32CAF35}" type="slidenum">
+              <a:rPr lang="en-NZ" smtClean="0"/>
+              <a:t>20</a:t>
+            </a:fld>
+            <a:endParaRPr lang="en-NZ" dirty="0"/>
+          </a:p>
+        </p:txBody>
+      </p:sp>
+    </p:spTree>
+    <p:extLst>
+      <p:ext uri="{BB962C8B-B14F-4D97-AF65-F5344CB8AC3E}">
+        <p14:creationId xmlns:p14="http://schemas.microsoft.com/office/powerpoint/2010/main" val="2575600191"/>
+      </p:ext>
+    </p:extLst>
+  </p:cSld>
+  <p:clrMapOvr>
+    <a:masterClrMapping/>
+  </p:clrMapOvr>
+</p:sld>
+</file>
+
+<file path=ppt/slides/slide21.xml><?xml version="1.0" encoding="utf-8"?>
+<p:sld xmlns:a="http://schemas.openxmlformats.org/drawingml/2006/main" xmlns:r="http://schemas.openxmlformats.org/officeDocument/2006/relationships" xmlns:p="http://schemas.openxmlformats.org/presentationml/2006/main">
+  <p:cSld>
+    <p:spTree>
+      <p:nvGrpSpPr>
+        <p:cNvPr id="1" name=""/>
+        <p:cNvGrpSpPr/>
+        <p:nvPr/>
+      </p:nvGrpSpPr>
+      <p:grpSpPr>
+        <a:xfrm>
+          <a:off x="0" y="0"/>
+          <a:ext cx="0" cy="0"/>
+          <a:chOff x="0" y="0"/>
+          <a:chExt cx="0" cy="0"/>
+        </a:xfrm>
+      </p:grpSpPr>
+      <p:sp>
+        <p:nvSpPr>
+          <p:cNvPr id="2" name="Title 1">
+            <a:extLst>
+              <a:ext uri="{FF2B5EF4-FFF2-40B4-BE49-F238E27FC236}">
+                <a16:creationId xmlns:a16="http://schemas.microsoft.com/office/drawing/2014/main" id="{0DC1F5F1-E9B3-388B-F2F4-A727DA0B29C5}"/>
+              </a:ext>
+            </a:extLst>
+          </p:cNvPr>
+          <p:cNvSpPr>
+            <a:spLocks noGrp="1"/>
+          </p:cNvSpPr>
+          <p:nvPr>
+            <p:ph type="title"/>
+          </p:nvPr>
+        </p:nvSpPr>
+        <p:spPr>
+          <a:xfrm>
+            <a:off x="947817" y="2728735"/>
+            <a:ext cx="9404723" cy="1400530"/>
+          </a:xfrm>
+        </p:spPr>
+        <p:txBody>
+          <a:bodyPr/>
+          <a:lstStyle/>
+          <a:p>
+            <a:pPr algn="ctr"/>
+            <a:r>
+              <a:rPr lang="nl-NL" dirty="0" err="1"/>
+              <a:t>Thank</a:t>
+            </a:r>
+            <a:r>
+              <a:rPr lang="nl-NL" dirty="0"/>
+              <a:t> </a:t>
+            </a:r>
+            <a:r>
+              <a:rPr lang="nl-NL" dirty="0" err="1"/>
+              <a:t>you</a:t>
+            </a:r>
+            <a:r>
+              <a:rPr lang="nl-NL" dirty="0"/>
+              <a:t> </a:t>
+            </a:r>
+            <a:r>
+              <a:rPr lang="nl-NL" dirty="0" err="1"/>
+              <a:t>for</a:t>
+            </a:r>
+            <a:r>
+              <a:rPr lang="nl-NL" dirty="0"/>
+              <a:t> </a:t>
+            </a:r>
+            <a:r>
+              <a:rPr lang="nl-NL" dirty="0" err="1"/>
+              <a:t>your</a:t>
+            </a:r>
+            <a:r>
+              <a:rPr lang="nl-NL" dirty="0"/>
+              <a:t> attention.</a:t>
+            </a:r>
+            <a:endParaRPr lang="en-NZ" dirty="0"/>
+          </a:p>
+        </p:txBody>
+      </p:sp>
+      <p:sp>
+        <p:nvSpPr>
+          <p:cNvPr id="4" name="Slide Number Placeholder 3">
+            <a:extLst>
+              <a:ext uri="{FF2B5EF4-FFF2-40B4-BE49-F238E27FC236}">
+                <a16:creationId xmlns:a16="http://schemas.microsoft.com/office/drawing/2014/main" id="{0AD92AA6-2E8A-6582-404D-D5137E8A5B21}"/>
+              </a:ext>
+            </a:extLst>
+          </p:cNvPr>
+          <p:cNvSpPr>
+            <a:spLocks noGrp="1"/>
+          </p:cNvSpPr>
+          <p:nvPr>
+            <p:ph type="sldNum" sz="quarter" idx="12"/>
+          </p:nvPr>
+        </p:nvSpPr>
+        <p:spPr/>
+        <p:txBody>
+          <a:bodyPr/>
+          <a:lstStyle/>
+          <a:p>
+            <a:fld id="{7E50A921-1625-4E66-8B53-913CC32CAF35}" type="slidenum">
+              <a:rPr lang="en-NZ" smtClean="0"/>
+              <a:t>21</a:t>
+            </a:fld>
+            <a:endParaRPr lang="en-NZ" dirty="0"/>
+          </a:p>
+        </p:txBody>
+      </p:sp>
+    </p:spTree>
+    <p:extLst>
+      <p:ext uri="{BB962C8B-B14F-4D97-AF65-F5344CB8AC3E}">
+        <p14:creationId xmlns:p14="http://schemas.microsoft.com/office/powerpoint/2010/main" val="2731243771"/>
       </p:ext>
     </p:extLst>
   </p:cSld>
@@ -21649,7 +21949,7 @@
           <p:cNvPr id="2" name="Title 1">
             <a:extLst>
               <a:ext uri="{FF2B5EF4-FFF2-40B4-BE49-F238E27FC236}">
-                <a16:creationId xmlns:a16="http://schemas.microsoft.com/office/drawing/2014/main" id="{F6802B09-E94F-1FD7-978C-AF7DBFB6DC77}"/>
+                <a16:creationId xmlns:a16="http://schemas.microsoft.com/office/drawing/2014/main" id="{3CBED2EF-781F-A098-87A2-54DE51DE9E77}"/>
               </a:ext>
             </a:extLst>
           </p:cNvPr>
@@ -21666,23 +21966,53 @@
           <a:lstStyle/>
           <a:p>
             <a:r>
-              <a:rPr lang="nl-NL" dirty="0" err="1"/>
-              <a:t>What</a:t>
-            </a:r>
-            <a:r>
-              <a:rPr lang="nl-NL" dirty="0"/>
-              <a:t> is a compiler?</a:t>
-            </a:r>
-            <a:endParaRPr lang="en-NZ" dirty="0"/>
+              <a:rPr lang="en-NL" dirty="0"/>
+              <a:t>Why?</a:t>
+            </a:r>
           </a:p>
         </p:txBody>
       </p:sp>
+      <p:pic>
+        <p:nvPicPr>
+          <p:cNvPr id="6" name="Content Placeholder 5" descr="A screenshot of a computer&#10;&#10;Description automatically generated">
+            <a:extLst>
+              <a:ext uri="{FF2B5EF4-FFF2-40B4-BE49-F238E27FC236}">
+                <a16:creationId xmlns:a16="http://schemas.microsoft.com/office/drawing/2014/main" id="{01ADEE90-65C4-D9B7-C1AC-25E8AFE40B66}"/>
+              </a:ext>
+            </a:extLst>
+          </p:cNvPr>
+          <p:cNvPicPr>
+            <a:picLocks noGrp="1" noChangeAspect="1"/>
+          </p:cNvPicPr>
+          <p:nvPr>
+            <p:ph idx="1"/>
+          </p:nvPr>
+        </p:nvPicPr>
+        <p:blipFill>
+          <a:blip r:embed="rId2">
+            <a:extLst>
+              <a:ext uri="{28A0092B-C50C-407E-A947-70E740481C1C}">
+                <a14:useLocalDpi xmlns:a14="http://schemas.microsoft.com/office/drawing/2010/main" val="0"/>
+              </a:ext>
+            </a:extLst>
+          </a:blip>
+          <a:stretch>
+            <a:fillRect/>
+          </a:stretch>
+        </p:blipFill>
+        <p:spPr>
+          <a:xfrm>
+            <a:off x="1001261" y="1992302"/>
+            <a:ext cx="9575669" cy="3855669"/>
+          </a:xfrm>
+        </p:spPr>
+      </p:pic>
       <p:sp>
         <p:nvSpPr>
           <p:cNvPr id="4" name="Slide Number Placeholder 3">
             <a:extLst>
               <a:ext uri="{FF2B5EF4-FFF2-40B4-BE49-F238E27FC236}">
-                <a16:creationId xmlns:a16="http://schemas.microsoft.com/office/drawing/2014/main" id="{640E8D7F-DF52-64A5-B10D-A39ADB9E66A8}"/>
+                <a16:creationId xmlns:a16="http://schemas.microsoft.com/office/drawing/2014/main" id="{2DCAAF2F-BE67-F8E5-34A3-0A3FA57EAB89}"/>
               </a:ext>
             </a:extLst>
           </p:cNvPr>
@@ -21702,66 +22032,276 @@
               <a:rPr lang="en-NZ" smtClean="0"/>
               <a:t>3</a:t>
             </a:fld>
-            <a:endParaRPr lang="en-NZ"/>
+            <a:endParaRPr lang="en-NZ" dirty="0"/>
           </a:p>
         </p:txBody>
       </p:sp>
       <p:sp>
         <p:nvSpPr>
-          <p:cNvPr id="5" name="Content Placeholder 4">
+          <p:cNvPr id="8" name="Content Placeholder 2">
             <a:extLst>
               <a:ext uri="{FF2B5EF4-FFF2-40B4-BE49-F238E27FC236}">
-                <a16:creationId xmlns:a16="http://schemas.microsoft.com/office/drawing/2014/main" id="{4EC94FA8-218B-B51A-00AB-47DD39FEA2B6}"/>
+                <a16:creationId xmlns:a16="http://schemas.microsoft.com/office/drawing/2014/main" id="{378F060E-DC93-1A35-A562-346EB553C068}"/>
               </a:ext>
             </a:extLst>
           </p:cNvPr>
-          <p:cNvSpPr>
-            <a:spLocks noGrp="1"/>
+          <p:cNvSpPr txBox="1">
+            <a:spLocks/>
           </p:cNvSpPr>
-          <p:nvPr>
-            <p:ph idx="1"/>
-          </p:nvPr>
+          <p:nvPr/>
         </p:nvSpPr>
-        <p:spPr/>
+        <p:spPr>
+          <a:xfrm>
+            <a:off x="745179" y="1586574"/>
+            <a:ext cx="10445560" cy="4195481"/>
+          </a:xfrm>
+          <a:prstGeom prst="rect">
+            <a:avLst/>
+          </a:prstGeom>
+        </p:spPr>
         <p:txBody>
-          <a:bodyPr/>
-          <a:lstStyle/>
-          <a:p>
-            <a:r>
-              <a:rPr lang="en-NZ" dirty="0"/>
-              <a:t>A compiler translates the entire source code of a program into machine code before execution.</a:t>
-            </a:r>
-          </a:p>
-          <a:p>
-            <a:r>
-              <a:rPr lang="en-NZ" dirty="0"/>
-              <a:t>The output is a standalone executable file that can be run independently.</a:t>
-            </a:r>
-          </a:p>
-          <a:p>
-            <a:r>
-              <a:rPr lang="en-NZ" dirty="0"/>
-              <a:t>Compilation is done once, and the executable can be reused multiple times without recompilation.</a:t>
-            </a:r>
-          </a:p>
-          <a:p>
-            <a:r>
-              <a:rPr lang="en-NZ" dirty="0"/>
-              <a:t>Compilers typically perform optimizations for better performance, resulting in faster execution.</a:t>
-            </a:r>
-          </a:p>
-          <a:p>
-            <a:r>
-              <a:rPr lang="en-NZ" dirty="0"/>
-              <a:t>Examples of compiled languages include C, C++, and Rust.</a:t>
-            </a:r>
+          <a:bodyPr vert="horz" lIns="91440" tIns="45720" rIns="91440" bIns="45720" rtlCol="0">
+            <a:normAutofit/>
+          </a:bodyPr>
+          <a:lstStyle>
+            <a:lvl1pPr marL="342900" indent="-342900" algn="l" defTabSz="457200" rtl="0" eaLnBrk="1" latinLnBrk="0" hangingPunct="1">
+              <a:spcBef>
+                <a:spcPts val="1000"/>
+              </a:spcBef>
+              <a:spcAft>
+                <a:spcPts val="0"/>
+              </a:spcAft>
+              <a:buClr>
+                <a:schemeClr val="bg2">
+                  <a:lumMod val="40000"/>
+                  <a:lumOff val="60000"/>
+                </a:schemeClr>
+              </a:buClr>
+              <a:buSzPct val="80000"/>
+              <a:buFont typeface="Wingdings 3" charset="2"/>
+              <a:buChar char=""/>
+              <a:defRPr sz="2000" b="0" i="0" kern="1200">
+                <a:solidFill>
+                  <a:schemeClr val="tx1"/>
+                </a:solidFill>
+                <a:latin typeface="+mj-lt"/>
+                <a:ea typeface="+mj-ea"/>
+                <a:cs typeface="+mj-cs"/>
+              </a:defRPr>
+            </a:lvl1pPr>
+            <a:lvl2pPr marL="742950" indent="-285750" algn="l" defTabSz="457200" rtl="0" eaLnBrk="1" latinLnBrk="0" hangingPunct="1">
+              <a:spcBef>
+                <a:spcPts val="1000"/>
+              </a:spcBef>
+              <a:spcAft>
+                <a:spcPts val="0"/>
+              </a:spcAft>
+              <a:buClr>
+                <a:schemeClr val="bg2">
+                  <a:lumMod val="40000"/>
+                  <a:lumOff val="60000"/>
+                </a:schemeClr>
+              </a:buClr>
+              <a:buSzPct val="80000"/>
+              <a:buFont typeface="Wingdings 3" charset="2"/>
+              <a:buChar char=""/>
+              <a:defRPr sz="1800" b="0" i="0" kern="1200">
+                <a:solidFill>
+                  <a:schemeClr val="tx1"/>
+                </a:solidFill>
+                <a:latin typeface="+mj-lt"/>
+                <a:ea typeface="+mj-ea"/>
+                <a:cs typeface="+mj-cs"/>
+              </a:defRPr>
+            </a:lvl2pPr>
+            <a:lvl3pPr marL="1143000" indent="-228600" algn="l" defTabSz="457200" rtl="0" eaLnBrk="1" latinLnBrk="0" hangingPunct="1">
+              <a:spcBef>
+                <a:spcPts val="1000"/>
+              </a:spcBef>
+              <a:spcAft>
+                <a:spcPts val="0"/>
+              </a:spcAft>
+              <a:buClr>
+                <a:schemeClr val="bg2">
+                  <a:lumMod val="40000"/>
+                  <a:lumOff val="60000"/>
+                </a:schemeClr>
+              </a:buClr>
+              <a:buSzPct val="80000"/>
+              <a:buFont typeface="Wingdings 3" charset="2"/>
+              <a:buChar char=""/>
+              <a:defRPr sz="1600" b="0" i="0" kern="1200">
+                <a:solidFill>
+                  <a:schemeClr val="tx1"/>
+                </a:solidFill>
+                <a:latin typeface="+mj-lt"/>
+                <a:ea typeface="+mj-ea"/>
+                <a:cs typeface="+mj-cs"/>
+              </a:defRPr>
+            </a:lvl3pPr>
+            <a:lvl4pPr marL="1600200" indent="-228600" algn="l" defTabSz="457200" rtl="0" eaLnBrk="1" latinLnBrk="0" hangingPunct="1">
+              <a:spcBef>
+                <a:spcPts val="1000"/>
+              </a:spcBef>
+              <a:spcAft>
+                <a:spcPts val="0"/>
+              </a:spcAft>
+              <a:buClr>
+                <a:schemeClr val="bg2">
+                  <a:lumMod val="40000"/>
+                  <a:lumOff val="60000"/>
+                </a:schemeClr>
+              </a:buClr>
+              <a:buSzPct val="80000"/>
+              <a:buFont typeface="Wingdings 3" charset="2"/>
+              <a:buChar char=""/>
+              <a:defRPr sz="1400" b="0" i="0" kern="1200">
+                <a:solidFill>
+                  <a:schemeClr val="tx1"/>
+                </a:solidFill>
+                <a:latin typeface="+mj-lt"/>
+                <a:ea typeface="+mj-ea"/>
+                <a:cs typeface="+mj-cs"/>
+              </a:defRPr>
+            </a:lvl4pPr>
+            <a:lvl5pPr marL="2057400" indent="-228600" algn="l" defTabSz="457200" rtl="0" eaLnBrk="1" latinLnBrk="0" hangingPunct="1">
+              <a:spcBef>
+                <a:spcPts val="1000"/>
+              </a:spcBef>
+              <a:spcAft>
+                <a:spcPts val="0"/>
+              </a:spcAft>
+              <a:buClr>
+                <a:schemeClr val="bg2">
+                  <a:lumMod val="40000"/>
+                  <a:lumOff val="60000"/>
+                </a:schemeClr>
+              </a:buClr>
+              <a:buSzPct val="80000"/>
+              <a:buFont typeface="Wingdings 3" charset="2"/>
+              <a:buChar char=""/>
+              <a:defRPr sz="1400" b="0" i="0" kern="1200">
+                <a:solidFill>
+                  <a:schemeClr val="tx1"/>
+                </a:solidFill>
+                <a:latin typeface="+mj-lt"/>
+                <a:ea typeface="+mj-ea"/>
+                <a:cs typeface="+mj-cs"/>
+              </a:defRPr>
+            </a:lvl5pPr>
+            <a:lvl6pPr marL="2506000" indent="-228600" algn="l" defTabSz="457200" rtl="0" eaLnBrk="1" latinLnBrk="0" hangingPunct="1">
+              <a:spcBef>
+                <a:spcPts val="1000"/>
+              </a:spcBef>
+              <a:spcAft>
+                <a:spcPts val="0"/>
+              </a:spcAft>
+              <a:buClr>
+                <a:schemeClr val="bg2">
+                  <a:lumMod val="40000"/>
+                  <a:lumOff val="60000"/>
+                </a:schemeClr>
+              </a:buClr>
+              <a:buSzPct val="80000"/>
+              <a:buFont typeface="Wingdings 3" charset="2"/>
+              <a:buChar char=""/>
+              <a:defRPr sz="1400" b="0" i="0" kern="1200">
+                <a:solidFill>
+                  <a:schemeClr val="tx1"/>
+                </a:solidFill>
+                <a:latin typeface="+mj-lt"/>
+                <a:ea typeface="+mj-ea"/>
+                <a:cs typeface="+mj-cs"/>
+              </a:defRPr>
+            </a:lvl6pPr>
+            <a:lvl7pPr marL="2971800" indent="-228600" algn="l" defTabSz="457200" rtl="0" eaLnBrk="1" latinLnBrk="0" hangingPunct="1">
+              <a:spcBef>
+                <a:spcPts val="1000"/>
+              </a:spcBef>
+              <a:spcAft>
+                <a:spcPts val="0"/>
+              </a:spcAft>
+              <a:buClr>
+                <a:schemeClr val="bg2">
+                  <a:lumMod val="40000"/>
+                  <a:lumOff val="60000"/>
+                </a:schemeClr>
+              </a:buClr>
+              <a:buSzPct val="80000"/>
+              <a:buFont typeface="Wingdings 3" charset="2"/>
+              <a:buChar char=""/>
+              <a:defRPr sz="1400" b="0" i="0" kern="1200">
+                <a:solidFill>
+                  <a:schemeClr val="tx1"/>
+                </a:solidFill>
+                <a:latin typeface="+mj-lt"/>
+                <a:ea typeface="+mj-ea"/>
+                <a:cs typeface="+mj-cs"/>
+              </a:defRPr>
+            </a:lvl7pPr>
+            <a:lvl8pPr marL="3429000" indent="-228600" algn="l" defTabSz="457200" rtl="0" eaLnBrk="1" latinLnBrk="0" hangingPunct="1">
+              <a:spcBef>
+                <a:spcPts val="1000"/>
+              </a:spcBef>
+              <a:spcAft>
+                <a:spcPts val="0"/>
+              </a:spcAft>
+              <a:buClr>
+                <a:schemeClr val="bg2">
+                  <a:lumMod val="40000"/>
+                  <a:lumOff val="60000"/>
+                </a:schemeClr>
+              </a:buClr>
+              <a:buSzPct val="80000"/>
+              <a:buFont typeface="Wingdings 3" charset="2"/>
+              <a:buChar char=""/>
+              <a:defRPr sz="1400" b="0" i="0" kern="1200">
+                <a:solidFill>
+                  <a:schemeClr val="tx1"/>
+                </a:solidFill>
+                <a:latin typeface="+mj-lt"/>
+                <a:ea typeface="+mj-ea"/>
+                <a:cs typeface="+mj-cs"/>
+              </a:defRPr>
+            </a:lvl8pPr>
+            <a:lvl9pPr marL="3886200" indent="-228600" algn="l" defTabSz="457200" rtl="0" eaLnBrk="1" latinLnBrk="0" hangingPunct="1">
+              <a:spcBef>
+                <a:spcPts val="1000"/>
+              </a:spcBef>
+              <a:spcAft>
+                <a:spcPts val="0"/>
+              </a:spcAft>
+              <a:buClr>
+                <a:schemeClr val="bg2">
+                  <a:lumMod val="40000"/>
+                  <a:lumOff val="60000"/>
+                </a:schemeClr>
+              </a:buClr>
+              <a:buSzPct val="80000"/>
+              <a:buFont typeface="Wingdings 3" charset="2"/>
+              <a:buChar char=""/>
+              <a:defRPr sz="1400" b="0" i="0" kern="1200">
+                <a:solidFill>
+                  <a:schemeClr val="tx1"/>
+                </a:solidFill>
+                <a:latin typeface="+mj-lt"/>
+                <a:ea typeface="+mj-ea"/>
+                <a:cs typeface="+mj-cs"/>
+              </a:defRPr>
+            </a:lvl9pPr>
+          </a:lstStyle>
+          <a:p>
+            <a:pPr marL="0" indent="0">
+              <a:buNone/>
+            </a:pPr>
+            <a:endParaRPr lang="en-NZ" dirty="0"/>
           </a:p>
         </p:txBody>
       </p:sp>
     </p:spTree>
     <p:extLst>
       <p:ext uri="{BB962C8B-B14F-4D97-AF65-F5344CB8AC3E}">
-        <p14:creationId xmlns:p14="http://schemas.microsoft.com/office/powerpoint/2010/main" val="2995959217"/>
+        <p14:creationId xmlns:p14="http://schemas.microsoft.com/office/powerpoint/2010/main" val="1628970256"/>
       </p:ext>
     </p:extLst>
   </p:cSld>
@@ -21772,6 +22312,1382 @@
 </file>
 
 <file path=ppt/slides/slide4.xml><?xml version="1.0" encoding="utf-8"?>
+<p:sld xmlns:a="http://schemas.openxmlformats.org/drawingml/2006/main" xmlns:r="http://schemas.openxmlformats.org/officeDocument/2006/relationships" xmlns:p="http://schemas.openxmlformats.org/presentationml/2006/main">
+  <p:cSld>
+    <p:spTree>
+      <p:nvGrpSpPr>
+        <p:cNvPr id="1" name="">
+          <a:extLst>
+            <a:ext uri="{FF2B5EF4-FFF2-40B4-BE49-F238E27FC236}">
+              <a16:creationId xmlns:a16="http://schemas.microsoft.com/office/drawing/2014/main" id="{9D6F87E6-A55F-9444-C9D3-77752615B9BE}"/>
+            </a:ext>
+          </a:extLst>
+        </p:cNvPr>
+        <p:cNvGrpSpPr/>
+        <p:nvPr/>
+      </p:nvGrpSpPr>
+      <p:grpSpPr>
+        <a:xfrm>
+          <a:off x="0" y="0"/>
+          <a:ext cx="0" cy="0"/>
+          <a:chOff x="0" y="0"/>
+          <a:chExt cx="0" cy="0"/>
+        </a:xfrm>
+      </p:grpSpPr>
+      <p:sp>
+        <p:nvSpPr>
+          <p:cNvPr id="2" name="Title 1">
+            <a:extLst>
+              <a:ext uri="{FF2B5EF4-FFF2-40B4-BE49-F238E27FC236}">
+                <a16:creationId xmlns:a16="http://schemas.microsoft.com/office/drawing/2014/main" id="{5D4E672A-8C71-9BE1-BA4F-B93D568B8D30}"/>
+              </a:ext>
+            </a:extLst>
+          </p:cNvPr>
+          <p:cNvSpPr>
+            <a:spLocks noGrp="1"/>
+          </p:cNvSpPr>
+          <p:nvPr>
+            <p:ph type="title"/>
+          </p:nvPr>
+        </p:nvSpPr>
+        <p:spPr/>
+        <p:txBody>
+          <a:bodyPr/>
+          <a:lstStyle/>
+          <a:p>
+            <a:r>
+              <a:rPr lang="nl-NL" dirty="0"/>
+              <a:t>Compiler </a:t>
+            </a:r>
+            <a:r>
+              <a:rPr lang="nl-NL" dirty="0" err="1"/>
+              <a:t>vs</a:t>
+            </a:r>
+            <a:r>
+              <a:rPr lang="nl-NL" dirty="0"/>
+              <a:t> Interpreter?</a:t>
+            </a:r>
+            <a:endParaRPr lang="en-NZ" dirty="0"/>
+          </a:p>
+        </p:txBody>
+      </p:sp>
+      <p:sp>
+        <p:nvSpPr>
+          <p:cNvPr id="4" name="Slide Number Placeholder 3">
+            <a:extLst>
+              <a:ext uri="{FF2B5EF4-FFF2-40B4-BE49-F238E27FC236}">
+                <a16:creationId xmlns:a16="http://schemas.microsoft.com/office/drawing/2014/main" id="{8E5BA0F7-1DFC-531D-3F57-C5DEFDDEFB40}"/>
+              </a:ext>
+            </a:extLst>
+          </p:cNvPr>
+          <p:cNvSpPr>
+            <a:spLocks noGrp="1"/>
+          </p:cNvSpPr>
+          <p:nvPr>
+            <p:ph type="sldNum" sz="quarter" idx="12"/>
+          </p:nvPr>
+        </p:nvSpPr>
+        <p:spPr/>
+        <p:txBody>
+          <a:bodyPr/>
+          <a:lstStyle/>
+          <a:p>
+            <a:fld id="{7E50A921-1625-4E66-8B53-913CC32CAF35}" type="slidenum">
+              <a:rPr lang="en-NZ" smtClean="0"/>
+              <a:t>4</a:t>
+            </a:fld>
+            <a:endParaRPr lang="en-NZ"/>
+          </a:p>
+        </p:txBody>
+      </p:sp>
+      <p:graphicFrame>
+        <p:nvGraphicFramePr>
+          <p:cNvPr id="3" name="Content Placeholder 2">
+            <a:extLst>
+              <a:ext uri="{FF2B5EF4-FFF2-40B4-BE49-F238E27FC236}">
+                <a16:creationId xmlns:a16="http://schemas.microsoft.com/office/drawing/2014/main" id="{25533D94-1098-744D-ED08-AE117B2D78DB}"/>
+              </a:ext>
+            </a:extLst>
+          </p:cNvPr>
+          <p:cNvGraphicFramePr>
+            <a:graphicFrameLocks noGrp="1"/>
+          </p:cNvGraphicFramePr>
+          <p:nvPr>
+            <p:ph idx="1"/>
+            <p:extLst>
+              <p:ext uri="{D42A27DB-BD31-4B8C-83A1-F6EECF244321}">
+                <p14:modId xmlns:p14="http://schemas.microsoft.com/office/powerpoint/2010/main" val="3842864279"/>
+              </p:ext>
+            </p:extLst>
+          </p:nvPr>
+        </p:nvGraphicFramePr>
+        <p:xfrm>
+          <a:off x="442060" y="1622909"/>
+          <a:ext cx="11154468" cy="3397140"/>
+        </p:xfrm>
+        <a:graphic>
+          <a:graphicData uri="http://schemas.openxmlformats.org/drawingml/2006/table">
+            <a:tbl>
+              <a:tblPr/>
+              <a:tblGrid>
+                <a:gridCol w="2507031">
+                  <a:extLst>
+                    <a:ext uri="{9D8B030D-6E8A-4147-A177-3AD203B41FA5}">
+                      <a16:colId xmlns:a16="http://schemas.microsoft.com/office/drawing/2014/main" val="1602698639"/>
+                    </a:ext>
+                  </a:extLst>
+                </a:gridCol>
+                <a:gridCol w="4505388">
+                  <a:extLst>
+                    <a:ext uri="{9D8B030D-6E8A-4147-A177-3AD203B41FA5}">
+                      <a16:colId xmlns:a16="http://schemas.microsoft.com/office/drawing/2014/main" val="1247192616"/>
+                    </a:ext>
+                  </a:extLst>
+                </a:gridCol>
+                <a:gridCol w="4142049">
+                  <a:extLst>
+                    <a:ext uri="{9D8B030D-6E8A-4147-A177-3AD203B41FA5}">
+                      <a16:colId xmlns:a16="http://schemas.microsoft.com/office/drawing/2014/main" val="1713708505"/>
+                    </a:ext>
+                  </a:extLst>
+                </a:gridCol>
+              </a:tblGrid>
+              <a:tr h="469674">
+                <a:tc>
+                  <a:txBody>
+                    <a:bodyPr/>
+                    <a:lstStyle/>
+                    <a:p>
+                      <a:pPr lvl="1" rtl="0" fontAlgn="b"/>
+                      <a:r>
+                        <a:rPr lang="en-GB" sz="1600" dirty="0">
+                          <a:effectLst/>
+                        </a:rPr>
+                        <a:t>Aspect</a:t>
+                      </a:r>
+                    </a:p>
+                  </a:txBody>
+                  <a:tcPr marL="12497" marR="12497" marT="8332" marB="8332" anchor="ctr">
+                    <a:lnL w="9525" cap="flat" cmpd="sng" algn="ctr">
+                      <a:solidFill>
+                        <a:srgbClr val="CCCCCC"/>
+                      </a:solidFill>
+                      <a:prstDash val="solid"/>
+                      <a:round/>
+                      <a:headEnd type="none" w="med" len="med"/>
+                      <a:tailEnd type="none" w="med" len="med"/>
+                    </a:lnL>
+                    <a:lnR w="9525" cap="flat" cmpd="sng" algn="ctr">
+                      <a:solidFill>
+                        <a:srgbClr val="CCCCCC"/>
+                      </a:solidFill>
+                      <a:prstDash val="solid"/>
+                      <a:round/>
+                      <a:headEnd type="none" w="med" len="med"/>
+                      <a:tailEnd type="none" w="med" len="med"/>
+                    </a:lnR>
+                    <a:lnT w="9525" cap="flat" cmpd="sng" algn="ctr">
+                      <a:solidFill>
+                        <a:srgbClr val="CCCCCC"/>
+                      </a:solidFill>
+                      <a:prstDash val="solid"/>
+                      <a:round/>
+                      <a:headEnd type="none" w="med" len="med"/>
+                      <a:tailEnd type="none" w="med" len="med"/>
+                    </a:lnT>
+                    <a:lnB w="9525" cap="flat" cmpd="sng" algn="ctr">
+                      <a:solidFill>
+                        <a:srgbClr val="CCCCCC"/>
+                      </a:solidFill>
+                      <a:prstDash val="solid"/>
+                      <a:round/>
+                      <a:headEnd type="none" w="med" len="med"/>
+                      <a:tailEnd type="none" w="med" len="med"/>
+                    </a:lnB>
+                    <a:noFill/>
+                  </a:tcPr>
+                </a:tc>
+                <a:tc>
+                  <a:txBody>
+                    <a:bodyPr/>
+                    <a:lstStyle/>
+                    <a:p>
+                      <a:pPr lvl="1" rtl="0" fontAlgn="b"/>
+                      <a:r>
+                        <a:rPr lang="en-GB" sz="1600" b="1" dirty="0">
+                          <a:effectLst/>
+                        </a:rPr>
+                        <a:t>Compiler</a:t>
+                      </a:r>
+                    </a:p>
+                  </a:txBody>
+                  <a:tcPr marL="12497" marR="12497" marT="8332" marB="8332" anchor="ctr">
+                    <a:lnL w="9525" cap="flat" cmpd="sng" algn="ctr">
+                      <a:solidFill>
+                        <a:srgbClr val="CCCCCC"/>
+                      </a:solidFill>
+                      <a:prstDash val="solid"/>
+                      <a:round/>
+                      <a:headEnd type="none" w="med" len="med"/>
+                      <a:tailEnd type="none" w="med" len="med"/>
+                    </a:lnL>
+                    <a:lnR w="9525" cap="flat" cmpd="sng" algn="ctr">
+                      <a:solidFill>
+                        <a:srgbClr val="CCCCCC"/>
+                      </a:solidFill>
+                      <a:prstDash val="solid"/>
+                      <a:round/>
+                      <a:headEnd type="none" w="med" len="med"/>
+                      <a:tailEnd type="none" w="med" len="med"/>
+                    </a:lnR>
+                    <a:lnT w="9525" cap="flat" cmpd="sng" algn="ctr">
+                      <a:solidFill>
+                        <a:srgbClr val="CCCCCC"/>
+                      </a:solidFill>
+                      <a:prstDash val="solid"/>
+                      <a:round/>
+                      <a:headEnd type="none" w="med" len="med"/>
+                      <a:tailEnd type="none" w="med" len="med"/>
+                    </a:lnT>
+                    <a:lnB w="9525" cap="flat" cmpd="sng" algn="ctr">
+                      <a:solidFill>
+                        <a:srgbClr val="CCCCCC"/>
+                      </a:solidFill>
+                      <a:prstDash val="solid"/>
+                      <a:round/>
+                      <a:headEnd type="none" w="med" len="med"/>
+                      <a:tailEnd type="none" w="med" len="med"/>
+                    </a:lnB>
+                    <a:noFill/>
+                  </a:tcPr>
+                </a:tc>
+                <a:tc>
+                  <a:txBody>
+                    <a:bodyPr/>
+                    <a:lstStyle/>
+                    <a:p>
+                      <a:pPr lvl="1" rtl="0" fontAlgn="b"/>
+                      <a:r>
+                        <a:rPr lang="en-GB" sz="1600" b="1">
+                          <a:effectLst/>
+                        </a:rPr>
+                        <a:t>Interpreter</a:t>
+                      </a:r>
+                    </a:p>
+                  </a:txBody>
+                  <a:tcPr marL="12497" marR="12497" marT="8332" marB="8332" anchor="ctr">
+                    <a:lnL w="9525" cap="flat" cmpd="sng" algn="ctr">
+                      <a:solidFill>
+                        <a:srgbClr val="CCCCCC"/>
+                      </a:solidFill>
+                      <a:prstDash val="solid"/>
+                      <a:round/>
+                      <a:headEnd type="none" w="med" len="med"/>
+                      <a:tailEnd type="none" w="med" len="med"/>
+                    </a:lnL>
+                    <a:lnR w="9525" cap="flat" cmpd="sng" algn="ctr">
+                      <a:solidFill>
+                        <a:srgbClr val="CCCCCC"/>
+                      </a:solidFill>
+                      <a:prstDash val="solid"/>
+                      <a:round/>
+                      <a:headEnd type="none" w="med" len="med"/>
+                      <a:tailEnd type="none" w="med" len="med"/>
+                    </a:lnR>
+                    <a:lnT w="9525" cap="flat" cmpd="sng" algn="ctr">
+                      <a:solidFill>
+                        <a:srgbClr val="CCCCCC"/>
+                      </a:solidFill>
+                      <a:prstDash val="solid"/>
+                      <a:round/>
+                      <a:headEnd type="none" w="med" len="med"/>
+                      <a:tailEnd type="none" w="med" len="med"/>
+                    </a:lnT>
+                    <a:lnB w="9525" cap="flat" cmpd="sng" algn="ctr">
+                      <a:solidFill>
+                        <a:srgbClr val="200532"/>
+                      </a:solidFill>
+                      <a:prstDash val="solid"/>
+                      <a:round/>
+                      <a:headEnd type="none" w="med" len="med"/>
+                      <a:tailEnd type="none" w="med" len="med"/>
+                    </a:lnB>
+                    <a:noFill/>
+                  </a:tcPr>
+                </a:tc>
+                <a:extLst>
+                  <a:ext uri="{0D108BD9-81ED-4DB2-BD59-A6C34878D82A}">
+                    <a16:rowId xmlns:a16="http://schemas.microsoft.com/office/drawing/2014/main" val="620623752"/>
+                  </a:ext>
+                </a:extLst>
+              </a:tr>
+              <a:tr h="469674">
+                <a:tc>
+                  <a:txBody>
+                    <a:bodyPr/>
+                    <a:lstStyle/>
+                    <a:p>
+                      <a:pPr lvl="1" rtl="0" fontAlgn="b"/>
+                      <a:r>
+                        <a:rPr lang="en-GB" sz="1600" b="1" dirty="0">
+                          <a:effectLst/>
+                        </a:rPr>
+                        <a:t>Translation Method</a:t>
+                      </a:r>
+                    </a:p>
+                  </a:txBody>
+                  <a:tcPr marL="12497" marR="12497" marT="8332" marB="8332" anchor="ctr">
+                    <a:lnL w="9525" cap="flat" cmpd="sng" algn="ctr">
+                      <a:solidFill>
+                        <a:srgbClr val="CCCCCC"/>
+                      </a:solidFill>
+                      <a:prstDash val="solid"/>
+                      <a:round/>
+                      <a:headEnd type="none" w="med" len="med"/>
+                      <a:tailEnd type="none" w="med" len="med"/>
+                    </a:lnL>
+                    <a:lnR w="9525" cap="flat" cmpd="sng" algn="ctr">
+                      <a:solidFill>
+                        <a:srgbClr val="CCCCCC"/>
+                      </a:solidFill>
+                      <a:prstDash val="solid"/>
+                      <a:round/>
+                      <a:headEnd type="none" w="med" len="med"/>
+                      <a:tailEnd type="none" w="med" len="med"/>
+                    </a:lnR>
+                    <a:lnT w="9525" cap="flat" cmpd="sng" algn="ctr">
+                      <a:solidFill>
+                        <a:srgbClr val="CCCCCC"/>
+                      </a:solidFill>
+                      <a:prstDash val="solid"/>
+                      <a:round/>
+                      <a:headEnd type="none" w="med" len="med"/>
+                      <a:tailEnd type="none" w="med" len="med"/>
+                    </a:lnT>
+                    <a:lnB w="9525" cap="flat" cmpd="sng" algn="ctr">
+                      <a:solidFill>
+                        <a:srgbClr val="CCCCCC"/>
+                      </a:solidFill>
+                      <a:prstDash val="solid"/>
+                      <a:round/>
+                      <a:headEnd type="none" w="med" len="med"/>
+                      <a:tailEnd type="none" w="med" len="med"/>
+                    </a:lnB>
+                    <a:noFill/>
+                  </a:tcPr>
+                </a:tc>
+                <a:tc>
+                  <a:txBody>
+                    <a:bodyPr/>
+                    <a:lstStyle/>
+                    <a:p>
+                      <a:pPr lvl="1" rtl="0" fontAlgn="b"/>
+                      <a:r>
+                        <a:rPr lang="en-GB" sz="1600" dirty="0">
+                          <a:effectLst/>
+                        </a:rPr>
+                        <a:t>Translates code into machine code</a:t>
+                      </a:r>
+                    </a:p>
+                  </a:txBody>
+                  <a:tcPr marL="12497" marR="12497" marT="8332" marB="8332" anchor="ctr">
+                    <a:lnL w="9525" cap="flat" cmpd="sng" algn="ctr">
+                      <a:solidFill>
+                        <a:srgbClr val="CCCCCC"/>
+                      </a:solidFill>
+                      <a:prstDash val="solid"/>
+                      <a:round/>
+                      <a:headEnd type="none" w="med" len="med"/>
+                      <a:tailEnd type="none" w="med" len="med"/>
+                    </a:lnL>
+                    <a:lnR w="9525" cap="flat" cmpd="sng" algn="ctr">
+                      <a:solidFill>
+                        <a:srgbClr val="200532"/>
+                      </a:solidFill>
+                      <a:prstDash val="solid"/>
+                      <a:round/>
+                      <a:headEnd type="none" w="med" len="med"/>
+                      <a:tailEnd type="none" w="med" len="med"/>
+                    </a:lnR>
+                    <a:lnT w="9525" cap="flat" cmpd="sng" algn="ctr">
+                      <a:solidFill>
+                        <a:srgbClr val="CCCCCC"/>
+                      </a:solidFill>
+                      <a:prstDash val="solid"/>
+                      <a:round/>
+                      <a:headEnd type="none" w="med" len="med"/>
+                      <a:tailEnd type="none" w="med" len="med"/>
+                    </a:lnT>
+                    <a:lnB w="9525" cap="flat" cmpd="sng" algn="ctr">
+                      <a:solidFill>
+                        <a:srgbClr val="CCCCCC"/>
+                      </a:solidFill>
+                      <a:prstDash val="solid"/>
+                      <a:round/>
+                      <a:headEnd type="none" w="med" len="med"/>
+                      <a:tailEnd type="none" w="med" len="med"/>
+                    </a:lnB>
+                    <a:noFill/>
+                  </a:tcPr>
+                </a:tc>
+                <a:tc>
+                  <a:txBody>
+                    <a:bodyPr/>
+                    <a:lstStyle/>
+                    <a:p>
+                      <a:pPr lvl="1" rtl="0" fontAlgn="b"/>
+                      <a:r>
+                        <a:rPr lang="en-GB" sz="1600" dirty="0">
+                          <a:effectLst/>
+                        </a:rPr>
+                        <a:t>Executes code line by line</a:t>
+                      </a:r>
+                    </a:p>
+                  </a:txBody>
+                  <a:tcPr marL="0" marR="0" marT="8332" marB="8332" anchor="ctr">
+                    <a:lnL w="9525" cap="flat" cmpd="sng" algn="ctr">
+                      <a:solidFill>
+                        <a:srgbClr val="200532"/>
+                      </a:solidFill>
+                      <a:prstDash val="solid"/>
+                      <a:round/>
+                      <a:headEnd type="none" w="med" len="med"/>
+                      <a:tailEnd type="none" w="med" len="med"/>
+                    </a:lnL>
+                    <a:lnR w="9525" cap="flat" cmpd="sng" algn="ctr">
+                      <a:solidFill>
+                        <a:srgbClr val="200532"/>
+                      </a:solidFill>
+                      <a:prstDash val="solid"/>
+                      <a:round/>
+                      <a:headEnd type="none" w="med" len="med"/>
+                      <a:tailEnd type="none" w="med" len="med"/>
+                    </a:lnR>
+                    <a:lnT w="9525" cap="flat" cmpd="sng" algn="ctr">
+                      <a:solidFill>
+                        <a:srgbClr val="200532"/>
+                      </a:solidFill>
+                      <a:prstDash val="solid"/>
+                      <a:round/>
+                      <a:headEnd type="none" w="med" len="med"/>
+                      <a:tailEnd type="none" w="med" len="med"/>
+                    </a:lnT>
+                    <a:lnB w="9525" cap="flat" cmpd="sng" algn="ctr">
+                      <a:solidFill>
+                        <a:srgbClr val="C02032"/>
+                      </a:solidFill>
+                      <a:prstDash val="solid"/>
+                      <a:round/>
+                      <a:headEnd type="none" w="med" len="med"/>
+                      <a:tailEnd type="none" w="med" len="med"/>
+                    </a:lnB>
+                    <a:noFill/>
+                  </a:tcPr>
+                </a:tc>
+                <a:extLst>
+                  <a:ext uri="{0D108BD9-81ED-4DB2-BD59-A6C34878D82A}">
+                    <a16:rowId xmlns:a16="http://schemas.microsoft.com/office/drawing/2014/main" val="45124396"/>
+                  </a:ext>
+                </a:extLst>
+              </a:tr>
+              <a:tr h="506148">
+                <a:tc>
+                  <a:txBody>
+                    <a:bodyPr/>
+                    <a:lstStyle/>
+                    <a:p>
+                      <a:pPr lvl="1" rtl="0" fontAlgn="b"/>
+                      <a:r>
+                        <a:rPr lang="en-GB" sz="1600" b="1">
+                          <a:effectLst/>
+                        </a:rPr>
+                        <a:t>Output</a:t>
+                      </a:r>
+                    </a:p>
+                  </a:txBody>
+                  <a:tcPr marL="12497" marR="12497" marT="8332" marB="8332" anchor="ctr">
+                    <a:lnL w="9525" cap="flat" cmpd="sng" algn="ctr">
+                      <a:solidFill>
+                        <a:srgbClr val="CCCCCC"/>
+                      </a:solidFill>
+                      <a:prstDash val="solid"/>
+                      <a:round/>
+                      <a:headEnd type="none" w="med" len="med"/>
+                      <a:tailEnd type="none" w="med" len="med"/>
+                    </a:lnL>
+                    <a:lnR w="9525" cap="flat" cmpd="sng" algn="ctr">
+                      <a:solidFill>
+                        <a:srgbClr val="CCCCCC"/>
+                      </a:solidFill>
+                      <a:prstDash val="solid"/>
+                      <a:round/>
+                      <a:headEnd type="none" w="med" len="med"/>
+                      <a:tailEnd type="none" w="med" len="med"/>
+                    </a:lnR>
+                    <a:lnT w="9525" cap="flat" cmpd="sng" algn="ctr">
+                      <a:solidFill>
+                        <a:srgbClr val="CCCCCC"/>
+                      </a:solidFill>
+                      <a:prstDash val="solid"/>
+                      <a:round/>
+                      <a:headEnd type="none" w="med" len="med"/>
+                      <a:tailEnd type="none" w="med" len="med"/>
+                    </a:lnT>
+                    <a:lnB w="9525" cap="flat" cmpd="sng" algn="ctr">
+                      <a:solidFill>
+                        <a:srgbClr val="CCCCCC"/>
+                      </a:solidFill>
+                      <a:prstDash val="solid"/>
+                      <a:round/>
+                      <a:headEnd type="none" w="med" len="med"/>
+                      <a:tailEnd type="none" w="med" len="med"/>
+                    </a:lnB>
+                    <a:noFill/>
+                  </a:tcPr>
+                </a:tc>
+                <a:tc>
+                  <a:txBody>
+                    <a:bodyPr/>
+                    <a:lstStyle/>
+                    <a:p>
+                      <a:pPr lvl="1" rtl="0" fontAlgn="b"/>
+                      <a:r>
+                        <a:rPr lang="en-GB" sz="1600" dirty="0">
+                          <a:effectLst/>
+                        </a:rPr>
+                        <a:t>Creates an independent executable</a:t>
+                      </a:r>
+                    </a:p>
+                  </a:txBody>
+                  <a:tcPr marL="12497" marR="12497" marT="8332" marB="8332" anchor="ctr">
+                    <a:lnL w="9525" cap="flat" cmpd="sng" algn="ctr">
+                      <a:solidFill>
+                        <a:srgbClr val="CCCCCC"/>
+                      </a:solidFill>
+                      <a:prstDash val="solid"/>
+                      <a:round/>
+                      <a:headEnd type="none" w="med" len="med"/>
+                      <a:tailEnd type="none" w="med" len="med"/>
+                    </a:lnL>
+                    <a:lnR w="9525" cap="flat" cmpd="sng" algn="ctr">
+                      <a:solidFill>
+                        <a:srgbClr val="C02032"/>
+                      </a:solidFill>
+                      <a:prstDash val="solid"/>
+                      <a:round/>
+                      <a:headEnd type="none" w="med" len="med"/>
+                      <a:tailEnd type="none" w="med" len="med"/>
+                    </a:lnR>
+                    <a:lnT w="9525" cap="flat" cmpd="sng" algn="ctr">
+                      <a:solidFill>
+                        <a:srgbClr val="CCCCCC"/>
+                      </a:solidFill>
+                      <a:prstDash val="solid"/>
+                      <a:round/>
+                      <a:headEnd type="none" w="med" len="med"/>
+                      <a:tailEnd type="none" w="med" len="med"/>
+                    </a:lnT>
+                    <a:lnB w="9525" cap="flat" cmpd="sng" algn="ctr">
+                      <a:solidFill>
+                        <a:srgbClr val="CCCCCC"/>
+                      </a:solidFill>
+                      <a:prstDash val="solid"/>
+                      <a:round/>
+                      <a:headEnd type="none" w="med" len="med"/>
+                      <a:tailEnd type="none" w="med" len="med"/>
+                    </a:lnB>
+                    <a:noFill/>
+                  </a:tcPr>
+                </a:tc>
+                <a:tc>
+                  <a:txBody>
+                    <a:bodyPr/>
+                    <a:lstStyle/>
+                    <a:p>
+                      <a:pPr lvl="1" rtl="0" fontAlgn="b"/>
+                      <a:r>
+                        <a:rPr lang="en-GB" sz="1600" dirty="0">
+                          <a:effectLst/>
+                        </a:rPr>
+                        <a:t>No independent file; runs in real-time</a:t>
+                      </a:r>
+                    </a:p>
+                  </a:txBody>
+                  <a:tcPr marL="0" marR="0" marT="8332" marB="8332" anchor="ctr">
+                    <a:lnL w="9525" cap="flat" cmpd="sng" algn="ctr">
+                      <a:solidFill>
+                        <a:srgbClr val="C02032"/>
+                      </a:solidFill>
+                      <a:prstDash val="solid"/>
+                      <a:round/>
+                      <a:headEnd type="none" w="med" len="med"/>
+                      <a:tailEnd type="none" w="med" len="med"/>
+                    </a:lnL>
+                    <a:lnR w="9525" cap="flat" cmpd="sng" algn="ctr">
+                      <a:solidFill>
+                        <a:srgbClr val="C02032"/>
+                      </a:solidFill>
+                      <a:prstDash val="solid"/>
+                      <a:round/>
+                      <a:headEnd type="none" w="med" len="med"/>
+                      <a:tailEnd type="none" w="med" len="med"/>
+                    </a:lnR>
+                    <a:lnT w="9525" cap="flat" cmpd="sng" algn="ctr">
+                      <a:solidFill>
+                        <a:srgbClr val="C02032"/>
+                      </a:solidFill>
+                      <a:prstDash val="solid"/>
+                      <a:round/>
+                      <a:headEnd type="none" w="med" len="med"/>
+                      <a:tailEnd type="none" w="med" len="med"/>
+                    </a:lnT>
+                    <a:lnB w="9525" cap="flat" cmpd="sng" algn="ctr">
+                      <a:solidFill>
+                        <a:srgbClr val="C07832"/>
+                      </a:solidFill>
+                      <a:prstDash val="solid"/>
+                      <a:round/>
+                      <a:headEnd type="none" w="med" len="med"/>
+                      <a:tailEnd type="none" w="med" len="med"/>
+                    </a:lnB>
+                    <a:noFill/>
+                  </a:tcPr>
+                </a:tc>
+                <a:extLst>
+                  <a:ext uri="{0D108BD9-81ED-4DB2-BD59-A6C34878D82A}">
+                    <a16:rowId xmlns:a16="http://schemas.microsoft.com/office/drawing/2014/main" val="972477774"/>
+                  </a:ext>
+                </a:extLst>
+              </a:tr>
+              <a:tr h="469674">
+                <a:tc>
+                  <a:txBody>
+                    <a:bodyPr/>
+                    <a:lstStyle/>
+                    <a:p>
+                      <a:pPr lvl="1" rtl="0" fontAlgn="b"/>
+                      <a:r>
+                        <a:rPr lang="en-GB" sz="1600" b="1" dirty="0">
+                          <a:effectLst/>
+                        </a:rPr>
+                        <a:t>Execution Speed</a:t>
+                      </a:r>
+                    </a:p>
+                  </a:txBody>
+                  <a:tcPr marL="12497" marR="12497" marT="8332" marB="8332" anchor="ctr">
+                    <a:lnL w="9525" cap="flat" cmpd="sng" algn="ctr">
+                      <a:solidFill>
+                        <a:srgbClr val="CCCCCC"/>
+                      </a:solidFill>
+                      <a:prstDash val="solid"/>
+                      <a:round/>
+                      <a:headEnd type="none" w="med" len="med"/>
+                      <a:tailEnd type="none" w="med" len="med"/>
+                    </a:lnL>
+                    <a:lnR w="9525" cap="flat" cmpd="sng" algn="ctr">
+                      <a:solidFill>
+                        <a:srgbClr val="CCCCCC"/>
+                      </a:solidFill>
+                      <a:prstDash val="solid"/>
+                      <a:round/>
+                      <a:headEnd type="none" w="med" len="med"/>
+                      <a:tailEnd type="none" w="med" len="med"/>
+                    </a:lnR>
+                    <a:lnT w="9525" cap="flat" cmpd="sng" algn="ctr">
+                      <a:solidFill>
+                        <a:srgbClr val="CCCCCC"/>
+                      </a:solidFill>
+                      <a:prstDash val="solid"/>
+                      <a:round/>
+                      <a:headEnd type="none" w="med" len="med"/>
+                      <a:tailEnd type="none" w="med" len="med"/>
+                    </a:lnT>
+                    <a:lnB w="9525" cap="flat" cmpd="sng" algn="ctr">
+                      <a:solidFill>
+                        <a:srgbClr val="CCCCCC"/>
+                      </a:solidFill>
+                      <a:prstDash val="solid"/>
+                      <a:round/>
+                      <a:headEnd type="none" w="med" len="med"/>
+                      <a:tailEnd type="none" w="med" len="med"/>
+                    </a:lnB>
+                    <a:noFill/>
+                  </a:tcPr>
+                </a:tc>
+                <a:tc>
+                  <a:txBody>
+                    <a:bodyPr/>
+                    <a:lstStyle/>
+                    <a:p>
+                      <a:pPr lvl="1" rtl="0" fontAlgn="b"/>
+                      <a:r>
+                        <a:rPr lang="en-GB" sz="1600">
+                          <a:effectLst/>
+                        </a:rPr>
+                        <a:t>Faster (precompiled code)</a:t>
+                      </a:r>
+                    </a:p>
+                  </a:txBody>
+                  <a:tcPr marL="12497" marR="12497" marT="8332" marB="8332" anchor="ctr">
+                    <a:lnL w="9525" cap="flat" cmpd="sng" algn="ctr">
+                      <a:solidFill>
+                        <a:srgbClr val="CCCCCC"/>
+                      </a:solidFill>
+                      <a:prstDash val="solid"/>
+                      <a:round/>
+                      <a:headEnd type="none" w="med" len="med"/>
+                      <a:tailEnd type="none" w="med" len="med"/>
+                    </a:lnL>
+                    <a:lnR w="9525" cap="flat" cmpd="sng" algn="ctr">
+                      <a:solidFill>
+                        <a:srgbClr val="C07832"/>
+                      </a:solidFill>
+                      <a:prstDash val="solid"/>
+                      <a:round/>
+                      <a:headEnd type="none" w="med" len="med"/>
+                      <a:tailEnd type="none" w="med" len="med"/>
+                    </a:lnR>
+                    <a:lnT w="9525" cap="flat" cmpd="sng" algn="ctr">
+                      <a:solidFill>
+                        <a:srgbClr val="CCCCCC"/>
+                      </a:solidFill>
+                      <a:prstDash val="solid"/>
+                      <a:round/>
+                      <a:headEnd type="none" w="med" len="med"/>
+                      <a:tailEnd type="none" w="med" len="med"/>
+                    </a:lnT>
+                    <a:lnB w="9525" cap="flat" cmpd="sng" algn="ctr">
+                      <a:solidFill>
+                        <a:srgbClr val="CCCCCC"/>
+                      </a:solidFill>
+                      <a:prstDash val="solid"/>
+                      <a:round/>
+                      <a:headEnd type="none" w="med" len="med"/>
+                      <a:tailEnd type="none" w="med" len="med"/>
+                    </a:lnB>
+                    <a:noFill/>
+                  </a:tcPr>
+                </a:tc>
+                <a:tc>
+                  <a:txBody>
+                    <a:bodyPr/>
+                    <a:lstStyle/>
+                    <a:p>
+                      <a:pPr lvl="1" rtl="0" fontAlgn="b"/>
+                      <a:r>
+                        <a:rPr lang="en-GB" sz="1600" dirty="0">
+                          <a:effectLst/>
+                        </a:rPr>
+                        <a:t>Slower (interpreted at runtime)</a:t>
+                      </a:r>
+                    </a:p>
+                  </a:txBody>
+                  <a:tcPr marL="0" marR="0" marT="8332" marB="8332" anchor="ctr">
+                    <a:lnL w="9525" cap="flat" cmpd="sng" algn="ctr">
+                      <a:solidFill>
+                        <a:srgbClr val="C07832"/>
+                      </a:solidFill>
+                      <a:prstDash val="solid"/>
+                      <a:round/>
+                      <a:headEnd type="none" w="med" len="med"/>
+                      <a:tailEnd type="none" w="med" len="med"/>
+                    </a:lnL>
+                    <a:lnR w="9525" cap="flat" cmpd="sng" algn="ctr">
+                      <a:solidFill>
+                        <a:srgbClr val="C07832"/>
+                      </a:solidFill>
+                      <a:prstDash val="solid"/>
+                      <a:round/>
+                      <a:headEnd type="none" w="med" len="med"/>
+                      <a:tailEnd type="none" w="med" len="med"/>
+                    </a:lnR>
+                    <a:lnT w="9525" cap="flat" cmpd="sng" algn="ctr">
+                      <a:solidFill>
+                        <a:srgbClr val="C07832"/>
+                      </a:solidFill>
+                      <a:prstDash val="solid"/>
+                      <a:round/>
+                      <a:headEnd type="none" w="med" len="med"/>
+                      <a:tailEnd type="none" w="med" len="med"/>
+                    </a:lnT>
+                    <a:lnB w="9525" cap="flat" cmpd="sng" algn="ctr">
+                      <a:solidFill>
+                        <a:srgbClr val="807331"/>
+                      </a:solidFill>
+                      <a:prstDash val="solid"/>
+                      <a:round/>
+                      <a:headEnd type="none" w="med" len="med"/>
+                      <a:tailEnd type="none" w="med" len="med"/>
+                    </a:lnB>
+                    <a:noFill/>
+                  </a:tcPr>
+                </a:tc>
+                <a:extLst>
+                  <a:ext uri="{0D108BD9-81ED-4DB2-BD59-A6C34878D82A}">
+                    <a16:rowId xmlns:a16="http://schemas.microsoft.com/office/drawing/2014/main" val="2214702700"/>
+                  </a:ext>
+                </a:extLst>
+              </a:tr>
+              <a:tr h="506148">
+                <a:tc>
+                  <a:txBody>
+                    <a:bodyPr/>
+                    <a:lstStyle/>
+                    <a:p>
+                      <a:pPr lvl="1" rtl="0" fontAlgn="b"/>
+                      <a:r>
+                        <a:rPr lang="en-GB" sz="1600" b="1">
+                          <a:effectLst/>
+                        </a:rPr>
+                        <a:t>Error Reporting</a:t>
+                      </a:r>
+                    </a:p>
+                  </a:txBody>
+                  <a:tcPr marL="12497" marR="12497" marT="8332" marB="8332" anchor="ctr">
+                    <a:lnL w="9525" cap="flat" cmpd="sng" algn="ctr">
+                      <a:solidFill>
+                        <a:srgbClr val="CCCCCC"/>
+                      </a:solidFill>
+                      <a:prstDash val="solid"/>
+                      <a:round/>
+                      <a:headEnd type="none" w="med" len="med"/>
+                      <a:tailEnd type="none" w="med" len="med"/>
+                    </a:lnL>
+                    <a:lnR w="9525" cap="flat" cmpd="sng" algn="ctr">
+                      <a:solidFill>
+                        <a:srgbClr val="CCCCCC"/>
+                      </a:solidFill>
+                      <a:prstDash val="solid"/>
+                      <a:round/>
+                      <a:headEnd type="none" w="med" len="med"/>
+                      <a:tailEnd type="none" w="med" len="med"/>
+                    </a:lnR>
+                    <a:lnT w="9525" cap="flat" cmpd="sng" algn="ctr">
+                      <a:solidFill>
+                        <a:srgbClr val="CCCCCC"/>
+                      </a:solidFill>
+                      <a:prstDash val="solid"/>
+                      <a:round/>
+                      <a:headEnd type="none" w="med" len="med"/>
+                      <a:tailEnd type="none" w="med" len="med"/>
+                    </a:lnT>
+                    <a:lnB w="9525" cap="flat" cmpd="sng" algn="ctr">
+                      <a:solidFill>
+                        <a:srgbClr val="CCCCCC"/>
+                      </a:solidFill>
+                      <a:prstDash val="solid"/>
+                      <a:round/>
+                      <a:headEnd type="none" w="med" len="med"/>
+                      <a:tailEnd type="none" w="med" len="med"/>
+                    </a:lnB>
+                    <a:noFill/>
+                  </a:tcPr>
+                </a:tc>
+                <a:tc>
+                  <a:txBody>
+                    <a:bodyPr/>
+                    <a:lstStyle/>
+                    <a:p>
+                      <a:pPr lvl="1" rtl="0" fontAlgn="b"/>
+                      <a:r>
+                        <a:rPr lang="en-GB" sz="1600">
+                          <a:effectLst/>
+                        </a:rPr>
+                        <a:t>All errors reported at compile time</a:t>
+                      </a:r>
+                    </a:p>
+                  </a:txBody>
+                  <a:tcPr marL="12497" marR="12497" marT="8332" marB="8332" anchor="ctr">
+                    <a:lnL w="9525" cap="flat" cmpd="sng" algn="ctr">
+                      <a:solidFill>
+                        <a:srgbClr val="CCCCCC"/>
+                      </a:solidFill>
+                      <a:prstDash val="solid"/>
+                      <a:round/>
+                      <a:headEnd type="none" w="med" len="med"/>
+                      <a:tailEnd type="none" w="med" len="med"/>
+                    </a:lnL>
+                    <a:lnR w="9525" cap="flat" cmpd="sng" algn="ctr">
+                      <a:solidFill>
+                        <a:srgbClr val="807331"/>
+                      </a:solidFill>
+                      <a:prstDash val="solid"/>
+                      <a:round/>
+                      <a:headEnd type="none" w="med" len="med"/>
+                      <a:tailEnd type="none" w="med" len="med"/>
+                    </a:lnR>
+                    <a:lnT w="9525" cap="flat" cmpd="sng" algn="ctr">
+                      <a:solidFill>
+                        <a:srgbClr val="CCCCCC"/>
+                      </a:solidFill>
+                      <a:prstDash val="solid"/>
+                      <a:round/>
+                      <a:headEnd type="none" w="med" len="med"/>
+                      <a:tailEnd type="none" w="med" len="med"/>
+                    </a:lnT>
+                    <a:lnB w="9525" cap="flat" cmpd="sng" algn="ctr">
+                      <a:solidFill>
+                        <a:srgbClr val="CCCCCC"/>
+                      </a:solidFill>
+                      <a:prstDash val="solid"/>
+                      <a:round/>
+                      <a:headEnd type="none" w="med" len="med"/>
+                      <a:tailEnd type="none" w="med" len="med"/>
+                    </a:lnB>
+                    <a:noFill/>
+                  </a:tcPr>
+                </a:tc>
+                <a:tc>
+                  <a:txBody>
+                    <a:bodyPr/>
+                    <a:lstStyle/>
+                    <a:p>
+                      <a:pPr lvl="1" rtl="0" fontAlgn="b"/>
+                      <a:r>
+                        <a:rPr lang="en-GB" sz="1600" dirty="0">
+                          <a:effectLst/>
+                        </a:rPr>
+                        <a:t>Errors detected during execution</a:t>
+                      </a:r>
+                    </a:p>
+                  </a:txBody>
+                  <a:tcPr marL="0" marR="0" marT="8332" marB="8332" anchor="ctr">
+                    <a:lnL w="9525" cap="flat" cmpd="sng" algn="ctr">
+                      <a:solidFill>
+                        <a:srgbClr val="807331"/>
+                      </a:solidFill>
+                      <a:prstDash val="solid"/>
+                      <a:round/>
+                      <a:headEnd type="none" w="med" len="med"/>
+                      <a:tailEnd type="none" w="med" len="med"/>
+                    </a:lnL>
+                    <a:lnR w="9525" cap="flat" cmpd="sng" algn="ctr">
+                      <a:solidFill>
+                        <a:srgbClr val="807331"/>
+                      </a:solidFill>
+                      <a:prstDash val="solid"/>
+                      <a:round/>
+                      <a:headEnd type="none" w="med" len="med"/>
+                      <a:tailEnd type="none" w="med" len="med"/>
+                    </a:lnR>
+                    <a:lnT w="9525" cap="flat" cmpd="sng" algn="ctr">
+                      <a:solidFill>
+                        <a:srgbClr val="807331"/>
+                      </a:solidFill>
+                      <a:prstDash val="solid"/>
+                      <a:round/>
+                      <a:headEnd type="none" w="med" len="med"/>
+                      <a:tailEnd type="none" w="med" len="med"/>
+                    </a:lnT>
+                    <a:lnB w="9525" cap="flat" cmpd="sng" algn="ctr">
+                      <a:solidFill>
+                        <a:srgbClr val="609031"/>
+                      </a:solidFill>
+                      <a:prstDash val="solid"/>
+                      <a:round/>
+                      <a:headEnd type="none" w="med" len="med"/>
+                      <a:tailEnd type="none" w="med" len="med"/>
+                    </a:lnB>
+                    <a:noFill/>
+                  </a:tcPr>
+                </a:tc>
+                <a:extLst>
+                  <a:ext uri="{0D108BD9-81ED-4DB2-BD59-A6C34878D82A}">
+                    <a16:rowId xmlns:a16="http://schemas.microsoft.com/office/drawing/2014/main" val="1206508899"/>
+                  </a:ext>
+                </a:extLst>
+              </a:tr>
+              <a:tr h="506148">
+                <a:tc>
+                  <a:txBody>
+                    <a:bodyPr/>
+                    <a:lstStyle/>
+                    <a:p>
+                      <a:pPr lvl="1" rtl="0" fontAlgn="b"/>
+                      <a:r>
+                        <a:rPr lang="en-GB" sz="1600" b="1">
+                          <a:effectLst/>
+                        </a:rPr>
+                        <a:t>Dependency</a:t>
+                      </a:r>
+                    </a:p>
+                  </a:txBody>
+                  <a:tcPr marL="12497" marR="12497" marT="8332" marB="8332" anchor="ctr">
+                    <a:lnL w="9525" cap="flat" cmpd="sng" algn="ctr">
+                      <a:solidFill>
+                        <a:srgbClr val="CCCCCC"/>
+                      </a:solidFill>
+                      <a:prstDash val="solid"/>
+                      <a:round/>
+                      <a:headEnd type="none" w="med" len="med"/>
+                      <a:tailEnd type="none" w="med" len="med"/>
+                    </a:lnL>
+                    <a:lnR w="9525" cap="flat" cmpd="sng" algn="ctr">
+                      <a:solidFill>
+                        <a:srgbClr val="CCCCCC"/>
+                      </a:solidFill>
+                      <a:prstDash val="solid"/>
+                      <a:round/>
+                      <a:headEnd type="none" w="med" len="med"/>
+                      <a:tailEnd type="none" w="med" len="med"/>
+                    </a:lnR>
+                    <a:lnT w="9525" cap="flat" cmpd="sng" algn="ctr">
+                      <a:solidFill>
+                        <a:srgbClr val="CCCCCC"/>
+                      </a:solidFill>
+                      <a:prstDash val="solid"/>
+                      <a:round/>
+                      <a:headEnd type="none" w="med" len="med"/>
+                      <a:tailEnd type="none" w="med" len="med"/>
+                    </a:lnT>
+                    <a:lnB w="9525" cap="flat" cmpd="sng" algn="ctr">
+                      <a:solidFill>
+                        <a:srgbClr val="CCCCCC"/>
+                      </a:solidFill>
+                      <a:prstDash val="solid"/>
+                      <a:round/>
+                      <a:headEnd type="none" w="med" len="med"/>
+                      <a:tailEnd type="none" w="med" len="med"/>
+                    </a:lnB>
+                    <a:noFill/>
+                  </a:tcPr>
+                </a:tc>
+                <a:tc>
+                  <a:txBody>
+                    <a:bodyPr/>
+                    <a:lstStyle/>
+                    <a:p>
+                      <a:pPr lvl="1" rtl="0" fontAlgn="b"/>
+                      <a:r>
+                        <a:rPr lang="en-GB" sz="1600">
+                          <a:effectLst/>
+                        </a:rPr>
+                        <a:t>No dependency on the compiler post-build</a:t>
+                      </a:r>
+                    </a:p>
+                  </a:txBody>
+                  <a:tcPr marL="12497" marR="12497" marT="8332" marB="8332" anchor="ctr">
+                    <a:lnL w="9525" cap="flat" cmpd="sng" algn="ctr">
+                      <a:solidFill>
+                        <a:srgbClr val="CCCCCC"/>
+                      </a:solidFill>
+                      <a:prstDash val="solid"/>
+                      <a:round/>
+                      <a:headEnd type="none" w="med" len="med"/>
+                      <a:tailEnd type="none" w="med" len="med"/>
+                    </a:lnL>
+                    <a:lnR w="9525" cap="flat" cmpd="sng" algn="ctr">
+                      <a:solidFill>
+                        <a:srgbClr val="609031"/>
+                      </a:solidFill>
+                      <a:prstDash val="solid"/>
+                      <a:round/>
+                      <a:headEnd type="none" w="med" len="med"/>
+                      <a:tailEnd type="none" w="med" len="med"/>
+                    </a:lnR>
+                    <a:lnT w="9525" cap="flat" cmpd="sng" algn="ctr">
+                      <a:solidFill>
+                        <a:srgbClr val="CCCCCC"/>
+                      </a:solidFill>
+                      <a:prstDash val="solid"/>
+                      <a:round/>
+                      <a:headEnd type="none" w="med" len="med"/>
+                      <a:tailEnd type="none" w="med" len="med"/>
+                    </a:lnT>
+                    <a:lnB w="9525" cap="flat" cmpd="sng" algn="ctr">
+                      <a:solidFill>
+                        <a:srgbClr val="CCCCCC"/>
+                      </a:solidFill>
+                      <a:prstDash val="solid"/>
+                      <a:round/>
+                      <a:headEnd type="none" w="med" len="med"/>
+                      <a:tailEnd type="none" w="med" len="med"/>
+                    </a:lnB>
+                    <a:noFill/>
+                  </a:tcPr>
+                </a:tc>
+                <a:tc>
+                  <a:txBody>
+                    <a:bodyPr/>
+                    <a:lstStyle/>
+                    <a:p>
+                      <a:pPr lvl="1" rtl="0" fontAlgn="b"/>
+                      <a:r>
+                        <a:rPr lang="en-GB" sz="1600" dirty="0">
+                          <a:effectLst/>
+                        </a:rPr>
+                        <a:t>Requires interpreter at runtime</a:t>
+                      </a:r>
+                    </a:p>
+                  </a:txBody>
+                  <a:tcPr marL="0" marR="0" marT="8332" marB="8332" anchor="ctr">
+                    <a:lnL w="9525" cap="flat" cmpd="sng" algn="ctr">
+                      <a:solidFill>
+                        <a:srgbClr val="609031"/>
+                      </a:solidFill>
+                      <a:prstDash val="solid"/>
+                      <a:round/>
+                      <a:headEnd type="none" w="med" len="med"/>
+                      <a:tailEnd type="none" w="med" len="med"/>
+                    </a:lnL>
+                    <a:lnR w="9525" cap="flat" cmpd="sng" algn="ctr">
+                      <a:solidFill>
+                        <a:srgbClr val="609031"/>
+                      </a:solidFill>
+                      <a:prstDash val="solid"/>
+                      <a:round/>
+                      <a:headEnd type="none" w="med" len="med"/>
+                      <a:tailEnd type="none" w="med" len="med"/>
+                    </a:lnR>
+                    <a:lnT w="9525" cap="flat" cmpd="sng" algn="ctr">
+                      <a:solidFill>
+                        <a:srgbClr val="609031"/>
+                      </a:solidFill>
+                      <a:prstDash val="solid"/>
+                      <a:round/>
+                      <a:headEnd type="none" w="med" len="med"/>
+                      <a:tailEnd type="none" w="med" len="med"/>
+                    </a:lnT>
+                    <a:lnB w="9525" cap="flat" cmpd="sng" algn="ctr">
+                      <a:solidFill>
+                        <a:srgbClr val="809230"/>
+                      </a:solidFill>
+                      <a:prstDash val="solid"/>
+                      <a:round/>
+                      <a:headEnd type="none" w="med" len="med"/>
+                      <a:tailEnd type="none" w="med" len="med"/>
+                    </a:lnB>
+                    <a:noFill/>
+                  </a:tcPr>
+                </a:tc>
+                <a:extLst>
+                  <a:ext uri="{0D108BD9-81ED-4DB2-BD59-A6C34878D82A}">
+                    <a16:rowId xmlns:a16="http://schemas.microsoft.com/office/drawing/2014/main" val="1013800821"/>
+                  </a:ext>
+                </a:extLst>
+              </a:tr>
+              <a:tr h="469674">
+                <a:tc>
+                  <a:txBody>
+                    <a:bodyPr/>
+                    <a:lstStyle/>
+                    <a:p>
+                      <a:pPr lvl="1" rtl="0" fontAlgn="b"/>
+                      <a:r>
+                        <a:rPr lang="en-GB" sz="1600" b="1" dirty="0">
+                          <a:effectLst/>
+                        </a:rPr>
+                        <a:t>Examples</a:t>
+                      </a:r>
+                    </a:p>
+                  </a:txBody>
+                  <a:tcPr marL="12497" marR="12497" marT="8332" marB="8332" anchor="ctr">
+                    <a:lnL w="9525" cap="flat" cmpd="sng" algn="ctr">
+                      <a:solidFill>
+                        <a:srgbClr val="CCCCCC"/>
+                      </a:solidFill>
+                      <a:prstDash val="solid"/>
+                      <a:round/>
+                      <a:headEnd type="none" w="med" len="med"/>
+                      <a:tailEnd type="none" w="med" len="med"/>
+                    </a:lnL>
+                    <a:lnR w="9525" cap="flat" cmpd="sng" algn="ctr">
+                      <a:solidFill>
+                        <a:srgbClr val="CCCCCC"/>
+                      </a:solidFill>
+                      <a:prstDash val="solid"/>
+                      <a:round/>
+                      <a:headEnd type="none" w="med" len="med"/>
+                      <a:tailEnd type="none" w="med" len="med"/>
+                    </a:lnR>
+                    <a:lnT w="9525" cap="flat" cmpd="sng" algn="ctr">
+                      <a:solidFill>
+                        <a:srgbClr val="CCCCCC"/>
+                      </a:solidFill>
+                      <a:prstDash val="solid"/>
+                      <a:round/>
+                      <a:headEnd type="none" w="med" len="med"/>
+                      <a:tailEnd type="none" w="med" len="med"/>
+                    </a:lnT>
+                    <a:lnB w="9525" cap="flat" cmpd="sng" algn="ctr">
+                      <a:solidFill>
+                        <a:srgbClr val="CCCCCC"/>
+                      </a:solidFill>
+                      <a:prstDash val="solid"/>
+                      <a:round/>
+                      <a:headEnd type="none" w="med" len="med"/>
+                      <a:tailEnd type="none" w="med" len="med"/>
+                    </a:lnB>
+                    <a:noFill/>
+                  </a:tcPr>
+                </a:tc>
+                <a:tc>
+                  <a:txBody>
+                    <a:bodyPr/>
+                    <a:lstStyle/>
+                    <a:p>
+                      <a:pPr lvl="1" rtl="0" fontAlgn="b"/>
+                      <a:r>
+                        <a:rPr lang="en-GB" sz="1600" dirty="0">
+                          <a:effectLst/>
+                        </a:rPr>
+                        <a:t>C, C++, Rust, Go</a:t>
+                      </a:r>
+                    </a:p>
+                  </a:txBody>
+                  <a:tcPr marL="12497" marR="12497" marT="8332" marB="8332" anchor="ctr">
+                    <a:lnL w="9525" cap="flat" cmpd="sng" algn="ctr">
+                      <a:solidFill>
+                        <a:srgbClr val="CCCCCC"/>
+                      </a:solidFill>
+                      <a:prstDash val="solid"/>
+                      <a:round/>
+                      <a:headEnd type="none" w="med" len="med"/>
+                      <a:tailEnd type="none" w="med" len="med"/>
+                    </a:lnL>
+                    <a:lnR w="9525" cap="flat" cmpd="sng" algn="ctr">
+                      <a:solidFill>
+                        <a:srgbClr val="809230"/>
+                      </a:solidFill>
+                      <a:prstDash val="solid"/>
+                      <a:round/>
+                      <a:headEnd type="none" w="med" len="med"/>
+                      <a:tailEnd type="none" w="med" len="med"/>
+                    </a:lnR>
+                    <a:lnT w="9525" cap="flat" cmpd="sng" algn="ctr">
+                      <a:solidFill>
+                        <a:srgbClr val="CCCCCC"/>
+                      </a:solidFill>
+                      <a:prstDash val="solid"/>
+                      <a:round/>
+                      <a:headEnd type="none" w="med" len="med"/>
+                      <a:tailEnd type="none" w="med" len="med"/>
+                    </a:lnT>
+                    <a:lnB w="9525" cap="flat" cmpd="sng" algn="ctr">
+                      <a:solidFill>
+                        <a:srgbClr val="CCCCCC"/>
+                      </a:solidFill>
+                      <a:prstDash val="solid"/>
+                      <a:round/>
+                      <a:headEnd type="none" w="med" len="med"/>
+                      <a:tailEnd type="none" w="med" len="med"/>
+                    </a:lnB>
+                    <a:noFill/>
+                  </a:tcPr>
+                </a:tc>
+                <a:tc>
+                  <a:txBody>
+                    <a:bodyPr/>
+                    <a:lstStyle/>
+                    <a:p>
+                      <a:pPr lvl="1" rtl="0" fontAlgn="b"/>
+                      <a:r>
+                        <a:rPr lang="en-GB" sz="1600" dirty="0">
+                          <a:effectLst/>
+                        </a:rPr>
+                        <a:t>Python, JavaScript, Ruby</a:t>
+                      </a:r>
+                    </a:p>
+                  </a:txBody>
+                  <a:tcPr marL="0" marR="0" marT="8332" marB="8332" anchor="ctr">
+                    <a:lnL w="9525" cap="flat" cmpd="sng" algn="ctr">
+                      <a:solidFill>
+                        <a:srgbClr val="809230"/>
+                      </a:solidFill>
+                      <a:prstDash val="solid"/>
+                      <a:round/>
+                      <a:headEnd type="none" w="med" len="med"/>
+                      <a:tailEnd type="none" w="med" len="med"/>
+                    </a:lnL>
+                    <a:lnR w="9525" cap="flat" cmpd="sng" algn="ctr">
+                      <a:solidFill>
+                        <a:srgbClr val="809230"/>
+                      </a:solidFill>
+                      <a:prstDash val="solid"/>
+                      <a:round/>
+                      <a:headEnd type="none" w="med" len="med"/>
+                      <a:tailEnd type="none" w="med" len="med"/>
+                    </a:lnR>
+                    <a:lnT w="9525" cap="flat" cmpd="sng" algn="ctr">
+                      <a:solidFill>
+                        <a:srgbClr val="809230"/>
+                      </a:solidFill>
+                      <a:prstDash val="solid"/>
+                      <a:round/>
+                      <a:headEnd type="none" w="med" len="med"/>
+                      <a:tailEnd type="none" w="med" len="med"/>
+                    </a:lnT>
+                    <a:lnB w="9525" cap="flat" cmpd="sng" algn="ctr">
+                      <a:solidFill>
+                        <a:srgbClr val="809230"/>
+                      </a:solidFill>
+                      <a:prstDash val="solid"/>
+                      <a:round/>
+                      <a:headEnd type="none" w="med" len="med"/>
+                      <a:tailEnd type="none" w="med" len="med"/>
+                    </a:lnB>
+                    <a:noFill/>
+                  </a:tcPr>
+                </a:tc>
+                <a:extLst>
+                  <a:ext uri="{0D108BD9-81ED-4DB2-BD59-A6C34878D82A}">
+                    <a16:rowId xmlns:a16="http://schemas.microsoft.com/office/drawing/2014/main" val="1932620725"/>
+                  </a:ext>
+                </a:extLst>
+              </a:tr>
+            </a:tbl>
+          </a:graphicData>
+        </a:graphic>
+      </p:graphicFrame>
+      <p:sp>
+        <p:nvSpPr>
+          <p:cNvPr id="6" name="TextBox 5">
+            <a:extLst>
+              <a:ext uri="{FF2B5EF4-FFF2-40B4-BE49-F238E27FC236}">
+                <a16:creationId xmlns:a16="http://schemas.microsoft.com/office/drawing/2014/main" id="{A70F06B8-BD31-C3AE-C0FD-A87C6FFBF959}"/>
+              </a:ext>
+            </a:extLst>
+          </p:cNvPr>
+          <p:cNvSpPr txBox="1"/>
+          <p:nvPr/>
+        </p:nvSpPr>
+        <p:spPr>
+          <a:xfrm>
+            <a:off x="2967258" y="5328954"/>
+            <a:ext cx="3618298" cy="369332"/>
+          </a:xfrm>
+          <a:prstGeom prst="rect">
+            <a:avLst/>
+          </a:prstGeom>
+          <a:noFill/>
+        </p:spPr>
+        <p:txBody>
+          <a:bodyPr wrap="none" rtlCol="0">
+            <a:spAutoFit/>
+          </a:bodyPr>
+          <a:lstStyle/>
+          <a:p>
+            <a:r>
+              <a:rPr lang="en-NL" dirty="0"/>
+              <a:t>AOT (Ahead of Time) Compiler</a:t>
+            </a:r>
+          </a:p>
+        </p:txBody>
+      </p:sp>
+    </p:spTree>
+    <p:extLst>
+      <p:ext uri="{BB962C8B-B14F-4D97-AF65-F5344CB8AC3E}">
+        <p14:creationId xmlns:p14="http://schemas.microsoft.com/office/powerpoint/2010/main" val="2451466867"/>
+      </p:ext>
+    </p:extLst>
+  </p:cSld>
+  <p:clrMapOvr>
+    <a:masterClrMapping/>
+  </p:clrMapOvr>
+</p:sld>
+</file>
+
+<file path=ppt/slides/slide5.xml><?xml version="1.0" encoding="utf-8"?>
 <p:sld xmlns:a="http://schemas.openxmlformats.org/drawingml/2006/main" xmlns:r="http://schemas.openxmlformats.org/officeDocument/2006/relationships" xmlns:p="http://schemas.openxmlformats.org/presentationml/2006/main">
   <p:cSld>
     <p:spTree>
@@ -21793,7 +23709,7 @@
           <p:cNvPr id="2" name="Title 1">
             <a:extLst>
               <a:ext uri="{FF2B5EF4-FFF2-40B4-BE49-F238E27FC236}">
-                <a16:creationId xmlns:a16="http://schemas.microsoft.com/office/drawing/2014/main" id="{04B9A511-6881-083C-DFAA-1A8CFD42037C}"/>
+                <a16:creationId xmlns:a16="http://schemas.microsoft.com/office/drawing/2014/main" id="{6FE46F39-6C10-F84C-5CAF-D65CF8D5E1D0}"/>
               </a:ext>
             </a:extLst>
           </p:cNvPr>
@@ -21810,81 +23726,8 @@
           <a:lstStyle/>
           <a:p>
             <a:r>
-              <a:rPr lang="nl-NL" dirty="0" err="1"/>
-              <a:t>What</a:t>
-            </a:r>
-            <a:r>
-              <a:rPr lang="nl-NL" dirty="0"/>
-              <a:t> is </a:t>
-            </a:r>
-            <a:r>
-              <a:rPr lang="nl-NL" dirty="0" err="1"/>
-              <a:t>an</a:t>
-            </a:r>
-            <a:r>
-              <a:rPr lang="nl-NL" dirty="0"/>
-              <a:t> </a:t>
-            </a:r>
-            <a:r>
-              <a:rPr lang="nl-NL" dirty="0" err="1"/>
-              <a:t>interpreter</a:t>
-            </a:r>
-            <a:r>
-              <a:rPr lang="nl-NL" dirty="0"/>
-              <a:t>?</a:t>
-            </a:r>
-            <a:endParaRPr lang="en-NZ" dirty="0"/>
-          </a:p>
-        </p:txBody>
-      </p:sp>
-      <p:sp>
-        <p:nvSpPr>
-          <p:cNvPr id="3" name="Content Placeholder 2">
-            <a:extLst>
-              <a:ext uri="{FF2B5EF4-FFF2-40B4-BE49-F238E27FC236}">
-                <a16:creationId xmlns:a16="http://schemas.microsoft.com/office/drawing/2014/main" id="{B40525A0-257D-FF6B-F5E3-7533C899046A}"/>
-              </a:ext>
-            </a:extLst>
-          </p:cNvPr>
-          <p:cNvSpPr>
-            <a:spLocks noGrp="1"/>
-          </p:cNvSpPr>
-          <p:nvPr>
-            <p:ph idx="1"/>
-          </p:nvPr>
-        </p:nvSpPr>
-        <p:spPr/>
-        <p:txBody>
-          <a:bodyPr/>
-          <a:lstStyle/>
-          <a:p>
-            <a:r>
-              <a:rPr lang="en-NZ" dirty="0"/>
-              <a:t>An interpreter translates source code into machine code line-by-line during execution.</a:t>
-            </a:r>
-          </a:p>
-          <a:p>
-            <a:r>
-              <a:rPr lang="en-NZ" dirty="0"/>
-              <a:t>It does not produce an intermediate executable file; instead, it directly executes the code.</a:t>
-            </a:r>
-          </a:p>
-          <a:p>
-            <a:r>
-              <a:rPr lang="en-NZ" dirty="0"/>
-              <a:t>Each time the program runs, it must be interpreted anew, leading to slower execution compared to compiled code.</a:t>
-            </a:r>
-          </a:p>
-          <a:p>
-            <a:r>
-              <a:rPr lang="en-NZ" dirty="0"/>
-              <a:t>Interpreters are often used in development environments for easier debugging and testing.</a:t>
-            </a:r>
-          </a:p>
-          <a:p>
-            <a:r>
-              <a:rPr lang="en-NZ" dirty="0"/>
-              <a:t>Examples of interpreted languages include Python, JavaScript, and Ruby.</a:t>
+              <a:rPr lang="en-NL" dirty="0"/>
+              <a:t>Type</a:t>
             </a:r>
           </a:p>
         </p:txBody>
@@ -21894,7 +23737,7 @@
           <p:cNvPr id="4" name="Slide Number Placeholder 3">
             <a:extLst>
               <a:ext uri="{FF2B5EF4-FFF2-40B4-BE49-F238E27FC236}">
-                <a16:creationId xmlns:a16="http://schemas.microsoft.com/office/drawing/2014/main" id="{91B0E616-CD56-E305-80EC-4C40EDEA8C57}"/>
+                <a16:creationId xmlns:a16="http://schemas.microsoft.com/office/drawing/2014/main" id="{3EEBA708-9710-662B-DB7D-55090F266E4E}"/>
               </a:ext>
             </a:extLst>
           </p:cNvPr>
@@ -21912,16 +23755,187 @@
           <a:p>
             <a:fld id="{7E50A921-1625-4E66-8B53-913CC32CAF35}" type="slidenum">
               <a:rPr lang="en-NZ" smtClean="0"/>
-              <a:t>4</a:t>
+              <a:t>5</a:t>
             </a:fld>
             <a:endParaRPr lang="en-NZ" dirty="0"/>
           </a:p>
         </p:txBody>
       </p:sp>
+      <p:graphicFrame>
+        <p:nvGraphicFramePr>
+          <p:cNvPr id="5" name="Table 4">
+            <a:extLst>
+              <a:ext uri="{FF2B5EF4-FFF2-40B4-BE49-F238E27FC236}">
+                <a16:creationId xmlns:a16="http://schemas.microsoft.com/office/drawing/2014/main" id="{63ED1CD3-F5BA-B8B9-554A-EF5156942AC0}"/>
+              </a:ext>
+            </a:extLst>
+          </p:cNvPr>
+          <p:cNvGraphicFramePr>
+            <a:graphicFrameLocks noGrp="1"/>
+          </p:cNvGraphicFramePr>
+          <p:nvPr>
+            <p:extLst>
+              <p:ext uri="{D42A27DB-BD31-4B8C-83A1-F6EECF244321}">
+                <p14:modId xmlns:p14="http://schemas.microsoft.com/office/powerpoint/2010/main" val="1933490341"/>
+              </p:ext>
+            </p:extLst>
+          </p:nvPr>
+        </p:nvGraphicFramePr>
+        <p:xfrm>
+          <a:off x="1103312" y="2755311"/>
+          <a:ext cx="9603040" cy="1730727"/>
+        </p:xfrm>
+        <a:graphic>
+          <a:graphicData uri="http://schemas.openxmlformats.org/drawingml/2006/table">
+            <a:tbl>
+              <a:tblPr firstRow="1" bandRow="1">
+                <a:tableStyleId>{5C22544A-7EE6-4342-B048-85BDC9FD1C3A}</a:tableStyleId>
+              </a:tblPr>
+              <a:tblGrid>
+                <a:gridCol w="4801520">
+                  <a:extLst>
+                    <a:ext uri="{9D8B030D-6E8A-4147-A177-3AD203B41FA5}">
+                      <a16:colId xmlns:a16="http://schemas.microsoft.com/office/drawing/2014/main" val="3648925260"/>
+                    </a:ext>
+                  </a:extLst>
+                </a:gridCol>
+                <a:gridCol w="4801520">
+                  <a:extLst>
+                    <a:ext uri="{9D8B030D-6E8A-4147-A177-3AD203B41FA5}">
+                      <a16:colId xmlns:a16="http://schemas.microsoft.com/office/drawing/2014/main" val="4016048039"/>
+                    </a:ext>
+                  </a:extLst>
+                </a:gridCol>
+              </a:tblGrid>
+              <a:tr h="816327">
+                <a:tc>
+                  <a:txBody>
+                    <a:bodyPr/>
+                    <a:lstStyle/>
+                    <a:p>
+                      <a:endParaRPr lang="en-NL" sz="2400" dirty="0"/>
+                    </a:p>
+                  </a:txBody>
+                  <a:tcPr/>
+                </a:tc>
+                <a:tc>
+                  <a:txBody>
+                    <a:bodyPr/>
+                    <a:lstStyle/>
+                    <a:p>
+                      <a:r>
+                        <a:rPr lang="nl-NL" sz="2400" dirty="0"/>
+                        <a:t>Type </a:t>
+                      </a:r>
+                      <a:r>
+                        <a:rPr lang="nl-NL" sz="2400" dirty="0" err="1"/>
+                        <a:t>checking</a:t>
+                      </a:r>
+                      <a:r>
+                        <a:rPr lang="nl-NL" sz="2400" dirty="0"/>
+                        <a:t> is </a:t>
+                      </a:r>
+                      <a:r>
+                        <a:rPr lang="nl-NL" sz="2400" dirty="0" err="1"/>
+                        <a:t>performed</a:t>
+                      </a:r>
+                      <a:r>
+                        <a:rPr lang="nl-NL" sz="2400" dirty="0"/>
+                        <a:t> ..</a:t>
+                      </a:r>
+                      <a:endParaRPr lang="en-NL" sz="2400" dirty="0"/>
+                    </a:p>
+                  </a:txBody>
+                  <a:tcPr/>
+                </a:tc>
+                <a:extLst>
+                  <a:ext uri="{0D108BD9-81ED-4DB2-BD59-A6C34878D82A}">
+                    <a16:rowId xmlns:a16="http://schemas.microsoft.com/office/drawing/2014/main" val="347028197"/>
+                  </a:ext>
+                </a:extLst>
+              </a:tr>
+              <a:tr h="455352">
+                <a:tc>
+                  <a:txBody>
+                    <a:bodyPr/>
+                    <a:lstStyle/>
+                    <a:p>
+                      <a:r>
+                        <a:rPr lang="en-NL" sz="2400" dirty="0"/>
+                        <a:t>Statically typed</a:t>
+                      </a:r>
+                    </a:p>
+                  </a:txBody>
+                  <a:tcPr/>
+                </a:tc>
+                <a:tc>
+                  <a:txBody>
+                    <a:bodyPr/>
+                    <a:lstStyle/>
+                    <a:p>
+                      <a:r>
+                        <a:rPr lang="en-GB" sz="2400" dirty="0"/>
+                        <a:t>A</a:t>
+                      </a:r>
+                      <a:r>
+                        <a:rPr lang="en-NL" sz="2400" dirty="0"/>
+                        <a:t>t compile time</a:t>
+                      </a:r>
+                    </a:p>
+                  </a:txBody>
+                  <a:tcPr/>
+                </a:tc>
+                <a:extLst>
+                  <a:ext uri="{0D108BD9-81ED-4DB2-BD59-A6C34878D82A}">
+                    <a16:rowId xmlns:a16="http://schemas.microsoft.com/office/drawing/2014/main" val="3682573433"/>
+                  </a:ext>
+                </a:extLst>
+              </a:tr>
+              <a:tr h="455352">
+                <a:tc>
+                  <a:txBody>
+                    <a:bodyPr/>
+                    <a:lstStyle/>
+                    <a:p>
+                      <a:r>
+                        <a:rPr lang="en-NL" sz="2400" dirty="0"/>
+                        <a:t>Dynamically typed</a:t>
+                      </a:r>
+                    </a:p>
+                  </a:txBody>
+                  <a:tcPr/>
+                </a:tc>
+                <a:tc>
+                  <a:txBody>
+                    <a:bodyPr/>
+                    <a:lstStyle/>
+                    <a:p>
+                      <a:r>
+                        <a:rPr lang="en-GB" sz="2400" dirty="0"/>
+                        <a:t>A</a:t>
+                      </a:r>
+                      <a:r>
+                        <a:rPr lang="en-NL" sz="2400" dirty="0"/>
+                        <a:t>t run time</a:t>
+                      </a:r>
+                    </a:p>
+                  </a:txBody>
+                  <a:tcPr/>
+                </a:tc>
+                <a:extLst>
+                  <a:ext uri="{0D108BD9-81ED-4DB2-BD59-A6C34878D82A}">
+                    <a16:rowId xmlns:a16="http://schemas.microsoft.com/office/drawing/2014/main" val="2249784146"/>
+                  </a:ext>
+                </a:extLst>
+              </a:tr>
+            </a:tbl>
+          </a:graphicData>
+        </a:graphic>
+      </p:graphicFrame>
     </p:spTree>
     <p:extLst>
       <p:ext uri="{BB962C8B-B14F-4D97-AF65-F5344CB8AC3E}">
-        <p14:creationId xmlns:p14="http://schemas.microsoft.com/office/powerpoint/2010/main" val="930259969"/>
+        <p14:creationId xmlns:p14="http://schemas.microsoft.com/office/powerpoint/2010/main" val="1194888344"/>
       </p:ext>
     </p:extLst>
   </p:cSld>
@@ -21931,7 +23945,7 @@
 </p:sld>
 </file>
 
-<file path=ppt/slides/slide5.xml><?xml version="1.0" encoding="utf-8"?>
+<file path=ppt/slides/slide6.xml><?xml version="1.0" encoding="utf-8"?>
 <p:sld xmlns:a="http://schemas.openxmlformats.org/drawingml/2006/main" xmlns:r="http://schemas.openxmlformats.org/officeDocument/2006/relationships" xmlns:p="http://schemas.openxmlformats.org/presentationml/2006/main">
   <p:cSld>
     <p:bg>
@@ -23025,7 +25039,7 @@
                   <a:spcPts val="600"/>
                 </a:spcAft>
               </a:pPr>
-              <a:t>5</a:t>
+              <a:t>6</a:t>
             </a:fld>
             <a:endParaRPr lang="en-NZ">
               <a:solidFill>
@@ -23111,7 +25125,7 @@
 </p:sld>
 </file>
 
-<file path=ppt/slides/slide6.xml><?xml version="1.0" encoding="utf-8"?>
+<file path=ppt/slides/slide7.xml><?xml version="1.0" encoding="utf-8"?>
 <p:sld xmlns:a="http://schemas.openxmlformats.org/drawingml/2006/main" xmlns:r="http://schemas.openxmlformats.org/officeDocument/2006/relationships" xmlns:p="http://schemas.openxmlformats.org/presentationml/2006/main">
   <p:cSld>
     <p:spTree>
@@ -23251,7 +25265,7 @@
             </a:r>
             <a:r>
               <a:rPr lang="en-NZ" dirty="0"/>
-              <a:t> (default) / </a:t>
+              <a:t> (reference) / </a:t>
             </a:r>
             <a:r>
               <a:rPr lang="en-NZ" dirty="0" err="1"/>
@@ -23298,7 +25312,7 @@
           <a:p>
             <a:fld id="{7E50A921-1625-4E66-8B53-913CC32CAF35}" type="slidenum">
               <a:rPr lang="en-NZ" smtClean="0"/>
-              <a:t>6</a:t>
+              <a:t>7</a:t>
             </a:fld>
             <a:endParaRPr lang="en-NZ" dirty="0"/>
           </a:p>
@@ -23356,7 +25370,372 @@
 </p:sld>
 </file>
 
-<file path=ppt/slides/slide7.xml><?xml version="1.0" encoding="utf-8"?>
+<file path=ppt/slides/slide8.xml><?xml version="1.0" encoding="utf-8"?>
+<p:sld xmlns:a="http://schemas.openxmlformats.org/drawingml/2006/main" xmlns:r="http://schemas.openxmlformats.org/officeDocument/2006/relationships" xmlns:p="http://schemas.openxmlformats.org/presentationml/2006/main">
+  <p:cSld>
+    <p:spTree>
+      <p:nvGrpSpPr>
+        <p:cNvPr id="1" name="">
+          <a:extLst>
+            <a:ext uri="{FF2B5EF4-FFF2-40B4-BE49-F238E27FC236}">
+              <a16:creationId xmlns:a16="http://schemas.microsoft.com/office/drawing/2014/main" id="{D8E7C951-89CB-9EC0-4C14-7D726163FC4F}"/>
+            </a:ext>
+          </a:extLst>
+        </p:cNvPr>
+        <p:cNvGrpSpPr/>
+        <p:nvPr/>
+      </p:nvGrpSpPr>
+      <p:grpSpPr>
+        <a:xfrm>
+          <a:off x="0" y="0"/>
+          <a:ext cx="0" cy="0"/>
+          <a:chOff x="0" y="0"/>
+          <a:chExt cx="0" cy="0"/>
+        </a:xfrm>
+      </p:grpSpPr>
+      <p:sp>
+        <p:nvSpPr>
+          <p:cNvPr id="2" name="Title 1">
+            <a:extLst>
+              <a:ext uri="{FF2B5EF4-FFF2-40B4-BE49-F238E27FC236}">
+                <a16:creationId xmlns:a16="http://schemas.microsoft.com/office/drawing/2014/main" id="{44A9F442-765E-9B79-0DF4-253B5032D964}"/>
+              </a:ext>
+            </a:extLst>
+          </p:cNvPr>
+          <p:cNvSpPr>
+            <a:spLocks noGrp="1"/>
+          </p:cNvSpPr>
+          <p:nvPr>
+            <p:ph type="title"/>
+          </p:nvPr>
+        </p:nvSpPr>
+        <p:spPr/>
+        <p:txBody>
+          <a:bodyPr/>
+          <a:lstStyle/>
+          <a:p>
+            <a:r>
+              <a:rPr lang="nl-NL" dirty="0" err="1"/>
+              <a:t>Compiled</a:t>
+            </a:r>
+            <a:r>
+              <a:rPr lang="nl-NL" dirty="0"/>
+              <a:t>/</a:t>
+            </a:r>
+            <a:r>
+              <a:rPr lang="nl-NL" dirty="0" err="1"/>
+              <a:t>interpreted</a:t>
+            </a:r>
+            <a:r>
+              <a:rPr lang="nl-NL" dirty="0"/>
+              <a:t> - </a:t>
+            </a:r>
+            <a:r>
+              <a:rPr lang="nl-NL" dirty="0" err="1"/>
+              <a:t>hybrid</a:t>
+            </a:r>
+            <a:endParaRPr lang="en-NZ" dirty="0"/>
+          </a:p>
+        </p:txBody>
+      </p:sp>
+      <p:sp>
+        <p:nvSpPr>
+          <p:cNvPr id="3" name="Content Placeholder 2">
+            <a:extLst>
+              <a:ext uri="{FF2B5EF4-FFF2-40B4-BE49-F238E27FC236}">
+                <a16:creationId xmlns:a16="http://schemas.microsoft.com/office/drawing/2014/main" id="{338DEF57-DB93-9581-617D-CF69C09FC892}"/>
+              </a:ext>
+            </a:extLst>
+          </p:cNvPr>
+          <p:cNvSpPr>
+            <a:spLocks noGrp="1"/>
+          </p:cNvSpPr>
+          <p:nvPr>
+            <p:ph idx="1"/>
+          </p:nvPr>
+        </p:nvSpPr>
+        <p:spPr/>
+        <p:txBody>
+          <a:bodyPr/>
+          <a:lstStyle/>
+          <a:p>
+            <a:r>
+              <a:rPr lang="en-NZ" dirty="0"/>
+              <a:t>Statically typed</a:t>
+            </a:r>
+          </a:p>
+          <a:p>
+            <a:pPr lvl="1"/>
+            <a:r>
+              <a:rPr lang="en-NZ" dirty="0">
+                <a:highlight>
+                  <a:srgbClr val="000080"/>
+                </a:highlight>
+              </a:rPr>
+              <a:t>C / C++ / Rust</a:t>
+            </a:r>
+          </a:p>
+          <a:p>
+            <a:pPr lvl="1"/>
+            <a:r>
+              <a:rPr lang="en-NZ" dirty="0">
+                <a:highlight>
+                  <a:srgbClr val="FF00FF"/>
+                </a:highlight>
+              </a:rPr>
+              <a:t>Java, C# (Virtual Machine)</a:t>
+            </a:r>
+          </a:p>
+          <a:p>
+            <a:r>
+              <a:rPr lang="en-NZ" dirty="0"/>
+              <a:t>Dynamically typed</a:t>
+            </a:r>
+          </a:p>
+          <a:p>
+            <a:pPr lvl="1"/>
+            <a:r>
+              <a:rPr lang="en-NZ" dirty="0">
+                <a:highlight>
+                  <a:srgbClr val="FF00FF"/>
+                </a:highlight>
+              </a:rPr>
+              <a:t>JavaScript</a:t>
+            </a:r>
+          </a:p>
+          <a:p>
+            <a:pPr lvl="2"/>
+            <a:r>
+              <a:rPr lang="en-NZ" dirty="0">
+                <a:highlight>
+                  <a:srgbClr val="FF00FF"/>
+                </a:highlight>
+              </a:rPr>
+              <a:t>Engines like V8 (Node.js / Chrome / Edge)</a:t>
+            </a:r>
+          </a:p>
+          <a:p>
+            <a:pPr lvl="1"/>
+            <a:r>
+              <a:rPr lang="en-NZ" dirty="0"/>
+              <a:t>Python (</a:t>
+            </a:r>
+            <a:r>
+              <a:rPr lang="en-NZ" dirty="0" err="1"/>
+              <a:t>CPython</a:t>
+            </a:r>
+            <a:r>
+              <a:rPr lang="en-NZ" dirty="0"/>
+              <a:t> (reference) / </a:t>
+            </a:r>
+            <a:r>
+              <a:rPr lang="en-NZ" dirty="0" err="1">
+                <a:highlight>
+                  <a:srgbClr val="FF00FF"/>
+                </a:highlight>
+              </a:rPr>
+              <a:t>PyPy</a:t>
+            </a:r>
+            <a:r>
+              <a:rPr lang="en-NZ" dirty="0"/>
+              <a:t>), also Virtual Machine</a:t>
+            </a:r>
+          </a:p>
+          <a:p>
+            <a:pPr lvl="1"/>
+            <a:r>
+              <a:rPr lang="en-NZ" dirty="0"/>
+              <a:t>Bash</a:t>
+            </a:r>
+          </a:p>
+          <a:p>
+            <a:pPr lvl="1"/>
+            <a:endParaRPr lang="en-NZ" dirty="0"/>
+          </a:p>
+        </p:txBody>
+      </p:sp>
+      <p:sp>
+        <p:nvSpPr>
+          <p:cNvPr id="4" name="Slide Number Placeholder 3">
+            <a:extLst>
+              <a:ext uri="{FF2B5EF4-FFF2-40B4-BE49-F238E27FC236}">
+                <a16:creationId xmlns:a16="http://schemas.microsoft.com/office/drawing/2014/main" id="{52378F1C-A5EC-7605-3FE9-3239F0DE952B}"/>
+              </a:ext>
+            </a:extLst>
+          </p:cNvPr>
+          <p:cNvSpPr>
+            <a:spLocks noGrp="1"/>
+          </p:cNvSpPr>
+          <p:nvPr>
+            <p:ph type="sldNum" sz="quarter" idx="12"/>
+          </p:nvPr>
+        </p:nvSpPr>
+        <p:spPr/>
+        <p:txBody>
+          <a:bodyPr/>
+          <a:lstStyle/>
+          <a:p>
+            <a:fld id="{7E50A921-1625-4E66-8B53-913CC32CAF35}" type="slidenum">
+              <a:rPr lang="en-NZ" smtClean="0"/>
+              <a:t>8</a:t>
+            </a:fld>
+            <a:endParaRPr lang="en-NZ" dirty="0"/>
+          </a:p>
+        </p:txBody>
+      </p:sp>
+      <p:sp>
+        <p:nvSpPr>
+          <p:cNvPr id="5" name="TextBox 4">
+            <a:extLst>
+              <a:ext uri="{FF2B5EF4-FFF2-40B4-BE49-F238E27FC236}">
+                <a16:creationId xmlns:a16="http://schemas.microsoft.com/office/drawing/2014/main" id="{1046BD83-5FF5-4450-BCE2-FD4C47B0559D}"/>
+              </a:ext>
+            </a:extLst>
+          </p:cNvPr>
+          <p:cNvSpPr txBox="1"/>
+          <p:nvPr/>
+        </p:nvSpPr>
+        <p:spPr>
+          <a:xfrm rot="1614606">
+            <a:off x="8017121" y="3217635"/>
+            <a:ext cx="3316698" cy="646331"/>
+          </a:xfrm>
+          <a:prstGeom prst="rect">
+            <a:avLst/>
+          </a:prstGeom>
+          <a:noFill/>
+        </p:spPr>
+        <p:txBody>
+          <a:bodyPr wrap="square" rtlCol="0">
+            <a:spAutoFit/>
+          </a:bodyPr>
+          <a:lstStyle/>
+          <a:p>
+            <a:r>
+              <a:rPr lang="en-GB" sz="3600" dirty="0"/>
+              <a:t>T</a:t>
+            </a:r>
+            <a:r>
+              <a:rPr lang="en-NL" sz="3600" dirty="0"/>
+              <a:t>ype blurring</a:t>
+            </a:r>
+          </a:p>
+        </p:txBody>
+      </p:sp>
+      <p:sp>
+        <p:nvSpPr>
+          <p:cNvPr id="7" name="TextBox 6">
+            <a:extLst>
+              <a:ext uri="{FF2B5EF4-FFF2-40B4-BE49-F238E27FC236}">
+                <a16:creationId xmlns:a16="http://schemas.microsoft.com/office/drawing/2014/main" id="{356D67FF-C028-21E9-6B1E-C7435586BFD7}"/>
+              </a:ext>
+            </a:extLst>
+          </p:cNvPr>
+          <p:cNvSpPr txBox="1"/>
+          <p:nvPr/>
+        </p:nvSpPr>
+        <p:spPr>
+          <a:xfrm>
+            <a:off x="4935338" y="1980191"/>
+            <a:ext cx="3684022" cy="646331"/>
+          </a:xfrm>
+          <a:prstGeom prst="rect">
+            <a:avLst/>
+          </a:prstGeom>
+          <a:noFill/>
+        </p:spPr>
+        <p:txBody>
+          <a:bodyPr wrap="none" rtlCol="0">
+            <a:spAutoFit/>
+          </a:bodyPr>
+          <a:lstStyle/>
+          <a:p>
+            <a:r>
+              <a:rPr lang="en-GB" dirty="0">
+                <a:solidFill>
+                  <a:srgbClr val="000080"/>
+                </a:solidFill>
+              </a:rPr>
+              <a:t>A</a:t>
+            </a:r>
+            <a:r>
+              <a:rPr lang="en-NL" dirty="0">
+                <a:solidFill>
+                  <a:srgbClr val="000080"/>
+                </a:solidFill>
+              </a:rPr>
+              <a:t>head of time (AOT) compiling</a:t>
+            </a:r>
+          </a:p>
+          <a:p>
+            <a:r>
+              <a:rPr lang="en-NL" dirty="0">
+                <a:solidFill>
+                  <a:srgbClr val="FF00FF"/>
+                </a:solidFill>
+              </a:rPr>
+              <a:t>Just-in-time (JIT) compiling</a:t>
+            </a:r>
+          </a:p>
+        </p:txBody>
+      </p:sp>
+      <p:cxnSp>
+        <p:nvCxnSpPr>
+          <p:cNvPr id="9" name="Straight Connector 8">
+            <a:extLst>
+              <a:ext uri="{FF2B5EF4-FFF2-40B4-BE49-F238E27FC236}">
+                <a16:creationId xmlns:a16="http://schemas.microsoft.com/office/drawing/2014/main" id="{F8037607-203D-0CC8-5A8B-73A46E238261}"/>
+              </a:ext>
+            </a:extLst>
+          </p:cNvPr>
+          <p:cNvCxnSpPr>
+            <a:cxnSpLocks/>
+          </p:cNvCxnSpPr>
+          <p:nvPr/>
+        </p:nvCxnSpPr>
+        <p:spPr>
+          <a:xfrm>
+            <a:off x="2791645" y="4868726"/>
+            <a:ext cx="2295083" cy="0"/>
+          </a:xfrm>
+          <a:prstGeom prst="line">
+            <a:avLst/>
+          </a:prstGeom>
+          <a:ln w="28575">
+            <a:solidFill>
+              <a:srgbClr val="FF00FF"/>
+            </a:solidFill>
+          </a:ln>
+        </p:spPr>
+        <p:style>
+          <a:lnRef idx="1">
+            <a:schemeClr val="accent1"/>
+          </a:lnRef>
+          <a:fillRef idx="0">
+            <a:schemeClr val="accent1"/>
+          </a:fillRef>
+          <a:effectRef idx="0">
+            <a:schemeClr val="accent1"/>
+          </a:effectRef>
+          <a:fontRef idx="minor">
+            <a:schemeClr val="tx1"/>
+          </a:fontRef>
+        </p:style>
+      </p:cxnSp>
+    </p:spTree>
+    <p:extLst>
+      <p:ext uri="{BB962C8B-B14F-4D97-AF65-F5344CB8AC3E}">
+        <p14:creationId xmlns:p14="http://schemas.microsoft.com/office/powerpoint/2010/main" val="1613373525"/>
+      </p:ext>
+    </p:extLst>
+  </p:cSld>
+  <p:clrMapOvr>
+    <a:masterClrMapping/>
+  </p:clrMapOvr>
+</p:sld>
+</file>
+
+<file path=ppt/slides/slide9.xml><?xml version="1.0" encoding="utf-8"?>
 <p:sld xmlns:a="http://schemas.openxmlformats.org/drawingml/2006/main" xmlns:r="http://schemas.openxmlformats.org/officeDocument/2006/relationships" xmlns:p="http://schemas.openxmlformats.org/presentationml/2006/main">
   <p:cSld>
     <p:bg>
@@ -24428,7 +26807,7 @@
                   <a:spcPts val="600"/>
                 </a:spcAft>
               </a:pPr>
-              <a:t>7</a:t>
+              <a:t>9</a:t>
             </a:fld>
             <a:endParaRPr lang="en-NZ">
               <a:solidFill>
@@ -24478,296 +26857,6 @@
   </p:cSld>
   <p:clrMapOvr>
     <a:overrideClrMapping bg1="lt1" tx1="dk1" bg2="lt2" tx2="dk2" accent1="accent1" accent2="accent2" accent3="accent3" accent4="accent4" accent5="accent5" accent6="accent6" hlink="hlink" folHlink="folHlink"/>
-  </p:clrMapOvr>
-</p:sld>
-</file>
-
-<file path=ppt/slides/slide8.xml><?xml version="1.0" encoding="utf-8"?>
-<p:sld xmlns:a="http://schemas.openxmlformats.org/drawingml/2006/main" xmlns:r="http://schemas.openxmlformats.org/officeDocument/2006/relationships" xmlns:p="http://schemas.openxmlformats.org/presentationml/2006/main">
-  <p:cSld>
-    <p:spTree>
-      <p:nvGrpSpPr>
-        <p:cNvPr id="1" name=""/>
-        <p:cNvGrpSpPr/>
-        <p:nvPr/>
-      </p:nvGrpSpPr>
-      <p:grpSpPr>
-        <a:xfrm>
-          <a:off x="0" y="0"/>
-          <a:ext cx="0" cy="0"/>
-          <a:chOff x="0" y="0"/>
-          <a:chExt cx="0" cy="0"/>
-        </a:xfrm>
-      </p:grpSpPr>
-      <p:sp>
-        <p:nvSpPr>
-          <p:cNvPr id="2" name="Title 1">
-            <a:extLst>
-              <a:ext uri="{FF2B5EF4-FFF2-40B4-BE49-F238E27FC236}">
-                <a16:creationId xmlns:a16="http://schemas.microsoft.com/office/drawing/2014/main" id="{9FBEF56F-545F-37AB-80AF-D4C9FC3C4A36}"/>
-              </a:ext>
-            </a:extLst>
-          </p:cNvPr>
-          <p:cNvSpPr>
-            <a:spLocks noGrp="1"/>
-          </p:cNvSpPr>
-          <p:nvPr>
-            <p:ph type="title"/>
-          </p:nvPr>
-        </p:nvSpPr>
-        <p:spPr/>
-        <p:txBody>
-          <a:bodyPr/>
-          <a:lstStyle/>
-          <a:p>
-            <a:r>
-              <a:rPr lang="nl-NL" dirty="0"/>
-              <a:t>LISP </a:t>
-            </a:r>
-            <a:r>
-              <a:rPr lang="nl-NL" dirty="0" err="1"/>
-              <a:t>programming</a:t>
-            </a:r>
-            <a:r>
-              <a:rPr lang="nl-NL" dirty="0"/>
-              <a:t> </a:t>
-            </a:r>
-            <a:r>
-              <a:rPr lang="nl-NL" dirty="0" err="1"/>
-              <a:t>language</a:t>
-            </a:r>
-            <a:endParaRPr lang="en-NZ" dirty="0"/>
-          </a:p>
-        </p:txBody>
-      </p:sp>
-      <p:pic>
-        <p:nvPicPr>
-          <p:cNvPr id="6" name="Content Placeholder 5">
-            <a:extLst>
-              <a:ext uri="{FF2B5EF4-FFF2-40B4-BE49-F238E27FC236}">
-                <a16:creationId xmlns:a16="http://schemas.microsoft.com/office/drawing/2014/main" id="{0FE6D680-0B9A-72DD-4839-B2961A5AB183}"/>
-              </a:ext>
-            </a:extLst>
-          </p:cNvPr>
-          <p:cNvPicPr>
-            <a:picLocks noGrp="1" noChangeAspect="1"/>
-          </p:cNvPicPr>
-          <p:nvPr>
-            <p:ph idx="1"/>
-          </p:nvPr>
-        </p:nvPicPr>
-        <p:blipFill>
-          <a:blip r:embed="rId2"/>
-          <a:stretch>
-            <a:fillRect/>
-          </a:stretch>
-        </p:blipFill>
-        <p:spPr>
-          <a:xfrm>
-            <a:off x="1103313" y="2271618"/>
-            <a:ext cx="8947150" cy="3757802"/>
-          </a:xfrm>
-        </p:spPr>
-      </p:pic>
-      <p:sp>
-        <p:nvSpPr>
-          <p:cNvPr id="4" name="Slide Number Placeholder 3">
-            <a:extLst>
-              <a:ext uri="{FF2B5EF4-FFF2-40B4-BE49-F238E27FC236}">
-                <a16:creationId xmlns:a16="http://schemas.microsoft.com/office/drawing/2014/main" id="{BDED708F-BA01-7FBC-D76A-6BE51E89683D}"/>
-              </a:ext>
-            </a:extLst>
-          </p:cNvPr>
-          <p:cNvSpPr>
-            <a:spLocks noGrp="1"/>
-          </p:cNvSpPr>
-          <p:nvPr>
-            <p:ph type="sldNum" sz="quarter" idx="12"/>
-          </p:nvPr>
-        </p:nvSpPr>
-        <p:spPr/>
-        <p:txBody>
-          <a:bodyPr/>
-          <a:lstStyle/>
-          <a:p>
-            <a:fld id="{7E50A921-1625-4E66-8B53-913CC32CAF35}" type="slidenum">
-              <a:rPr lang="en-NZ" smtClean="0"/>
-              <a:t>8</a:t>
-            </a:fld>
-            <a:endParaRPr lang="en-NZ" dirty="0"/>
-          </a:p>
-        </p:txBody>
-      </p:sp>
-    </p:spTree>
-    <p:extLst>
-      <p:ext uri="{BB962C8B-B14F-4D97-AF65-F5344CB8AC3E}">
-        <p14:creationId xmlns:p14="http://schemas.microsoft.com/office/powerpoint/2010/main" val="406299684"/>
-      </p:ext>
-    </p:extLst>
-  </p:cSld>
-  <p:clrMapOvr>
-    <a:masterClrMapping/>
-  </p:clrMapOvr>
-</p:sld>
-</file>
-
-<file path=ppt/slides/slide9.xml><?xml version="1.0" encoding="utf-8"?>
-<p:sld xmlns:a="http://schemas.openxmlformats.org/drawingml/2006/main" xmlns:r="http://schemas.openxmlformats.org/officeDocument/2006/relationships" xmlns:p="http://schemas.openxmlformats.org/presentationml/2006/main">
-  <p:cSld>
-    <p:spTree>
-      <p:nvGrpSpPr>
-        <p:cNvPr id="1" name=""/>
-        <p:cNvGrpSpPr/>
-        <p:nvPr/>
-      </p:nvGrpSpPr>
-      <p:grpSpPr>
-        <a:xfrm>
-          <a:off x="0" y="0"/>
-          <a:ext cx="0" cy="0"/>
-          <a:chOff x="0" y="0"/>
-          <a:chExt cx="0" cy="0"/>
-        </a:xfrm>
-      </p:grpSpPr>
-      <p:sp>
-        <p:nvSpPr>
-          <p:cNvPr id="2" name="Title 1">
-            <a:extLst>
-              <a:ext uri="{FF2B5EF4-FFF2-40B4-BE49-F238E27FC236}">
-                <a16:creationId xmlns:a16="http://schemas.microsoft.com/office/drawing/2014/main" id="{0E3D4BE5-9B71-A8EB-F825-B02C792C5B66}"/>
-              </a:ext>
-            </a:extLst>
-          </p:cNvPr>
-          <p:cNvSpPr>
-            <a:spLocks noGrp="1"/>
-          </p:cNvSpPr>
-          <p:nvPr>
-            <p:ph type="title"/>
-          </p:nvPr>
-        </p:nvSpPr>
-        <p:spPr>
-          <a:xfrm>
-            <a:off x="643855" y="1447800"/>
-            <a:ext cx="3108626" cy="4572000"/>
-          </a:xfrm>
-        </p:spPr>
-        <p:txBody>
-          <a:bodyPr anchor="ctr">
-            <a:normAutofit/>
-          </a:bodyPr>
-          <a:lstStyle/>
-          <a:p>
-            <a:r>
-              <a:rPr lang="en-NZ" sz="3200" dirty="0">
-                <a:solidFill>
-                  <a:srgbClr val="F2F2F2"/>
-                </a:solidFill>
-              </a:rPr>
-              <a:t>What is JIT compiler?</a:t>
-            </a:r>
-            <a:br>
-              <a:rPr lang="en-NZ" sz="3200" dirty="0">
-                <a:solidFill>
-                  <a:srgbClr val="F2F2F2"/>
-                </a:solidFill>
-              </a:rPr>
-            </a:br>
-            <a:endParaRPr lang="en-NZ" sz="3200" dirty="0">
-              <a:solidFill>
-                <a:srgbClr val="F2F2F2"/>
-              </a:solidFill>
-            </a:endParaRPr>
-          </a:p>
-        </p:txBody>
-      </p:sp>
-      <p:sp>
-        <p:nvSpPr>
-          <p:cNvPr id="4" name="Slide Number Placeholder 3">
-            <a:extLst>
-              <a:ext uri="{FF2B5EF4-FFF2-40B4-BE49-F238E27FC236}">
-                <a16:creationId xmlns:a16="http://schemas.microsoft.com/office/drawing/2014/main" id="{D8D52B4C-6702-2465-EEDA-4E62AD0F7D8D}"/>
-              </a:ext>
-            </a:extLst>
-          </p:cNvPr>
-          <p:cNvSpPr>
-            <a:spLocks noGrp="1"/>
-          </p:cNvSpPr>
-          <p:nvPr>
-            <p:ph type="sldNum" sz="quarter" idx="12"/>
-          </p:nvPr>
-        </p:nvSpPr>
-        <p:spPr>
-          <a:xfrm>
-            <a:off x="10352540" y="295729"/>
-            <a:ext cx="838199" cy="767687"/>
-          </a:xfrm>
-        </p:spPr>
-        <p:txBody>
-          <a:bodyPr>
-            <a:normAutofit/>
-          </a:bodyPr>
-          <a:lstStyle/>
-          <a:p>
-            <a:pPr>
-              <a:spcAft>
-                <a:spcPts val="600"/>
-              </a:spcAft>
-            </a:pPr>
-            <a:fld id="{7E50A921-1625-4E66-8B53-913CC32CAF35}" type="slidenum">
-              <a:rPr lang="en-NZ">
-                <a:solidFill>
-                  <a:srgbClr val="FFFFFF"/>
-                </a:solidFill>
-              </a:rPr>
-              <a:pPr>
-                <a:spcAft>
-                  <a:spcPts val="600"/>
-                </a:spcAft>
-              </a:pPr>
-              <a:t>9</a:t>
-            </a:fld>
-            <a:endParaRPr lang="en-NZ">
-              <a:solidFill>
-                <a:srgbClr val="FFFFFF"/>
-              </a:solidFill>
-            </a:endParaRPr>
-          </a:p>
-        </p:txBody>
-      </p:sp>
-      <p:graphicFrame>
-        <p:nvGraphicFramePr>
-          <p:cNvPr id="6" name="Content Placeholder 2">
-            <a:extLst>
-              <a:ext uri="{FF2B5EF4-FFF2-40B4-BE49-F238E27FC236}">
-                <a16:creationId xmlns:a16="http://schemas.microsoft.com/office/drawing/2014/main" id="{2502376C-7173-60FD-A3B4-9859A7B3096A}"/>
-              </a:ext>
-            </a:extLst>
-          </p:cNvPr>
-          <p:cNvGraphicFramePr>
-            <a:graphicFrameLocks noGrp="1"/>
-          </p:cNvGraphicFramePr>
-          <p:nvPr>
-            <p:ph idx="1"/>
-          </p:nvPr>
-        </p:nvGraphicFramePr>
-        <p:xfrm>
-          <a:off x="5048250" y="1447800"/>
-          <a:ext cx="6496050" cy="4572000"/>
-        </p:xfrm>
-        <a:graphic>
-          <a:graphicData uri="http://schemas.openxmlformats.org/drawingml/2006/diagram">
-            <dgm:relIds xmlns:dgm="http://schemas.openxmlformats.org/drawingml/2006/diagram" xmlns:r="http://schemas.openxmlformats.org/officeDocument/2006/relationships" r:dm="rId2" r:lo="rId3" r:qs="rId4" r:cs="rId5"/>
-          </a:graphicData>
-        </a:graphic>
-      </p:graphicFrame>
-    </p:spTree>
-    <p:extLst>
-      <p:ext uri="{BB962C8B-B14F-4D97-AF65-F5344CB8AC3E}">
-        <p14:creationId xmlns:p14="http://schemas.microsoft.com/office/powerpoint/2010/main" val="2741470329"/>
-      </p:ext>
-    </p:extLst>
-  </p:cSld>
-  <p:clrMapOvr>
-    <a:masterClrMapping/>
   </p:clrMapOvr>
 </p:sld>
 </file>

</xml_diff>

<commit_message>
error in diagram fixed
</commit_message>
<xml_diff>
--- a/documents/presentation/presentation jit compiler.pptx
+++ b/documents/presentation/presentation jit compiler.pptx
@@ -141,7 +141,7 @@
 <file path=ppt/revisionInfo.xml><?xml version="1.0" encoding="utf-8"?>
 <p1510:revInfo xmlns:a="http://schemas.openxmlformats.org/drawingml/2006/main" xmlns:r="http://schemas.openxmlformats.org/officeDocument/2006/relationships" xmlns:p1510="http://schemas.microsoft.com/office/powerpoint/2015/10/main">
   <p1510:revLst>
-    <p1510:client id="{3BC882D7-0369-453F-A1BB-621FEF4F8646}" v="40" dt="2024-11-17T10:21:01.645"/>
+    <p1510:client id="{3BC882D7-0369-453F-A1BB-621FEF4F8646}" v="41" dt="2024-11-17T11:13:10.221"/>
   </p1510:revLst>
 </p1510:revInfo>
 </file>
@@ -151,7 +151,7 @@
   <pc:docChgLst>
     <pc:chgData name="Arauz Bonilla,Jorge J.U." userId="1bf2599c-1c01-48b4-bae8-52167a7d20f0" providerId="ADAL" clId="{3BC882D7-0369-453F-A1BB-621FEF4F8646}"/>
     <pc:docChg chg="undo custSel addSld delSld modSld sldOrd">
-      <pc:chgData name="Arauz Bonilla,Jorge J.U." userId="1bf2599c-1c01-48b4-bae8-52167a7d20f0" providerId="ADAL" clId="{3BC882D7-0369-453F-A1BB-621FEF4F8646}" dt="2024-11-17T10:21:01.640" v="2531"/>
+      <pc:chgData name="Arauz Bonilla,Jorge J.U." userId="1bf2599c-1c01-48b4-bae8-52167a7d20f0" providerId="ADAL" clId="{3BC882D7-0369-453F-A1BB-621FEF4F8646}" dt="2024-11-17T11:13:39.006" v="2556" actId="1076"/>
       <pc:docMkLst>
         <pc:docMk/>
       </pc:docMkLst>
@@ -999,7 +999,7 @@
         </pc:spChg>
       </pc:sldChg>
       <pc:sldChg chg="addSp delSp modSp new mod setBg">
-        <pc:chgData name="Arauz Bonilla,Jorge J.U." userId="1bf2599c-1c01-48b4-bae8-52167a7d20f0" providerId="ADAL" clId="{3BC882D7-0369-453F-A1BB-621FEF4F8646}" dt="2024-11-17T09:37:38.062" v="2159" actId="20577"/>
+        <pc:chgData name="Arauz Bonilla,Jorge J.U." userId="1bf2599c-1c01-48b4-bae8-52167a7d20f0" providerId="ADAL" clId="{3BC882D7-0369-453F-A1BB-621FEF4F8646}" dt="2024-11-17T11:13:39.006" v="2556" actId="1076"/>
         <pc:sldMkLst>
           <pc:docMk/>
           <pc:sldMk cId="3886250600" sldId="287"/>
@@ -1010,6 +1010,14 @@
             <pc:docMk/>
             <pc:sldMk cId="3886250600" sldId="287"/>
             <ac:spMk id="2" creationId="{96C9447C-3AE4-041D-5079-2314CC3315C8}"/>
+          </ac:spMkLst>
+        </pc:spChg>
+        <pc:spChg chg="add">
+          <ac:chgData name="Arauz Bonilla,Jorge J.U." userId="1bf2599c-1c01-48b4-bae8-52167a7d20f0" providerId="ADAL" clId="{3BC882D7-0369-453F-A1BB-621FEF4F8646}" dt="2024-11-17T11:13:02.298" v="2532" actId="11529"/>
+          <ac:spMkLst>
+            <pc:docMk/>
+            <pc:sldMk cId="3886250600" sldId="287"/>
+            <ac:spMk id="3" creationId="{5E375E48-AC6D-470E-5F84-3FD93ACE2B09}"/>
           </ac:spMkLst>
         </pc:spChg>
         <pc:spChg chg="del">
@@ -1026,6 +1034,22 @@
             <pc:docMk/>
             <pc:sldMk cId="3886250600" sldId="287"/>
             <ac:spMk id="4" creationId="{96B43384-CA1A-DECF-4A30-AAD25D9F0337}"/>
+          </ac:spMkLst>
+        </pc:spChg>
+        <pc:spChg chg="add mod">
+          <ac:chgData name="Arauz Bonilla,Jorge J.U." userId="1bf2599c-1c01-48b4-bae8-52167a7d20f0" providerId="ADAL" clId="{3BC882D7-0369-453F-A1BB-621FEF4F8646}" dt="2024-11-17T11:13:25.535" v="2554" actId="1076"/>
+          <ac:spMkLst>
+            <pc:docMk/>
+            <pc:sldMk cId="3886250600" sldId="287"/>
+            <ac:spMk id="5" creationId="{6BE869F5-D05F-E76E-D1AA-6053C2911EEE}"/>
+          </ac:spMkLst>
+        </pc:spChg>
+        <pc:spChg chg="add mod">
+          <ac:chgData name="Arauz Bonilla,Jorge J.U." userId="1bf2599c-1c01-48b4-bae8-52167a7d20f0" providerId="ADAL" clId="{3BC882D7-0369-453F-A1BB-621FEF4F8646}" dt="2024-11-17T11:13:39.006" v="2556" actId="1076"/>
+          <ac:spMkLst>
+            <pc:docMk/>
+            <pc:sldMk cId="3886250600" sldId="287"/>
+            <ac:spMk id="7" creationId="{4C7C95DD-1B3B-EF48-FDD2-7126EE7A4475}"/>
           </ac:spMkLst>
         </pc:spChg>
         <pc:spChg chg="add mod">
@@ -19435,6 +19459,138 @@
           </a:prstGeom>
         </p:spPr>
       </p:pic>
+      <p:sp>
+        <p:nvSpPr>
+          <p:cNvPr id="3" name="Oval 2">
+            <a:extLst>
+              <a:ext uri="{FF2B5EF4-FFF2-40B4-BE49-F238E27FC236}">
+                <a16:creationId xmlns:a16="http://schemas.microsoft.com/office/drawing/2014/main" id="{5E375E48-AC6D-470E-5F84-3FD93ACE2B09}"/>
+              </a:ext>
+            </a:extLst>
+          </p:cNvPr>
+          <p:cNvSpPr/>
+          <p:nvPr/>
+        </p:nvSpPr>
+        <p:spPr>
+          <a:xfrm>
+            <a:off x="7415784" y="5660136"/>
+            <a:ext cx="329184" cy="292608"/>
+          </a:xfrm>
+          <a:prstGeom prst="ellipse">
+            <a:avLst/>
+          </a:prstGeom>
+        </p:spPr>
+        <p:style>
+          <a:lnRef idx="2">
+            <a:schemeClr val="accent1">
+              <a:shade val="15000"/>
+            </a:schemeClr>
+          </a:lnRef>
+          <a:fillRef idx="1">
+            <a:schemeClr val="accent1"/>
+          </a:fillRef>
+          <a:effectRef idx="0">
+            <a:schemeClr val="accent1"/>
+          </a:effectRef>
+          <a:fontRef idx="minor">
+            <a:schemeClr val="lt1"/>
+          </a:fontRef>
+        </p:style>
+        <p:txBody>
+          <a:bodyPr rtlCol="0" anchor="ctr"/>
+          <a:lstStyle/>
+          <a:p>
+            <a:pPr algn="ctr"/>
+            <a:endParaRPr lang="en-NZ"/>
+          </a:p>
+        </p:txBody>
+      </p:sp>
+      <p:sp>
+        <p:nvSpPr>
+          <p:cNvPr id="5" name="TextBox 4">
+            <a:extLst>
+              <a:ext uri="{FF2B5EF4-FFF2-40B4-BE49-F238E27FC236}">
+                <a16:creationId xmlns:a16="http://schemas.microsoft.com/office/drawing/2014/main" id="{6BE869F5-D05F-E76E-D1AA-6053C2911EEE}"/>
+              </a:ext>
+            </a:extLst>
+          </p:cNvPr>
+          <p:cNvSpPr txBox="1"/>
+          <p:nvPr/>
+        </p:nvSpPr>
+        <p:spPr>
+          <a:xfrm>
+            <a:off x="1600200" y="5019563"/>
+            <a:ext cx="2467342" cy="369332"/>
+          </a:xfrm>
+          <a:prstGeom prst="rect">
+            <a:avLst/>
+          </a:prstGeom>
+          <a:noFill/>
+        </p:spPr>
+        <p:txBody>
+          <a:bodyPr wrap="none" rtlCol="0">
+            <a:spAutoFit/>
+          </a:bodyPr>
+          <a:lstStyle/>
+          <a:p>
+            <a:r>
+              <a:rPr lang="nl-NL" dirty="0"/>
+              <a:t>Machine </a:t>
+            </a:r>
+            <a:r>
+              <a:rPr lang="nl-NL" dirty="0" err="1"/>
+              <a:t>instructions</a:t>
+            </a:r>
+            <a:endParaRPr lang="en-NZ" dirty="0"/>
+          </a:p>
+        </p:txBody>
+      </p:sp>
+      <p:sp>
+        <p:nvSpPr>
+          <p:cNvPr id="7" name="Oval 6">
+            <a:extLst>
+              <a:ext uri="{FF2B5EF4-FFF2-40B4-BE49-F238E27FC236}">
+                <a16:creationId xmlns:a16="http://schemas.microsoft.com/office/drawing/2014/main" id="{4C7C95DD-1B3B-EF48-FDD2-7126EE7A4475}"/>
+              </a:ext>
+            </a:extLst>
+          </p:cNvPr>
+          <p:cNvSpPr/>
+          <p:nvPr/>
+        </p:nvSpPr>
+        <p:spPr>
+          <a:xfrm>
+            <a:off x="4067542" y="4993917"/>
+            <a:ext cx="429768" cy="420624"/>
+          </a:xfrm>
+          <a:prstGeom prst="ellipse">
+            <a:avLst/>
+          </a:prstGeom>
+        </p:spPr>
+        <p:style>
+          <a:lnRef idx="2">
+            <a:schemeClr val="accent1">
+              <a:shade val="15000"/>
+            </a:schemeClr>
+          </a:lnRef>
+          <a:fillRef idx="1">
+            <a:schemeClr val="accent1"/>
+          </a:fillRef>
+          <a:effectRef idx="0">
+            <a:schemeClr val="accent1"/>
+          </a:effectRef>
+          <a:fontRef idx="minor">
+            <a:schemeClr val="lt1"/>
+          </a:fontRef>
+        </p:style>
+        <p:txBody>
+          <a:bodyPr rtlCol="0" anchor="ctr"/>
+          <a:lstStyle/>
+          <a:p>
+            <a:pPr algn="ctr"/>
+            <a:endParaRPr lang="en-NZ"/>
+          </a:p>
+        </p:txBody>
+      </p:sp>
     </p:spTree>
     <p:extLst>
       <p:ext uri="{BB962C8B-B14F-4D97-AF65-F5344CB8AC3E}">

</xml_diff>